<commit_message>
Update license info and title
</commit_message>
<xml_diff>
--- a/singularity.pptx
+++ b/singularity.pptx
@@ -324,7 +324,7 @@
           <a:p>
             <a:fld id="{6BD974B4-F374-4E74-84D3-1EB7DBF32A2A}" type="datetimeFigureOut">
               <a:rPr lang="nl-BE" smtClean="0"/>
-              <a:t>2/09/2019</a:t>
+              <a:t>23/10/2019</a:t>
             </a:fld>
             <a:endParaRPr lang="nl-BE"/>
           </a:p>
@@ -807,7 +807,7 @@
           <a:p>
             <a:fld id="{A433E747-842D-4EF3-8202-AC54FEC33061}" type="datetime1">
               <a:rPr lang="nl-BE" smtClean="0"/>
-              <a:t>2/09/2019</a:t>
+              <a:t>23/10/2019</a:t>
             </a:fld>
             <a:endParaRPr lang="nl-BE"/>
           </a:p>
@@ -977,7 +977,7 @@
           <a:p>
             <a:fld id="{7C821354-3381-4DF5-ABED-FDAFA2BAD3F8}" type="datetime1">
               <a:rPr lang="nl-BE" smtClean="0"/>
-              <a:t>2/09/2019</a:t>
+              <a:t>23/10/2019</a:t>
             </a:fld>
             <a:endParaRPr lang="nl-BE"/>
           </a:p>
@@ -1157,7 +1157,7 @@
           <a:p>
             <a:fld id="{C6B54B95-9964-4BBF-B171-A69413AB9FC5}" type="datetime1">
               <a:rPr lang="nl-BE" smtClean="0"/>
-              <a:t>2/09/2019</a:t>
+              <a:t>23/10/2019</a:t>
             </a:fld>
             <a:endParaRPr lang="nl-BE"/>
           </a:p>
@@ -1327,7 +1327,7 @@
           <a:p>
             <a:fld id="{BE45CDE5-064C-4862-90E9-83B8FD778625}" type="datetime1">
               <a:rPr lang="nl-BE" smtClean="0"/>
-              <a:t>2/09/2019</a:t>
+              <a:t>23/10/2019</a:t>
             </a:fld>
             <a:endParaRPr lang="nl-BE"/>
           </a:p>
@@ -1571,7 +1571,7 @@
           <a:p>
             <a:fld id="{C75A345C-628E-463E-B8F7-69C25D344DF5}" type="datetime1">
               <a:rPr lang="nl-BE" smtClean="0"/>
-              <a:t>2/09/2019</a:t>
+              <a:t>23/10/2019</a:t>
             </a:fld>
             <a:endParaRPr lang="nl-BE"/>
           </a:p>
@@ -1803,7 +1803,7 @@
           <a:p>
             <a:fld id="{65B04534-538C-4249-A635-8BB2B8486464}" type="datetime1">
               <a:rPr lang="nl-BE" smtClean="0"/>
-              <a:t>2/09/2019</a:t>
+              <a:t>23/10/2019</a:t>
             </a:fld>
             <a:endParaRPr lang="nl-BE"/>
           </a:p>
@@ -2170,7 +2170,7 @@
           <a:p>
             <a:fld id="{089671CB-8547-4C91-A3D5-012E6E8790E6}" type="datetime1">
               <a:rPr lang="nl-BE" smtClean="0"/>
-              <a:t>2/09/2019</a:t>
+              <a:t>23/10/2019</a:t>
             </a:fld>
             <a:endParaRPr lang="nl-BE"/>
           </a:p>
@@ -2288,7 +2288,7 @@
           <a:p>
             <a:fld id="{5765335F-FC99-4A2B-B87B-6AF6F3762B67}" type="datetime1">
               <a:rPr lang="nl-BE" smtClean="0"/>
-              <a:t>2/09/2019</a:t>
+              <a:t>23/10/2019</a:t>
             </a:fld>
             <a:endParaRPr lang="nl-BE"/>
           </a:p>
@@ -2383,7 +2383,7 @@
           <a:p>
             <a:fld id="{1711BA58-B677-4D21-BDCD-9DD1AEA8A328}" type="datetime1">
               <a:rPr lang="nl-BE" smtClean="0"/>
-              <a:t>2/09/2019</a:t>
+              <a:t>23/10/2019</a:t>
             </a:fld>
             <a:endParaRPr lang="nl-BE"/>
           </a:p>
@@ -2660,7 +2660,7 @@
           <a:p>
             <a:fld id="{5513BE8B-B89C-461B-89D1-D5BE33ADB6B9}" type="datetime1">
               <a:rPr lang="nl-BE" smtClean="0"/>
-              <a:t>2/09/2019</a:t>
+              <a:t>23/10/2019</a:t>
             </a:fld>
             <a:endParaRPr lang="nl-BE"/>
           </a:p>
@@ -2917,7 +2917,7 @@
           <a:p>
             <a:fld id="{AEE65485-0554-4482-9B9C-289893A0B56B}" type="datetime1">
               <a:rPr lang="nl-BE" smtClean="0"/>
-              <a:t>2/09/2019</a:t>
+              <a:t>23/10/2019</a:t>
             </a:fld>
             <a:endParaRPr lang="nl-BE"/>
           </a:p>
@@ -3130,7 +3130,7 @@
           <a:p>
             <a:fld id="{6FF26CEC-AF8A-4096-9A53-521F7571A055}" type="datetime1">
               <a:rPr lang="nl-BE" smtClean="0"/>
-              <a:t>2/09/2019</a:t>
+              <a:t>23/10/2019</a:t>
             </a:fld>
             <a:endParaRPr lang="nl-BE"/>
           </a:p>
@@ -3553,7 +3553,7 @@
           <a:p>
             <a:r>
               <a:rPr lang="en-US" dirty="0" smtClean="0"/>
-              <a:t>The singularity is near!</a:t>
+              <a:t>Containers for HPC</a:t>
             </a:r>
             <a:endParaRPr lang="nl-BE" dirty="0"/>
           </a:p>
@@ -3601,59 +3601,6 @@
       </p:sp>
       <p:sp>
         <p:nvSpPr>
-          <p:cNvPr id="4" name="TextBox 3"/>
-          <p:cNvSpPr txBox="1"/>
-          <p:nvPr/>
-        </p:nvSpPr>
-        <p:spPr>
-          <a:xfrm>
-            <a:off x="1775204" y="5445224"/>
-            <a:ext cx="6869573" cy="646331"/>
-          </a:xfrm>
-          <a:prstGeom prst="rect">
-            <a:avLst/>
-          </a:prstGeom>
-          <a:noFill/>
-        </p:spPr>
-        <p:txBody>
-          <a:bodyPr wrap="none" rtlCol="0">
-            <a:spAutoFit/>
-          </a:bodyPr>
-          <a:lstStyle/>
-          <a:p>
-            <a:r>
-              <a:rPr lang="en-US" b="1" dirty="0" smtClean="0"/>
-              <a:t>License</a:t>
-            </a:r>
-            <a:r>
-              <a:rPr lang="en-US" dirty="0" smtClean="0"/>
-              <a:t>: this presentation is released under the Creative Commons, see</a:t>
-            </a:r>
-            <a:br>
-              <a:rPr lang="en-US" dirty="0" smtClean="0"/>
-            </a:br>
-            <a:r>
-              <a:rPr lang="nl-BE" dirty="0">
-                <a:hlinkClick r:id="rId3"/>
-              </a:rPr>
-              <a:t>http://creativecommons.org/publicdomain/zero/1.0</a:t>
-            </a:r>
-            <a:r>
-              <a:rPr lang="nl-BE" dirty="0" smtClean="0">
-                <a:hlinkClick r:id="rId3"/>
-              </a:rPr>
-              <a:t>/</a:t>
-            </a:r>
-            <a:r>
-              <a:rPr lang="nl-BE" dirty="0" smtClean="0"/>
-              <a:t> </a:t>
-            </a:r>
-            <a:endParaRPr lang="nl-BE" dirty="0"/>
-          </a:p>
-        </p:txBody>
-      </p:sp>
-      <p:sp>
-        <p:nvSpPr>
           <p:cNvPr id="5" name="Slide Number Placeholder 4"/>
           <p:cNvSpPr>
             <a:spLocks noGrp="1"/>
@@ -3672,6 +3619,59 @@
               <a:t>1</a:t>
             </a:fld>
             <a:endParaRPr lang="nl-BE"/>
+          </a:p>
+        </p:txBody>
+      </p:sp>
+      <p:sp>
+        <p:nvSpPr>
+          <p:cNvPr id="6" name="TextBox 5"/>
+          <p:cNvSpPr txBox="1"/>
+          <p:nvPr/>
+        </p:nvSpPr>
+        <p:spPr>
+          <a:xfrm>
+            <a:off x="892204" y="6009448"/>
+            <a:ext cx="7424212" cy="646331"/>
+          </a:xfrm>
+          <a:prstGeom prst="rect">
+            <a:avLst/>
+          </a:prstGeom>
+          <a:noFill/>
+        </p:spPr>
+        <p:txBody>
+          <a:bodyPr wrap="none" rtlCol="0">
+            <a:spAutoFit/>
+          </a:bodyPr>
+          <a:lstStyle/>
+          <a:p>
+            <a:r>
+              <a:rPr lang="en-US" b="1" dirty="0" smtClean="0"/>
+              <a:t>License</a:t>
+            </a:r>
+            <a:r>
+              <a:rPr lang="en-US" dirty="0" smtClean="0"/>
+              <a:t>: this presentation is released under the Creative Commons CC BY 4.0,</a:t>
+            </a:r>
+            <a:br>
+              <a:rPr lang="en-US" dirty="0" smtClean="0"/>
+            </a:br>
+            <a:r>
+              <a:rPr lang="en-US" dirty="0" smtClean="0"/>
+              <a:t>see </a:t>
+            </a:r>
+            <a:r>
+              <a:rPr lang="en-US" dirty="0" smtClean="0">
+                <a:hlinkClick r:id="rId3"/>
+              </a:rPr>
+              <a:t>https</a:t>
+            </a:r>
+            <a:r>
+              <a:rPr lang="en-US" dirty="0">
+                <a:hlinkClick r:id="rId3"/>
+              </a:rPr>
+              <a:t>://creativecommons.org/licenses/by/4.0/deed.ast</a:t>
+            </a:r>
+            <a:endParaRPr lang="nl-BE" dirty="0"/>
           </a:p>
         </p:txBody>
       </p:sp>
@@ -9572,17 +9572,7 @@
                 <a:latin typeface="Courier New" panose="02070309020205020404" pitchFamily="49" charset="0"/>
                 <a:cs typeface="Courier New" panose="02070309020205020404" pitchFamily="49" charset="0"/>
               </a:rPr>
-              <a:t>$ </a:t>
-            </a:r>
-            <a:r>
-              <a:rPr lang="en-US" b="1" dirty="0" smtClean="0">
-                <a:solidFill>
-                  <a:schemeClr val="bg1"/>
-                </a:solidFill>
-                <a:latin typeface="Courier New" panose="02070309020205020404" pitchFamily="49" charset="0"/>
-                <a:cs typeface="Courier New" panose="02070309020205020404" pitchFamily="49" charset="0"/>
-              </a:rPr>
-              <a:t>singularity build  -remote  </a:t>
+              <a:t>$ singularity build  -remote  </a:t>
             </a:r>
             <a:r>
               <a:rPr lang="en-US" b="1" dirty="0" err="1" smtClean="0">

</xml_diff>

<commit_message>
Update link to Singularity web site
</commit_message>
<xml_diff>
--- a/singularity.pptx
+++ b/singularity.pptx
@@ -14268,11 +14268,27 @@
           <a:p>
             <a:r>
               <a:rPr lang="en-US" dirty="0" smtClean="0"/>
-              <a:t>Singularity developed </a:t>
+              <a:t>Singularity originally </a:t>
+            </a:r>
+            <a:r>
+              <a:rPr lang="en-US" dirty="0" smtClean="0"/>
+              <a:t>developed </a:t>
             </a:r>
             <a:r>
               <a:rPr lang="en-US" dirty="0"/>
-              <a:t>by Berkeley Lab</a:t>
+              <a:t>by Berkeley </a:t>
+            </a:r>
+            <a:r>
+              <a:rPr lang="en-US" dirty="0" smtClean="0"/>
+              <a:t>Lab, now at </a:t>
+            </a:r>
+            <a:r>
+              <a:rPr lang="en-US" dirty="0" err="1" smtClean="0"/>
+              <a:t>Sylabs</a:t>
+            </a:r>
+            <a:r>
+              <a:rPr lang="en-US" dirty="0"/>
+              <a:t/>
             </a:r>
             <a:br>
               <a:rPr lang="en-US" dirty="0"/>
@@ -14281,18 +14297,9 @@
               <a:rPr lang="en-US" dirty="0">
                 <a:hlinkClick r:id="rId2"/>
               </a:rPr>
-              <a:t>http://singularity.lbl.gov</a:t>
-            </a:r>
-            <a:r>
-              <a:rPr lang="en-US" dirty="0" smtClean="0">
-                <a:hlinkClick r:id="rId2"/>
-              </a:rPr>
-              <a:t>/</a:t>
-            </a:r>
-            <a:r>
-              <a:rPr lang="en-US" dirty="0" smtClean="0"/>
-              <a:t> </a:t>
-            </a:r>
+              <a:t>https://sylabs.io/singularity/</a:t>
+            </a:r>
+            <a:endParaRPr lang="en-US" dirty="0" smtClean="0"/>
           </a:p>
           <a:p>
             <a:r>

</xml_diff>

<commit_message>
Add section on hpccm
</commit_message>
<xml_diff>
--- a/singularity.pptx
+++ b/singularity.pptx
@@ -5,7 +5,7 @@
     <p:sldMasterId id="2147483660" r:id="rId1"/>
   </p:sldMasterIdLst>
   <p:notesMasterIdLst>
-    <p:notesMasterId r:id="rId47"/>
+    <p:notesMasterId r:id="rId50"/>
   </p:notesMasterIdLst>
   <p:sldIdLst>
     <p:sldId id="256" r:id="rId2"/>
@@ -29,30 +29,33 @@
     <p:sldId id="268" r:id="rId20"/>
     <p:sldId id="302" r:id="rId21"/>
     <p:sldId id="292" r:id="rId22"/>
-    <p:sldId id="275" r:id="rId23"/>
-    <p:sldId id="269" r:id="rId24"/>
-    <p:sldId id="278" r:id="rId25"/>
-    <p:sldId id="271" r:id="rId26"/>
-    <p:sldId id="289" r:id="rId27"/>
-    <p:sldId id="282" r:id="rId28"/>
-    <p:sldId id="283" r:id="rId29"/>
-    <p:sldId id="284" r:id="rId30"/>
-    <p:sldId id="279" r:id="rId31"/>
-    <p:sldId id="280" r:id="rId32"/>
-    <p:sldId id="281" r:id="rId33"/>
-    <p:sldId id="296" r:id="rId34"/>
-    <p:sldId id="297" r:id="rId35"/>
-    <p:sldId id="298" r:id="rId36"/>
-    <p:sldId id="299" r:id="rId37"/>
-    <p:sldId id="300" r:id="rId38"/>
-    <p:sldId id="285" r:id="rId39"/>
-    <p:sldId id="286" r:id="rId40"/>
-    <p:sldId id="287" r:id="rId41"/>
-    <p:sldId id="272" r:id="rId42"/>
-    <p:sldId id="276" r:id="rId43"/>
-    <p:sldId id="270" r:id="rId44"/>
-    <p:sldId id="277" r:id="rId45"/>
-    <p:sldId id="291" r:id="rId46"/>
+    <p:sldId id="304" r:id="rId23"/>
+    <p:sldId id="305" r:id="rId24"/>
+    <p:sldId id="306" r:id="rId25"/>
+    <p:sldId id="275" r:id="rId26"/>
+    <p:sldId id="269" r:id="rId27"/>
+    <p:sldId id="278" r:id="rId28"/>
+    <p:sldId id="271" r:id="rId29"/>
+    <p:sldId id="289" r:id="rId30"/>
+    <p:sldId id="282" r:id="rId31"/>
+    <p:sldId id="283" r:id="rId32"/>
+    <p:sldId id="284" r:id="rId33"/>
+    <p:sldId id="279" r:id="rId34"/>
+    <p:sldId id="280" r:id="rId35"/>
+    <p:sldId id="281" r:id="rId36"/>
+    <p:sldId id="296" r:id="rId37"/>
+    <p:sldId id="297" r:id="rId38"/>
+    <p:sldId id="298" r:id="rId39"/>
+    <p:sldId id="299" r:id="rId40"/>
+    <p:sldId id="300" r:id="rId41"/>
+    <p:sldId id="285" r:id="rId42"/>
+    <p:sldId id="286" r:id="rId43"/>
+    <p:sldId id="287" r:id="rId44"/>
+    <p:sldId id="272" r:id="rId45"/>
+    <p:sldId id="276" r:id="rId46"/>
+    <p:sldId id="270" r:id="rId47"/>
+    <p:sldId id="277" r:id="rId48"/>
+    <p:sldId id="291" r:id="rId49"/>
   </p:sldIdLst>
   <p:sldSz cx="9144000" cy="6858000" type="screen4x3"/>
   <p:notesSz cx="6858000" cy="9144000"/>
@@ -187,6 +190,13 @@
             <p14:sldId id="292"/>
           </p14:sldIdLst>
         </p14:section>
+        <p14:section name="hpccm" id="{9C5C937C-51EB-4384-8F29-6695FB3A3960}">
+          <p14:sldIdLst>
+            <p14:sldId id="304"/>
+            <p14:sldId id="305"/>
+            <p14:sldId id="306"/>
+          </p14:sldIdLst>
+        </p14:section>
         <p14:section name="Using images" id="{5E20A28C-20F0-4BB4-B4EF-5C50D078FC9E}">
           <p14:sldIdLst>
             <p14:sldId id="275"/>
@@ -326,7 +336,7 @@
           <a:p>
             <a:fld id="{6BD974B4-F374-4E74-84D3-1EB7DBF32A2A}" type="datetimeFigureOut">
               <a:rPr lang="nl-BE" smtClean="0"/>
-              <a:t>15/11/2020</a:t>
+              <a:t>16/11/2020</a:t>
             </a:fld>
             <a:endParaRPr lang="nl-BE"/>
           </a:p>
@@ -809,7 +819,7 @@
           <a:p>
             <a:fld id="{A433E747-842D-4EF3-8202-AC54FEC33061}" type="datetime1">
               <a:rPr lang="nl-BE" smtClean="0"/>
-              <a:t>15/11/2020</a:t>
+              <a:t>16/11/2020</a:t>
             </a:fld>
             <a:endParaRPr lang="nl-BE"/>
           </a:p>
@@ -979,7 +989,7 @@
           <a:p>
             <a:fld id="{7C821354-3381-4DF5-ABED-FDAFA2BAD3F8}" type="datetime1">
               <a:rPr lang="nl-BE" smtClean="0"/>
-              <a:t>15/11/2020</a:t>
+              <a:t>16/11/2020</a:t>
             </a:fld>
             <a:endParaRPr lang="nl-BE"/>
           </a:p>
@@ -1159,7 +1169,7 @@
           <a:p>
             <a:fld id="{C6B54B95-9964-4BBF-B171-A69413AB9FC5}" type="datetime1">
               <a:rPr lang="nl-BE" smtClean="0"/>
-              <a:t>15/11/2020</a:t>
+              <a:t>16/11/2020</a:t>
             </a:fld>
             <a:endParaRPr lang="nl-BE"/>
           </a:p>
@@ -1329,7 +1339,7 @@
           <a:p>
             <a:fld id="{BE45CDE5-064C-4862-90E9-83B8FD778625}" type="datetime1">
               <a:rPr lang="nl-BE" smtClean="0"/>
-              <a:t>15/11/2020</a:t>
+              <a:t>16/11/2020</a:t>
             </a:fld>
             <a:endParaRPr lang="nl-BE"/>
           </a:p>
@@ -1573,7 +1583,7 @@
           <a:p>
             <a:fld id="{C75A345C-628E-463E-B8F7-69C25D344DF5}" type="datetime1">
               <a:rPr lang="nl-BE" smtClean="0"/>
-              <a:t>15/11/2020</a:t>
+              <a:t>16/11/2020</a:t>
             </a:fld>
             <a:endParaRPr lang="nl-BE"/>
           </a:p>
@@ -1805,7 +1815,7 @@
           <a:p>
             <a:fld id="{65B04534-538C-4249-A635-8BB2B8486464}" type="datetime1">
               <a:rPr lang="nl-BE" smtClean="0"/>
-              <a:t>15/11/2020</a:t>
+              <a:t>16/11/2020</a:t>
             </a:fld>
             <a:endParaRPr lang="nl-BE"/>
           </a:p>
@@ -2172,7 +2182,7 @@
           <a:p>
             <a:fld id="{089671CB-8547-4C91-A3D5-012E6E8790E6}" type="datetime1">
               <a:rPr lang="nl-BE" smtClean="0"/>
-              <a:t>15/11/2020</a:t>
+              <a:t>16/11/2020</a:t>
             </a:fld>
             <a:endParaRPr lang="nl-BE"/>
           </a:p>
@@ -2290,7 +2300,7 @@
           <a:p>
             <a:fld id="{5765335F-FC99-4A2B-B87B-6AF6F3762B67}" type="datetime1">
               <a:rPr lang="nl-BE" smtClean="0"/>
-              <a:t>15/11/2020</a:t>
+              <a:t>16/11/2020</a:t>
             </a:fld>
             <a:endParaRPr lang="nl-BE"/>
           </a:p>
@@ -2385,7 +2395,7 @@
           <a:p>
             <a:fld id="{1711BA58-B677-4D21-BDCD-9DD1AEA8A328}" type="datetime1">
               <a:rPr lang="nl-BE" smtClean="0"/>
-              <a:t>15/11/2020</a:t>
+              <a:t>16/11/2020</a:t>
             </a:fld>
             <a:endParaRPr lang="nl-BE"/>
           </a:p>
@@ -2662,7 +2672,7 @@
           <a:p>
             <a:fld id="{5513BE8B-B89C-461B-89D1-D5BE33ADB6B9}" type="datetime1">
               <a:rPr lang="nl-BE" smtClean="0"/>
-              <a:t>15/11/2020</a:t>
+              <a:t>16/11/2020</a:t>
             </a:fld>
             <a:endParaRPr lang="nl-BE"/>
           </a:p>
@@ -2919,7 +2929,7 @@
           <a:p>
             <a:fld id="{AEE65485-0554-4482-9B9C-289893A0B56B}" type="datetime1">
               <a:rPr lang="nl-BE" smtClean="0"/>
-              <a:t>15/11/2020</a:t>
+              <a:t>16/11/2020</a:t>
             </a:fld>
             <a:endParaRPr lang="nl-BE"/>
           </a:p>
@@ -3132,7 +3142,7 @@
           <a:p>
             <a:fld id="{6FF26CEC-AF8A-4096-9A53-521F7571A055}" type="datetime1">
               <a:rPr lang="nl-BE" smtClean="0"/>
-              <a:t>15/11/2020</a:t>
+              <a:t>16/11/2020</a:t>
             </a:fld>
             <a:endParaRPr lang="nl-BE"/>
           </a:p>
@@ -3760,7 +3770,7 @@
             <a:pPr lvl="1"/>
             <a:r>
               <a:rPr lang="en-US" dirty="0"/>
-              <a:t>disco: 19.04, bionic: 18.04, </a:t>
+              <a:t>focal: 20.04, bionic: 18.04, </a:t>
             </a:r>
             <a:r>
               <a:rPr lang="en-US" dirty="0" err="1"/>
@@ -3856,7 +3866,7 @@
                 <a:latin typeface="Courier New" panose="02070309020205020404" pitchFamily="49" charset="0"/>
                 <a:cs typeface="Courier New" panose="02070309020205020404" pitchFamily="49" charset="0"/>
               </a:rPr>
-              <a:t>xenial</a:t>
+              <a:t>focal</a:t>
             </a:r>
             <a:endParaRPr lang="nl-BE" dirty="0">
               <a:latin typeface="Courier New" panose="02070309020205020404" pitchFamily="49" charset="0"/>
@@ -3889,7 +3899,7 @@
         </p:nvSpPr>
         <p:spPr>
           <a:xfrm>
-            <a:off x="277586" y="4465868"/>
+            <a:off x="277586" y="4473823"/>
             <a:ext cx="8456161" cy="1200329"/>
           </a:xfrm>
           <a:prstGeom prst="rect">
@@ -10857,7 +10867,13 @@
       </p:grpSpPr>
       <p:sp>
         <p:nvSpPr>
-          <p:cNvPr id="2" name="Title 1"/>
+          <p:cNvPr id="2" name="Title 1">
+            <a:extLst>
+              <a:ext uri="{FF2B5EF4-FFF2-40B4-BE49-F238E27FC236}">
+                <a16:creationId xmlns:a16="http://schemas.microsoft.com/office/drawing/2014/main" id="{ACBA0E89-FFC0-4845-BDDE-D796834FDB8A}"/>
+              </a:ext>
+            </a:extLst>
+          </p:cNvPr>
           <p:cNvSpPr>
             <a:spLocks noGrp="1"/>
           </p:cNvSpPr>
@@ -10872,20 +10888,26 @@
           <a:p>
             <a:r>
               <a:rPr lang="en-US" dirty="0"/>
-              <a:t>Using images</a:t>
-            </a:r>
-            <a:endParaRPr lang="nl-BE" dirty="0"/>
+              <a:t>And one more thing…</a:t>
+            </a:r>
+            <a:endParaRPr lang="en-BE" dirty="0"/>
           </a:p>
         </p:txBody>
       </p:sp>
       <p:sp>
         <p:nvSpPr>
-          <p:cNvPr id="3" name="Text Placeholder 2"/>
+          <p:cNvPr id="4" name="Content Placeholder 3">
+            <a:extLst>
+              <a:ext uri="{FF2B5EF4-FFF2-40B4-BE49-F238E27FC236}">
+                <a16:creationId xmlns:a16="http://schemas.microsoft.com/office/drawing/2014/main" id="{B874A562-79AA-40F3-BE3F-7E563916FE03}"/>
+              </a:ext>
+            </a:extLst>
+          </p:cNvPr>
           <p:cNvSpPr>
             <a:spLocks noGrp="1"/>
           </p:cNvSpPr>
           <p:nvPr>
-            <p:ph type="body" idx="1"/>
+            <p:ph idx="1"/>
           </p:nvPr>
         </p:nvSpPr>
         <p:spPr/>
@@ -10893,13 +10915,83 @@
           <a:bodyPr/>
           <a:lstStyle/>
           <a:p>
-            <a:endParaRPr lang="nl-BE"/>
+            <a:r>
+              <a:rPr lang="en-US" dirty="0" err="1"/>
+              <a:t>hpccm</a:t>
+            </a:r>
+            <a:r>
+              <a:rPr lang="en-US" dirty="0"/>
+              <a:t> (HPC Container Maker)</a:t>
+            </a:r>
+          </a:p>
+          <a:p>
+            <a:pPr lvl="1"/>
+            <a:r>
+              <a:rPr lang="en-US" dirty="0"/>
+              <a:t>NIVIDIA open source project</a:t>
+            </a:r>
+            <a:br>
+              <a:rPr lang="en-US" dirty="0"/>
+            </a:br>
+            <a:r>
+              <a:rPr lang="en-US" dirty="0">
+                <a:hlinkClick r:id="rId2"/>
+              </a:rPr>
+              <a:t>https://github.com/NVIDIA/hpc-container-maker</a:t>
+            </a:r>
+            <a:r>
+              <a:rPr lang="en-US" dirty="0"/>
+              <a:t> </a:t>
+            </a:r>
+          </a:p>
+          <a:p>
+            <a:pPr lvl="1"/>
+            <a:r>
+              <a:rPr lang="en-US" dirty="0"/>
+              <a:t>Python script defines container</a:t>
+            </a:r>
+          </a:p>
+          <a:p>
+            <a:pPr lvl="1"/>
+            <a:r>
+              <a:rPr lang="en-US" dirty="0"/>
+              <a:t>Translated to</a:t>
+            </a:r>
+          </a:p>
+          <a:p>
+            <a:pPr lvl="2"/>
+            <a:r>
+              <a:rPr lang="en-US" dirty="0" err="1"/>
+              <a:t>Dockerfile</a:t>
+            </a:r>
+            <a:endParaRPr lang="en-US" dirty="0"/>
+          </a:p>
+          <a:p>
+            <a:pPr lvl="2"/>
+            <a:r>
+              <a:rPr lang="en-US" dirty="0"/>
+              <a:t>Singularity recipe</a:t>
+            </a:r>
+          </a:p>
+          <a:p>
+            <a:pPr lvl="2"/>
+            <a:r>
+              <a:rPr lang="en-US" dirty="0"/>
+              <a:t>Bash install script</a:t>
+            </a:r>
+            <a:endParaRPr lang="en-BE" dirty="0"/>
           </a:p>
         </p:txBody>
       </p:sp>
       <p:sp>
         <p:nvSpPr>
-          <p:cNvPr id="4" name="Slide Number Placeholder 3"/>
+          <p:cNvPr id="3" name="Slide Number Placeholder 2">
+            <a:extLst>
+              <a:ext uri="{FF2B5EF4-FFF2-40B4-BE49-F238E27FC236}">
+                <a16:creationId xmlns:a16="http://schemas.microsoft.com/office/drawing/2014/main" id="{003C4797-6577-4CD5-A1FC-E39FB8C24121}"/>
+              </a:ext>
+            </a:extLst>
+          </p:cNvPr>
           <p:cNvSpPr>
             <a:spLocks noGrp="1"/>
           </p:cNvSpPr>
@@ -10920,20 +11012,2259 @@
           </a:p>
         </p:txBody>
       </p:sp>
+      <p:sp>
+        <p:nvSpPr>
+          <p:cNvPr id="5" name="TextBox 4">
+            <a:extLst>
+              <a:ext uri="{FF2B5EF4-FFF2-40B4-BE49-F238E27FC236}">
+                <a16:creationId xmlns:a16="http://schemas.microsoft.com/office/drawing/2014/main" id="{16D32B20-84CE-4BC6-95AD-8F2F6E921673}"/>
+              </a:ext>
+            </a:extLst>
+          </p:cNvPr>
+          <p:cNvSpPr txBox="1"/>
+          <p:nvPr/>
+        </p:nvSpPr>
+        <p:spPr>
+          <a:xfrm>
+            <a:off x="2171204" y="5287618"/>
+            <a:ext cx="4484882" cy="461665"/>
+          </a:xfrm>
+          <a:prstGeom prst="rect">
+            <a:avLst/>
+          </a:prstGeom>
+          <a:noFill/>
+          <a:ln>
+            <a:solidFill>
+              <a:schemeClr val="tx1"/>
+            </a:solidFill>
+          </a:ln>
+        </p:spPr>
+        <p:txBody>
+          <a:bodyPr wrap="none" rtlCol="0">
+            <a:spAutoFit/>
+          </a:bodyPr>
+          <a:lstStyle/>
+          <a:p>
+            <a:r>
+              <a:rPr lang="en-US" sz="2400" dirty="0"/>
+              <a:t>High-level description of container</a:t>
+            </a:r>
+            <a:endParaRPr lang="en-BE" sz="2400" dirty="0"/>
+          </a:p>
+        </p:txBody>
+      </p:sp>
     </p:spTree>
     <p:extLst>
       <p:ext uri="{BB962C8B-B14F-4D97-AF65-F5344CB8AC3E}">
-        <p14:creationId xmlns:p14="http://schemas.microsoft.com/office/powerpoint/2010/main" val="276782416"/>
+        <p14:creationId xmlns:p14="http://schemas.microsoft.com/office/powerpoint/2010/main" val="3896012899"/>
       </p:ext>
     </p:extLst>
   </p:cSld>
   <p:clrMapOvr>
     <a:masterClrMapping/>
   </p:clrMapOvr>
+  <p:timing>
+    <p:tnLst>
+      <p:par>
+        <p:cTn id="1" dur="indefinite" restart="never" nodeType="tmRoot">
+          <p:childTnLst>
+            <p:seq concurrent="1" nextAc="seek">
+              <p:cTn id="2" dur="indefinite" nodeType="mainSeq">
+                <p:childTnLst>
+                  <p:par>
+                    <p:cTn id="3" fill="hold">
+                      <p:stCondLst>
+                        <p:cond delay="indefinite"/>
+                        <p:cond evt="onBegin" delay="0">
+                          <p:tn val="2"/>
+                        </p:cond>
+                      </p:stCondLst>
+                      <p:childTnLst>
+                        <p:par>
+                          <p:cTn id="4" fill="hold">
+                            <p:stCondLst>
+                              <p:cond delay="0"/>
+                            </p:stCondLst>
+                            <p:childTnLst>
+                              <p:par>
+                                <p:cTn id="5" presetID="1" presetClass="entr" presetSubtype="0" fill="hold" grpId="0" nodeType="withEffect">
+                                  <p:stCondLst>
+                                    <p:cond delay="0"/>
+                                  </p:stCondLst>
+                                  <p:childTnLst>
+                                    <p:set>
+                                      <p:cBhvr>
+                                        <p:cTn id="6" dur="1" fill="hold">
+                                          <p:stCondLst>
+                                            <p:cond delay="0"/>
+                                          </p:stCondLst>
+                                        </p:cTn>
+                                        <p:tgtEl>
+                                          <p:spTgt spid="4">
+                                            <p:txEl>
+                                              <p:pRg st="0" end="0"/>
+                                            </p:txEl>
+                                          </p:spTgt>
+                                        </p:tgtEl>
+                                        <p:attrNameLst>
+                                          <p:attrName>style.visibility</p:attrName>
+                                        </p:attrNameLst>
+                                      </p:cBhvr>
+                                      <p:to>
+                                        <p:strVal val="visible"/>
+                                      </p:to>
+                                    </p:set>
+                                  </p:childTnLst>
+                                </p:cTn>
+                              </p:par>
+                            </p:childTnLst>
+                          </p:cTn>
+                        </p:par>
+                      </p:childTnLst>
+                    </p:cTn>
+                  </p:par>
+                  <p:par>
+                    <p:cTn id="7" fill="hold">
+                      <p:stCondLst>
+                        <p:cond delay="indefinite"/>
+                      </p:stCondLst>
+                      <p:childTnLst>
+                        <p:par>
+                          <p:cTn id="8" fill="hold">
+                            <p:stCondLst>
+                              <p:cond delay="0"/>
+                            </p:stCondLst>
+                            <p:childTnLst>
+                              <p:par>
+                                <p:cTn id="9" presetID="1" presetClass="entr" presetSubtype="0" fill="hold" grpId="0" nodeType="clickEffect">
+                                  <p:stCondLst>
+                                    <p:cond delay="0"/>
+                                  </p:stCondLst>
+                                  <p:childTnLst>
+                                    <p:set>
+                                      <p:cBhvr>
+                                        <p:cTn id="10" dur="1" fill="hold">
+                                          <p:stCondLst>
+                                            <p:cond delay="0"/>
+                                          </p:stCondLst>
+                                        </p:cTn>
+                                        <p:tgtEl>
+                                          <p:spTgt spid="4">
+                                            <p:txEl>
+                                              <p:pRg st="1" end="1"/>
+                                            </p:txEl>
+                                          </p:spTgt>
+                                        </p:tgtEl>
+                                        <p:attrNameLst>
+                                          <p:attrName>style.visibility</p:attrName>
+                                        </p:attrNameLst>
+                                      </p:cBhvr>
+                                      <p:to>
+                                        <p:strVal val="visible"/>
+                                      </p:to>
+                                    </p:set>
+                                  </p:childTnLst>
+                                </p:cTn>
+                              </p:par>
+                            </p:childTnLst>
+                          </p:cTn>
+                        </p:par>
+                      </p:childTnLst>
+                    </p:cTn>
+                  </p:par>
+                  <p:par>
+                    <p:cTn id="11" fill="hold">
+                      <p:stCondLst>
+                        <p:cond delay="indefinite"/>
+                      </p:stCondLst>
+                      <p:childTnLst>
+                        <p:par>
+                          <p:cTn id="12" fill="hold">
+                            <p:stCondLst>
+                              <p:cond delay="0"/>
+                            </p:stCondLst>
+                            <p:childTnLst>
+                              <p:par>
+                                <p:cTn id="13" presetID="1" presetClass="entr" presetSubtype="0" fill="hold" grpId="0" nodeType="clickEffect">
+                                  <p:stCondLst>
+                                    <p:cond delay="0"/>
+                                  </p:stCondLst>
+                                  <p:childTnLst>
+                                    <p:set>
+                                      <p:cBhvr>
+                                        <p:cTn id="14" dur="1" fill="hold">
+                                          <p:stCondLst>
+                                            <p:cond delay="0"/>
+                                          </p:stCondLst>
+                                        </p:cTn>
+                                        <p:tgtEl>
+                                          <p:spTgt spid="4">
+                                            <p:txEl>
+                                              <p:pRg st="2" end="2"/>
+                                            </p:txEl>
+                                          </p:spTgt>
+                                        </p:tgtEl>
+                                        <p:attrNameLst>
+                                          <p:attrName>style.visibility</p:attrName>
+                                        </p:attrNameLst>
+                                      </p:cBhvr>
+                                      <p:to>
+                                        <p:strVal val="visible"/>
+                                      </p:to>
+                                    </p:set>
+                                  </p:childTnLst>
+                                </p:cTn>
+                              </p:par>
+                            </p:childTnLst>
+                          </p:cTn>
+                        </p:par>
+                      </p:childTnLst>
+                    </p:cTn>
+                  </p:par>
+                  <p:par>
+                    <p:cTn id="15" fill="hold">
+                      <p:stCondLst>
+                        <p:cond delay="indefinite"/>
+                      </p:stCondLst>
+                      <p:childTnLst>
+                        <p:par>
+                          <p:cTn id="16" fill="hold">
+                            <p:stCondLst>
+                              <p:cond delay="0"/>
+                            </p:stCondLst>
+                            <p:childTnLst>
+                              <p:par>
+                                <p:cTn id="17" presetID="1" presetClass="entr" presetSubtype="0" fill="hold" grpId="0" nodeType="clickEffect">
+                                  <p:stCondLst>
+                                    <p:cond delay="0"/>
+                                  </p:stCondLst>
+                                  <p:childTnLst>
+                                    <p:set>
+                                      <p:cBhvr>
+                                        <p:cTn id="18" dur="1" fill="hold">
+                                          <p:stCondLst>
+                                            <p:cond delay="0"/>
+                                          </p:stCondLst>
+                                        </p:cTn>
+                                        <p:tgtEl>
+                                          <p:spTgt spid="4">
+                                            <p:txEl>
+                                              <p:pRg st="3" end="3"/>
+                                            </p:txEl>
+                                          </p:spTgt>
+                                        </p:tgtEl>
+                                        <p:attrNameLst>
+                                          <p:attrName>style.visibility</p:attrName>
+                                        </p:attrNameLst>
+                                      </p:cBhvr>
+                                      <p:to>
+                                        <p:strVal val="visible"/>
+                                      </p:to>
+                                    </p:set>
+                                  </p:childTnLst>
+                                </p:cTn>
+                              </p:par>
+                              <p:par>
+                                <p:cTn id="19" presetID="1" presetClass="entr" presetSubtype="0" fill="hold" grpId="0" nodeType="withEffect">
+                                  <p:stCondLst>
+                                    <p:cond delay="0"/>
+                                  </p:stCondLst>
+                                  <p:childTnLst>
+                                    <p:set>
+                                      <p:cBhvr>
+                                        <p:cTn id="20" dur="1" fill="hold">
+                                          <p:stCondLst>
+                                            <p:cond delay="0"/>
+                                          </p:stCondLst>
+                                        </p:cTn>
+                                        <p:tgtEl>
+                                          <p:spTgt spid="4">
+                                            <p:txEl>
+                                              <p:pRg st="4" end="4"/>
+                                            </p:txEl>
+                                          </p:spTgt>
+                                        </p:tgtEl>
+                                        <p:attrNameLst>
+                                          <p:attrName>style.visibility</p:attrName>
+                                        </p:attrNameLst>
+                                      </p:cBhvr>
+                                      <p:to>
+                                        <p:strVal val="visible"/>
+                                      </p:to>
+                                    </p:set>
+                                  </p:childTnLst>
+                                </p:cTn>
+                              </p:par>
+                              <p:par>
+                                <p:cTn id="21" presetID="1" presetClass="entr" presetSubtype="0" fill="hold" grpId="0" nodeType="withEffect">
+                                  <p:stCondLst>
+                                    <p:cond delay="0"/>
+                                  </p:stCondLst>
+                                  <p:childTnLst>
+                                    <p:set>
+                                      <p:cBhvr>
+                                        <p:cTn id="22" dur="1" fill="hold">
+                                          <p:stCondLst>
+                                            <p:cond delay="0"/>
+                                          </p:stCondLst>
+                                        </p:cTn>
+                                        <p:tgtEl>
+                                          <p:spTgt spid="4">
+                                            <p:txEl>
+                                              <p:pRg st="5" end="5"/>
+                                            </p:txEl>
+                                          </p:spTgt>
+                                        </p:tgtEl>
+                                        <p:attrNameLst>
+                                          <p:attrName>style.visibility</p:attrName>
+                                        </p:attrNameLst>
+                                      </p:cBhvr>
+                                      <p:to>
+                                        <p:strVal val="visible"/>
+                                      </p:to>
+                                    </p:set>
+                                  </p:childTnLst>
+                                </p:cTn>
+                              </p:par>
+                              <p:par>
+                                <p:cTn id="23" presetID="1" presetClass="entr" presetSubtype="0" fill="hold" grpId="0" nodeType="withEffect">
+                                  <p:stCondLst>
+                                    <p:cond delay="0"/>
+                                  </p:stCondLst>
+                                  <p:childTnLst>
+                                    <p:set>
+                                      <p:cBhvr>
+                                        <p:cTn id="24" dur="1" fill="hold">
+                                          <p:stCondLst>
+                                            <p:cond delay="0"/>
+                                          </p:stCondLst>
+                                        </p:cTn>
+                                        <p:tgtEl>
+                                          <p:spTgt spid="4">
+                                            <p:txEl>
+                                              <p:pRg st="6" end="6"/>
+                                            </p:txEl>
+                                          </p:spTgt>
+                                        </p:tgtEl>
+                                        <p:attrNameLst>
+                                          <p:attrName>style.visibility</p:attrName>
+                                        </p:attrNameLst>
+                                      </p:cBhvr>
+                                      <p:to>
+                                        <p:strVal val="visible"/>
+                                      </p:to>
+                                    </p:set>
+                                  </p:childTnLst>
+                                </p:cTn>
+                              </p:par>
+                            </p:childTnLst>
+                          </p:cTn>
+                        </p:par>
+                      </p:childTnLst>
+                    </p:cTn>
+                  </p:par>
+                  <p:par>
+                    <p:cTn id="25" fill="hold">
+                      <p:stCondLst>
+                        <p:cond delay="indefinite"/>
+                      </p:stCondLst>
+                      <p:childTnLst>
+                        <p:par>
+                          <p:cTn id="26" fill="hold">
+                            <p:stCondLst>
+                              <p:cond delay="0"/>
+                            </p:stCondLst>
+                            <p:childTnLst>
+                              <p:par>
+                                <p:cTn id="27" presetID="1" presetClass="entr" presetSubtype="0" fill="hold" grpId="0" nodeType="clickEffect">
+                                  <p:stCondLst>
+                                    <p:cond delay="0"/>
+                                  </p:stCondLst>
+                                  <p:childTnLst>
+                                    <p:set>
+                                      <p:cBhvr>
+                                        <p:cTn id="28" dur="1" fill="hold">
+                                          <p:stCondLst>
+                                            <p:cond delay="0"/>
+                                          </p:stCondLst>
+                                        </p:cTn>
+                                        <p:tgtEl>
+                                          <p:spTgt spid="5"/>
+                                        </p:tgtEl>
+                                        <p:attrNameLst>
+                                          <p:attrName>style.visibility</p:attrName>
+                                        </p:attrNameLst>
+                                      </p:cBhvr>
+                                      <p:to>
+                                        <p:strVal val="visible"/>
+                                      </p:to>
+                                    </p:set>
+                                  </p:childTnLst>
+                                </p:cTn>
+                              </p:par>
+                            </p:childTnLst>
+                          </p:cTn>
+                        </p:par>
+                      </p:childTnLst>
+                    </p:cTn>
+                  </p:par>
+                </p:childTnLst>
+              </p:cTn>
+              <p:prevCondLst>
+                <p:cond evt="onPrev" delay="0">
+                  <p:tgtEl>
+                    <p:sldTgt/>
+                  </p:tgtEl>
+                </p:cond>
+              </p:prevCondLst>
+              <p:nextCondLst>
+                <p:cond evt="onNext" delay="0">
+                  <p:tgtEl>
+                    <p:sldTgt/>
+                  </p:tgtEl>
+                </p:cond>
+              </p:nextCondLst>
+            </p:seq>
+          </p:childTnLst>
+        </p:cTn>
+      </p:par>
+    </p:tnLst>
+    <p:bldLst>
+      <p:bldP spid="4" grpId="0" uiExpand="1" build="p" bldLvl="2"/>
+      <p:bldP spid="5" grpId="0" animBg="1"/>
+    </p:bldLst>
+  </p:timing>
 </p:sld>
 </file>
 
 <file path=ppt/slides/slide23.xml><?xml version="1.0" encoding="utf-8"?>
+<p:sld xmlns:a="http://schemas.openxmlformats.org/drawingml/2006/main" xmlns:r="http://schemas.openxmlformats.org/officeDocument/2006/relationships" xmlns:p="http://schemas.openxmlformats.org/presentationml/2006/main">
+  <p:cSld>
+    <p:spTree>
+      <p:nvGrpSpPr>
+        <p:cNvPr id="1" name=""/>
+        <p:cNvGrpSpPr/>
+        <p:nvPr/>
+      </p:nvGrpSpPr>
+      <p:grpSpPr>
+        <a:xfrm>
+          <a:off x="0" y="0"/>
+          <a:ext cx="0" cy="0"/>
+          <a:chOff x="0" y="0"/>
+          <a:chExt cx="0" cy="0"/>
+        </a:xfrm>
+      </p:grpSpPr>
+      <p:sp>
+        <p:nvSpPr>
+          <p:cNvPr id="2" name="Title 1">
+            <a:extLst>
+              <a:ext uri="{FF2B5EF4-FFF2-40B4-BE49-F238E27FC236}">
+                <a16:creationId xmlns:a16="http://schemas.microsoft.com/office/drawing/2014/main" id="{47A0024D-92D0-4578-938D-5F75C0A2AF8F}"/>
+              </a:ext>
+            </a:extLst>
+          </p:cNvPr>
+          <p:cNvSpPr>
+            <a:spLocks noGrp="1"/>
+          </p:cNvSpPr>
+          <p:nvPr>
+            <p:ph type="title"/>
+          </p:nvPr>
+        </p:nvSpPr>
+        <p:spPr/>
+        <p:txBody>
+          <a:bodyPr/>
+          <a:lstStyle/>
+          <a:p>
+            <a:r>
+              <a:rPr lang="en-US" dirty="0" err="1"/>
+              <a:t>hpccm</a:t>
+            </a:r>
+            <a:r>
+              <a:rPr lang="en-US" dirty="0"/>
+              <a:t> recipe</a:t>
+            </a:r>
+            <a:endParaRPr lang="en-BE" dirty="0"/>
+          </a:p>
+        </p:txBody>
+      </p:sp>
+      <p:sp>
+        <p:nvSpPr>
+          <p:cNvPr id="4" name="Slide Number Placeholder 3">
+            <a:extLst>
+              <a:ext uri="{FF2B5EF4-FFF2-40B4-BE49-F238E27FC236}">
+                <a16:creationId xmlns:a16="http://schemas.microsoft.com/office/drawing/2014/main" id="{2B92F15A-F72C-45C3-8FC1-87EF31268470}"/>
+              </a:ext>
+            </a:extLst>
+          </p:cNvPr>
+          <p:cNvSpPr>
+            <a:spLocks noGrp="1"/>
+          </p:cNvSpPr>
+          <p:nvPr>
+            <p:ph type="sldNum" sz="quarter" idx="12"/>
+          </p:nvPr>
+        </p:nvSpPr>
+        <p:spPr/>
+        <p:txBody>
+          <a:bodyPr/>
+          <a:lstStyle/>
+          <a:p>
+            <a:fld id="{AEFF399F-E3B5-4890-BC79-9BC8D4DF3F2D}" type="slidenum">
+              <a:rPr lang="nl-BE" smtClean="0"/>
+              <a:t>23</a:t>
+            </a:fld>
+            <a:endParaRPr lang="nl-BE"/>
+          </a:p>
+        </p:txBody>
+      </p:sp>
+      <p:sp>
+        <p:nvSpPr>
+          <p:cNvPr id="7" name="TextBox 6">
+            <a:extLst>
+              <a:ext uri="{FF2B5EF4-FFF2-40B4-BE49-F238E27FC236}">
+                <a16:creationId xmlns:a16="http://schemas.microsoft.com/office/drawing/2014/main" id="{928860A3-3F83-4392-BB21-81C5903F760B}"/>
+              </a:ext>
+            </a:extLst>
+          </p:cNvPr>
+          <p:cNvSpPr txBox="1"/>
+          <p:nvPr/>
+        </p:nvSpPr>
+        <p:spPr>
+          <a:xfrm>
+            <a:off x="505899" y="1373482"/>
+            <a:ext cx="8063105" cy="4801314"/>
+          </a:xfrm>
+          <a:prstGeom prst="rect">
+            <a:avLst/>
+          </a:prstGeom>
+          <a:solidFill>
+            <a:schemeClr val="bg1">
+              <a:lumMod val="85000"/>
+            </a:schemeClr>
+          </a:solidFill>
+          <a:ln>
+            <a:solidFill>
+              <a:schemeClr val="tx1"/>
+            </a:solidFill>
+          </a:ln>
+        </p:spPr>
+        <p:txBody>
+          <a:bodyPr wrap="none" rtlCol="0">
+            <a:spAutoFit/>
+          </a:bodyPr>
+          <a:lstStyle/>
+          <a:p>
+            <a:r>
+              <a:rPr lang="en-GB" dirty="0"/>
+              <a:t>import </a:t>
+            </a:r>
+            <a:r>
+              <a:rPr lang="en-GB" dirty="0" err="1"/>
+              <a:t>pathlib</a:t>
+            </a:r>
+            <a:endParaRPr lang="en-GB" dirty="0"/>
+          </a:p>
+          <a:p>
+            <a:endParaRPr lang="en-GB" dirty="0"/>
+          </a:p>
+          <a:p>
+            <a:r>
+              <a:rPr lang="en-GB" dirty="0"/>
+              <a:t># Choose a base image                          </a:t>
+            </a:r>
+          </a:p>
+          <a:p>
+            <a:r>
+              <a:rPr lang="en-GB" dirty="0"/>
+              <a:t>Stage0.baseimage('ubuntu:20.04')</a:t>
+            </a:r>
+          </a:p>
+          <a:p>
+            <a:r>
+              <a:rPr lang="en-GB" dirty="0"/>
+              <a:t>                                               </a:t>
+            </a:r>
+          </a:p>
+          <a:p>
+            <a:r>
+              <a:rPr lang="en-GB" dirty="0"/>
+              <a:t># Install build tools                          </a:t>
+            </a:r>
+          </a:p>
+          <a:p>
+            <a:r>
+              <a:rPr lang="en-GB" dirty="0"/>
+              <a:t>Stage0 += </a:t>
+            </a:r>
+            <a:r>
+              <a:rPr lang="en-GB" dirty="0" err="1"/>
+              <a:t>apt_get</a:t>
+            </a:r>
+            <a:r>
+              <a:rPr lang="en-GB" dirty="0"/>
+              <a:t>(</a:t>
+            </a:r>
+            <a:r>
+              <a:rPr lang="en-GB" dirty="0" err="1"/>
+              <a:t>ospackages</a:t>
+            </a:r>
+            <a:r>
+              <a:rPr lang="en-GB" dirty="0"/>
+              <a:t>=['build-essential', 'make'])                                                </a:t>
+            </a:r>
+          </a:p>
+          <a:p>
+            <a:r>
+              <a:rPr lang="en-GB" dirty="0"/>
+              <a:t>Stage0 += </a:t>
+            </a:r>
+            <a:r>
+              <a:rPr lang="en-GB" dirty="0" err="1"/>
+              <a:t>cmake</a:t>
+            </a:r>
+            <a:r>
+              <a:rPr lang="en-GB" dirty="0"/>
+              <a:t>(</a:t>
+            </a:r>
+            <a:r>
+              <a:rPr lang="en-GB" dirty="0" err="1"/>
+              <a:t>eula</a:t>
+            </a:r>
+            <a:r>
+              <a:rPr lang="en-GB" dirty="0"/>
+              <a:t>=True)</a:t>
+            </a:r>
+          </a:p>
+          <a:p>
+            <a:endParaRPr lang="en-GB" dirty="0"/>
+          </a:p>
+          <a:p>
+            <a:r>
+              <a:rPr lang="en-GB" dirty="0"/>
+              <a:t># Install GNU compilers (upstream)</a:t>
+            </a:r>
+          </a:p>
+          <a:p>
+            <a:r>
+              <a:rPr lang="en-GB" dirty="0"/>
+              <a:t>Stage0 += gnu() </a:t>
+            </a:r>
+          </a:p>
+          <a:p>
+            <a:endParaRPr lang="en-GB" dirty="0"/>
+          </a:p>
+          <a:p>
+            <a:r>
+              <a:rPr lang="en-GB" dirty="0"/>
+              <a:t># Copy in some example code</a:t>
+            </a:r>
+          </a:p>
+          <a:p>
+            <a:r>
+              <a:rPr lang="en-GB" dirty="0" err="1"/>
+              <a:t>source_dir</a:t>
+            </a:r>
+            <a:r>
+              <a:rPr lang="en-GB" dirty="0"/>
+              <a:t> = </a:t>
+            </a:r>
+            <a:r>
+              <a:rPr lang="en-GB" dirty="0" err="1"/>
+              <a:t>pathlib.Path</a:t>
+            </a:r>
+            <a:r>
+              <a:rPr lang="en-GB" dirty="0"/>
+              <a:t>('source-code')</a:t>
+            </a:r>
+          </a:p>
+          <a:p>
+            <a:r>
+              <a:rPr lang="en-GB" dirty="0" err="1"/>
+              <a:t>example_dir</a:t>
+            </a:r>
+            <a:r>
+              <a:rPr lang="en-GB" dirty="0"/>
+              <a:t> = '/</a:t>
+            </a:r>
+            <a:r>
+              <a:rPr lang="en-GB" dirty="0" err="1"/>
+              <a:t>sample_code</a:t>
+            </a:r>
+            <a:r>
+              <a:rPr lang="en-GB" dirty="0"/>
+              <a:t>'</a:t>
+            </a:r>
+          </a:p>
+          <a:p>
+            <a:r>
+              <a:rPr lang="en-GB" dirty="0"/>
+              <a:t>for file in </a:t>
+            </a:r>
+            <a:r>
+              <a:rPr lang="en-GB" dirty="0" err="1"/>
+              <a:t>source_dir.glob</a:t>
+            </a:r>
+            <a:r>
+              <a:rPr lang="en-GB" dirty="0"/>
+              <a:t>('*'):</a:t>
+            </a:r>
+          </a:p>
+          <a:p>
+            <a:r>
+              <a:rPr lang="en-GB" dirty="0"/>
+              <a:t>    Stage0 += copy(</a:t>
+            </a:r>
+            <a:r>
+              <a:rPr lang="en-GB" dirty="0" err="1"/>
+              <a:t>src</a:t>
+            </a:r>
+            <a:r>
+              <a:rPr lang="en-GB" dirty="0"/>
+              <a:t>=f'{file}', </a:t>
+            </a:r>
+            <a:r>
+              <a:rPr lang="en-GB" dirty="0" err="1"/>
+              <a:t>dest</a:t>
+            </a:r>
+            <a:r>
+              <a:rPr lang="en-GB" dirty="0"/>
+              <a:t>=f'{</a:t>
+            </a:r>
+            <a:r>
+              <a:rPr lang="en-GB" dirty="0" err="1"/>
+              <a:t>example_dir</a:t>
+            </a:r>
+            <a:r>
+              <a:rPr lang="en-GB" dirty="0"/>
+              <a:t>}/', _</a:t>
+            </a:r>
+            <a:r>
+              <a:rPr lang="en-GB" dirty="0" err="1"/>
+              <a:t>mkdir</a:t>
+            </a:r>
+            <a:r>
+              <a:rPr lang="en-GB" dirty="0"/>
+              <a:t>=True)</a:t>
+            </a:r>
+          </a:p>
+        </p:txBody>
+      </p:sp>
+      <p:grpSp>
+        <p:nvGrpSpPr>
+          <p:cNvPr id="43" name="Group 42">
+            <a:extLst>
+              <a:ext uri="{FF2B5EF4-FFF2-40B4-BE49-F238E27FC236}">
+                <a16:creationId xmlns:a16="http://schemas.microsoft.com/office/drawing/2014/main" id="{B95E46C0-A802-43A4-9208-7637B5EE45CF}"/>
+              </a:ext>
+            </a:extLst>
+          </p:cNvPr>
+          <p:cNvGrpSpPr/>
+          <p:nvPr/>
+        </p:nvGrpSpPr>
+        <p:grpSpPr>
+          <a:xfrm>
+            <a:off x="2369490" y="2201388"/>
+            <a:ext cx="6050939" cy="369332"/>
+            <a:chOff x="2369490" y="2201388"/>
+            <a:chExt cx="6050939" cy="369332"/>
+          </a:xfrm>
+        </p:grpSpPr>
+        <p:sp>
+          <p:nvSpPr>
+            <p:cNvPr id="8" name="Rectangle: Rounded Corners 7">
+              <a:extLst>
+                <a:ext uri="{FF2B5EF4-FFF2-40B4-BE49-F238E27FC236}">
+                  <a16:creationId xmlns:a16="http://schemas.microsoft.com/office/drawing/2014/main" id="{5BD792DB-9287-4A58-9060-34AF3BB60D91}"/>
+                </a:ext>
+              </a:extLst>
+            </p:cNvPr>
+            <p:cNvSpPr/>
+            <p:nvPr/>
+          </p:nvSpPr>
+          <p:spPr>
+            <a:xfrm>
+              <a:off x="2369490" y="2250219"/>
+              <a:ext cx="1319916" cy="278296"/>
+            </a:xfrm>
+            <a:prstGeom prst="roundRect">
+              <a:avLst/>
+            </a:prstGeom>
+            <a:solidFill>
+              <a:schemeClr val="accent1">
+                <a:alpha val="40000"/>
+              </a:schemeClr>
+            </a:solidFill>
+            <a:ln>
+              <a:solidFill>
+                <a:schemeClr val="accent1"/>
+              </a:solidFill>
+            </a:ln>
+          </p:spPr>
+          <p:style>
+            <a:lnRef idx="2">
+              <a:schemeClr val="accent1">
+                <a:shade val="50000"/>
+              </a:schemeClr>
+            </a:lnRef>
+            <a:fillRef idx="1">
+              <a:schemeClr val="accent1"/>
+            </a:fillRef>
+            <a:effectRef idx="0">
+              <a:schemeClr val="accent1"/>
+            </a:effectRef>
+            <a:fontRef idx="minor">
+              <a:schemeClr val="lt1"/>
+            </a:fontRef>
+          </p:style>
+          <p:txBody>
+            <a:bodyPr rtlCol="0" anchor="ctr"/>
+            <a:lstStyle/>
+            <a:p>
+              <a:pPr algn="ctr"/>
+              <a:endParaRPr lang="en-BE"/>
+            </a:p>
+          </p:txBody>
+        </p:sp>
+        <p:sp>
+          <p:nvSpPr>
+            <p:cNvPr id="15" name="TextBox 14">
+              <a:extLst>
+                <a:ext uri="{FF2B5EF4-FFF2-40B4-BE49-F238E27FC236}">
+                  <a16:creationId xmlns:a16="http://schemas.microsoft.com/office/drawing/2014/main" id="{92174981-54BE-4ED0-A37C-9E49335F3F5F}"/>
+                </a:ext>
+              </a:extLst>
+            </p:cNvPr>
+            <p:cNvSpPr txBox="1"/>
+            <p:nvPr/>
+          </p:nvSpPr>
+          <p:spPr>
+            <a:xfrm>
+              <a:off x="6750659" y="2201388"/>
+              <a:ext cx="1669770" cy="369332"/>
+            </a:xfrm>
+            <a:prstGeom prst="rect">
+              <a:avLst/>
+            </a:prstGeom>
+            <a:solidFill>
+              <a:schemeClr val="bg1"/>
+            </a:solidFill>
+            <a:ln>
+              <a:solidFill>
+                <a:schemeClr val="tx1"/>
+              </a:solidFill>
+            </a:ln>
+          </p:spPr>
+          <p:txBody>
+            <a:bodyPr wrap="square" rtlCol="0">
+              <a:spAutoFit/>
+            </a:bodyPr>
+            <a:lstStyle/>
+            <a:p>
+              <a:r>
+                <a:rPr lang="en-US" dirty="0"/>
+                <a:t>base OS image</a:t>
+              </a:r>
+              <a:endParaRPr lang="en-BE" dirty="0"/>
+            </a:p>
+          </p:txBody>
+        </p:sp>
+        <p:cxnSp>
+          <p:nvCxnSpPr>
+            <p:cNvPr id="17" name="Straight Arrow Connector 16">
+              <a:extLst>
+                <a:ext uri="{FF2B5EF4-FFF2-40B4-BE49-F238E27FC236}">
+                  <a16:creationId xmlns:a16="http://schemas.microsoft.com/office/drawing/2014/main" id="{CD941071-69E7-4AA4-99EA-141E2C7329DB}"/>
+                </a:ext>
+              </a:extLst>
+            </p:cNvPr>
+            <p:cNvCxnSpPr>
+              <a:cxnSpLocks/>
+              <a:stCxn id="15" idx="1"/>
+              <a:endCxn id="8" idx="3"/>
+            </p:cNvCxnSpPr>
+            <p:nvPr/>
+          </p:nvCxnSpPr>
+          <p:spPr>
+            <a:xfrm flipH="1">
+              <a:off x="3689406" y="2386054"/>
+              <a:ext cx="3061253" cy="3313"/>
+            </a:xfrm>
+            <a:prstGeom prst="straightConnector1">
+              <a:avLst/>
+            </a:prstGeom>
+            <a:ln>
+              <a:solidFill>
+                <a:schemeClr val="tx1"/>
+              </a:solidFill>
+              <a:tailEnd type="stealth" w="lg" len="lg"/>
+            </a:ln>
+          </p:spPr>
+          <p:style>
+            <a:lnRef idx="1">
+              <a:schemeClr val="accent1"/>
+            </a:lnRef>
+            <a:fillRef idx="0">
+              <a:schemeClr val="accent1"/>
+            </a:fillRef>
+            <a:effectRef idx="0">
+              <a:schemeClr val="accent1"/>
+            </a:effectRef>
+            <a:fontRef idx="minor">
+              <a:schemeClr val="tx1"/>
+            </a:fontRef>
+          </p:style>
+        </p:cxnSp>
+      </p:grpSp>
+      <p:grpSp>
+        <p:nvGrpSpPr>
+          <p:cNvPr id="44" name="Group 43">
+            <a:extLst>
+              <a:ext uri="{FF2B5EF4-FFF2-40B4-BE49-F238E27FC236}">
+                <a16:creationId xmlns:a16="http://schemas.microsoft.com/office/drawing/2014/main" id="{1014D9BB-AF04-4BD9-84A5-20121777C38F}"/>
+              </a:ext>
+            </a:extLst>
+          </p:cNvPr>
+          <p:cNvGrpSpPr/>
+          <p:nvPr/>
+        </p:nvGrpSpPr>
+        <p:grpSpPr>
+          <a:xfrm>
+            <a:off x="3539657" y="3024412"/>
+            <a:ext cx="4880772" cy="369332"/>
+            <a:chOff x="3539657" y="3024412"/>
+            <a:chExt cx="4880772" cy="369332"/>
+          </a:xfrm>
+        </p:grpSpPr>
+        <p:sp>
+          <p:nvSpPr>
+            <p:cNvPr id="10" name="Rectangle: Rounded Corners 9">
+              <a:extLst>
+                <a:ext uri="{FF2B5EF4-FFF2-40B4-BE49-F238E27FC236}">
+                  <a16:creationId xmlns:a16="http://schemas.microsoft.com/office/drawing/2014/main" id="{B16EC1CC-1CE1-49EA-A4C9-BB82B4682483}"/>
+                </a:ext>
+              </a:extLst>
+            </p:cNvPr>
+            <p:cNvSpPr/>
+            <p:nvPr/>
+          </p:nvSpPr>
+          <p:spPr>
+            <a:xfrm>
+              <a:off x="3539657" y="3081419"/>
+              <a:ext cx="2272746" cy="278296"/>
+            </a:xfrm>
+            <a:prstGeom prst="roundRect">
+              <a:avLst/>
+            </a:prstGeom>
+            <a:solidFill>
+              <a:schemeClr val="accent2">
+                <a:alpha val="40000"/>
+              </a:schemeClr>
+            </a:solidFill>
+            <a:ln>
+              <a:solidFill>
+                <a:schemeClr val="accent2"/>
+              </a:solidFill>
+            </a:ln>
+          </p:spPr>
+          <p:style>
+            <a:lnRef idx="2">
+              <a:schemeClr val="accent1">
+                <a:shade val="50000"/>
+              </a:schemeClr>
+            </a:lnRef>
+            <a:fillRef idx="1">
+              <a:schemeClr val="accent1"/>
+            </a:fillRef>
+            <a:effectRef idx="0">
+              <a:schemeClr val="accent1"/>
+            </a:effectRef>
+            <a:fontRef idx="minor">
+              <a:schemeClr val="lt1"/>
+            </a:fontRef>
+          </p:style>
+          <p:txBody>
+            <a:bodyPr rtlCol="0" anchor="ctr"/>
+            <a:lstStyle/>
+            <a:p>
+              <a:pPr algn="ctr"/>
+              <a:endParaRPr lang="en-BE"/>
+            </a:p>
+          </p:txBody>
+        </p:sp>
+        <p:sp>
+          <p:nvSpPr>
+            <p:cNvPr id="19" name="TextBox 18">
+              <a:extLst>
+                <a:ext uri="{FF2B5EF4-FFF2-40B4-BE49-F238E27FC236}">
+                  <a16:creationId xmlns:a16="http://schemas.microsoft.com/office/drawing/2014/main" id="{22EC095E-4651-47AC-BF1A-081F27B68035}"/>
+                </a:ext>
+              </a:extLst>
+            </p:cNvPr>
+            <p:cNvSpPr txBox="1"/>
+            <p:nvPr/>
+          </p:nvSpPr>
+          <p:spPr>
+            <a:xfrm>
+              <a:off x="6750658" y="3024412"/>
+              <a:ext cx="1669771" cy="369332"/>
+            </a:xfrm>
+            <a:prstGeom prst="rect">
+              <a:avLst/>
+            </a:prstGeom>
+            <a:solidFill>
+              <a:schemeClr val="bg1"/>
+            </a:solidFill>
+            <a:ln>
+              <a:solidFill>
+                <a:schemeClr val="tx1"/>
+              </a:solidFill>
+            </a:ln>
+          </p:spPr>
+          <p:txBody>
+            <a:bodyPr wrap="square" rtlCol="0">
+              <a:spAutoFit/>
+            </a:bodyPr>
+            <a:lstStyle/>
+            <a:p>
+              <a:r>
+                <a:rPr lang="en-US" dirty="0"/>
+                <a:t>OS packages</a:t>
+              </a:r>
+              <a:endParaRPr lang="en-BE" dirty="0"/>
+            </a:p>
+          </p:txBody>
+        </p:sp>
+        <p:cxnSp>
+          <p:nvCxnSpPr>
+            <p:cNvPr id="20" name="Straight Arrow Connector 19">
+              <a:extLst>
+                <a:ext uri="{FF2B5EF4-FFF2-40B4-BE49-F238E27FC236}">
+                  <a16:creationId xmlns:a16="http://schemas.microsoft.com/office/drawing/2014/main" id="{9B85DE68-DA0D-4FF4-9F66-FFBD3FC0DF2B}"/>
+                </a:ext>
+              </a:extLst>
+            </p:cNvPr>
+            <p:cNvCxnSpPr>
+              <a:cxnSpLocks/>
+              <a:stCxn id="19" idx="1"/>
+              <a:endCxn id="10" idx="3"/>
+            </p:cNvCxnSpPr>
+            <p:nvPr/>
+          </p:nvCxnSpPr>
+          <p:spPr>
+            <a:xfrm flipH="1">
+              <a:off x="5812403" y="3209078"/>
+              <a:ext cx="938255" cy="11489"/>
+            </a:xfrm>
+            <a:prstGeom prst="straightConnector1">
+              <a:avLst/>
+            </a:prstGeom>
+            <a:ln>
+              <a:solidFill>
+                <a:schemeClr val="tx1"/>
+              </a:solidFill>
+              <a:tailEnd type="stealth" w="lg" len="lg"/>
+            </a:ln>
+          </p:spPr>
+          <p:style>
+            <a:lnRef idx="1">
+              <a:schemeClr val="accent1"/>
+            </a:lnRef>
+            <a:fillRef idx="0">
+              <a:schemeClr val="accent1"/>
+            </a:fillRef>
+            <a:effectRef idx="0">
+              <a:schemeClr val="accent1"/>
+            </a:effectRef>
+            <a:fontRef idx="minor">
+              <a:schemeClr val="tx1"/>
+            </a:fontRef>
+          </p:style>
+        </p:cxnSp>
+      </p:grpSp>
+      <p:grpSp>
+        <p:nvGrpSpPr>
+          <p:cNvPr id="45" name="Group 44">
+            <a:extLst>
+              <a:ext uri="{FF2B5EF4-FFF2-40B4-BE49-F238E27FC236}">
+                <a16:creationId xmlns:a16="http://schemas.microsoft.com/office/drawing/2014/main" id="{871E1884-30D9-470F-9469-FAB9CD5CEF54}"/>
+              </a:ext>
+            </a:extLst>
+          </p:cNvPr>
+          <p:cNvGrpSpPr/>
+          <p:nvPr/>
+        </p:nvGrpSpPr>
+        <p:grpSpPr>
+          <a:xfrm>
+            <a:off x="1709531" y="5036741"/>
+            <a:ext cx="6756784" cy="1066493"/>
+            <a:chOff x="1709531" y="5036741"/>
+            <a:chExt cx="6756784" cy="1066493"/>
+          </a:xfrm>
+        </p:grpSpPr>
+        <p:sp>
+          <p:nvSpPr>
+            <p:cNvPr id="38" name="Rectangle: Rounded Corners 37">
+              <a:extLst>
+                <a:ext uri="{FF2B5EF4-FFF2-40B4-BE49-F238E27FC236}">
+                  <a16:creationId xmlns:a16="http://schemas.microsoft.com/office/drawing/2014/main" id="{A25FC1BE-C783-4A31-8073-DA513EC2C01A}"/>
+                </a:ext>
+              </a:extLst>
+            </p:cNvPr>
+            <p:cNvSpPr/>
+            <p:nvPr/>
+          </p:nvSpPr>
+          <p:spPr>
+            <a:xfrm>
+              <a:off x="1709531" y="5824938"/>
+              <a:ext cx="5160395" cy="278296"/>
+            </a:xfrm>
+            <a:prstGeom prst="roundRect">
+              <a:avLst/>
+            </a:prstGeom>
+            <a:solidFill>
+              <a:srgbClr val="92D050">
+                <a:alpha val="40000"/>
+              </a:srgbClr>
+            </a:solidFill>
+            <a:ln>
+              <a:solidFill>
+                <a:srgbClr val="92D050"/>
+              </a:solidFill>
+            </a:ln>
+          </p:spPr>
+          <p:style>
+            <a:lnRef idx="2">
+              <a:schemeClr val="accent1">
+                <a:shade val="50000"/>
+              </a:schemeClr>
+            </a:lnRef>
+            <a:fillRef idx="1">
+              <a:schemeClr val="accent1"/>
+            </a:fillRef>
+            <a:effectRef idx="0">
+              <a:schemeClr val="accent1"/>
+            </a:effectRef>
+            <a:fontRef idx="minor">
+              <a:schemeClr val="lt1"/>
+            </a:fontRef>
+          </p:style>
+          <p:txBody>
+            <a:bodyPr rtlCol="0" anchor="ctr"/>
+            <a:lstStyle/>
+            <a:p>
+              <a:pPr algn="ctr"/>
+              <a:endParaRPr lang="en-BE"/>
+            </a:p>
+          </p:txBody>
+        </p:sp>
+        <p:sp>
+          <p:nvSpPr>
+            <p:cNvPr id="39" name="TextBox 38">
+              <a:extLst>
+                <a:ext uri="{FF2B5EF4-FFF2-40B4-BE49-F238E27FC236}">
+                  <a16:creationId xmlns:a16="http://schemas.microsoft.com/office/drawing/2014/main" id="{67CB3AF9-831B-496F-9794-D60CAED838B8}"/>
+                </a:ext>
+              </a:extLst>
+            </p:cNvPr>
+            <p:cNvSpPr txBox="1"/>
+            <p:nvPr/>
+          </p:nvSpPr>
+          <p:spPr>
+            <a:xfrm>
+              <a:off x="6796544" y="5036741"/>
+              <a:ext cx="1669771" cy="369332"/>
+            </a:xfrm>
+            <a:prstGeom prst="rect">
+              <a:avLst/>
+            </a:prstGeom>
+            <a:solidFill>
+              <a:schemeClr val="bg1"/>
+            </a:solidFill>
+            <a:ln>
+              <a:solidFill>
+                <a:schemeClr val="tx1"/>
+              </a:solidFill>
+            </a:ln>
+          </p:spPr>
+          <p:txBody>
+            <a:bodyPr wrap="square" rtlCol="0">
+              <a:spAutoFit/>
+            </a:bodyPr>
+            <a:lstStyle/>
+            <a:p>
+              <a:r>
+                <a:rPr lang="en-US" dirty="0"/>
+                <a:t>copy files</a:t>
+              </a:r>
+              <a:endParaRPr lang="en-BE" dirty="0"/>
+            </a:p>
+          </p:txBody>
+        </p:sp>
+        <p:cxnSp>
+          <p:nvCxnSpPr>
+            <p:cNvPr id="40" name="Straight Arrow Connector 39">
+              <a:extLst>
+                <a:ext uri="{FF2B5EF4-FFF2-40B4-BE49-F238E27FC236}">
+                  <a16:creationId xmlns:a16="http://schemas.microsoft.com/office/drawing/2014/main" id="{BA4F2462-0437-41EA-90FA-EB4AF9C62440}"/>
+                </a:ext>
+              </a:extLst>
+            </p:cNvPr>
+            <p:cNvCxnSpPr>
+              <a:cxnSpLocks/>
+              <a:stCxn id="39" idx="1"/>
+            </p:cNvCxnSpPr>
+            <p:nvPr/>
+          </p:nvCxnSpPr>
+          <p:spPr>
+            <a:xfrm flipH="1">
+              <a:off x="4572000" y="5221407"/>
+              <a:ext cx="2224544" cy="563283"/>
+            </a:xfrm>
+            <a:prstGeom prst="straightConnector1">
+              <a:avLst/>
+            </a:prstGeom>
+            <a:ln>
+              <a:solidFill>
+                <a:schemeClr val="tx1"/>
+              </a:solidFill>
+              <a:tailEnd type="stealth" w="lg" len="lg"/>
+            </a:ln>
+          </p:spPr>
+          <p:style>
+            <a:lnRef idx="1">
+              <a:schemeClr val="accent1"/>
+            </a:lnRef>
+            <a:fillRef idx="0">
+              <a:schemeClr val="accent1"/>
+            </a:fillRef>
+            <a:effectRef idx="0">
+              <a:schemeClr val="accent1"/>
+            </a:effectRef>
+            <a:fontRef idx="minor">
+              <a:schemeClr val="tx1"/>
+            </a:fontRef>
+          </p:style>
+        </p:cxnSp>
+      </p:grpSp>
+      <p:grpSp>
+        <p:nvGrpSpPr>
+          <p:cNvPr id="33" name="Group 32">
+            <a:extLst>
+              <a:ext uri="{FF2B5EF4-FFF2-40B4-BE49-F238E27FC236}">
+                <a16:creationId xmlns:a16="http://schemas.microsoft.com/office/drawing/2014/main" id="{1FEB8849-1C74-41F9-B85D-02BA71948AD0}"/>
+              </a:ext>
+            </a:extLst>
+          </p:cNvPr>
+          <p:cNvGrpSpPr/>
+          <p:nvPr/>
+        </p:nvGrpSpPr>
+        <p:grpSpPr>
+          <a:xfrm>
+            <a:off x="1513400" y="3341451"/>
+            <a:ext cx="6907031" cy="1116122"/>
+            <a:chOff x="1513400" y="3341451"/>
+            <a:chExt cx="6907031" cy="1116122"/>
+          </a:xfrm>
+        </p:grpSpPr>
+        <p:sp>
+          <p:nvSpPr>
+            <p:cNvPr id="12" name="Rectangle: Rounded Corners 11">
+              <a:extLst>
+                <a:ext uri="{FF2B5EF4-FFF2-40B4-BE49-F238E27FC236}">
+                  <a16:creationId xmlns:a16="http://schemas.microsoft.com/office/drawing/2014/main" id="{8AF6D51B-186A-4FEA-A4F2-70CE9B122B9E}"/>
+                </a:ext>
+              </a:extLst>
+            </p:cNvPr>
+            <p:cNvSpPr/>
+            <p:nvPr/>
+          </p:nvSpPr>
+          <p:spPr>
+            <a:xfrm>
+              <a:off x="1513400" y="3341451"/>
+              <a:ext cx="1762537" cy="278296"/>
+            </a:xfrm>
+            <a:prstGeom prst="roundRect">
+              <a:avLst/>
+            </a:prstGeom>
+            <a:solidFill>
+              <a:schemeClr val="accent4">
+                <a:alpha val="40000"/>
+              </a:schemeClr>
+            </a:solidFill>
+            <a:ln>
+              <a:solidFill>
+                <a:schemeClr val="accent4"/>
+              </a:solidFill>
+            </a:ln>
+          </p:spPr>
+          <p:style>
+            <a:lnRef idx="2">
+              <a:schemeClr val="accent1">
+                <a:shade val="50000"/>
+              </a:schemeClr>
+            </a:lnRef>
+            <a:fillRef idx="1">
+              <a:schemeClr val="accent1"/>
+            </a:fillRef>
+            <a:effectRef idx="0">
+              <a:schemeClr val="accent1"/>
+            </a:effectRef>
+            <a:fontRef idx="minor">
+              <a:schemeClr val="lt1"/>
+            </a:fontRef>
+          </p:style>
+          <p:txBody>
+            <a:bodyPr rtlCol="0" anchor="ctr"/>
+            <a:lstStyle/>
+            <a:p>
+              <a:pPr algn="ctr"/>
+              <a:endParaRPr lang="en-BE"/>
+            </a:p>
+          </p:txBody>
+        </p:sp>
+        <p:sp>
+          <p:nvSpPr>
+            <p:cNvPr id="14" name="Rectangle: Rounded Corners 13">
+              <a:extLst>
+                <a:ext uri="{FF2B5EF4-FFF2-40B4-BE49-F238E27FC236}">
+                  <a16:creationId xmlns:a16="http://schemas.microsoft.com/office/drawing/2014/main" id="{E0A95EC8-17C7-4D3C-A987-AB5027042527}"/>
+                </a:ext>
+              </a:extLst>
+            </p:cNvPr>
+            <p:cNvSpPr/>
+            <p:nvPr/>
+          </p:nvSpPr>
+          <p:spPr>
+            <a:xfrm>
+              <a:off x="1527977" y="4179277"/>
+              <a:ext cx="602973" cy="278296"/>
+            </a:xfrm>
+            <a:prstGeom prst="roundRect">
+              <a:avLst/>
+            </a:prstGeom>
+            <a:solidFill>
+              <a:schemeClr val="accent4">
+                <a:alpha val="40000"/>
+              </a:schemeClr>
+            </a:solidFill>
+            <a:ln>
+              <a:solidFill>
+                <a:schemeClr val="accent4"/>
+              </a:solidFill>
+            </a:ln>
+          </p:spPr>
+          <p:style>
+            <a:lnRef idx="2">
+              <a:schemeClr val="accent1">
+                <a:shade val="50000"/>
+              </a:schemeClr>
+            </a:lnRef>
+            <a:fillRef idx="1">
+              <a:schemeClr val="accent1"/>
+            </a:fillRef>
+            <a:effectRef idx="0">
+              <a:schemeClr val="accent1"/>
+            </a:effectRef>
+            <a:fontRef idx="minor">
+              <a:schemeClr val="lt1"/>
+            </a:fontRef>
+          </p:style>
+          <p:txBody>
+            <a:bodyPr rtlCol="0" anchor="ctr"/>
+            <a:lstStyle/>
+            <a:p>
+              <a:pPr algn="ctr"/>
+              <a:endParaRPr lang="en-BE"/>
+            </a:p>
+          </p:txBody>
+        </p:sp>
+        <p:sp>
+          <p:nvSpPr>
+            <p:cNvPr id="25" name="TextBox 24">
+              <a:extLst>
+                <a:ext uri="{FF2B5EF4-FFF2-40B4-BE49-F238E27FC236}">
+                  <a16:creationId xmlns:a16="http://schemas.microsoft.com/office/drawing/2014/main" id="{B6638D05-B4D5-4F6B-BDA3-731861FEED4E}"/>
+                </a:ext>
+              </a:extLst>
+            </p:cNvPr>
+            <p:cNvSpPr txBox="1"/>
+            <p:nvPr/>
+          </p:nvSpPr>
+          <p:spPr>
+            <a:xfrm>
+              <a:off x="6750659" y="3813407"/>
+              <a:ext cx="1669772" cy="369332"/>
+            </a:xfrm>
+            <a:prstGeom prst="rect">
+              <a:avLst/>
+            </a:prstGeom>
+            <a:solidFill>
+              <a:schemeClr val="bg1"/>
+            </a:solidFill>
+            <a:ln>
+              <a:solidFill>
+                <a:schemeClr val="tx1"/>
+              </a:solidFill>
+            </a:ln>
+          </p:spPr>
+          <p:txBody>
+            <a:bodyPr wrap="square" rtlCol="0">
+              <a:spAutoFit/>
+            </a:bodyPr>
+            <a:lstStyle/>
+            <a:p>
+              <a:r>
+                <a:rPr lang="en-US" dirty="0"/>
+                <a:t>building blocks</a:t>
+              </a:r>
+              <a:endParaRPr lang="en-BE" dirty="0"/>
+            </a:p>
+          </p:txBody>
+        </p:sp>
+        <p:cxnSp>
+          <p:nvCxnSpPr>
+            <p:cNvPr id="26" name="Straight Arrow Connector 25">
+              <a:extLst>
+                <a:ext uri="{FF2B5EF4-FFF2-40B4-BE49-F238E27FC236}">
+                  <a16:creationId xmlns:a16="http://schemas.microsoft.com/office/drawing/2014/main" id="{2A908B14-5410-4331-9820-4A64E1B8A969}"/>
+                </a:ext>
+              </a:extLst>
+            </p:cNvPr>
+            <p:cNvCxnSpPr>
+              <a:cxnSpLocks/>
+              <a:stCxn id="25" idx="1"/>
+              <a:endCxn id="12" idx="3"/>
+            </p:cNvCxnSpPr>
+            <p:nvPr/>
+          </p:nvCxnSpPr>
+          <p:spPr>
+            <a:xfrm flipH="1" flipV="1">
+              <a:off x="3275937" y="3480599"/>
+              <a:ext cx="3474722" cy="517474"/>
+            </a:xfrm>
+            <a:prstGeom prst="straightConnector1">
+              <a:avLst/>
+            </a:prstGeom>
+            <a:ln>
+              <a:solidFill>
+                <a:schemeClr val="tx1"/>
+              </a:solidFill>
+              <a:tailEnd type="stealth" w="lg" len="lg"/>
+            </a:ln>
+          </p:spPr>
+          <p:style>
+            <a:lnRef idx="1">
+              <a:schemeClr val="accent1"/>
+            </a:lnRef>
+            <a:fillRef idx="0">
+              <a:schemeClr val="accent1"/>
+            </a:fillRef>
+            <a:effectRef idx="0">
+              <a:schemeClr val="accent1"/>
+            </a:effectRef>
+            <a:fontRef idx="minor">
+              <a:schemeClr val="tx1"/>
+            </a:fontRef>
+          </p:style>
+        </p:cxnSp>
+        <p:cxnSp>
+          <p:nvCxnSpPr>
+            <p:cNvPr id="28" name="Straight Arrow Connector 27">
+              <a:extLst>
+                <a:ext uri="{FF2B5EF4-FFF2-40B4-BE49-F238E27FC236}">
+                  <a16:creationId xmlns:a16="http://schemas.microsoft.com/office/drawing/2014/main" id="{F45824CC-35E0-4FC5-A4BC-CEB2756692D9}"/>
+                </a:ext>
+              </a:extLst>
+            </p:cNvPr>
+            <p:cNvCxnSpPr>
+              <a:cxnSpLocks/>
+              <a:stCxn id="25" idx="1"/>
+              <a:endCxn id="14" idx="3"/>
+            </p:cNvCxnSpPr>
+            <p:nvPr/>
+          </p:nvCxnSpPr>
+          <p:spPr>
+            <a:xfrm flipH="1">
+              <a:off x="2130950" y="3998073"/>
+              <a:ext cx="4619709" cy="320352"/>
+            </a:xfrm>
+            <a:prstGeom prst="straightConnector1">
+              <a:avLst/>
+            </a:prstGeom>
+            <a:ln>
+              <a:solidFill>
+                <a:schemeClr val="tx1"/>
+              </a:solidFill>
+              <a:tailEnd type="stealth" w="lg" len="lg"/>
+            </a:ln>
+          </p:spPr>
+          <p:style>
+            <a:lnRef idx="1">
+              <a:schemeClr val="accent1"/>
+            </a:lnRef>
+            <a:fillRef idx="0">
+              <a:schemeClr val="accent1"/>
+            </a:fillRef>
+            <a:effectRef idx="0">
+              <a:schemeClr val="accent1"/>
+            </a:effectRef>
+            <a:fontRef idx="minor">
+              <a:schemeClr val="tx1"/>
+            </a:fontRef>
+          </p:style>
+        </p:cxnSp>
+      </p:grpSp>
+    </p:spTree>
+    <p:extLst>
+      <p:ext uri="{BB962C8B-B14F-4D97-AF65-F5344CB8AC3E}">
+        <p14:creationId xmlns:p14="http://schemas.microsoft.com/office/powerpoint/2010/main" val="1307896986"/>
+      </p:ext>
+    </p:extLst>
+  </p:cSld>
+  <p:clrMapOvr>
+    <a:masterClrMapping/>
+  </p:clrMapOvr>
+  <p:timing>
+    <p:tnLst>
+      <p:par>
+        <p:cTn id="1" dur="indefinite" restart="never" nodeType="tmRoot">
+          <p:childTnLst>
+            <p:seq concurrent="1" nextAc="seek">
+              <p:cTn id="2" dur="indefinite" nodeType="mainSeq">
+                <p:childTnLst>
+                  <p:par>
+                    <p:cTn id="3" fill="hold">
+                      <p:stCondLst>
+                        <p:cond delay="indefinite"/>
+                      </p:stCondLst>
+                      <p:childTnLst>
+                        <p:par>
+                          <p:cTn id="4" fill="hold">
+                            <p:stCondLst>
+                              <p:cond delay="0"/>
+                            </p:stCondLst>
+                            <p:childTnLst>
+                              <p:par>
+                                <p:cTn id="5" presetID="1" presetClass="entr" presetSubtype="0" fill="hold" nodeType="clickEffect">
+                                  <p:stCondLst>
+                                    <p:cond delay="0"/>
+                                  </p:stCondLst>
+                                  <p:childTnLst>
+                                    <p:set>
+                                      <p:cBhvr>
+                                        <p:cTn id="6" dur="1" fill="hold">
+                                          <p:stCondLst>
+                                            <p:cond delay="0"/>
+                                          </p:stCondLst>
+                                        </p:cTn>
+                                        <p:tgtEl>
+                                          <p:spTgt spid="43"/>
+                                        </p:tgtEl>
+                                        <p:attrNameLst>
+                                          <p:attrName>style.visibility</p:attrName>
+                                        </p:attrNameLst>
+                                      </p:cBhvr>
+                                      <p:to>
+                                        <p:strVal val="visible"/>
+                                      </p:to>
+                                    </p:set>
+                                  </p:childTnLst>
+                                </p:cTn>
+                              </p:par>
+                            </p:childTnLst>
+                          </p:cTn>
+                        </p:par>
+                      </p:childTnLst>
+                    </p:cTn>
+                  </p:par>
+                  <p:par>
+                    <p:cTn id="7" fill="hold">
+                      <p:stCondLst>
+                        <p:cond delay="indefinite"/>
+                      </p:stCondLst>
+                      <p:childTnLst>
+                        <p:par>
+                          <p:cTn id="8" fill="hold">
+                            <p:stCondLst>
+                              <p:cond delay="0"/>
+                            </p:stCondLst>
+                            <p:childTnLst>
+                              <p:par>
+                                <p:cTn id="9" presetID="1" presetClass="entr" presetSubtype="0" fill="hold" nodeType="clickEffect">
+                                  <p:stCondLst>
+                                    <p:cond delay="0"/>
+                                  </p:stCondLst>
+                                  <p:childTnLst>
+                                    <p:set>
+                                      <p:cBhvr>
+                                        <p:cTn id="10" dur="1" fill="hold">
+                                          <p:stCondLst>
+                                            <p:cond delay="0"/>
+                                          </p:stCondLst>
+                                        </p:cTn>
+                                        <p:tgtEl>
+                                          <p:spTgt spid="44"/>
+                                        </p:tgtEl>
+                                        <p:attrNameLst>
+                                          <p:attrName>style.visibility</p:attrName>
+                                        </p:attrNameLst>
+                                      </p:cBhvr>
+                                      <p:to>
+                                        <p:strVal val="visible"/>
+                                      </p:to>
+                                    </p:set>
+                                  </p:childTnLst>
+                                </p:cTn>
+                              </p:par>
+                            </p:childTnLst>
+                          </p:cTn>
+                        </p:par>
+                      </p:childTnLst>
+                    </p:cTn>
+                  </p:par>
+                  <p:par>
+                    <p:cTn id="11" fill="hold">
+                      <p:stCondLst>
+                        <p:cond delay="indefinite"/>
+                      </p:stCondLst>
+                      <p:childTnLst>
+                        <p:par>
+                          <p:cTn id="12" fill="hold">
+                            <p:stCondLst>
+                              <p:cond delay="0"/>
+                            </p:stCondLst>
+                            <p:childTnLst>
+                              <p:par>
+                                <p:cTn id="13" presetID="1" presetClass="entr" presetSubtype="0" fill="hold" nodeType="clickEffect">
+                                  <p:stCondLst>
+                                    <p:cond delay="0"/>
+                                  </p:stCondLst>
+                                  <p:childTnLst>
+                                    <p:set>
+                                      <p:cBhvr>
+                                        <p:cTn id="14" dur="1" fill="hold">
+                                          <p:stCondLst>
+                                            <p:cond delay="0"/>
+                                          </p:stCondLst>
+                                        </p:cTn>
+                                        <p:tgtEl>
+                                          <p:spTgt spid="33"/>
+                                        </p:tgtEl>
+                                        <p:attrNameLst>
+                                          <p:attrName>style.visibility</p:attrName>
+                                        </p:attrNameLst>
+                                      </p:cBhvr>
+                                      <p:to>
+                                        <p:strVal val="visible"/>
+                                      </p:to>
+                                    </p:set>
+                                  </p:childTnLst>
+                                </p:cTn>
+                              </p:par>
+                            </p:childTnLst>
+                          </p:cTn>
+                        </p:par>
+                      </p:childTnLst>
+                    </p:cTn>
+                  </p:par>
+                  <p:par>
+                    <p:cTn id="15" fill="hold">
+                      <p:stCondLst>
+                        <p:cond delay="indefinite"/>
+                      </p:stCondLst>
+                      <p:childTnLst>
+                        <p:par>
+                          <p:cTn id="16" fill="hold">
+                            <p:stCondLst>
+                              <p:cond delay="0"/>
+                            </p:stCondLst>
+                            <p:childTnLst>
+                              <p:par>
+                                <p:cTn id="17" presetID="1" presetClass="entr" presetSubtype="0" fill="hold" nodeType="clickEffect">
+                                  <p:stCondLst>
+                                    <p:cond delay="0"/>
+                                  </p:stCondLst>
+                                  <p:childTnLst>
+                                    <p:set>
+                                      <p:cBhvr>
+                                        <p:cTn id="18" dur="1" fill="hold">
+                                          <p:stCondLst>
+                                            <p:cond delay="0"/>
+                                          </p:stCondLst>
+                                        </p:cTn>
+                                        <p:tgtEl>
+                                          <p:spTgt spid="45"/>
+                                        </p:tgtEl>
+                                        <p:attrNameLst>
+                                          <p:attrName>style.visibility</p:attrName>
+                                        </p:attrNameLst>
+                                      </p:cBhvr>
+                                      <p:to>
+                                        <p:strVal val="visible"/>
+                                      </p:to>
+                                    </p:set>
+                                  </p:childTnLst>
+                                </p:cTn>
+                              </p:par>
+                            </p:childTnLst>
+                          </p:cTn>
+                        </p:par>
+                      </p:childTnLst>
+                    </p:cTn>
+                  </p:par>
+                </p:childTnLst>
+              </p:cTn>
+              <p:prevCondLst>
+                <p:cond evt="onPrev" delay="0">
+                  <p:tgtEl>
+                    <p:sldTgt/>
+                  </p:tgtEl>
+                </p:cond>
+              </p:prevCondLst>
+              <p:nextCondLst>
+                <p:cond evt="onNext" delay="0">
+                  <p:tgtEl>
+                    <p:sldTgt/>
+                  </p:tgtEl>
+                </p:cond>
+              </p:nextCondLst>
+            </p:seq>
+          </p:childTnLst>
+        </p:cTn>
+      </p:par>
+    </p:tnLst>
+  </p:timing>
+</p:sld>
+</file>
+
+<file path=ppt/slides/slide24.xml><?xml version="1.0" encoding="utf-8"?>
+<p:sld xmlns:a="http://schemas.openxmlformats.org/drawingml/2006/main" xmlns:r="http://schemas.openxmlformats.org/officeDocument/2006/relationships" xmlns:p="http://schemas.openxmlformats.org/presentationml/2006/main">
+  <p:cSld>
+    <p:spTree>
+      <p:nvGrpSpPr>
+        <p:cNvPr id="1" name=""/>
+        <p:cNvGrpSpPr/>
+        <p:nvPr/>
+      </p:nvGrpSpPr>
+      <p:grpSpPr>
+        <a:xfrm>
+          <a:off x="0" y="0"/>
+          <a:ext cx="0" cy="0"/>
+          <a:chOff x="0" y="0"/>
+          <a:chExt cx="0" cy="0"/>
+        </a:xfrm>
+      </p:grpSpPr>
+      <p:sp>
+        <p:nvSpPr>
+          <p:cNvPr id="2" name="Title 1">
+            <a:extLst>
+              <a:ext uri="{FF2B5EF4-FFF2-40B4-BE49-F238E27FC236}">
+                <a16:creationId xmlns:a16="http://schemas.microsoft.com/office/drawing/2014/main" id="{C409018A-0409-4ED2-8835-EFDB9A1D4B24}"/>
+              </a:ext>
+            </a:extLst>
+          </p:cNvPr>
+          <p:cNvSpPr>
+            <a:spLocks noGrp="1"/>
+          </p:cNvSpPr>
+          <p:nvPr>
+            <p:ph type="title"/>
+          </p:nvPr>
+        </p:nvSpPr>
+        <p:spPr/>
+        <p:txBody>
+          <a:bodyPr/>
+          <a:lstStyle/>
+          <a:p>
+            <a:r>
+              <a:rPr lang="en-US" dirty="0" err="1"/>
+              <a:t>hpccm</a:t>
+            </a:r>
+            <a:r>
+              <a:rPr lang="en-US" dirty="0"/>
+              <a:t> to docker/singularity</a:t>
+            </a:r>
+            <a:endParaRPr lang="en-BE" dirty="0"/>
+          </a:p>
+        </p:txBody>
+      </p:sp>
+      <p:sp>
+        <p:nvSpPr>
+          <p:cNvPr id="4" name="Content Placeholder 3">
+            <a:extLst>
+              <a:ext uri="{FF2B5EF4-FFF2-40B4-BE49-F238E27FC236}">
+                <a16:creationId xmlns:a16="http://schemas.microsoft.com/office/drawing/2014/main" id="{DC3AF0E6-3CD8-4E50-B093-EA419DF18292}"/>
+              </a:ext>
+            </a:extLst>
+          </p:cNvPr>
+          <p:cNvSpPr>
+            <a:spLocks noGrp="1"/>
+          </p:cNvSpPr>
+          <p:nvPr>
+            <p:ph idx="1"/>
+          </p:nvPr>
+        </p:nvSpPr>
+        <p:spPr/>
+        <p:txBody>
+          <a:bodyPr/>
+          <a:lstStyle/>
+          <a:p>
+            <a:r>
+              <a:rPr lang="en-US" dirty="0"/>
+              <a:t>Generate a singularity definition file</a:t>
+            </a:r>
+          </a:p>
+          <a:p>
+            <a:endParaRPr lang="en-US" dirty="0"/>
+          </a:p>
+          <a:p>
+            <a:endParaRPr lang="en-US" dirty="0"/>
+          </a:p>
+          <a:p>
+            <a:endParaRPr lang="en-US" dirty="0"/>
+          </a:p>
+          <a:p>
+            <a:r>
+              <a:rPr lang="en-US" dirty="0"/>
+              <a:t>Generate a </a:t>
+            </a:r>
+            <a:r>
+              <a:rPr lang="en-US" dirty="0" err="1"/>
+              <a:t>Dockerfile</a:t>
+            </a:r>
+            <a:endParaRPr lang="en-US" dirty="0"/>
+          </a:p>
+        </p:txBody>
+      </p:sp>
+      <p:sp>
+        <p:nvSpPr>
+          <p:cNvPr id="3" name="Slide Number Placeholder 2">
+            <a:extLst>
+              <a:ext uri="{FF2B5EF4-FFF2-40B4-BE49-F238E27FC236}">
+                <a16:creationId xmlns:a16="http://schemas.microsoft.com/office/drawing/2014/main" id="{56754F3F-BA2E-4FE5-9731-B14350975539}"/>
+              </a:ext>
+            </a:extLst>
+          </p:cNvPr>
+          <p:cNvSpPr>
+            <a:spLocks noGrp="1"/>
+          </p:cNvSpPr>
+          <p:nvPr>
+            <p:ph type="sldNum" sz="quarter" idx="12"/>
+          </p:nvPr>
+        </p:nvSpPr>
+        <p:spPr/>
+        <p:txBody>
+          <a:bodyPr/>
+          <a:lstStyle/>
+          <a:p>
+            <a:fld id="{AEFF399F-E3B5-4890-BC79-9BC8D4DF3F2D}" type="slidenum">
+              <a:rPr lang="nl-BE" smtClean="0"/>
+              <a:t>24</a:t>
+            </a:fld>
+            <a:endParaRPr lang="nl-BE"/>
+          </a:p>
+        </p:txBody>
+      </p:sp>
+      <p:sp>
+        <p:nvSpPr>
+          <p:cNvPr id="5" name="TextBox 4">
+            <a:extLst>
+              <a:ext uri="{FF2B5EF4-FFF2-40B4-BE49-F238E27FC236}">
+                <a16:creationId xmlns:a16="http://schemas.microsoft.com/office/drawing/2014/main" id="{7F3EB592-569B-4705-B02B-473A2E5F24E0}"/>
+              </a:ext>
+            </a:extLst>
+          </p:cNvPr>
+          <p:cNvSpPr txBox="1"/>
+          <p:nvPr/>
+        </p:nvSpPr>
+        <p:spPr>
+          <a:xfrm>
+            <a:off x="791937" y="2400347"/>
+            <a:ext cx="4893246" cy="923330"/>
+          </a:xfrm>
+          <a:prstGeom prst="rect">
+            <a:avLst/>
+          </a:prstGeom>
+          <a:solidFill>
+            <a:schemeClr val="tx1"/>
+          </a:solidFill>
+        </p:spPr>
+        <p:txBody>
+          <a:bodyPr wrap="square" rtlCol="0">
+            <a:spAutoFit/>
+          </a:bodyPr>
+          <a:lstStyle/>
+          <a:p>
+            <a:r>
+              <a:rPr lang="en-US" b="1" dirty="0">
+                <a:solidFill>
+                  <a:schemeClr val="bg1"/>
+                </a:solidFill>
+                <a:latin typeface="Courier New" panose="02070309020205020404" pitchFamily="49" charset="0"/>
+                <a:cs typeface="Courier New" panose="02070309020205020404" pitchFamily="49" charset="0"/>
+              </a:rPr>
+              <a:t>$ </a:t>
+            </a:r>
+            <a:r>
+              <a:rPr lang="en-US" b="1" dirty="0" err="1">
+                <a:solidFill>
+                  <a:schemeClr val="bg1"/>
+                </a:solidFill>
+                <a:latin typeface="Courier New" panose="02070309020205020404" pitchFamily="49" charset="0"/>
+                <a:cs typeface="Courier New" panose="02070309020205020404" pitchFamily="49" charset="0"/>
+              </a:rPr>
+              <a:t>hpccm</a:t>
+            </a:r>
+            <a:r>
+              <a:rPr lang="en-US" b="1" dirty="0">
+                <a:solidFill>
+                  <a:schemeClr val="bg1"/>
+                </a:solidFill>
+                <a:latin typeface="Courier New" panose="02070309020205020404" pitchFamily="49" charset="0"/>
+                <a:cs typeface="Courier New" panose="02070309020205020404" pitchFamily="49" charset="0"/>
+              </a:rPr>
+              <a:t>  --recipe machine.py   \</a:t>
+            </a:r>
+          </a:p>
+          <a:p>
+            <a:r>
+              <a:rPr lang="en-US" b="1" dirty="0">
+                <a:solidFill>
+                  <a:schemeClr val="bg1"/>
+                </a:solidFill>
+                <a:latin typeface="Courier New" panose="02070309020205020404" pitchFamily="49" charset="0"/>
+                <a:cs typeface="Courier New" panose="02070309020205020404" pitchFamily="49" charset="0"/>
+              </a:rPr>
+              <a:t>         --format singularity  \</a:t>
+            </a:r>
+          </a:p>
+          <a:p>
+            <a:r>
+              <a:rPr lang="en-US" b="1" dirty="0">
+                <a:solidFill>
+                  <a:schemeClr val="bg1"/>
+                </a:solidFill>
+                <a:latin typeface="Courier New" panose="02070309020205020404" pitchFamily="49" charset="0"/>
+                <a:cs typeface="Courier New" panose="02070309020205020404" pitchFamily="49" charset="0"/>
+              </a:rPr>
+              <a:t>         &gt; machine.def</a:t>
+            </a:r>
+            <a:endParaRPr lang="nl-BE" b="1" dirty="0">
+              <a:solidFill>
+                <a:schemeClr val="bg1"/>
+              </a:solidFill>
+              <a:latin typeface="Courier New" panose="02070309020205020404" pitchFamily="49" charset="0"/>
+              <a:cs typeface="Courier New" panose="02070309020205020404" pitchFamily="49" charset="0"/>
+            </a:endParaRPr>
+          </a:p>
+        </p:txBody>
+      </p:sp>
+      <p:sp>
+        <p:nvSpPr>
+          <p:cNvPr id="6" name="TextBox 5">
+            <a:extLst>
+              <a:ext uri="{FF2B5EF4-FFF2-40B4-BE49-F238E27FC236}">
+                <a16:creationId xmlns:a16="http://schemas.microsoft.com/office/drawing/2014/main" id="{28397307-5106-4FC8-96A0-AEF2D108958D}"/>
+              </a:ext>
+            </a:extLst>
+          </p:cNvPr>
+          <p:cNvSpPr txBox="1"/>
+          <p:nvPr/>
+        </p:nvSpPr>
+        <p:spPr>
+          <a:xfrm>
+            <a:off x="791935" y="4421302"/>
+            <a:ext cx="4893247" cy="923330"/>
+          </a:xfrm>
+          <a:prstGeom prst="rect">
+            <a:avLst/>
+          </a:prstGeom>
+          <a:solidFill>
+            <a:schemeClr val="tx1"/>
+          </a:solidFill>
+        </p:spPr>
+        <p:txBody>
+          <a:bodyPr wrap="square" rtlCol="0">
+            <a:spAutoFit/>
+          </a:bodyPr>
+          <a:lstStyle/>
+          <a:p>
+            <a:r>
+              <a:rPr lang="en-US" b="1" dirty="0">
+                <a:solidFill>
+                  <a:schemeClr val="bg1"/>
+                </a:solidFill>
+                <a:latin typeface="Courier New" panose="02070309020205020404" pitchFamily="49" charset="0"/>
+                <a:cs typeface="Courier New" panose="02070309020205020404" pitchFamily="49" charset="0"/>
+              </a:rPr>
+              <a:t>$ </a:t>
+            </a:r>
+            <a:r>
+              <a:rPr lang="en-US" b="1" dirty="0" err="1">
+                <a:solidFill>
+                  <a:schemeClr val="bg1"/>
+                </a:solidFill>
+                <a:latin typeface="Courier New" panose="02070309020205020404" pitchFamily="49" charset="0"/>
+                <a:cs typeface="Courier New" panose="02070309020205020404" pitchFamily="49" charset="0"/>
+              </a:rPr>
+              <a:t>hpccm</a:t>
+            </a:r>
+            <a:r>
+              <a:rPr lang="en-US" b="1" dirty="0">
+                <a:solidFill>
+                  <a:schemeClr val="bg1"/>
+                </a:solidFill>
+                <a:latin typeface="Courier New" panose="02070309020205020404" pitchFamily="49" charset="0"/>
+                <a:cs typeface="Courier New" panose="02070309020205020404" pitchFamily="49" charset="0"/>
+              </a:rPr>
+              <a:t>  --recipe machine.py  \</a:t>
+            </a:r>
+          </a:p>
+          <a:p>
+            <a:r>
+              <a:rPr lang="en-US" b="1" dirty="0">
+                <a:solidFill>
+                  <a:schemeClr val="bg1"/>
+                </a:solidFill>
+                <a:latin typeface="Courier New" panose="02070309020205020404" pitchFamily="49" charset="0"/>
+                <a:cs typeface="Courier New" panose="02070309020205020404" pitchFamily="49" charset="0"/>
+              </a:rPr>
+              <a:t>         --format docker      \</a:t>
+            </a:r>
+          </a:p>
+          <a:p>
+            <a:r>
+              <a:rPr lang="en-US" b="1" dirty="0">
+                <a:solidFill>
+                  <a:schemeClr val="bg1"/>
+                </a:solidFill>
+                <a:latin typeface="Courier New" panose="02070309020205020404" pitchFamily="49" charset="0"/>
+                <a:cs typeface="Courier New" panose="02070309020205020404" pitchFamily="49" charset="0"/>
+              </a:rPr>
+              <a:t>         &gt; </a:t>
+            </a:r>
+            <a:r>
+              <a:rPr lang="en-US" b="1" dirty="0" err="1">
+                <a:solidFill>
+                  <a:schemeClr val="bg1"/>
+                </a:solidFill>
+                <a:latin typeface="Courier New" panose="02070309020205020404" pitchFamily="49" charset="0"/>
+                <a:cs typeface="Courier New" panose="02070309020205020404" pitchFamily="49" charset="0"/>
+              </a:rPr>
+              <a:t>Dockerfile</a:t>
+            </a:r>
+            <a:endParaRPr lang="nl-BE" b="1" dirty="0">
+              <a:solidFill>
+                <a:schemeClr val="bg1"/>
+              </a:solidFill>
+              <a:latin typeface="Courier New" panose="02070309020205020404" pitchFamily="49" charset="0"/>
+              <a:cs typeface="Courier New" panose="02070309020205020404" pitchFamily="49" charset="0"/>
+            </a:endParaRPr>
+          </a:p>
+        </p:txBody>
+      </p:sp>
+    </p:spTree>
+    <p:extLst>
+      <p:ext uri="{BB962C8B-B14F-4D97-AF65-F5344CB8AC3E}">
+        <p14:creationId xmlns:p14="http://schemas.microsoft.com/office/powerpoint/2010/main" val="3981712022"/>
+      </p:ext>
+    </p:extLst>
+  </p:cSld>
+  <p:clrMapOvr>
+    <a:masterClrMapping/>
+  </p:clrMapOvr>
+  <p:timing>
+    <p:tnLst>
+      <p:par>
+        <p:cTn id="1" dur="indefinite" restart="never" nodeType="tmRoot">
+          <p:childTnLst>
+            <p:seq concurrent="1" nextAc="seek">
+              <p:cTn id="2" dur="indefinite" nodeType="mainSeq">
+                <p:childTnLst>
+                  <p:par>
+                    <p:cTn id="3" fill="hold">
+                      <p:stCondLst>
+                        <p:cond delay="indefinite"/>
+                        <p:cond evt="onBegin" delay="0">
+                          <p:tn val="2"/>
+                        </p:cond>
+                      </p:stCondLst>
+                      <p:childTnLst>
+                        <p:par>
+                          <p:cTn id="4" fill="hold">
+                            <p:stCondLst>
+                              <p:cond delay="0"/>
+                            </p:stCondLst>
+                            <p:childTnLst>
+                              <p:par>
+                                <p:cTn id="5" presetID="1" presetClass="entr" presetSubtype="0" fill="hold" grpId="0" nodeType="withEffect">
+                                  <p:stCondLst>
+                                    <p:cond delay="0"/>
+                                  </p:stCondLst>
+                                  <p:childTnLst>
+                                    <p:set>
+                                      <p:cBhvr>
+                                        <p:cTn id="6" dur="1" fill="hold">
+                                          <p:stCondLst>
+                                            <p:cond delay="0"/>
+                                          </p:stCondLst>
+                                        </p:cTn>
+                                        <p:tgtEl>
+                                          <p:spTgt spid="4">
+                                            <p:txEl>
+                                              <p:pRg st="0" end="0"/>
+                                            </p:txEl>
+                                          </p:spTgt>
+                                        </p:tgtEl>
+                                        <p:attrNameLst>
+                                          <p:attrName>style.visibility</p:attrName>
+                                        </p:attrNameLst>
+                                      </p:cBhvr>
+                                      <p:to>
+                                        <p:strVal val="visible"/>
+                                      </p:to>
+                                    </p:set>
+                                  </p:childTnLst>
+                                </p:cTn>
+                              </p:par>
+                              <p:par>
+                                <p:cTn id="7" presetID="1" presetClass="entr" presetSubtype="0" fill="hold" grpId="0" nodeType="withEffect">
+                                  <p:stCondLst>
+                                    <p:cond delay="0"/>
+                                  </p:stCondLst>
+                                  <p:childTnLst>
+                                    <p:set>
+                                      <p:cBhvr>
+                                        <p:cTn id="8" dur="1" fill="hold">
+                                          <p:stCondLst>
+                                            <p:cond delay="0"/>
+                                          </p:stCondLst>
+                                        </p:cTn>
+                                        <p:tgtEl>
+                                          <p:spTgt spid="5"/>
+                                        </p:tgtEl>
+                                        <p:attrNameLst>
+                                          <p:attrName>style.visibility</p:attrName>
+                                        </p:attrNameLst>
+                                      </p:cBhvr>
+                                      <p:to>
+                                        <p:strVal val="visible"/>
+                                      </p:to>
+                                    </p:set>
+                                  </p:childTnLst>
+                                </p:cTn>
+                              </p:par>
+                            </p:childTnLst>
+                          </p:cTn>
+                        </p:par>
+                      </p:childTnLst>
+                    </p:cTn>
+                  </p:par>
+                  <p:par>
+                    <p:cTn id="9" fill="hold">
+                      <p:stCondLst>
+                        <p:cond delay="indefinite"/>
+                      </p:stCondLst>
+                      <p:childTnLst>
+                        <p:par>
+                          <p:cTn id="10" fill="hold">
+                            <p:stCondLst>
+                              <p:cond delay="0"/>
+                            </p:stCondLst>
+                            <p:childTnLst>
+                              <p:par>
+                                <p:cTn id="11" presetID="1" presetClass="entr" presetSubtype="0" fill="hold" grpId="0" nodeType="clickEffect">
+                                  <p:stCondLst>
+                                    <p:cond delay="0"/>
+                                  </p:stCondLst>
+                                  <p:childTnLst>
+                                    <p:set>
+                                      <p:cBhvr>
+                                        <p:cTn id="12" dur="1" fill="hold">
+                                          <p:stCondLst>
+                                            <p:cond delay="0"/>
+                                          </p:stCondLst>
+                                        </p:cTn>
+                                        <p:tgtEl>
+                                          <p:spTgt spid="4">
+                                            <p:txEl>
+                                              <p:pRg st="4" end="4"/>
+                                            </p:txEl>
+                                          </p:spTgt>
+                                        </p:tgtEl>
+                                        <p:attrNameLst>
+                                          <p:attrName>style.visibility</p:attrName>
+                                        </p:attrNameLst>
+                                      </p:cBhvr>
+                                      <p:to>
+                                        <p:strVal val="visible"/>
+                                      </p:to>
+                                    </p:set>
+                                  </p:childTnLst>
+                                </p:cTn>
+                              </p:par>
+                              <p:par>
+                                <p:cTn id="13" presetID="1" presetClass="entr" presetSubtype="0" fill="hold" grpId="0" nodeType="withEffect">
+                                  <p:stCondLst>
+                                    <p:cond delay="0"/>
+                                  </p:stCondLst>
+                                  <p:childTnLst>
+                                    <p:set>
+                                      <p:cBhvr>
+                                        <p:cTn id="14" dur="1" fill="hold">
+                                          <p:stCondLst>
+                                            <p:cond delay="0"/>
+                                          </p:stCondLst>
+                                        </p:cTn>
+                                        <p:tgtEl>
+                                          <p:spTgt spid="6"/>
+                                        </p:tgtEl>
+                                        <p:attrNameLst>
+                                          <p:attrName>style.visibility</p:attrName>
+                                        </p:attrNameLst>
+                                      </p:cBhvr>
+                                      <p:to>
+                                        <p:strVal val="visible"/>
+                                      </p:to>
+                                    </p:set>
+                                  </p:childTnLst>
+                                </p:cTn>
+                              </p:par>
+                            </p:childTnLst>
+                          </p:cTn>
+                        </p:par>
+                      </p:childTnLst>
+                    </p:cTn>
+                  </p:par>
+                </p:childTnLst>
+              </p:cTn>
+              <p:prevCondLst>
+                <p:cond evt="onPrev" delay="0">
+                  <p:tgtEl>
+                    <p:sldTgt/>
+                  </p:tgtEl>
+                </p:cond>
+              </p:prevCondLst>
+              <p:nextCondLst>
+                <p:cond evt="onNext" delay="0">
+                  <p:tgtEl>
+                    <p:sldTgt/>
+                  </p:tgtEl>
+                </p:cond>
+              </p:nextCondLst>
+            </p:seq>
+          </p:childTnLst>
+        </p:cTn>
+      </p:par>
+    </p:tnLst>
+    <p:bldLst>
+      <p:bldP spid="4" grpId="0" uiExpand="1" build="p"/>
+      <p:bldP spid="5" grpId="0" animBg="1"/>
+      <p:bldP spid="6" grpId="0" animBg="1"/>
+    </p:bldLst>
+  </p:timing>
+</p:sld>
+</file>
+
+<file path=ppt/slides/slide25.xml><?xml version="1.0" encoding="utf-8"?>
 <p:sld xmlns:a="http://schemas.openxmlformats.org/drawingml/2006/main" xmlns:r="http://schemas.openxmlformats.org/officeDocument/2006/relationships" xmlns:p="http://schemas.openxmlformats.org/presentationml/2006/main">
   <p:cSld>
     <p:spTree>
@@ -10967,6 +13298,101 @@
           <a:p>
             <a:r>
               <a:rPr lang="en-US" dirty="0"/>
+              <a:t>Using images</a:t>
+            </a:r>
+            <a:endParaRPr lang="nl-BE" dirty="0"/>
+          </a:p>
+        </p:txBody>
+      </p:sp>
+      <p:sp>
+        <p:nvSpPr>
+          <p:cNvPr id="3" name="Text Placeholder 2"/>
+          <p:cNvSpPr>
+            <a:spLocks noGrp="1"/>
+          </p:cNvSpPr>
+          <p:nvPr>
+            <p:ph type="body" idx="1"/>
+          </p:nvPr>
+        </p:nvSpPr>
+        <p:spPr/>
+        <p:txBody>
+          <a:bodyPr/>
+          <a:lstStyle/>
+          <a:p>
+            <a:endParaRPr lang="nl-BE"/>
+          </a:p>
+        </p:txBody>
+      </p:sp>
+      <p:sp>
+        <p:nvSpPr>
+          <p:cNvPr id="4" name="Slide Number Placeholder 3"/>
+          <p:cNvSpPr>
+            <a:spLocks noGrp="1"/>
+          </p:cNvSpPr>
+          <p:nvPr>
+            <p:ph type="sldNum" sz="quarter" idx="12"/>
+          </p:nvPr>
+        </p:nvSpPr>
+        <p:spPr/>
+        <p:txBody>
+          <a:bodyPr/>
+          <a:lstStyle/>
+          <a:p>
+            <a:fld id="{AEFF399F-E3B5-4890-BC79-9BC8D4DF3F2D}" type="slidenum">
+              <a:rPr lang="nl-BE" smtClean="0"/>
+              <a:t>25</a:t>
+            </a:fld>
+            <a:endParaRPr lang="nl-BE"/>
+          </a:p>
+        </p:txBody>
+      </p:sp>
+    </p:spTree>
+    <p:extLst>
+      <p:ext uri="{BB962C8B-B14F-4D97-AF65-F5344CB8AC3E}">
+        <p14:creationId xmlns:p14="http://schemas.microsoft.com/office/powerpoint/2010/main" val="276782416"/>
+      </p:ext>
+    </p:extLst>
+  </p:cSld>
+  <p:clrMapOvr>
+    <a:masterClrMapping/>
+  </p:clrMapOvr>
+</p:sld>
+</file>
+
+<file path=ppt/slides/slide26.xml><?xml version="1.0" encoding="utf-8"?>
+<p:sld xmlns:a="http://schemas.openxmlformats.org/drawingml/2006/main" xmlns:r="http://schemas.openxmlformats.org/officeDocument/2006/relationships" xmlns:p="http://schemas.openxmlformats.org/presentationml/2006/main">
+  <p:cSld>
+    <p:spTree>
+      <p:nvGrpSpPr>
+        <p:cNvPr id="1" name=""/>
+        <p:cNvGrpSpPr/>
+        <p:nvPr/>
+      </p:nvGrpSpPr>
+      <p:grpSpPr>
+        <a:xfrm>
+          <a:off x="0" y="0"/>
+          <a:ext cx="0" cy="0"/>
+          <a:chOff x="0" y="0"/>
+          <a:chExt cx="0" cy="0"/>
+        </a:xfrm>
+      </p:grpSpPr>
+      <p:sp>
+        <p:nvSpPr>
+          <p:cNvPr id="2" name="Title 1"/>
+          <p:cNvSpPr>
+            <a:spLocks noGrp="1"/>
+          </p:cNvSpPr>
+          <p:nvPr>
+            <p:ph type="title"/>
+          </p:nvPr>
+        </p:nvSpPr>
+        <p:spPr/>
+        <p:txBody>
+          <a:bodyPr/>
+          <a:lstStyle/>
+          <a:p>
+            <a:r>
+              <a:rPr lang="en-US" dirty="0"/>
               <a:t>Run container/execute commands</a:t>
             </a:r>
             <a:endParaRPr lang="nl-BE" dirty="0"/>
@@ -11328,7 +13754,7 @@
           <a:p>
             <a:fld id="{AEFF399F-E3B5-4890-BC79-9BC8D4DF3F2D}" type="slidenum">
               <a:rPr lang="nl-BE" smtClean="0"/>
-              <a:t>23</a:t>
+              <a:t>26</a:t>
             </a:fld>
             <a:endParaRPr lang="nl-BE"/>
           </a:p>
@@ -11725,7 +14151,7 @@
 </p:sld>
 </file>
 
-<file path=ppt/slides/slide24.xml><?xml version="1.0" encoding="utf-8"?>
+<file path=ppt/slides/slide27.xml><?xml version="1.0" encoding="utf-8"?>
 <p:sld xmlns:a="http://schemas.openxmlformats.org/drawingml/2006/main" xmlns:r="http://schemas.openxmlformats.org/officeDocument/2006/relationships" xmlns:p="http://schemas.openxmlformats.org/presentationml/2006/main">
   <p:cSld>
     <p:spTree>
@@ -11826,7 +14252,7 @@
           <a:p>
             <a:fld id="{AEFF399F-E3B5-4890-BC79-9BC8D4DF3F2D}" type="slidenum">
               <a:rPr lang="nl-BE" smtClean="0"/>
-              <a:t>24</a:t>
+              <a:t>27</a:t>
             </a:fld>
             <a:endParaRPr lang="nl-BE"/>
           </a:p>
@@ -12145,7 +14571,7 @@
 </p:sld>
 </file>
 
-<file path=ppt/slides/slide25.xml><?xml version="1.0" encoding="utf-8"?>
+<file path=ppt/slides/slide28.xml><?xml version="1.0" encoding="utf-8"?>
 <p:sld xmlns:a="http://schemas.openxmlformats.org/drawingml/2006/main" xmlns:r="http://schemas.openxmlformats.org/officeDocument/2006/relationships" xmlns:p="http://schemas.openxmlformats.org/presentationml/2006/main">
   <p:cSld>
     <p:spTree>
@@ -12366,7 +14792,7 @@
           <a:p>
             <a:fld id="{AEFF399F-E3B5-4890-BC79-9BC8D4DF3F2D}" type="slidenum">
               <a:rPr lang="nl-BE" smtClean="0"/>
-              <a:t>25</a:t>
+              <a:t>28</a:t>
             </a:fld>
             <a:endParaRPr lang="nl-BE"/>
           </a:p>
@@ -12627,7 +15053,7 @@
 </p:sld>
 </file>
 
-<file path=ppt/slides/slide26.xml><?xml version="1.0" encoding="utf-8"?>
+<file path=ppt/slides/slide29.xml><?xml version="1.0" encoding="utf-8"?>
 <p:sld xmlns:a="http://schemas.openxmlformats.org/drawingml/2006/main" xmlns:r="http://schemas.openxmlformats.org/officeDocument/2006/relationships" xmlns:p="http://schemas.openxmlformats.org/presentationml/2006/main">
   <p:cSld>
     <p:spTree>
@@ -12828,7 +15254,7 @@
           <a:p>
             <a:fld id="{AEFF399F-E3B5-4890-BC79-9BC8D4DF3F2D}" type="slidenum">
               <a:rPr lang="nl-BE" smtClean="0"/>
-              <a:t>26</a:t>
+              <a:t>29</a:t>
             </a:fld>
             <a:endParaRPr lang="nl-BE"/>
           </a:p>
@@ -13216,7 +15642,7 @@
 </p:sld>
 </file>
 
-<file path=ppt/slides/slide27.xml><?xml version="1.0" encoding="utf-8"?>
+<file path=ppt/slides/slide3.xml><?xml version="1.0" encoding="utf-8"?>
 <p:sld xmlns:a="http://schemas.openxmlformats.org/drawingml/2006/main" xmlns:r="http://schemas.openxmlformats.org/officeDocument/2006/relationships" xmlns:p="http://schemas.openxmlformats.org/presentationml/2006/main">
   <p:cSld>
     <p:spTree>
@@ -13250,7 +15676,7 @@
           <a:p>
             <a:r>
               <a:rPr lang="en-US" dirty="0"/>
-              <a:t>Multithreaded applications</a:t>
+              <a:t>Introduction</a:t>
             </a:r>
             <a:endParaRPr lang="nl-BE" dirty="0"/>
           </a:p>
@@ -13292,7 +15718,7 @@
           <a:p>
             <a:fld id="{AEFF399F-E3B5-4890-BC79-9BC8D4DF3F2D}" type="slidenum">
               <a:rPr lang="nl-BE" smtClean="0"/>
-              <a:t>27</a:t>
+              <a:t>3</a:t>
             </a:fld>
             <a:endParaRPr lang="nl-BE"/>
           </a:p>
@@ -13301,7 +15727,7 @@
     </p:spTree>
     <p:extLst>
       <p:ext uri="{BB962C8B-B14F-4D97-AF65-F5344CB8AC3E}">
-        <p14:creationId xmlns:p14="http://schemas.microsoft.com/office/powerpoint/2010/main" val="2233734622"/>
+        <p14:creationId xmlns:p14="http://schemas.microsoft.com/office/powerpoint/2010/main" val="2215557954"/>
       </p:ext>
     </p:extLst>
   </p:cSld>
@@ -13311,7 +15737,7 @@
 </p:sld>
 </file>
 
-<file path=ppt/slides/slide28.xml><?xml version="1.0" encoding="utf-8"?>
+<file path=ppt/slides/slide30.xml><?xml version="1.0" encoding="utf-8"?>
 <p:sld xmlns:a="http://schemas.openxmlformats.org/drawingml/2006/main" xmlns:r="http://schemas.openxmlformats.org/officeDocument/2006/relationships" xmlns:p="http://schemas.openxmlformats.org/presentationml/2006/main">
   <p:cSld>
     <p:spTree>
@@ -13345,9 +15771,28 @@
           <a:p>
             <a:r>
               <a:rPr lang="en-US" dirty="0"/>
-              <a:t>Example recipe file</a:t>
+              <a:t>Multithreaded applications</a:t>
             </a:r>
             <a:endParaRPr lang="nl-BE" dirty="0"/>
+          </a:p>
+        </p:txBody>
+      </p:sp>
+      <p:sp>
+        <p:nvSpPr>
+          <p:cNvPr id="3" name="Text Placeholder 2"/>
+          <p:cNvSpPr>
+            <a:spLocks noGrp="1"/>
+          </p:cNvSpPr>
+          <p:nvPr>
+            <p:ph type="body" idx="1"/>
+          </p:nvPr>
+        </p:nvSpPr>
+        <p:spPr/>
+        <p:txBody>
+          <a:bodyPr/>
+          <a:lstStyle/>
+          <a:p>
+            <a:endParaRPr lang="nl-BE"/>
           </a:p>
         </p:txBody>
       </p:sp>
@@ -13368,7 +15813,83 @@
           <a:p>
             <a:fld id="{AEFF399F-E3B5-4890-BC79-9BC8D4DF3F2D}" type="slidenum">
               <a:rPr lang="nl-BE" smtClean="0"/>
-              <a:t>28</a:t>
+              <a:t>30</a:t>
+            </a:fld>
+            <a:endParaRPr lang="nl-BE"/>
+          </a:p>
+        </p:txBody>
+      </p:sp>
+    </p:spTree>
+    <p:extLst>
+      <p:ext uri="{BB962C8B-B14F-4D97-AF65-F5344CB8AC3E}">
+        <p14:creationId xmlns:p14="http://schemas.microsoft.com/office/powerpoint/2010/main" val="2233734622"/>
+      </p:ext>
+    </p:extLst>
+  </p:cSld>
+  <p:clrMapOvr>
+    <a:masterClrMapping/>
+  </p:clrMapOvr>
+</p:sld>
+</file>
+
+<file path=ppt/slides/slide31.xml><?xml version="1.0" encoding="utf-8"?>
+<p:sld xmlns:a="http://schemas.openxmlformats.org/drawingml/2006/main" xmlns:r="http://schemas.openxmlformats.org/officeDocument/2006/relationships" xmlns:p="http://schemas.openxmlformats.org/presentationml/2006/main">
+  <p:cSld>
+    <p:spTree>
+      <p:nvGrpSpPr>
+        <p:cNvPr id="1" name=""/>
+        <p:cNvGrpSpPr/>
+        <p:nvPr/>
+      </p:nvGrpSpPr>
+      <p:grpSpPr>
+        <a:xfrm>
+          <a:off x="0" y="0"/>
+          <a:ext cx="0" cy="0"/>
+          <a:chOff x="0" y="0"/>
+          <a:chExt cx="0" cy="0"/>
+        </a:xfrm>
+      </p:grpSpPr>
+      <p:sp>
+        <p:nvSpPr>
+          <p:cNvPr id="2" name="Title 1"/>
+          <p:cNvSpPr>
+            <a:spLocks noGrp="1"/>
+          </p:cNvSpPr>
+          <p:nvPr>
+            <p:ph type="title"/>
+          </p:nvPr>
+        </p:nvSpPr>
+        <p:spPr/>
+        <p:txBody>
+          <a:bodyPr/>
+          <a:lstStyle/>
+          <a:p>
+            <a:r>
+              <a:rPr lang="en-US" dirty="0"/>
+              <a:t>Example recipe file</a:t>
+            </a:r>
+            <a:endParaRPr lang="nl-BE" dirty="0"/>
+          </a:p>
+        </p:txBody>
+      </p:sp>
+      <p:sp>
+        <p:nvSpPr>
+          <p:cNvPr id="4" name="Slide Number Placeholder 3"/>
+          <p:cNvSpPr>
+            <a:spLocks noGrp="1"/>
+          </p:cNvSpPr>
+          <p:nvPr>
+            <p:ph type="sldNum" sz="quarter" idx="12"/>
+          </p:nvPr>
+        </p:nvSpPr>
+        <p:spPr/>
+        <p:txBody>
+          <a:bodyPr/>
+          <a:lstStyle/>
+          <a:p>
+            <a:fld id="{AEFF399F-E3B5-4890-BC79-9BC8D4DF3F2D}" type="slidenum">
+              <a:rPr lang="nl-BE" smtClean="0"/>
+              <a:t>31</a:t>
             </a:fld>
             <a:endParaRPr lang="nl-BE"/>
           </a:p>
@@ -14152,7 +16673,7 @@
 </p:sld>
 </file>
 
-<file path=ppt/slides/slide29.xml><?xml version="1.0" encoding="utf-8"?>
+<file path=ppt/slides/slide32.xml><?xml version="1.0" encoding="utf-8"?>
 <p:sld xmlns:a="http://schemas.openxmlformats.org/drawingml/2006/main" xmlns:r="http://schemas.openxmlformats.org/officeDocument/2006/relationships" xmlns:p="http://schemas.openxmlformats.org/presentationml/2006/main">
   <p:cSld>
     <p:spTree>
@@ -14240,7 +16761,7 @@
           <a:p>
             <a:fld id="{AEFF399F-E3B5-4890-BC79-9BC8D4DF3F2D}" type="slidenum">
               <a:rPr lang="nl-BE" smtClean="0"/>
-              <a:t>29</a:t>
+              <a:t>32</a:t>
             </a:fld>
             <a:endParaRPr lang="nl-BE"/>
           </a:p>
@@ -14550,7 +17071,7 @@
 </p:sld>
 </file>
 
-<file path=ppt/slides/slide3.xml><?xml version="1.0" encoding="utf-8"?>
+<file path=ppt/slides/slide33.xml><?xml version="1.0" encoding="utf-8"?>
 <p:sld xmlns:a="http://schemas.openxmlformats.org/drawingml/2006/main" xmlns:r="http://schemas.openxmlformats.org/officeDocument/2006/relationships" xmlns:p="http://schemas.openxmlformats.org/presentationml/2006/main">
   <p:cSld>
     <p:spTree>
@@ -14584,7 +17105,7 @@
           <a:p>
             <a:r>
               <a:rPr lang="en-US" dirty="0"/>
-              <a:t>Introduction</a:t>
+              <a:t>Distributed applications</a:t>
             </a:r>
             <a:endParaRPr lang="nl-BE" dirty="0"/>
           </a:p>
@@ -14626,7 +17147,7 @@
           <a:p>
             <a:fld id="{AEFF399F-E3B5-4890-BC79-9BC8D4DF3F2D}" type="slidenum">
               <a:rPr lang="nl-BE" smtClean="0"/>
-              <a:t>3</a:t>
+              <a:t>33</a:t>
             </a:fld>
             <a:endParaRPr lang="nl-BE"/>
           </a:p>
@@ -14635,7 +17156,7 @@
     </p:spTree>
     <p:extLst>
       <p:ext uri="{BB962C8B-B14F-4D97-AF65-F5344CB8AC3E}">
-        <p14:creationId xmlns:p14="http://schemas.microsoft.com/office/powerpoint/2010/main" val="2215557954"/>
+        <p14:creationId xmlns:p14="http://schemas.microsoft.com/office/powerpoint/2010/main" val="3672421668"/>
       </p:ext>
     </p:extLst>
   </p:cSld>
@@ -14645,7 +17166,7 @@
 </p:sld>
 </file>
 
-<file path=ppt/slides/slide30.xml><?xml version="1.0" encoding="utf-8"?>
+<file path=ppt/slides/slide34.xml><?xml version="1.0" encoding="utf-8"?>
 <p:sld xmlns:a="http://schemas.openxmlformats.org/drawingml/2006/main" xmlns:r="http://schemas.openxmlformats.org/officeDocument/2006/relationships" xmlns:p="http://schemas.openxmlformats.org/presentationml/2006/main">
   <p:cSld>
     <p:spTree>
@@ -14679,28 +17200,9 @@
           <a:p>
             <a:r>
               <a:rPr lang="en-US" dirty="0"/>
-              <a:t>Distributed applications</a:t>
+              <a:t>Example recipe file</a:t>
             </a:r>
             <a:endParaRPr lang="nl-BE" dirty="0"/>
-          </a:p>
-        </p:txBody>
-      </p:sp>
-      <p:sp>
-        <p:nvSpPr>
-          <p:cNvPr id="3" name="Text Placeholder 2"/>
-          <p:cNvSpPr>
-            <a:spLocks noGrp="1"/>
-          </p:cNvSpPr>
-          <p:nvPr>
-            <p:ph type="body" idx="1"/>
-          </p:nvPr>
-        </p:nvSpPr>
-        <p:spPr/>
-        <p:txBody>
-          <a:bodyPr/>
-          <a:lstStyle/>
-          <a:p>
-            <a:endParaRPr lang="nl-BE"/>
           </a:p>
         </p:txBody>
       </p:sp>
@@ -14721,83 +17223,7 @@
           <a:p>
             <a:fld id="{AEFF399F-E3B5-4890-BC79-9BC8D4DF3F2D}" type="slidenum">
               <a:rPr lang="nl-BE" smtClean="0"/>
-              <a:t>30</a:t>
-            </a:fld>
-            <a:endParaRPr lang="nl-BE"/>
-          </a:p>
-        </p:txBody>
-      </p:sp>
-    </p:spTree>
-    <p:extLst>
-      <p:ext uri="{BB962C8B-B14F-4D97-AF65-F5344CB8AC3E}">
-        <p14:creationId xmlns:p14="http://schemas.microsoft.com/office/powerpoint/2010/main" val="3672421668"/>
-      </p:ext>
-    </p:extLst>
-  </p:cSld>
-  <p:clrMapOvr>
-    <a:masterClrMapping/>
-  </p:clrMapOvr>
-</p:sld>
-</file>
-
-<file path=ppt/slides/slide31.xml><?xml version="1.0" encoding="utf-8"?>
-<p:sld xmlns:a="http://schemas.openxmlformats.org/drawingml/2006/main" xmlns:r="http://schemas.openxmlformats.org/officeDocument/2006/relationships" xmlns:p="http://schemas.openxmlformats.org/presentationml/2006/main">
-  <p:cSld>
-    <p:spTree>
-      <p:nvGrpSpPr>
-        <p:cNvPr id="1" name=""/>
-        <p:cNvGrpSpPr/>
-        <p:nvPr/>
-      </p:nvGrpSpPr>
-      <p:grpSpPr>
-        <a:xfrm>
-          <a:off x="0" y="0"/>
-          <a:ext cx="0" cy="0"/>
-          <a:chOff x="0" y="0"/>
-          <a:chExt cx="0" cy="0"/>
-        </a:xfrm>
-      </p:grpSpPr>
-      <p:sp>
-        <p:nvSpPr>
-          <p:cNvPr id="2" name="Title 1"/>
-          <p:cNvSpPr>
-            <a:spLocks noGrp="1"/>
-          </p:cNvSpPr>
-          <p:nvPr>
-            <p:ph type="title"/>
-          </p:nvPr>
-        </p:nvSpPr>
-        <p:spPr/>
-        <p:txBody>
-          <a:bodyPr/>
-          <a:lstStyle/>
-          <a:p>
-            <a:r>
-              <a:rPr lang="en-US" dirty="0"/>
-              <a:t>Example recipe file</a:t>
-            </a:r>
-            <a:endParaRPr lang="nl-BE" dirty="0"/>
-          </a:p>
-        </p:txBody>
-      </p:sp>
-      <p:sp>
-        <p:nvSpPr>
-          <p:cNvPr id="4" name="Slide Number Placeholder 3"/>
-          <p:cNvSpPr>
-            <a:spLocks noGrp="1"/>
-          </p:cNvSpPr>
-          <p:nvPr>
-            <p:ph type="sldNum" sz="quarter" idx="12"/>
-          </p:nvPr>
-        </p:nvSpPr>
-        <p:spPr/>
-        <p:txBody>
-          <a:bodyPr/>
-          <a:lstStyle/>
-          <a:p>
-            <a:fld id="{AEFF399F-E3B5-4890-BC79-9BC8D4DF3F2D}" type="slidenum">
-              <a:rPr lang="nl-BE" smtClean="0"/>
-              <a:t>31</a:t>
+              <a:t>34</a:t>
             </a:fld>
             <a:endParaRPr lang="nl-BE"/>
           </a:p>
@@ -16083,7 +18509,7 @@
 </p:sld>
 </file>
 
-<file path=ppt/slides/slide32.xml><?xml version="1.0" encoding="utf-8"?>
+<file path=ppt/slides/slide35.xml><?xml version="1.0" encoding="utf-8"?>
 <p:sld xmlns:a="http://schemas.openxmlformats.org/drawingml/2006/main" xmlns:r="http://schemas.openxmlformats.org/officeDocument/2006/relationships" xmlns:p="http://schemas.openxmlformats.org/presentationml/2006/main">
   <p:cSld>
     <p:spTree>
@@ -16163,7 +18589,7 @@
           <a:p>
             <a:fld id="{AEFF399F-E3B5-4890-BC79-9BC8D4DF3F2D}" type="slidenum">
               <a:rPr lang="nl-BE" smtClean="0"/>
-              <a:t>32</a:t>
+              <a:t>35</a:t>
             </a:fld>
             <a:endParaRPr lang="nl-BE"/>
           </a:p>
@@ -16493,7 +18919,7 @@
 </p:sld>
 </file>
 
-<file path=ppt/slides/slide33.xml><?xml version="1.0" encoding="utf-8"?>
+<file path=ppt/slides/slide36.xml><?xml version="1.0" encoding="utf-8"?>
 <p:sld xmlns:a="http://schemas.openxmlformats.org/drawingml/2006/main" xmlns:r="http://schemas.openxmlformats.org/officeDocument/2006/relationships" xmlns:p="http://schemas.openxmlformats.org/presentationml/2006/main">
   <p:cSld>
     <p:spTree>
@@ -16568,7 +18994,7 @@
           <a:p>
             <a:fld id="{AEFF399F-E3B5-4890-BC79-9BC8D4DF3F2D}" type="slidenum">
               <a:rPr lang="nl-BE" smtClean="0"/>
-              <a:t>33</a:t>
+              <a:t>36</a:t>
             </a:fld>
             <a:endParaRPr lang="nl-BE"/>
           </a:p>
@@ -16587,7 +19013,7 @@
 </p:sld>
 </file>
 
-<file path=ppt/slides/slide34.xml><?xml version="1.0" encoding="utf-8"?>
+<file path=ppt/slides/slide37.xml><?xml version="1.0" encoding="utf-8"?>
 <p:sld xmlns:a="http://schemas.openxmlformats.org/drawingml/2006/main" xmlns:r="http://schemas.openxmlformats.org/officeDocument/2006/relationships" xmlns:p="http://schemas.openxmlformats.org/presentationml/2006/main">
   <p:cSld>
     <p:spTree>
@@ -16725,7 +19151,7 @@
           <a:p>
             <a:fld id="{AEFF399F-E3B5-4890-BC79-9BC8D4DF3F2D}" type="slidenum">
               <a:rPr lang="nl-BE" smtClean="0"/>
-              <a:t>34</a:t>
+              <a:t>37</a:t>
             </a:fld>
             <a:endParaRPr lang="nl-BE"/>
           </a:p>
@@ -17332,7 +19758,7 @@
 </p:sld>
 </file>
 
-<file path=ppt/slides/slide35.xml><?xml version="1.0" encoding="utf-8"?>
+<file path=ppt/slides/slide38.xml><?xml version="1.0" encoding="utf-8"?>
 <p:sld xmlns:a="http://schemas.openxmlformats.org/drawingml/2006/main" xmlns:r="http://schemas.openxmlformats.org/officeDocument/2006/relationships" xmlns:p="http://schemas.openxmlformats.org/presentationml/2006/main">
   <p:cSld>
     <p:spTree>
@@ -17388,7 +19814,7 @@
           <a:p>
             <a:fld id="{AEFF399F-E3B5-4890-BC79-9BC8D4DF3F2D}" type="slidenum">
               <a:rPr lang="nl-BE" smtClean="0"/>
-              <a:t>35</a:t>
+              <a:t>38</a:t>
             </a:fld>
             <a:endParaRPr lang="nl-BE"/>
           </a:p>
@@ -18152,7 +20578,7 @@
 </p:sld>
 </file>
 
-<file path=ppt/slides/slide36.xml><?xml version="1.0" encoding="utf-8"?>
+<file path=ppt/slides/slide39.xml><?xml version="1.0" encoding="utf-8"?>
 <p:sld xmlns:a="http://schemas.openxmlformats.org/drawingml/2006/main" xmlns:r="http://schemas.openxmlformats.org/officeDocument/2006/relationships" xmlns:p="http://schemas.openxmlformats.org/presentationml/2006/main">
   <p:cSld>
     <p:spTree>
@@ -18208,7 +20634,7 @@
           <a:p>
             <a:fld id="{AEFF399F-E3B5-4890-BC79-9BC8D4DF3F2D}" type="slidenum">
               <a:rPr lang="nl-BE" smtClean="0"/>
-              <a:t>36</a:t>
+              <a:t>39</a:t>
             </a:fld>
             <a:endParaRPr lang="nl-BE"/>
           </a:p>
@@ -19096,7 +21522,7 @@
 </p:sld>
 </file>
 
-<file path=ppt/slides/slide37.xml><?xml version="1.0" encoding="utf-8"?>
+<file path=ppt/slides/slide4.xml><?xml version="1.0" encoding="utf-8"?>
 <p:sld xmlns:a="http://schemas.openxmlformats.org/drawingml/2006/main" xmlns:r="http://schemas.openxmlformats.org/officeDocument/2006/relationships" xmlns:p="http://schemas.openxmlformats.org/presentationml/2006/main">
   <p:cSld>
     <p:spTree>
@@ -19130,6 +21556,361 @@
           <a:p>
             <a:r>
               <a:rPr lang="en-US" dirty="0"/>
+              <a:t>Introduction</a:t>
+            </a:r>
+            <a:endParaRPr lang="nl-BE" dirty="0"/>
+          </a:p>
+        </p:txBody>
+      </p:sp>
+      <p:sp>
+        <p:nvSpPr>
+          <p:cNvPr id="3" name="Content Placeholder 2"/>
+          <p:cNvSpPr>
+            <a:spLocks noGrp="1"/>
+          </p:cNvSpPr>
+          <p:nvPr>
+            <p:ph idx="1"/>
+          </p:nvPr>
+        </p:nvSpPr>
+        <p:spPr/>
+        <p:txBody>
+          <a:bodyPr/>
+          <a:lstStyle/>
+          <a:p>
+            <a:r>
+              <a:rPr lang="en-US" dirty="0"/>
+              <a:t>Singularity originally developed by Berkeley Lab, now at </a:t>
+            </a:r>
+            <a:r>
+              <a:rPr lang="en-US" dirty="0" err="1"/>
+              <a:t>Sylabs</a:t>
+            </a:r>
+            <a:br>
+              <a:rPr lang="en-US" dirty="0"/>
+            </a:br>
+            <a:r>
+              <a:rPr lang="en-US" dirty="0">
+                <a:hlinkClick r:id="rId2"/>
+              </a:rPr>
+              <a:t>https://sylabs.io/singularity/</a:t>
+            </a:r>
+            <a:endParaRPr lang="en-US" dirty="0"/>
+          </a:p>
+          <a:p>
+            <a:r>
+              <a:rPr lang="en-US" dirty="0"/>
+              <a:t>Intended as HPC alternative to</a:t>
+            </a:r>
+          </a:p>
+          <a:p>
+            <a:pPr lvl="1"/>
+            <a:r>
+              <a:rPr lang="en-US" dirty="0"/>
+              <a:t>Docker</a:t>
+            </a:r>
+            <a:br>
+              <a:rPr lang="en-US" dirty="0"/>
+            </a:br>
+            <a:r>
+              <a:rPr lang="en-US" dirty="0">
+                <a:hlinkClick r:id="rId3"/>
+              </a:rPr>
+              <a:t>https://www.docker.com/</a:t>
+            </a:r>
+            <a:r>
+              <a:rPr lang="en-US" dirty="0"/>
+              <a:t> </a:t>
+            </a:r>
+          </a:p>
+          <a:p>
+            <a:pPr lvl="1"/>
+            <a:r>
+              <a:rPr lang="en-US" dirty="0"/>
+              <a:t>Shifter</a:t>
+            </a:r>
+            <a:br>
+              <a:rPr lang="en-US" dirty="0"/>
+            </a:br>
+            <a:r>
+              <a:rPr lang="en-US" dirty="0">
+                <a:hlinkClick r:id="rId4"/>
+              </a:rPr>
+              <a:t>https://github.com/NERSC/shifter</a:t>
+            </a:r>
+            <a:r>
+              <a:rPr lang="en-US" dirty="0"/>
+              <a:t> </a:t>
+            </a:r>
+            <a:endParaRPr lang="nl-BE" dirty="0"/>
+          </a:p>
+        </p:txBody>
+      </p:sp>
+      <p:sp>
+        <p:nvSpPr>
+          <p:cNvPr id="4" name="Slide Number Placeholder 3"/>
+          <p:cNvSpPr>
+            <a:spLocks noGrp="1"/>
+          </p:cNvSpPr>
+          <p:nvPr>
+            <p:ph type="sldNum" sz="quarter" idx="12"/>
+          </p:nvPr>
+        </p:nvSpPr>
+        <p:spPr/>
+        <p:txBody>
+          <a:bodyPr/>
+          <a:lstStyle/>
+          <a:p>
+            <a:fld id="{AEFF399F-E3B5-4890-BC79-9BC8D4DF3F2D}" type="slidenum">
+              <a:rPr lang="nl-BE" smtClean="0"/>
+              <a:t>4</a:t>
+            </a:fld>
+            <a:endParaRPr lang="nl-BE"/>
+          </a:p>
+        </p:txBody>
+      </p:sp>
+    </p:spTree>
+    <p:extLst>
+      <p:ext uri="{BB962C8B-B14F-4D97-AF65-F5344CB8AC3E}">
+        <p14:creationId xmlns:p14="http://schemas.microsoft.com/office/powerpoint/2010/main" val="658783311"/>
+      </p:ext>
+    </p:extLst>
+  </p:cSld>
+  <p:clrMapOvr>
+    <a:masterClrMapping/>
+  </p:clrMapOvr>
+  <p:timing>
+    <p:tnLst>
+      <p:par>
+        <p:cTn id="1" dur="indefinite" restart="never" nodeType="tmRoot">
+          <p:childTnLst>
+            <p:seq concurrent="1" nextAc="seek">
+              <p:cTn id="2" dur="indefinite" nodeType="mainSeq">
+                <p:childTnLst>
+                  <p:par>
+                    <p:cTn id="3" fill="hold">
+                      <p:stCondLst>
+                        <p:cond delay="indefinite"/>
+                        <p:cond evt="onBegin" delay="0">
+                          <p:tn val="2"/>
+                        </p:cond>
+                      </p:stCondLst>
+                      <p:childTnLst>
+                        <p:par>
+                          <p:cTn id="4" fill="hold">
+                            <p:stCondLst>
+                              <p:cond delay="0"/>
+                            </p:stCondLst>
+                            <p:childTnLst>
+                              <p:par>
+                                <p:cTn id="5" presetID="1" presetClass="entr" presetSubtype="0" fill="hold" grpId="0" nodeType="withEffect">
+                                  <p:stCondLst>
+                                    <p:cond delay="0"/>
+                                  </p:stCondLst>
+                                  <p:childTnLst>
+                                    <p:set>
+                                      <p:cBhvr>
+                                        <p:cTn id="6" dur="1" fill="hold">
+                                          <p:stCondLst>
+                                            <p:cond delay="0"/>
+                                          </p:stCondLst>
+                                        </p:cTn>
+                                        <p:tgtEl>
+                                          <p:spTgt spid="3">
+                                            <p:txEl>
+                                              <p:pRg st="0" end="0"/>
+                                            </p:txEl>
+                                          </p:spTgt>
+                                        </p:tgtEl>
+                                        <p:attrNameLst>
+                                          <p:attrName>style.visibility</p:attrName>
+                                        </p:attrNameLst>
+                                      </p:cBhvr>
+                                      <p:to>
+                                        <p:strVal val="visible"/>
+                                      </p:to>
+                                    </p:set>
+                                  </p:childTnLst>
+                                </p:cTn>
+                              </p:par>
+                            </p:childTnLst>
+                          </p:cTn>
+                        </p:par>
+                      </p:childTnLst>
+                    </p:cTn>
+                  </p:par>
+                  <p:par>
+                    <p:cTn id="7" fill="hold">
+                      <p:stCondLst>
+                        <p:cond delay="indefinite"/>
+                      </p:stCondLst>
+                      <p:childTnLst>
+                        <p:par>
+                          <p:cTn id="8" fill="hold">
+                            <p:stCondLst>
+                              <p:cond delay="0"/>
+                            </p:stCondLst>
+                            <p:childTnLst>
+                              <p:par>
+                                <p:cTn id="9" presetID="1" presetClass="entr" presetSubtype="0" fill="hold" grpId="0" nodeType="clickEffect">
+                                  <p:stCondLst>
+                                    <p:cond delay="0"/>
+                                  </p:stCondLst>
+                                  <p:childTnLst>
+                                    <p:set>
+                                      <p:cBhvr>
+                                        <p:cTn id="10" dur="1" fill="hold">
+                                          <p:stCondLst>
+                                            <p:cond delay="0"/>
+                                          </p:stCondLst>
+                                        </p:cTn>
+                                        <p:tgtEl>
+                                          <p:spTgt spid="3">
+                                            <p:txEl>
+                                              <p:pRg st="1" end="1"/>
+                                            </p:txEl>
+                                          </p:spTgt>
+                                        </p:tgtEl>
+                                        <p:attrNameLst>
+                                          <p:attrName>style.visibility</p:attrName>
+                                        </p:attrNameLst>
+                                      </p:cBhvr>
+                                      <p:to>
+                                        <p:strVal val="visible"/>
+                                      </p:to>
+                                    </p:set>
+                                  </p:childTnLst>
+                                </p:cTn>
+                              </p:par>
+                              <p:par>
+                                <p:cTn id="11" presetID="1" presetClass="entr" presetSubtype="0" fill="hold" grpId="0" nodeType="withEffect">
+                                  <p:stCondLst>
+                                    <p:cond delay="0"/>
+                                  </p:stCondLst>
+                                  <p:childTnLst>
+                                    <p:set>
+                                      <p:cBhvr>
+                                        <p:cTn id="12" dur="1" fill="hold">
+                                          <p:stCondLst>
+                                            <p:cond delay="0"/>
+                                          </p:stCondLst>
+                                        </p:cTn>
+                                        <p:tgtEl>
+                                          <p:spTgt spid="3">
+                                            <p:txEl>
+                                              <p:pRg st="2" end="2"/>
+                                            </p:txEl>
+                                          </p:spTgt>
+                                        </p:tgtEl>
+                                        <p:attrNameLst>
+                                          <p:attrName>style.visibility</p:attrName>
+                                        </p:attrNameLst>
+                                      </p:cBhvr>
+                                      <p:to>
+                                        <p:strVal val="visible"/>
+                                      </p:to>
+                                    </p:set>
+                                  </p:childTnLst>
+                                </p:cTn>
+                              </p:par>
+                              <p:par>
+                                <p:cTn id="13" presetID="1" presetClass="entr" presetSubtype="0" fill="hold" grpId="0" nodeType="withEffect">
+                                  <p:stCondLst>
+                                    <p:cond delay="0"/>
+                                  </p:stCondLst>
+                                  <p:childTnLst>
+                                    <p:set>
+                                      <p:cBhvr>
+                                        <p:cTn id="14" dur="1" fill="hold">
+                                          <p:stCondLst>
+                                            <p:cond delay="0"/>
+                                          </p:stCondLst>
+                                        </p:cTn>
+                                        <p:tgtEl>
+                                          <p:spTgt spid="3">
+                                            <p:txEl>
+                                              <p:pRg st="3" end="3"/>
+                                            </p:txEl>
+                                          </p:spTgt>
+                                        </p:tgtEl>
+                                        <p:attrNameLst>
+                                          <p:attrName>style.visibility</p:attrName>
+                                        </p:attrNameLst>
+                                      </p:cBhvr>
+                                      <p:to>
+                                        <p:strVal val="visible"/>
+                                      </p:to>
+                                    </p:set>
+                                  </p:childTnLst>
+                                </p:cTn>
+                              </p:par>
+                            </p:childTnLst>
+                          </p:cTn>
+                        </p:par>
+                      </p:childTnLst>
+                    </p:cTn>
+                  </p:par>
+                </p:childTnLst>
+              </p:cTn>
+              <p:prevCondLst>
+                <p:cond evt="onPrev" delay="0">
+                  <p:tgtEl>
+                    <p:sldTgt/>
+                  </p:tgtEl>
+                </p:cond>
+              </p:prevCondLst>
+              <p:nextCondLst>
+                <p:cond evt="onNext" delay="0">
+                  <p:tgtEl>
+                    <p:sldTgt/>
+                  </p:tgtEl>
+                </p:cond>
+              </p:nextCondLst>
+            </p:seq>
+          </p:childTnLst>
+        </p:cTn>
+      </p:par>
+    </p:tnLst>
+    <p:bldLst>
+      <p:bldP spid="3" grpId="0" uiExpand="1" build="p"/>
+    </p:bldLst>
+  </p:timing>
+</p:sld>
+</file>
+
+<file path=ppt/slides/slide40.xml><?xml version="1.0" encoding="utf-8"?>
+<p:sld xmlns:a="http://schemas.openxmlformats.org/drawingml/2006/main" xmlns:r="http://schemas.openxmlformats.org/officeDocument/2006/relationships" xmlns:p="http://schemas.openxmlformats.org/presentationml/2006/main">
+  <p:cSld>
+    <p:spTree>
+      <p:nvGrpSpPr>
+        <p:cNvPr id="1" name=""/>
+        <p:cNvGrpSpPr/>
+        <p:nvPr/>
+      </p:nvGrpSpPr>
+      <p:grpSpPr>
+        <a:xfrm>
+          <a:off x="0" y="0"/>
+          <a:ext cx="0" cy="0"/>
+          <a:chOff x="0" y="0"/>
+          <a:chExt cx="0" cy="0"/>
+        </a:xfrm>
+      </p:grpSpPr>
+      <p:sp>
+        <p:nvSpPr>
+          <p:cNvPr id="2" name="Title 1"/>
+          <p:cNvSpPr>
+            <a:spLocks noGrp="1"/>
+          </p:cNvSpPr>
+          <p:nvPr>
+            <p:ph type="title"/>
+          </p:nvPr>
+        </p:nvSpPr>
+        <p:spPr/>
+        <p:txBody>
+          <a:bodyPr/>
+          <a:lstStyle/>
+          <a:p>
+            <a:r>
+              <a:rPr lang="en-US" dirty="0"/>
               <a:t>Run instance(s)</a:t>
             </a:r>
           </a:p>
@@ -19204,7 +21985,7 @@
           <a:p>
             <a:fld id="{AEFF399F-E3B5-4890-BC79-9BC8D4DF3F2D}" type="slidenum">
               <a:rPr lang="nl-BE" smtClean="0"/>
-              <a:t>37</a:t>
+              <a:t>40</a:t>
             </a:fld>
             <a:endParaRPr lang="nl-BE" dirty="0"/>
           </a:p>
@@ -19992,7 +22773,7 @@
 </p:sld>
 </file>
 
-<file path=ppt/slides/slide38.xml><?xml version="1.0" encoding="utf-8"?>
+<file path=ppt/slides/slide41.xml><?xml version="1.0" encoding="utf-8"?>
 <p:sld xmlns:a="http://schemas.openxmlformats.org/drawingml/2006/main" xmlns:r="http://schemas.openxmlformats.org/officeDocument/2006/relationships" xmlns:p="http://schemas.openxmlformats.org/presentationml/2006/main">
   <p:cSld>
     <p:spTree>
@@ -20068,7 +22849,7 @@
           <a:p>
             <a:fld id="{AEFF399F-E3B5-4890-BC79-9BC8D4DF3F2D}" type="slidenum">
               <a:rPr lang="nl-BE" smtClean="0"/>
-              <a:t>38</a:t>
+              <a:t>41</a:t>
             </a:fld>
             <a:endParaRPr lang="nl-BE"/>
           </a:p>
@@ -20087,7 +22868,7 @@
 </p:sld>
 </file>
 
-<file path=ppt/slides/slide39.xml><?xml version="1.0" encoding="utf-8"?>
+<file path=ppt/slides/slide42.xml><?xml version="1.0" encoding="utf-8"?>
 <p:sld xmlns:a="http://schemas.openxmlformats.org/drawingml/2006/main" xmlns:r="http://schemas.openxmlformats.org/officeDocument/2006/relationships" xmlns:p="http://schemas.openxmlformats.org/presentationml/2006/main">
   <p:cSld>
     <p:spTree>
@@ -20297,7 +23078,7 @@
           <a:p>
             <a:fld id="{AEFF399F-E3B5-4890-BC79-9BC8D4DF3F2D}" type="slidenum">
               <a:rPr lang="nl-BE" smtClean="0"/>
-              <a:t>39</a:t>
+              <a:t>42</a:t>
             </a:fld>
             <a:endParaRPr lang="nl-BE"/>
           </a:p>
@@ -20827,7 +23608,7 @@
 </p:sld>
 </file>
 
-<file path=ppt/slides/slide4.xml><?xml version="1.0" encoding="utf-8"?>
+<file path=ppt/slides/slide43.xml><?xml version="1.0" encoding="utf-8"?>
 <p:sld xmlns:a="http://schemas.openxmlformats.org/drawingml/2006/main" xmlns:r="http://schemas.openxmlformats.org/officeDocument/2006/relationships" xmlns:p="http://schemas.openxmlformats.org/presentationml/2006/main">
   <p:cSld>
     <p:spTree>
@@ -20861,7 +23642,7 @@
           <a:p>
             <a:r>
               <a:rPr lang="en-US" dirty="0"/>
-              <a:t>Introduction</a:t>
+              <a:t>Singularity performance pitfalls</a:t>
             </a:r>
             <a:endParaRPr lang="nl-BE" dirty="0"/>
           </a:p>
@@ -20884,68 +23665,74 @@
           <a:p>
             <a:r>
               <a:rPr lang="en-US" dirty="0"/>
-              <a:t>Singularity originally developed by Berkeley Lab, now at </a:t>
-            </a:r>
-            <a:r>
-              <a:rPr lang="en-US" dirty="0" err="1"/>
-              <a:t>Sylabs</a:t>
+              <a:t>Using non-optimized libraries/applications</a:t>
+            </a:r>
+          </a:p>
+          <a:p>
+            <a:pPr lvl="1"/>
+            <a:r>
+              <a:rPr lang="en-US" dirty="0"/>
+              <a:t>Compilation can/should target specific hardware,</a:t>
             </a:r>
             <a:br>
               <a:rPr lang="en-US" dirty="0"/>
             </a:br>
             <a:r>
+              <a:rPr lang="en-US" dirty="0"/>
+              <a:t>e.g., </a:t>
+            </a:r>
+            <a:r>
               <a:rPr lang="en-US" dirty="0">
-                <a:hlinkClick r:id="rId2"/>
-              </a:rPr>
-              <a:t>https://sylabs.io/singularity/</a:t>
-            </a:r>
-            <a:endParaRPr lang="en-US" dirty="0"/>
-          </a:p>
-          <a:p>
+                <a:latin typeface="Courier New" panose="02070309020205020404" pitchFamily="49" charset="0"/>
+                <a:cs typeface="Courier New" panose="02070309020205020404" pitchFamily="49" charset="0"/>
+              </a:rPr>
+              <a:t>-</a:t>
+            </a:r>
+            <a:r>
+              <a:rPr lang="en-US" dirty="0" err="1">
+                <a:latin typeface="Courier New" panose="02070309020205020404" pitchFamily="49" charset="0"/>
+                <a:cs typeface="Courier New" panose="02070309020205020404" pitchFamily="49" charset="0"/>
+              </a:rPr>
+              <a:t>xHost</a:t>
+            </a:r>
+            <a:endParaRPr lang="en-US" dirty="0">
+              <a:latin typeface="Courier New" panose="02070309020205020404" pitchFamily="49" charset="0"/>
+              <a:cs typeface="Courier New" panose="02070309020205020404" pitchFamily="49" charset="0"/>
+            </a:endParaRPr>
+          </a:p>
+          <a:p>
+            <a:pPr lvl="1"/>
             <a:r>
               <a:rPr lang="en-US" dirty="0"/>
-              <a:t>Intended as HPC alternative to</a:t>
-            </a:r>
+              <a:t>Performance loss up to 10-40 %</a:t>
+            </a:r>
+            <a:endParaRPr lang="en-US" dirty="0">
+              <a:sym typeface="Symbol" panose="05050102010706020507" pitchFamily="18" charset="2"/>
+            </a:endParaRPr>
           </a:p>
           <a:p>
             <a:pPr lvl="1"/>
             <a:r>
-              <a:rPr lang="en-US" dirty="0"/>
-              <a:t>Docker</a:t>
-            </a:r>
-            <a:br>
-              <a:rPr lang="en-US" dirty="0"/>
-            </a:br>
-            <a:r>
               <a:rPr lang="en-US" dirty="0">
-                <a:hlinkClick r:id="rId3"/>
-              </a:rPr>
-              <a:t>https://www.docker.com/</a:t>
-            </a:r>
-            <a:r>
-              <a:rPr lang="en-US" dirty="0"/>
-              <a:t> </a:t>
+                <a:sym typeface="Symbol" panose="05050102010706020507" pitchFamily="18" charset="2"/>
+              </a:rPr>
+              <a:t>Crucial for BLAS, propagates to other scientific libraries, e.g., LAPACK, </a:t>
+            </a:r>
+            <a:r>
+              <a:rPr lang="en-US" dirty="0" err="1">
+                <a:sym typeface="Symbol" panose="05050102010706020507" pitchFamily="18" charset="2"/>
+              </a:rPr>
+              <a:t>PETSc</a:t>
+            </a:r>
+            <a:r>
+              <a:rPr lang="en-US" dirty="0">
+                <a:sym typeface="Symbol" panose="05050102010706020507" pitchFamily="18" charset="2"/>
+              </a:rPr>
+              <a:t>,…</a:t>
             </a:r>
           </a:p>
           <a:p>
             <a:pPr lvl="1"/>
-            <a:r>
-              <a:rPr lang="en-US" dirty="0"/>
-              <a:t>Shifter</a:t>
-            </a:r>
-            <a:br>
-              <a:rPr lang="en-US" dirty="0"/>
-            </a:br>
-            <a:r>
-              <a:rPr lang="en-US" dirty="0">
-                <a:hlinkClick r:id="rId4"/>
-              </a:rPr>
-              <a:t>https://github.com/NERSC/shifter</a:t>
-            </a:r>
-            <a:r>
-              <a:rPr lang="en-US" dirty="0"/>
-              <a:t> </a:t>
-            </a:r>
             <a:endParaRPr lang="nl-BE" dirty="0"/>
           </a:p>
         </p:txBody>
@@ -20967,368 +23754,7 @@
           <a:p>
             <a:fld id="{AEFF399F-E3B5-4890-BC79-9BC8D4DF3F2D}" type="slidenum">
               <a:rPr lang="nl-BE" smtClean="0"/>
-              <a:t>4</a:t>
-            </a:fld>
-            <a:endParaRPr lang="nl-BE"/>
-          </a:p>
-        </p:txBody>
-      </p:sp>
-    </p:spTree>
-    <p:extLst>
-      <p:ext uri="{BB962C8B-B14F-4D97-AF65-F5344CB8AC3E}">
-        <p14:creationId xmlns:p14="http://schemas.microsoft.com/office/powerpoint/2010/main" val="658783311"/>
-      </p:ext>
-    </p:extLst>
-  </p:cSld>
-  <p:clrMapOvr>
-    <a:masterClrMapping/>
-  </p:clrMapOvr>
-  <p:timing>
-    <p:tnLst>
-      <p:par>
-        <p:cTn id="1" dur="indefinite" restart="never" nodeType="tmRoot">
-          <p:childTnLst>
-            <p:seq concurrent="1" nextAc="seek">
-              <p:cTn id="2" dur="indefinite" nodeType="mainSeq">
-                <p:childTnLst>
-                  <p:par>
-                    <p:cTn id="3" fill="hold">
-                      <p:stCondLst>
-                        <p:cond delay="indefinite"/>
-                        <p:cond evt="onBegin" delay="0">
-                          <p:tn val="2"/>
-                        </p:cond>
-                      </p:stCondLst>
-                      <p:childTnLst>
-                        <p:par>
-                          <p:cTn id="4" fill="hold">
-                            <p:stCondLst>
-                              <p:cond delay="0"/>
-                            </p:stCondLst>
-                            <p:childTnLst>
-                              <p:par>
-                                <p:cTn id="5" presetID="1" presetClass="entr" presetSubtype="0" fill="hold" grpId="0" nodeType="withEffect">
-                                  <p:stCondLst>
-                                    <p:cond delay="0"/>
-                                  </p:stCondLst>
-                                  <p:childTnLst>
-                                    <p:set>
-                                      <p:cBhvr>
-                                        <p:cTn id="6" dur="1" fill="hold">
-                                          <p:stCondLst>
-                                            <p:cond delay="0"/>
-                                          </p:stCondLst>
-                                        </p:cTn>
-                                        <p:tgtEl>
-                                          <p:spTgt spid="3">
-                                            <p:txEl>
-                                              <p:pRg st="0" end="0"/>
-                                            </p:txEl>
-                                          </p:spTgt>
-                                        </p:tgtEl>
-                                        <p:attrNameLst>
-                                          <p:attrName>style.visibility</p:attrName>
-                                        </p:attrNameLst>
-                                      </p:cBhvr>
-                                      <p:to>
-                                        <p:strVal val="visible"/>
-                                      </p:to>
-                                    </p:set>
-                                  </p:childTnLst>
-                                </p:cTn>
-                              </p:par>
-                            </p:childTnLst>
-                          </p:cTn>
-                        </p:par>
-                      </p:childTnLst>
-                    </p:cTn>
-                  </p:par>
-                  <p:par>
-                    <p:cTn id="7" fill="hold">
-                      <p:stCondLst>
-                        <p:cond delay="indefinite"/>
-                      </p:stCondLst>
-                      <p:childTnLst>
-                        <p:par>
-                          <p:cTn id="8" fill="hold">
-                            <p:stCondLst>
-                              <p:cond delay="0"/>
-                            </p:stCondLst>
-                            <p:childTnLst>
-                              <p:par>
-                                <p:cTn id="9" presetID="1" presetClass="entr" presetSubtype="0" fill="hold" grpId="0" nodeType="clickEffect">
-                                  <p:stCondLst>
-                                    <p:cond delay="0"/>
-                                  </p:stCondLst>
-                                  <p:childTnLst>
-                                    <p:set>
-                                      <p:cBhvr>
-                                        <p:cTn id="10" dur="1" fill="hold">
-                                          <p:stCondLst>
-                                            <p:cond delay="0"/>
-                                          </p:stCondLst>
-                                        </p:cTn>
-                                        <p:tgtEl>
-                                          <p:spTgt spid="3">
-                                            <p:txEl>
-                                              <p:pRg st="1" end="1"/>
-                                            </p:txEl>
-                                          </p:spTgt>
-                                        </p:tgtEl>
-                                        <p:attrNameLst>
-                                          <p:attrName>style.visibility</p:attrName>
-                                        </p:attrNameLst>
-                                      </p:cBhvr>
-                                      <p:to>
-                                        <p:strVal val="visible"/>
-                                      </p:to>
-                                    </p:set>
-                                  </p:childTnLst>
-                                </p:cTn>
-                              </p:par>
-                              <p:par>
-                                <p:cTn id="11" presetID="1" presetClass="entr" presetSubtype="0" fill="hold" grpId="0" nodeType="withEffect">
-                                  <p:stCondLst>
-                                    <p:cond delay="0"/>
-                                  </p:stCondLst>
-                                  <p:childTnLst>
-                                    <p:set>
-                                      <p:cBhvr>
-                                        <p:cTn id="12" dur="1" fill="hold">
-                                          <p:stCondLst>
-                                            <p:cond delay="0"/>
-                                          </p:stCondLst>
-                                        </p:cTn>
-                                        <p:tgtEl>
-                                          <p:spTgt spid="3">
-                                            <p:txEl>
-                                              <p:pRg st="2" end="2"/>
-                                            </p:txEl>
-                                          </p:spTgt>
-                                        </p:tgtEl>
-                                        <p:attrNameLst>
-                                          <p:attrName>style.visibility</p:attrName>
-                                        </p:attrNameLst>
-                                      </p:cBhvr>
-                                      <p:to>
-                                        <p:strVal val="visible"/>
-                                      </p:to>
-                                    </p:set>
-                                  </p:childTnLst>
-                                </p:cTn>
-                              </p:par>
-                              <p:par>
-                                <p:cTn id="13" presetID="1" presetClass="entr" presetSubtype="0" fill="hold" grpId="0" nodeType="withEffect">
-                                  <p:stCondLst>
-                                    <p:cond delay="0"/>
-                                  </p:stCondLst>
-                                  <p:childTnLst>
-                                    <p:set>
-                                      <p:cBhvr>
-                                        <p:cTn id="14" dur="1" fill="hold">
-                                          <p:stCondLst>
-                                            <p:cond delay="0"/>
-                                          </p:stCondLst>
-                                        </p:cTn>
-                                        <p:tgtEl>
-                                          <p:spTgt spid="3">
-                                            <p:txEl>
-                                              <p:pRg st="3" end="3"/>
-                                            </p:txEl>
-                                          </p:spTgt>
-                                        </p:tgtEl>
-                                        <p:attrNameLst>
-                                          <p:attrName>style.visibility</p:attrName>
-                                        </p:attrNameLst>
-                                      </p:cBhvr>
-                                      <p:to>
-                                        <p:strVal val="visible"/>
-                                      </p:to>
-                                    </p:set>
-                                  </p:childTnLst>
-                                </p:cTn>
-                              </p:par>
-                            </p:childTnLst>
-                          </p:cTn>
-                        </p:par>
-                      </p:childTnLst>
-                    </p:cTn>
-                  </p:par>
-                </p:childTnLst>
-              </p:cTn>
-              <p:prevCondLst>
-                <p:cond evt="onPrev" delay="0">
-                  <p:tgtEl>
-                    <p:sldTgt/>
-                  </p:tgtEl>
-                </p:cond>
-              </p:prevCondLst>
-              <p:nextCondLst>
-                <p:cond evt="onNext" delay="0">
-                  <p:tgtEl>
-                    <p:sldTgt/>
-                  </p:tgtEl>
-                </p:cond>
-              </p:nextCondLst>
-            </p:seq>
-          </p:childTnLst>
-        </p:cTn>
-      </p:par>
-    </p:tnLst>
-    <p:bldLst>
-      <p:bldP spid="3" grpId="0" uiExpand="1" build="p"/>
-    </p:bldLst>
-  </p:timing>
-</p:sld>
-</file>
-
-<file path=ppt/slides/slide40.xml><?xml version="1.0" encoding="utf-8"?>
-<p:sld xmlns:a="http://schemas.openxmlformats.org/drawingml/2006/main" xmlns:r="http://schemas.openxmlformats.org/officeDocument/2006/relationships" xmlns:p="http://schemas.openxmlformats.org/presentationml/2006/main">
-  <p:cSld>
-    <p:spTree>
-      <p:nvGrpSpPr>
-        <p:cNvPr id="1" name=""/>
-        <p:cNvGrpSpPr/>
-        <p:nvPr/>
-      </p:nvGrpSpPr>
-      <p:grpSpPr>
-        <a:xfrm>
-          <a:off x="0" y="0"/>
-          <a:ext cx="0" cy="0"/>
-          <a:chOff x="0" y="0"/>
-          <a:chExt cx="0" cy="0"/>
-        </a:xfrm>
-      </p:grpSpPr>
-      <p:sp>
-        <p:nvSpPr>
-          <p:cNvPr id="2" name="Title 1"/>
-          <p:cNvSpPr>
-            <a:spLocks noGrp="1"/>
-          </p:cNvSpPr>
-          <p:nvPr>
-            <p:ph type="title"/>
-          </p:nvPr>
-        </p:nvSpPr>
-        <p:spPr/>
-        <p:txBody>
-          <a:bodyPr/>
-          <a:lstStyle/>
-          <a:p>
-            <a:r>
-              <a:rPr lang="en-US" dirty="0"/>
-              <a:t>Singularity performance pitfalls</a:t>
-            </a:r>
-            <a:endParaRPr lang="nl-BE" dirty="0"/>
-          </a:p>
-        </p:txBody>
-      </p:sp>
-      <p:sp>
-        <p:nvSpPr>
-          <p:cNvPr id="3" name="Content Placeholder 2"/>
-          <p:cNvSpPr>
-            <a:spLocks noGrp="1"/>
-          </p:cNvSpPr>
-          <p:nvPr>
-            <p:ph idx="1"/>
-          </p:nvPr>
-        </p:nvSpPr>
-        <p:spPr/>
-        <p:txBody>
-          <a:bodyPr/>
-          <a:lstStyle/>
-          <a:p>
-            <a:r>
-              <a:rPr lang="en-US" dirty="0"/>
-              <a:t>Using non-optimized libraries/applications</a:t>
-            </a:r>
-          </a:p>
-          <a:p>
-            <a:pPr lvl="1"/>
-            <a:r>
-              <a:rPr lang="en-US" dirty="0"/>
-              <a:t>Compilation can/should target specific hardware,</a:t>
-            </a:r>
-            <a:br>
-              <a:rPr lang="en-US" dirty="0"/>
-            </a:br>
-            <a:r>
-              <a:rPr lang="en-US" dirty="0"/>
-              <a:t>e.g., </a:t>
-            </a:r>
-            <a:r>
-              <a:rPr lang="en-US" dirty="0">
-                <a:latin typeface="Courier New" panose="02070309020205020404" pitchFamily="49" charset="0"/>
-                <a:cs typeface="Courier New" panose="02070309020205020404" pitchFamily="49" charset="0"/>
-              </a:rPr>
-              <a:t>-</a:t>
-            </a:r>
-            <a:r>
-              <a:rPr lang="en-US" dirty="0" err="1">
-                <a:latin typeface="Courier New" panose="02070309020205020404" pitchFamily="49" charset="0"/>
-                <a:cs typeface="Courier New" panose="02070309020205020404" pitchFamily="49" charset="0"/>
-              </a:rPr>
-              <a:t>xHost</a:t>
-            </a:r>
-            <a:endParaRPr lang="en-US" dirty="0">
-              <a:latin typeface="Courier New" panose="02070309020205020404" pitchFamily="49" charset="0"/>
-              <a:cs typeface="Courier New" panose="02070309020205020404" pitchFamily="49" charset="0"/>
-            </a:endParaRPr>
-          </a:p>
-          <a:p>
-            <a:pPr lvl="1"/>
-            <a:r>
-              <a:rPr lang="en-US" dirty="0"/>
-              <a:t>Performance loss up to 10-40 %</a:t>
-            </a:r>
-            <a:endParaRPr lang="en-US" dirty="0">
-              <a:sym typeface="Symbol" panose="05050102010706020507" pitchFamily="18" charset="2"/>
-            </a:endParaRPr>
-          </a:p>
-          <a:p>
-            <a:pPr lvl="1"/>
-            <a:r>
-              <a:rPr lang="en-US" dirty="0">
-                <a:sym typeface="Symbol" panose="05050102010706020507" pitchFamily="18" charset="2"/>
-              </a:rPr>
-              <a:t>Crucial for BLAS, propagates to other scientific libraries, e.g., LAPACK, </a:t>
-            </a:r>
-            <a:r>
-              <a:rPr lang="en-US" dirty="0" err="1">
-                <a:sym typeface="Symbol" panose="05050102010706020507" pitchFamily="18" charset="2"/>
-              </a:rPr>
-              <a:t>PETSc</a:t>
-            </a:r>
-            <a:r>
-              <a:rPr lang="en-US" dirty="0">
-                <a:sym typeface="Symbol" panose="05050102010706020507" pitchFamily="18" charset="2"/>
-              </a:rPr>
-              <a:t>,…</a:t>
-            </a:r>
-          </a:p>
-          <a:p>
-            <a:pPr lvl="1"/>
-            <a:endParaRPr lang="nl-BE" dirty="0"/>
-          </a:p>
-        </p:txBody>
-      </p:sp>
-      <p:sp>
-        <p:nvSpPr>
-          <p:cNvPr id="4" name="Slide Number Placeholder 3"/>
-          <p:cNvSpPr>
-            <a:spLocks noGrp="1"/>
-          </p:cNvSpPr>
-          <p:nvPr>
-            <p:ph type="sldNum" sz="quarter" idx="12"/>
-          </p:nvPr>
-        </p:nvSpPr>
-        <p:spPr/>
-        <p:txBody>
-          <a:bodyPr/>
-          <a:lstStyle/>
-          <a:p>
-            <a:fld id="{AEFF399F-E3B5-4890-BC79-9BC8D4DF3F2D}" type="slidenum">
-              <a:rPr lang="nl-BE" smtClean="0"/>
-              <a:t>40</a:t>
+              <a:t>43</a:t>
             </a:fld>
             <a:endParaRPr lang="nl-BE"/>
           </a:p>
@@ -21579,7 +24005,7 @@
 </p:sld>
 </file>
 
-<file path=ppt/slides/slide41.xml><?xml version="1.0" encoding="utf-8"?>
+<file path=ppt/slides/slide44.xml><?xml version="1.0" encoding="utf-8"?>
 <p:sld xmlns:a="http://schemas.openxmlformats.org/drawingml/2006/main" xmlns:r="http://schemas.openxmlformats.org/officeDocument/2006/relationships" xmlns:p="http://schemas.openxmlformats.org/presentationml/2006/main">
   <p:cSld>
     <p:spTree>
@@ -21655,7 +24081,7 @@
           <a:p>
             <a:fld id="{AEFF399F-E3B5-4890-BC79-9BC8D4DF3F2D}" type="slidenum">
               <a:rPr lang="nl-BE" smtClean="0"/>
-              <a:t>41</a:t>
+              <a:t>44</a:t>
             </a:fld>
             <a:endParaRPr lang="nl-BE"/>
           </a:p>
@@ -21674,7 +24100,7 @@
 </p:sld>
 </file>
 
-<file path=ppt/slides/slide42.xml><?xml version="1.0" encoding="utf-8"?>
+<file path=ppt/slides/slide45.xml><?xml version="1.0" encoding="utf-8"?>
 <p:sld xmlns:a="http://schemas.openxmlformats.org/drawingml/2006/main" xmlns:r="http://schemas.openxmlformats.org/officeDocument/2006/relationships" xmlns:p="http://schemas.openxmlformats.org/presentationml/2006/main">
   <p:cSld>
     <p:spTree>
@@ -21824,7 +24250,7 @@
           <a:p>
             <a:fld id="{AEFF399F-E3B5-4890-BC79-9BC8D4DF3F2D}" type="slidenum">
               <a:rPr lang="nl-BE" smtClean="0"/>
-              <a:t>42</a:t>
+              <a:t>45</a:t>
             </a:fld>
             <a:endParaRPr lang="nl-BE"/>
           </a:p>
@@ -22333,7 +24759,7 @@
 </p:sld>
 </file>
 
-<file path=ppt/slides/slide43.xml><?xml version="1.0" encoding="utf-8"?>
+<file path=ppt/slides/slide46.xml><?xml version="1.0" encoding="utf-8"?>
 <p:sld xmlns:a="http://schemas.openxmlformats.org/drawingml/2006/main" xmlns:r="http://schemas.openxmlformats.org/officeDocument/2006/relationships" xmlns:p="http://schemas.openxmlformats.org/presentationml/2006/main">
   <p:cSld>
     <p:spTree>
@@ -22537,7 +24963,7 @@
           <a:p>
             <a:fld id="{AEFF399F-E3B5-4890-BC79-9BC8D4DF3F2D}" type="slidenum">
               <a:rPr lang="nl-BE" smtClean="0"/>
-              <a:t>43</a:t>
+              <a:t>46</a:t>
             </a:fld>
             <a:endParaRPr lang="nl-BE"/>
           </a:p>
@@ -22868,7 +25294,7 @@
 </p:sld>
 </file>
 
-<file path=ppt/slides/slide44.xml><?xml version="1.0" encoding="utf-8"?>
+<file path=ppt/slides/slide47.xml><?xml version="1.0" encoding="utf-8"?>
 <p:sld xmlns:a="http://schemas.openxmlformats.org/drawingml/2006/main" xmlns:r="http://schemas.openxmlformats.org/officeDocument/2006/relationships" xmlns:p="http://schemas.openxmlformats.org/presentationml/2006/main">
   <p:cSld>
     <p:spTree>
@@ -23014,7 +25440,7 @@
           <a:p>
             <a:fld id="{AEFF399F-E3B5-4890-BC79-9BC8D4DF3F2D}" type="slidenum">
               <a:rPr lang="nl-BE" smtClean="0"/>
-              <a:t>44</a:t>
+              <a:t>47</a:t>
             </a:fld>
             <a:endParaRPr lang="nl-BE"/>
           </a:p>
@@ -23033,7 +25459,7 @@
 </p:sld>
 </file>
 
-<file path=ppt/slides/slide45.xml><?xml version="1.0" encoding="utf-8"?>
+<file path=ppt/slides/slide48.xml><?xml version="1.0" encoding="utf-8"?>
 <p:sld xmlns:a="http://schemas.openxmlformats.org/drawingml/2006/main" xmlns:r="http://schemas.openxmlformats.org/officeDocument/2006/relationships" xmlns:p="http://schemas.openxmlformats.org/presentationml/2006/main">
   <p:cSld>
     <p:spTree>
@@ -23345,7 +25771,7 @@
           <a:p>
             <a:fld id="{AEFF399F-E3B5-4890-BC79-9BC8D4DF3F2D}" type="slidenum">
               <a:rPr lang="nl-BE" smtClean="0"/>
-              <a:t>45</a:t>
+              <a:t>48</a:t>
             </a:fld>
             <a:endParaRPr lang="nl-BE"/>
           </a:p>

</xml_diff>

<commit_message>
Fix image file names
</commit_message>
<xml_diff>
--- a/singularity.pptx
+++ b/singularity.pptx
@@ -5,7 +5,7 @@
     <p:sldMasterId id="2147483660" r:id="rId1"/>
   </p:sldMasterIdLst>
   <p:notesMasterIdLst>
-    <p:notesMasterId r:id="rId50"/>
+    <p:notesMasterId r:id="rId52"/>
   </p:notesMasterIdLst>
   <p:sldIdLst>
     <p:sldId id="256" r:id="rId2"/>
@@ -51,11 +51,13 @@
     <p:sldId id="285" r:id="rId42"/>
     <p:sldId id="286" r:id="rId43"/>
     <p:sldId id="287" r:id="rId44"/>
-    <p:sldId id="272" r:id="rId45"/>
-    <p:sldId id="276" r:id="rId46"/>
-    <p:sldId id="270" r:id="rId47"/>
-    <p:sldId id="277" r:id="rId48"/>
-    <p:sldId id="291" r:id="rId49"/>
+    <p:sldId id="307" r:id="rId45"/>
+    <p:sldId id="308" r:id="rId46"/>
+    <p:sldId id="272" r:id="rId47"/>
+    <p:sldId id="276" r:id="rId48"/>
+    <p:sldId id="270" r:id="rId49"/>
+    <p:sldId id="277" r:id="rId50"/>
+    <p:sldId id="291" r:id="rId51"/>
   </p:sldIdLst>
   <p:sldSz cx="9144000" cy="6858000" type="screen4x3"/>
   <p:notesSz cx="6858000" cy="9144000"/>
@@ -230,6 +232,8 @@
             <p14:sldId id="285"/>
             <p14:sldId id="286"/>
             <p14:sldId id="287"/>
+            <p14:sldId id="307"/>
+            <p14:sldId id="308"/>
           </p14:sldIdLst>
         </p14:section>
         <p14:section name="Conclusions" id="{BD187F37-5316-4956-98DF-2B94953326CB}">
@@ -336,7 +340,7 @@
           <a:p>
             <a:fld id="{6BD974B4-F374-4E74-84D3-1EB7DBF32A2A}" type="datetimeFigureOut">
               <a:rPr lang="nl-BE" smtClean="0"/>
-              <a:t>17/11/2020</a:t>
+              <a:t>15/11/2021</a:t>
             </a:fld>
             <a:endParaRPr lang="nl-BE"/>
           </a:p>
@@ -819,7 +823,7 @@
           <a:p>
             <a:fld id="{A433E747-842D-4EF3-8202-AC54FEC33061}" type="datetime1">
               <a:rPr lang="nl-BE" smtClean="0"/>
-              <a:t>17/11/2020</a:t>
+              <a:t>15/11/2021</a:t>
             </a:fld>
             <a:endParaRPr lang="nl-BE"/>
           </a:p>
@@ -989,7 +993,7 @@
           <a:p>
             <a:fld id="{7C821354-3381-4DF5-ABED-FDAFA2BAD3F8}" type="datetime1">
               <a:rPr lang="nl-BE" smtClean="0"/>
-              <a:t>17/11/2020</a:t>
+              <a:t>15/11/2021</a:t>
             </a:fld>
             <a:endParaRPr lang="nl-BE"/>
           </a:p>
@@ -1169,7 +1173,7 @@
           <a:p>
             <a:fld id="{C6B54B95-9964-4BBF-B171-A69413AB9FC5}" type="datetime1">
               <a:rPr lang="nl-BE" smtClean="0"/>
-              <a:t>17/11/2020</a:t>
+              <a:t>15/11/2021</a:t>
             </a:fld>
             <a:endParaRPr lang="nl-BE"/>
           </a:p>
@@ -1339,7 +1343,7 @@
           <a:p>
             <a:fld id="{BE45CDE5-064C-4862-90E9-83B8FD778625}" type="datetime1">
               <a:rPr lang="nl-BE" smtClean="0"/>
-              <a:t>17/11/2020</a:t>
+              <a:t>15/11/2021</a:t>
             </a:fld>
             <a:endParaRPr lang="nl-BE"/>
           </a:p>
@@ -1583,7 +1587,7 @@
           <a:p>
             <a:fld id="{C75A345C-628E-463E-B8F7-69C25D344DF5}" type="datetime1">
               <a:rPr lang="nl-BE" smtClean="0"/>
-              <a:t>17/11/2020</a:t>
+              <a:t>15/11/2021</a:t>
             </a:fld>
             <a:endParaRPr lang="nl-BE"/>
           </a:p>
@@ -1815,7 +1819,7 @@
           <a:p>
             <a:fld id="{65B04534-538C-4249-A635-8BB2B8486464}" type="datetime1">
               <a:rPr lang="nl-BE" smtClean="0"/>
-              <a:t>17/11/2020</a:t>
+              <a:t>15/11/2021</a:t>
             </a:fld>
             <a:endParaRPr lang="nl-BE"/>
           </a:p>
@@ -2182,7 +2186,7 @@
           <a:p>
             <a:fld id="{089671CB-8547-4C91-A3D5-012E6E8790E6}" type="datetime1">
               <a:rPr lang="nl-BE" smtClean="0"/>
-              <a:t>17/11/2020</a:t>
+              <a:t>15/11/2021</a:t>
             </a:fld>
             <a:endParaRPr lang="nl-BE"/>
           </a:p>
@@ -2300,7 +2304,7 @@
           <a:p>
             <a:fld id="{5765335F-FC99-4A2B-B87B-6AF6F3762B67}" type="datetime1">
               <a:rPr lang="nl-BE" smtClean="0"/>
-              <a:t>17/11/2020</a:t>
+              <a:t>15/11/2021</a:t>
             </a:fld>
             <a:endParaRPr lang="nl-BE"/>
           </a:p>
@@ -2395,7 +2399,7 @@
           <a:p>
             <a:fld id="{1711BA58-B677-4D21-BDCD-9DD1AEA8A328}" type="datetime1">
               <a:rPr lang="nl-BE" smtClean="0"/>
-              <a:t>17/11/2020</a:t>
+              <a:t>15/11/2021</a:t>
             </a:fld>
             <a:endParaRPr lang="nl-BE"/>
           </a:p>
@@ -2672,7 +2676,7 @@
           <a:p>
             <a:fld id="{5513BE8B-B89C-461B-89D1-D5BE33ADB6B9}" type="datetime1">
               <a:rPr lang="nl-BE" smtClean="0"/>
-              <a:t>17/11/2020</a:t>
+              <a:t>15/11/2021</a:t>
             </a:fld>
             <a:endParaRPr lang="nl-BE"/>
           </a:p>
@@ -2929,7 +2933,7 @@
           <a:p>
             <a:fld id="{AEE65485-0554-4482-9B9C-289893A0B56B}" type="datetime1">
               <a:rPr lang="nl-BE" smtClean="0"/>
-              <a:t>17/11/2020</a:t>
+              <a:t>15/11/2021</a:t>
             </a:fld>
             <a:endParaRPr lang="nl-BE"/>
           </a:p>
@@ -3142,7 +3146,7 @@
           <a:p>
             <a:fld id="{6FF26CEC-AF8A-4096-9A53-521F7571A055}" type="datetime1">
               <a:rPr lang="nl-BE" smtClean="0"/>
-              <a:t>17/11/2020</a:t>
+              <a:t>15/11/2021</a:t>
             </a:fld>
             <a:endParaRPr lang="nl-BE"/>
           </a:p>
@@ -7414,7 +7418,7 @@
           </a:ln>
         </p:spPr>
         <p:txBody>
-          <a:bodyPr wrap="none" rtlCol="0">
+          <a:bodyPr wrap="square" rtlCol="0">
             <a:spAutoFit/>
           </a:bodyPr>
           <a:lstStyle/>
@@ -7440,7 +7444,7 @@
                 <a:latin typeface="Courier New" panose="02070309020205020404" pitchFamily="49" charset="0"/>
                 <a:cs typeface="Courier New" panose="02070309020205020404" pitchFamily="49" charset="0"/>
               </a:rPr>
-              <a:t>grace.simg</a:t>
+              <a:t>grace.sif</a:t>
             </a:r>
             <a:endParaRPr lang="nl-BE" dirty="0">
               <a:latin typeface="Courier New" panose="02070309020205020404" pitchFamily="49" charset="0"/>
@@ -14267,7 +14271,7 @@
         <p:spPr>
           <a:xfrm>
             <a:off x="800101" y="2402029"/>
-            <a:ext cx="7353295" cy="2031325"/>
+            <a:ext cx="7491153" cy="2031325"/>
           </a:xfrm>
           <a:prstGeom prst="rect">
             <a:avLst/>
@@ -14378,7 +14382,7 @@
                 <a:latin typeface="Courier New" panose="02070309020205020404" pitchFamily="49" charset="0"/>
                 <a:cs typeface="Courier New" panose="02070309020205020404" pitchFamily="49" charset="0"/>
               </a:rPr>
-              <a:t> –data data.dat \</a:t>
+              <a:t> –data  data.dat \</a:t>
             </a:r>
             <a:br>
               <a:rPr lang="en-US" dirty="0">
@@ -24044,7 +24048,13 @@
       </p:grpSpPr>
       <p:sp>
         <p:nvSpPr>
-          <p:cNvPr id="2" name="Title 1"/>
+          <p:cNvPr id="5" name="Title 4">
+            <a:extLst>
+              <a:ext uri="{FF2B5EF4-FFF2-40B4-BE49-F238E27FC236}">
+                <a16:creationId xmlns:a16="http://schemas.microsoft.com/office/drawing/2014/main" id="{9091AECB-7A4E-4CDD-8034-431325CB5480}"/>
+              </a:ext>
+            </a:extLst>
+          </p:cNvPr>
           <p:cNvSpPr>
             <a:spLocks noGrp="1"/>
           </p:cNvSpPr>
@@ -24058,16 +24068,22 @@
           <a:lstStyle/>
           <a:p>
             <a:r>
-              <a:rPr lang="en-US" dirty="0"/>
-              <a:t>Conclusions</a:t>
-            </a:r>
-            <a:endParaRPr lang="nl-BE" dirty="0"/>
+              <a:rPr lang="en-US" dirty="0" err="1"/>
+              <a:t>podman</a:t>
+            </a:r>
+            <a:endParaRPr lang="en-US" dirty="0"/>
           </a:p>
         </p:txBody>
       </p:sp>
       <p:sp>
         <p:nvSpPr>
-          <p:cNvPr id="3" name="Text Placeholder 2"/>
+          <p:cNvPr id="6" name="Text Placeholder 5">
+            <a:extLst>
+              <a:ext uri="{FF2B5EF4-FFF2-40B4-BE49-F238E27FC236}">
+                <a16:creationId xmlns:a16="http://schemas.microsoft.com/office/drawing/2014/main" id="{C6E58A0E-B656-4AC9-956C-A89EE4C1B406}"/>
+              </a:ext>
+            </a:extLst>
+          </p:cNvPr>
           <p:cNvSpPr>
             <a:spLocks noGrp="1"/>
           </p:cNvSpPr>
@@ -24080,13 +24096,19 @@
           <a:bodyPr/>
           <a:lstStyle/>
           <a:p>
-            <a:endParaRPr lang="nl-BE"/>
+            <a:endParaRPr lang="en-US"/>
           </a:p>
         </p:txBody>
       </p:sp>
       <p:sp>
         <p:nvSpPr>
-          <p:cNvPr id="4" name="Slide Number Placeholder 3"/>
+          <p:cNvPr id="4" name="Slide Number Placeholder 3">
+            <a:extLst>
+              <a:ext uri="{FF2B5EF4-FFF2-40B4-BE49-F238E27FC236}">
+                <a16:creationId xmlns:a16="http://schemas.microsoft.com/office/drawing/2014/main" id="{452170FA-B818-48CB-9A82-774DAE2FEC5D}"/>
+              </a:ext>
+            </a:extLst>
+          </p:cNvPr>
           <p:cNvSpPr>
             <a:spLocks noGrp="1"/>
           </p:cNvSpPr>
@@ -24110,7 +24132,7 @@
     </p:spTree>
     <p:extLst>
       <p:ext uri="{BB962C8B-B14F-4D97-AF65-F5344CB8AC3E}">
-        <p14:creationId xmlns:p14="http://schemas.microsoft.com/office/powerpoint/2010/main" val="2192721825"/>
+        <p14:creationId xmlns:p14="http://schemas.microsoft.com/office/powerpoint/2010/main" val="1670907563"/>
       </p:ext>
     </p:extLst>
   </p:cSld>
@@ -24121,6 +24143,155 @@
 </file>
 
 <file path=ppt/slides/slide45.xml><?xml version="1.0" encoding="utf-8"?>
+<p:sld xmlns:a="http://schemas.openxmlformats.org/drawingml/2006/main" xmlns:r="http://schemas.openxmlformats.org/officeDocument/2006/relationships" xmlns:p="http://schemas.openxmlformats.org/presentationml/2006/main">
+  <p:cSld>
+    <p:spTree>
+      <p:nvGrpSpPr>
+        <p:cNvPr id="1" name=""/>
+        <p:cNvGrpSpPr/>
+        <p:nvPr/>
+      </p:nvGrpSpPr>
+      <p:grpSpPr>
+        <a:xfrm>
+          <a:off x="0" y="0"/>
+          <a:ext cx="0" cy="0"/>
+          <a:chOff x="0" y="0"/>
+          <a:chExt cx="0" cy="0"/>
+        </a:xfrm>
+      </p:grpSpPr>
+      <p:sp>
+        <p:nvSpPr>
+          <p:cNvPr id="5" name="Title 4">
+            <a:extLst>
+              <a:ext uri="{FF2B5EF4-FFF2-40B4-BE49-F238E27FC236}">
+                <a16:creationId xmlns:a16="http://schemas.microsoft.com/office/drawing/2014/main" id="{0CEDB9E8-B663-4F3A-A21B-A8783B115314}"/>
+              </a:ext>
+            </a:extLst>
+          </p:cNvPr>
+          <p:cNvSpPr>
+            <a:spLocks noGrp="1"/>
+          </p:cNvSpPr>
+          <p:nvPr>
+            <p:ph type="title"/>
+          </p:nvPr>
+        </p:nvSpPr>
+        <p:spPr/>
+        <p:txBody>
+          <a:bodyPr/>
+          <a:lstStyle/>
+          <a:p>
+            <a:r>
+              <a:rPr lang="en-US" dirty="0"/>
+              <a:t>But I want docker…</a:t>
+            </a:r>
+          </a:p>
+        </p:txBody>
+      </p:sp>
+      <p:sp>
+        <p:nvSpPr>
+          <p:cNvPr id="6" name="Content Placeholder 5">
+            <a:extLst>
+              <a:ext uri="{FF2B5EF4-FFF2-40B4-BE49-F238E27FC236}">
+                <a16:creationId xmlns:a16="http://schemas.microsoft.com/office/drawing/2014/main" id="{649BF7E2-9ACC-4E8B-B122-38ECC991897B}"/>
+              </a:ext>
+            </a:extLst>
+          </p:cNvPr>
+          <p:cNvSpPr>
+            <a:spLocks noGrp="1"/>
+          </p:cNvSpPr>
+          <p:nvPr>
+            <p:ph idx="1"/>
+          </p:nvPr>
+        </p:nvSpPr>
+        <p:spPr/>
+        <p:txBody>
+          <a:bodyPr/>
+          <a:lstStyle/>
+          <a:p>
+            <a:r>
+              <a:rPr lang="en-US" dirty="0" err="1"/>
+              <a:t>podman</a:t>
+            </a:r>
+            <a:endParaRPr lang="en-US" dirty="0"/>
+          </a:p>
+          <a:p>
+            <a:pPr lvl="1"/>
+            <a:r>
+              <a:rPr lang="en-US" dirty="0"/>
+              <a:t>Can build containers without </a:t>
+            </a:r>
+            <a:r>
+              <a:rPr lang="en-US" dirty="0" err="1"/>
+              <a:t>sudo</a:t>
+            </a:r>
+            <a:endParaRPr lang="en-US" dirty="0"/>
+          </a:p>
+          <a:p>
+            <a:pPr lvl="1"/>
+            <a:r>
+              <a:rPr lang="en-US" dirty="0"/>
+              <a:t>Can run rootless containers</a:t>
+            </a:r>
+          </a:p>
+          <a:p>
+            <a:pPr lvl="2"/>
+            <a:r>
+              <a:rPr lang="en-US" dirty="0"/>
+              <a:t>No daemon</a:t>
+            </a:r>
+          </a:p>
+          <a:p>
+            <a:pPr lvl="1"/>
+            <a:r>
+              <a:rPr lang="en-US" dirty="0"/>
+              <a:t>Same commands as docker</a:t>
+            </a:r>
+          </a:p>
+        </p:txBody>
+      </p:sp>
+      <p:sp>
+        <p:nvSpPr>
+          <p:cNvPr id="4" name="Slide Number Placeholder 3">
+            <a:extLst>
+              <a:ext uri="{FF2B5EF4-FFF2-40B4-BE49-F238E27FC236}">
+                <a16:creationId xmlns:a16="http://schemas.microsoft.com/office/drawing/2014/main" id="{1A84113E-F77B-43C6-BF67-2394DEA6519B}"/>
+              </a:ext>
+            </a:extLst>
+          </p:cNvPr>
+          <p:cNvSpPr>
+            <a:spLocks noGrp="1"/>
+          </p:cNvSpPr>
+          <p:nvPr>
+            <p:ph type="sldNum" sz="quarter" idx="12"/>
+          </p:nvPr>
+        </p:nvSpPr>
+        <p:spPr/>
+        <p:txBody>
+          <a:bodyPr/>
+          <a:lstStyle/>
+          <a:p>
+            <a:fld id="{AEFF399F-E3B5-4890-BC79-9BC8D4DF3F2D}" type="slidenum">
+              <a:rPr lang="nl-BE" smtClean="0"/>
+              <a:t>45</a:t>
+            </a:fld>
+            <a:endParaRPr lang="nl-BE"/>
+          </a:p>
+        </p:txBody>
+      </p:sp>
+    </p:spTree>
+    <p:extLst>
+      <p:ext uri="{BB962C8B-B14F-4D97-AF65-F5344CB8AC3E}">
+        <p14:creationId xmlns:p14="http://schemas.microsoft.com/office/powerpoint/2010/main" val="1785437508"/>
+      </p:ext>
+    </p:extLst>
+  </p:cSld>
+  <p:clrMapOvr>
+    <a:masterClrMapping/>
+  </p:clrMapOvr>
+</p:sld>
+</file>
+
+<file path=ppt/slides/slide46.xml><?xml version="1.0" encoding="utf-8"?>
 <p:sld xmlns:a="http://schemas.openxmlformats.org/drawingml/2006/main" xmlns:r="http://schemas.openxmlformats.org/officeDocument/2006/relationships" xmlns:p="http://schemas.openxmlformats.org/presentationml/2006/main">
   <p:cSld>
     <p:spTree>
@@ -24162,12 +24333,12 @@
       </p:sp>
       <p:sp>
         <p:nvSpPr>
-          <p:cNvPr id="3" name="Content Placeholder 2"/>
+          <p:cNvPr id="3" name="Text Placeholder 2"/>
           <p:cNvSpPr>
             <a:spLocks noGrp="1"/>
           </p:cNvSpPr>
           <p:nvPr>
-            <p:ph idx="1"/>
+            <p:ph type="body" idx="1"/>
           </p:nvPr>
         </p:nvSpPr>
         <p:spPr/>
@@ -24175,81 +24346,7 @@
           <a:bodyPr/>
           <a:lstStyle/>
           <a:p>
-            <a:r>
-              <a:rPr lang="en-US" dirty="0"/>
-              <a:t>Singularity advantages</a:t>
-            </a:r>
-          </a:p>
-          <a:p>
-            <a:pPr lvl="1"/>
-            <a:r>
-              <a:rPr lang="en-US" dirty="0"/>
-              <a:t>Portability</a:t>
-            </a:r>
-          </a:p>
-          <a:p>
-            <a:pPr lvl="1"/>
-            <a:r>
-              <a:rPr lang="en-US" dirty="0"/>
-              <a:t>Reproducibility: recipes under version control</a:t>
-            </a:r>
-          </a:p>
-          <a:p>
-            <a:pPr lvl="1"/>
-            <a:r>
-              <a:rPr lang="en-US" dirty="0"/>
-              <a:t>Easily create images</a:t>
-            </a:r>
-          </a:p>
-          <a:p>
-            <a:pPr lvl="1"/>
-            <a:r>
-              <a:rPr lang="en-US" dirty="0"/>
-              <a:t>Integrate images into existing workflows</a:t>
-            </a:r>
-          </a:p>
-          <a:p>
-            <a:pPr lvl="1"/>
-            <a:r>
-              <a:rPr lang="en-US" dirty="0"/>
-              <a:t>No privilege escalation</a:t>
-            </a:r>
-          </a:p>
-          <a:p>
-            <a:pPr lvl="2"/>
-            <a:r>
-              <a:rPr lang="en-US" dirty="0"/>
-              <a:t>Create as root</a:t>
-            </a:r>
-          </a:p>
-          <a:p>
-            <a:pPr lvl="2"/>
-            <a:r>
-              <a:rPr lang="en-US" dirty="0"/>
-              <a:t>Run as user, no </a:t>
-            </a:r>
-            <a:r>
-              <a:rPr lang="en-US" dirty="0" err="1"/>
-              <a:t>sudo</a:t>
-            </a:r>
-            <a:r>
-              <a:rPr lang="en-US" dirty="0"/>
-              <a:t> possible</a:t>
-            </a:r>
-          </a:p>
-          <a:p>
-            <a:pPr lvl="1"/>
-            <a:r>
-              <a:rPr lang="en-US" dirty="0"/>
-              <a:t>Quite reasonable performance/overhead</a:t>
-            </a:r>
-          </a:p>
-          <a:p>
-            <a:r>
-              <a:rPr lang="en-US" dirty="0"/>
-              <a:t>No excuse to run crappy/suboptimal software!</a:t>
-            </a:r>
-            <a:endParaRPr lang="nl-BE" dirty="0"/>
+            <a:endParaRPr lang="nl-BE"/>
           </a:p>
         </p:txBody>
       </p:sp>
@@ -24270,7 +24367,176 @@
           <a:p>
             <a:fld id="{AEFF399F-E3B5-4890-BC79-9BC8D4DF3F2D}" type="slidenum">
               <a:rPr lang="nl-BE" smtClean="0"/>
-              <a:t>45</a:t>
+              <a:t>46</a:t>
+            </a:fld>
+            <a:endParaRPr lang="nl-BE"/>
+          </a:p>
+        </p:txBody>
+      </p:sp>
+    </p:spTree>
+    <p:extLst>
+      <p:ext uri="{BB962C8B-B14F-4D97-AF65-F5344CB8AC3E}">
+        <p14:creationId xmlns:p14="http://schemas.microsoft.com/office/powerpoint/2010/main" val="2192721825"/>
+      </p:ext>
+    </p:extLst>
+  </p:cSld>
+  <p:clrMapOvr>
+    <a:masterClrMapping/>
+  </p:clrMapOvr>
+</p:sld>
+</file>
+
+<file path=ppt/slides/slide47.xml><?xml version="1.0" encoding="utf-8"?>
+<p:sld xmlns:a="http://schemas.openxmlformats.org/drawingml/2006/main" xmlns:r="http://schemas.openxmlformats.org/officeDocument/2006/relationships" xmlns:p="http://schemas.openxmlformats.org/presentationml/2006/main">
+  <p:cSld>
+    <p:spTree>
+      <p:nvGrpSpPr>
+        <p:cNvPr id="1" name=""/>
+        <p:cNvGrpSpPr/>
+        <p:nvPr/>
+      </p:nvGrpSpPr>
+      <p:grpSpPr>
+        <a:xfrm>
+          <a:off x="0" y="0"/>
+          <a:ext cx="0" cy="0"/>
+          <a:chOff x="0" y="0"/>
+          <a:chExt cx="0" cy="0"/>
+        </a:xfrm>
+      </p:grpSpPr>
+      <p:sp>
+        <p:nvSpPr>
+          <p:cNvPr id="2" name="Title 1"/>
+          <p:cNvSpPr>
+            <a:spLocks noGrp="1"/>
+          </p:cNvSpPr>
+          <p:nvPr>
+            <p:ph type="title"/>
+          </p:nvPr>
+        </p:nvSpPr>
+        <p:spPr/>
+        <p:txBody>
+          <a:bodyPr/>
+          <a:lstStyle/>
+          <a:p>
+            <a:r>
+              <a:rPr lang="en-US" dirty="0"/>
+              <a:t>Conclusions</a:t>
+            </a:r>
+            <a:endParaRPr lang="nl-BE" dirty="0"/>
+          </a:p>
+        </p:txBody>
+      </p:sp>
+      <p:sp>
+        <p:nvSpPr>
+          <p:cNvPr id="3" name="Content Placeholder 2"/>
+          <p:cNvSpPr>
+            <a:spLocks noGrp="1"/>
+          </p:cNvSpPr>
+          <p:nvPr>
+            <p:ph idx="1"/>
+          </p:nvPr>
+        </p:nvSpPr>
+        <p:spPr/>
+        <p:txBody>
+          <a:bodyPr/>
+          <a:lstStyle/>
+          <a:p>
+            <a:r>
+              <a:rPr lang="en-US" dirty="0"/>
+              <a:t>Singularity advantages</a:t>
+            </a:r>
+          </a:p>
+          <a:p>
+            <a:pPr lvl="1"/>
+            <a:r>
+              <a:rPr lang="en-US" dirty="0"/>
+              <a:t>Portability</a:t>
+            </a:r>
+          </a:p>
+          <a:p>
+            <a:pPr lvl="1"/>
+            <a:r>
+              <a:rPr lang="en-US" dirty="0"/>
+              <a:t>Reproducibility: recipes under version control</a:t>
+            </a:r>
+          </a:p>
+          <a:p>
+            <a:pPr lvl="1"/>
+            <a:r>
+              <a:rPr lang="en-US" dirty="0"/>
+              <a:t>Easily create images</a:t>
+            </a:r>
+          </a:p>
+          <a:p>
+            <a:pPr lvl="1"/>
+            <a:r>
+              <a:rPr lang="en-US" dirty="0"/>
+              <a:t>Integrate images into existing workflows</a:t>
+            </a:r>
+          </a:p>
+          <a:p>
+            <a:pPr lvl="1"/>
+            <a:r>
+              <a:rPr lang="en-US" dirty="0"/>
+              <a:t>No privilege escalation</a:t>
+            </a:r>
+          </a:p>
+          <a:p>
+            <a:pPr lvl="2"/>
+            <a:r>
+              <a:rPr lang="en-US" dirty="0"/>
+              <a:t>Create as root</a:t>
+            </a:r>
+          </a:p>
+          <a:p>
+            <a:pPr lvl="2"/>
+            <a:r>
+              <a:rPr lang="en-US" dirty="0"/>
+              <a:t>Run as user, no </a:t>
+            </a:r>
+            <a:r>
+              <a:rPr lang="en-US" dirty="0" err="1"/>
+              <a:t>sudo</a:t>
+            </a:r>
+            <a:r>
+              <a:rPr lang="en-US" dirty="0"/>
+              <a:t> possible</a:t>
+            </a:r>
+          </a:p>
+          <a:p>
+            <a:pPr lvl="1"/>
+            <a:r>
+              <a:rPr lang="en-US" dirty="0"/>
+              <a:t>Quite reasonable performance/overhead</a:t>
+            </a:r>
+          </a:p>
+          <a:p>
+            <a:r>
+              <a:rPr lang="en-US" dirty="0"/>
+              <a:t>No excuse to run crappy/suboptimal software!</a:t>
+            </a:r>
+            <a:endParaRPr lang="nl-BE" dirty="0"/>
+          </a:p>
+        </p:txBody>
+      </p:sp>
+      <p:sp>
+        <p:nvSpPr>
+          <p:cNvPr id="4" name="Slide Number Placeholder 3"/>
+          <p:cNvSpPr>
+            <a:spLocks noGrp="1"/>
+          </p:cNvSpPr>
+          <p:nvPr>
+            <p:ph type="sldNum" sz="quarter" idx="12"/>
+          </p:nvPr>
+        </p:nvSpPr>
+        <p:spPr/>
+        <p:txBody>
+          <a:bodyPr/>
+          <a:lstStyle/>
+          <a:p>
+            <a:fld id="{AEFF399F-E3B5-4890-BC79-9BC8D4DF3F2D}" type="slidenum">
+              <a:rPr lang="nl-BE" smtClean="0"/>
+              <a:t>47</a:t>
             </a:fld>
             <a:endParaRPr lang="nl-BE"/>
           </a:p>
@@ -24779,7 +25045,7 @@
 </p:sld>
 </file>
 
-<file path=ppt/slides/slide46.xml><?xml version="1.0" encoding="utf-8"?>
+<file path=ppt/slides/slide48.xml><?xml version="1.0" encoding="utf-8"?>
 <p:sld xmlns:a="http://schemas.openxmlformats.org/drawingml/2006/main" xmlns:r="http://schemas.openxmlformats.org/officeDocument/2006/relationships" xmlns:p="http://schemas.openxmlformats.org/presentationml/2006/main">
   <p:cSld>
     <p:spTree>
@@ -24990,7 +25256,7 @@
           <a:p>
             <a:fld id="{AEFF399F-E3B5-4890-BC79-9BC8D4DF3F2D}" type="slidenum">
               <a:rPr lang="nl-BE" smtClean="0"/>
-              <a:t>46</a:t>
+              <a:t>48</a:t>
             </a:fld>
             <a:endParaRPr lang="nl-BE"/>
           </a:p>
@@ -25321,7 +25587,7 @@
 </p:sld>
 </file>
 
-<file path=ppt/slides/slide47.xml><?xml version="1.0" encoding="utf-8"?>
+<file path=ppt/slides/slide49.xml><?xml version="1.0" encoding="utf-8"?>
 <p:sld xmlns:a="http://schemas.openxmlformats.org/drawingml/2006/main" xmlns:r="http://schemas.openxmlformats.org/officeDocument/2006/relationships" xmlns:p="http://schemas.openxmlformats.org/presentationml/2006/main">
   <p:cSld>
     <p:spTree>
@@ -25467,7 +25733,7 @@
           <a:p>
             <a:fld id="{AEFF399F-E3B5-4890-BC79-9BC8D4DF3F2D}" type="slidenum">
               <a:rPr lang="nl-BE" smtClean="0"/>
-              <a:t>47</a:t>
+              <a:t>49</a:t>
             </a:fld>
             <a:endParaRPr lang="nl-BE"/>
           </a:p>
@@ -25483,674 +25749,6 @@
   <p:clrMapOvr>
     <a:masterClrMapping/>
   </p:clrMapOvr>
-</p:sld>
-</file>
-
-<file path=ppt/slides/slide48.xml><?xml version="1.0" encoding="utf-8"?>
-<p:sld xmlns:a="http://schemas.openxmlformats.org/drawingml/2006/main" xmlns:r="http://schemas.openxmlformats.org/officeDocument/2006/relationships" xmlns:p="http://schemas.openxmlformats.org/presentationml/2006/main">
-  <p:cSld>
-    <p:spTree>
-      <p:nvGrpSpPr>
-        <p:cNvPr id="1" name=""/>
-        <p:cNvGrpSpPr/>
-        <p:nvPr/>
-      </p:nvGrpSpPr>
-      <p:grpSpPr>
-        <a:xfrm>
-          <a:off x="0" y="0"/>
-          <a:ext cx="0" cy="0"/>
-          <a:chOff x="0" y="0"/>
-          <a:chExt cx="0" cy="0"/>
-        </a:xfrm>
-      </p:grpSpPr>
-      <p:sp>
-        <p:nvSpPr>
-          <p:cNvPr id="2" name="Title 1"/>
-          <p:cNvSpPr>
-            <a:spLocks noGrp="1"/>
-          </p:cNvSpPr>
-          <p:nvPr>
-            <p:ph type="title"/>
-          </p:nvPr>
-        </p:nvSpPr>
-        <p:spPr/>
-        <p:txBody>
-          <a:bodyPr/>
-          <a:lstStyle/>
-          <a:p>
-            <a:r>
-              <a:rPr lang="en-US" dirty="0"/>
-              <a:t>Create empty image</a:t>
-            </a:r>
-            <a:endParaRPr lang="nl-BE" dirty="0"/>
-          </a:p>
-        </p:txBody>
-      </p:sp>
-      <p:sp>
-        <p:nvSpPr>
-          <p:cNvPr id="3" name="Content Placeholder 2"/>
-          <p:cNvSpPr>
-            <a:spLocks noGrp="1"/>
-          </p:cNvSpPr>
-          <p:nvPr>
-            <p:ph idx="1"/>
-          </p:nvPr>
-        </p:nvSpPr>
-        <p:spPr/>
-        <p:txBody>
-          <a:bodyPr/>
-          <a:lstStyle/>
-          <a:p>
-            <a:r>
-              <a:rPr lang="en-US" dirty="0"/>
-              <a:t>Initially, empty image</a:t>
-            </a:r>
-          </a:p>
-          <a:p>
-            <a:r>
-              <a:rPr lang="en-US" dirty="0"/>
-              <a:t>Creation done with </a:t>
-            </a:r>
-            <a:r>
-              <a:rPr lang="en-US" dirty="0" err="1"/>
-              <a:t>sudo</a:t>
-            </a:r>
-            <a:endParaRPr lang="en-US" dirty="0"/>
-          </a:p>
-          <a:p>
-            <a:endParaRPr lang="en-US" dirty="0"/>
-          </a:p>
-          <a:p>
-            <a:r>
-              <a:rPr lang="en-US" dirty="0"/>
-              <a:t>Maximum size (in </a:t>
-            </a:r>
-            <a:r>
-              <a:rPr lang="en-US" dirty="0" err="1"/>
-              <a:t>MiB</a:t>
-            </a:r>
-            <a:r>
-              <a:rPr lang="en-US" dirty="0"/>
-              <a:t>) of the image</a:t>
-            </a:r>
-          </a:p>
-          <a:p>
-            <a:pPr lvl="1"/>
-            <a:r>
-              <a:rPr lang="en-US" dirty="0"/>
-              <a:t>Can be resized later, if necessary</a:t>
-            </a:r>
-          </a:p>
-          <a:p>
-            <a:endParaRPr lang="en-US" dirty="0"/>
-          </a:p>
-          <a:p>
-            <a:r>
-              <a:rPr lang="en-US" dirty="0"/>
-              <a:t>File system created "inside" image</a:t>
-            </a:r>
-            <a:endParaRPr lang="nl-BE" dirty="0"/>
-          </a:p>
-        </p:txBody>
-      </p:sp>
-      <p:sp>
-        <p:nvSpPr>
-          <p:cNvPr id="4" name="TextBox 3"/>
-          <p:cNvSpPr txBox="1"/>
-          <p:nvPr/>
-        </p:nvSpPr>
-        <p:spPr>
-          <a:xfrm>
-            <a:off x="1004208" y="2898322"/>
-            <a:ext cx="7491153" cy="369332"/>
-          </a:xfrm>
-          <a:prstGeom prst="rect">
-            <a:avLst/>
-          </a:prstGeom>
-          <a:solidFill>
-            <a:schemeClr val="tx1"/>
-          </a:solidFill>
-        </p:spPr>
-        <p:txBody>
-          <a:bodyPr wrap="none" rtlCol="0">
-            <a:spAutoFit/>
-          </a:bodyPr>
-          <a:lstStyle/>
-          <a:p>
-            <a:r>
-              <a:rPr lang="en-US" b="1" dirty="0">
-                <a:solidFill>
-                  <a:schemeClr val="bg1"/>
-                </a:solidFill>
-                <a:latin typeface="Courier New" panose="02070309020205020404" pitchFamily="49" charset="0"/>
-                <a:cs typeface="Courier New" panose="02070309020205020404" pitchFamily="49" charset="0"/>
-              </a:rPr>
-              <a:t>$ </a:t>
-            </a:r>
-            <a:r>
-              <a:rPr lang="en-US" b="1" dirty="0" err="1">
-                <a:solidFill>
-                  <a:schemeClr val="bg1"/>
-                </a:solidFill>
-                <a:latin typeface="Courier New" panose="02070309020205020404" pitchFamily="49" charset="0"/>
-                <a:cs typeface="Courier New" panose="02070309020205020404" pitchFamily="49" charset="0"/>
-              </a:rPr>
-              <a:t>sudo</a:t>
-            </a:r>
-            <a:r>
-              <a:rPr lang="en-US" b="1" dirty="0">
-                <a:solidFill>
-                  <a:schemeClr val="bg1"/>
-                </a:solidFill>
-                <a:latin typeface="Courier New" panose="02070309020205020404" pitchFamily="49" charset="0"/>
-                <a:cs typeface="Courier New" panose="02070309020205020404" pitchFamily="49" charset="0"/>
-              </a:rPr>
-              <a:t> singularity </a:t>
-            </a:r>
-            <a:r>
-              <a:rPr lang="en-US" b="1" dirty="0" err="1">
-                <a:solidFill>
-                  <a:schemeClr val="bg1"/>
-                </a:solidFill>
-                <a:latin typeface="Courier New" panose="02070309020205020404" pitchFamily="49" charset="0"/>
-                <a:cs typeface="Courier New" panose="02070309020205020404" pitchFamily="49" charset="0"/>
-              </a:rPr>
-              <a:t>image.create</a:t>
-            </a:r>
-            <a:r>
-              <a:rPr lang="en-US" b="1" dirty="0">
-                <a:solidFill>
-                  <a:schemeClr val="bg1"/>
-                </a:solidFill>
-                <a:latin typeface="Courier New" panose="02070309020205020404" pitchFamily="49" charset="0"/>
-                <a:cs typeface="Courier New" panose="02070309020205020404" pitchFamily="49" charset="0"/>
-              </a:rPr>
-              <a:t> --size 2048 </a:t>
-            </a:r>
-            <a:r>
-              <a:rPr lang="en-US" b="1" dirty="0" err="1">
-                <a:solidFill>
-                  <a:schemeClr val="bg1"/>
-                </a:solidFill>
-                <a:latin typeface="Courier New" panose="02070309020205020404" pitchFamily="49" charset="0"/>
-                <a:cs typeface="Courier New" panose="02070309020205020404" pitchFamily="49" charset="0"/>
-              </a:rPr>
-              <a:t>grace.img</a:t>
-            </a:r>
-            <a:endParaRPr lang="nl-BE" b="1" dirty="0">
-              <a:solidFill>
-                <a:schemeClr val="bg1"/>
-              </a:solidFill>
-              <a:latin typeface="Courier New" panose="02070309020205020404" pitchFamily="49" charset="0"/>
-              <a:cs typeface="Courier New" panose="02070309020205020404" pitchFamily="49" charset="0"/>
-            </a:endParaRPr>
-          </a:p>
-        </p:txBody>
-      </p:sp>
-      <p:sp>
-        <p:nvSpPr>
-          <p:cNvPr id="5" name="TextBox 4"/>
-          <p:cNvSpPr txBox="1"/>
-          <p:nvPr/>
-        </p:nvSpPr>
-        <p:spPr>
-          <a:xfrm>
-            <a:off x="1004208" y="4340351"/>
-            <a:ext cx="7491153" cy="369332"/>
-          </a:xfrm>
-          <a:prstGeom prst="rect">
-            <a:avLst/>
-          </a:prstGeom>
-          <a:solidFill>
-            <a:schemeClr val="tx1"/>
-          </a:solidFill>
-        </p:spPr>
-        <p:txBody>
-          <a:bodyPr wrap="none" rtlCol="0">
-            <a:spAutoFit/>
-          </a:bodyPr>
-          <a:lstStyle/>
-          <a:p>
-            <a:r>
-              <a:rPr lang="en-US" b="1" dirty="0">
-                <a:solidFill>
-                  <a:schemeClr val="bg1"/>
-                </a:solidFill>
-                <a:latin typeface="Courier New" panose="02070309020205020404" pitchFamily="49" charset="0"/>
-                <a:cs typeface="Courier New" panose="02070309020205020404" pitchFamily="49" charset="0"/>
-              </a:rPr>
-              <a:t>$ </a:t>
-            </a:r>
-            <a:r>
-              <a:rPr lang="en-US" b="1" dirty="0" err="1">
-                <a:solidFill>
-                  <a:schemeClr val="bg1"/>
-                </a:solidFill>
-                <a:latin typeface="Courier New" panose="02070309020205020404" pitchFamily="49" charset="0"/>
-                <a:cs typeface="Courier New" panose="02070309020205020404" pitchFamily="49" charset="0"/>
-              </a:rPr>
-              <a:t>sudo</a:t>
-            </a:r>
-            <a:r>
-              <a:rPr lang="en-US" b="1" dirty="0">
-                <a:solidFill>
-                  <a:schemeClr val="bg1"/>
-                </a:solidFill>
-                <a:latin typeface="Courier New" panose="02070309020205020404" pitchFamily="49" charset="0"/>
-                <a:cs typeface="Courier New" panose="02070309020205020404" pitchFamily="49" charset="0"/>
-              </a:rPr>
-              <a:t> singularity </a:t>
-            </a:r>
-            <a:r>
-              <a:rPr lang="en-US" b="1" dirty="0" err="1">
-                <a:solidFill>
-                  <a:schemeClr val="bg1"/>
-                </a:solidFill>
-                <a:latin typeface="Courier New" panose="02070309020205020404" pitchFamily="49" charset="0"/>
-                <a:cs typeface="Courier New" panose="02070309020205020404" pitchFamily="49" charset="0"/>
-              </a:rPr>
-              <a:t>image.expand</a:t>
-            </a:r>
-            <a:r>
-              <a:rPr lang="en-US" b="1" dirty="0">
-                <a:solidFill>
-                  <a:schemeClr val="bg1"/>
-                </a:solidFill>
-                <a:latin typeface="Courier New" panose="02070309020205020404" pitchFamily="49" charset="0"/>
-                <a:cs typeface="Courier New" panose="02070309020205020404" pitchFamily="49" charset="0"/>
-              </a:rPr>
-              <a:t> --size 1024 </a:t>
-            </a:r>
-            <a:r>
-              <a:rPr lang="en-US" b="1" dirty="0" err="1">
-                <a:solidFill>
-                  <a:schemeClr val="bg1"/>
-                </a:solidFill>
-                <a:latin typeface="Courier New" panose="02070309020205020404" pitchFamily="49" charset="0"/>
-                <a:cs typeface="Courier New" panose="02070309020205020404" pitchFamily="49" charset="0"/>
-              </a:rPr>
-              <a:t>grace.img</a:t>
-            </a:r>
-            <a:endParaRPr lang="nl-BE" b="1" dirty="0">
-              <a:solidFill>
-                <a:schemeClr val="bg1"/>
-              </a:solidFill>
-              <a:latin typeface="Courier New" panose="02070309020205020404" pitchFamily="49" charset="0"/>
-              <a:cs typeface="Courier New" panose="02070309020205020404" pitchFamily="49" charset="0"/>
-            </a:endParaRPr>
-          </a:p>
-        </p:txBody>
-      </p:sp>
-      <p:sp>
-        <p:nvSpPr>
-          <p:cNvPr id="6" name="Slide Number Placeholder 5"/>
-          <p:cNvSpPr>
-            <a:spLocks noGrp="1"/>
-          </p:cNvSpPr>
-          <p:nvPr>
-            <p:ph type="sldNum" sz="quarter" idx="12"/>
-          </p:nvPr>
-        </p:nvSpPr>
-        <p:spPr/>
-        <p:txBody>
-          <a:bodyPr/>
-          <a:lstStyle/>
-          <a:p>
-            <a:fld id="{AEFF399F-E3B5-4890-BC79-9BC8D4DF3F2D}" type="slidenum">
-              <a:rPr lang="nl-BE" smtClean="0"/>
-              <a:t>48</a:t>
-            </a:fld>
-            <a:endParaRPr lang="nl-BE"/>
-          </a:p>
-        </p:txBody>
-      </p:sp>
-    </p:spTree>
-    <p:extLst>
-      <p:ext uri="{BB962C8B-B14F-4D97-AF65-F5344CB8AC3E}">
-        <p14:creationId xmlns:p14="http://schemas.microsoft.com/office/powerpoint/2010/main" val="3169527940"/>
-      </p:ext>
-    </p:extLst>
-  </p:cSld>
-  <p:clrMapOvr>
-    <a:masterClrMapping/>
-  </p:clrMapOvr>
-  <p:timing>
-    <p:tnLst>
-      <p:par>
-        <p:cTn id="1" dur="indefinite" restart="never" nodeType="tmRoot">
-          <p:childTnLst>
-            <p:seq concurrent="1" nextAc="seek">
-              <p:cTn id="2" dur="indefinite" nodeType="mainSeq">
-                <p:childTnLst>
-                  <p:par>
-                    <p:cTn id="3" fill="hold">
-                      <p:stCondLst>
-                        <p:cond delay="indefinite"/>
-                        <p:cond evt="onBegin" delay="0">
-                          <p:tn val="2"/>
-                        </p:cond>
-                      </p:stCondLst>
-                      <p:childTnLst>
-                        <p:par>
-                          <p:cTn id="4" fill="hold">
-                            <p:stCondLst>
-                              <p:cond delay="0"/>
-                            </p:stCondLst>
-                            <p:childTnLst>
-                              <p:par>
-                                <p:cTn id="5" presetID="1" presetClass="entr" presetSubtype="0" fill="hold" grpId="0" nodeType="withEffect">
-                                  <p:stCondLst>
-                                    <p:cond delay="0"/>
-                                  </p:stCondLst>
-                                  <p:childTnLst>
-                                    <p:set>
-                                      <p:cBhvr>
-                                        <p:cTn id="6" dur="1" fill="hold">
-                                          <p:stCondLst>
-                                            <p:cond delay="0"/>
-                                          </p:stCondLst>
-                                        </p:cTn>
-                                        <p:tgtEl>
-                                          <p:spTgt spid="3">
-                                            <p:txEl>
-                                              <p:pRg st="0" end="0"/>
-                                            </p:txEl>
-                                          </p:spTgt>
-                                        </p:tgtEl>
-                                        <p:attrNameLst>
-                                          <p:attrName>style.visibility</p:attrName>
-                                        </p:attrNameLst>
-                                      </p:cBhvr>
-                                      <p:to>
-                                        <p:strVal val="visible"/>
-                                      </p:to>
-                                    </p:set>
-                                  </p:childTnLst>
-                                </p:cTn>
-                              </p:par>
-                            </p:childTnLst>
-                          </p:cTn>
-                        </p:par>
-                      </p:childTnLst>
-                    </p:cTn>
-                  </p:par>
-                  <p:par>
-                    <p:cTn id="7" fill="hold">
-                      <p:stCondLst>
-                        <p:cond delay="indefinite"/>
-                      </p:stCondLst>
-                      <p:childTnLst>
-                        <p:par>
-                          <p:cTn id="8" fill="hold">
-                            <p:stCondLst>
-                              <p:cond delay="0"/>
-                            </p:stCondLst>
-                            <p:childTnLst>
-                              <p:par>
-                                <p:cTn id="9" presetID="1" presetClass="entr" presetSubtype="0" fill="hold" grpId="0" nodeType="clickEffect">
-                                  <p:stCondLst>
-                                    <p:cond delay="0"/>
-                                  </p:stCondLst>
-                                  <p:childTnLst>
-                                    <p:set>
-                                      <p:cBhvr>
-                                        <p:cTn id="10" dur="1" fill="hold">
-                                          <p:stCondLst>
-                                            <p:cond delay="0"/>
-                                          </p:stCondLst>
-                                        </p:cTn>
-                                        <p:tgtEl>
-                                          <p:spTgt spid="3">
-                                            <p:txEl>
-                                              <p:pRg st="1" end="1"/>
-                                            </p:txEl>
-                                          </p:spTgt>
-                                        </p:tgtEl>
-                                        <p:attrNameLst>
-                                          <p:attrName>style.visibility</p:attrName>
-                                        </p:attrNameLst>
-                                      </p:cBhvr>
-                                      <p:to>
-                                        <p:strVal val="visible"/>
-                                      </p:to>
-                                    </p:set>
-                                  </p:childTnLst>
-                                </p:cTn>
-                              </p:par>
-                              <p:par>
-                                <p:cTn id="11" presetID="1" presetClass="entr" presetSubtype="0" fill="hold" grpId="0" nodeType="withEffect">
-                                  <p:stCondLst>
-                                    <p:cond delay="0"/>
-                                  </p:stCondLst>
-                                  <p:childTnLst>
-                                    <p:set>
-                                      <p:cBhvr>
-                                        <p:cTn id="12" dur="1" fill="hold">
-                                          <p:stCondLst>
-                                            <p:cond delay="0"/>
-                                          </p:stCondLst>
-                                        </p:cTn>
-                                        <p:tgtEl>
-                                          <p:spTgt spid="4"/>
-                                        </p:tgtEl>
-                                        <p:attrNameLst>
-                                          <p:attrName>style.visibility</p:attrName>
-                                        </p:attrNameLst>
-                                      </p:cBhvr>
-                                      <p:to>
-                                        <p:strVal val="visible"/>
-                                      </p:to>
-                                    </p:set>
-                                  </p:childTnLst>
-                                </p:cTn>
-                              </p:par>
-                            </p:childTnLst>
-                          </p:cTn>
-                        </p:par>
-                      </p:childTnLst>
-                    </p:cTn>
-                  </p:par>
-                  <p:par>
-                    <p:cTn id="13" fill="hold">
-                      <p:stCondLst>
-                        <p:cond delay="indefinite"/>
-                      </p:stCondLst>
-                      <p:childTnLst>
-                        <p:par>
-                          <p:cTn id="14" fill="hold">
-                            <p:stCondLst>
-                              <p:cond delay="0"/>
-                            </p:stCondLst>
-                            <p:childTnLst>
-                              <p:par>
-                                <p:cTn id="15" presetID="1" presetClass="entr" presetSubtype="0" fill="hold" grpId="0" nodeType="clickEffect">
-                                  <p:stCondLst>
-                                    <p:cond delay="0"/>
-                                  </p:stCondLst>
-                                  <p:childTnLst>
-                                    <p:set>
-                                      <p:cBhvr>
-                                        <p:cTn id="16" dur="1" fill="hold">
-                                          <p:stCondLst>
-                                            <p:cond delay="0"/>
-                                          </p:stCondLst>
-                                        </p:cTn>
-                                        <p:tgtEl>
-                                          <p:spTgt spid="3">
-                                            <p:txEl>
-                                              <p:pRg st="3" end="3"/>
-                                            </p:txEl>
-                                          </p:spTgt>
-                                        </p:tgtEl>
-                                        <p:attrNameLst>
-                                          <p:attrName>style.visibility</p:attrName>
-                                        </p:attrNameLst>
-                                      </p:cBhvr>
-                                      <p:to>
-                                        <p:strVal val="visible"/>
-                                      </p:to>
-                                    </p:set>
-                                  </p:childTnLst>
-                                </p:cTn>
-                              </p:par>
-                            </p:childTnLst>
-                          </p:cTn>
-                        </p:par>
-                      </p:childTnLst>
-                    </p:cTn>
-                  </p:par>
-                  <p:par>
-                    <p:cTn id="17" fill="hold">
-                      <p:stCondLst>
-                        <p:cond delay="indefinite"/>
-                      </p:stCondLst>
-                      <p:childTnLst>
-                        <p:par>
-                          <p:cTn id="18" fill="hold">
-                            <p:stCondLst>
-                              <p:cond delay="0"/>
-                            </p:stCondLst>
-                            <p:childTnLst>
-                              <p:par>
-                                <p:cTn id="19" presetID="1" presetClass="entr" presetSubtype="0" fill="hold" grpId="0" nodeType="clickEffect">
-                                  <p:stCondLst>
-                                    <p:cond delay="0"/>
-                                  </p:stCondLst>
-                                  <p:childTnLst>
-                                    <p:set>
-                                      <p:cBhvr>
-                                        <p:cTn id="20" dur="1" fill="hold">
-                                          <p:stCondLst>
-                                            <p:cond delay="0"/>
-                                          </p:stCondLst>
-                                        </p:cTn>
-                                        <p:tgtEl>
-                                          <p:spTgt spid="3">
-                                            <p:txEl>
-                                              <p:pRg st="4" end="4"/>
-                                            </p:txEl>
-                                          </p:spTgt>
-                                        </p:tgtEl>
-                                        <p:attrNameLst>
-                                          <p:attrName>style.visibility</p:attrName>
-                                        </p:attrNameLst>
-                                      </p:cBhvr>
-                                      <p:to>
-                                        <p:strVal val="visible"/>
-                                      </p:to>
-                                    </p:set>
-                                  </p:childTnLst>
-                                </p:cTn>
-                              </p:par>
-                              <p:par>
-                                <p:cTn id="21" presetID="1" presetClass="entr" presetSubtype="0" fill="hold" grpId="0" nodeType="withEffect">
-                                  <p:stCondLst>
-                                    <p:cond delay="0"/>
-                                  </p:stCondLst>
-                                  <p:childTnLst>
-                                    <p:set>
-                                      <p:cBhvr>
-                                        <p:cTn id="22" dur="1" fill="hold">
-                                          <p:stCondLst>
-                                            <p:cond delay="0"/>
-                                          </p:stCondLst>
-                                        </p:cTn>
-                                        <p:tgtEl>
-                                          <p:spTgt spid="5"/>
-                                        </p:tgtEl>
-                                        <p:attrNameLst>
-                                          <p:attrName>style.visibility</p:attrName>
-                                        </p:attrNameLst>
-                                      </p:cBhvr>
-                                      <p:to>
-                                        <p:strVal val="visible"/>
-                                      </p:to>
-                                    </p:set>
-                                  </p:childTnLst>
-                                </p:cTn>
-                              </p:par>
-                            </p:childTnLst>
-                          </p:cTn>
-                        </p:par>
-                      </p:childTnLst>
-                    </p:cTn>
-                  </p:par>
-                  <p:par>
-                    <p:cTn id="23" fill="hold">
-                      <p:stCondLst>
-                        <p:cond delay="indefinite"/>
-                      </p:stCondLst>
-                      <p:childTnLst>
-                        <p:par>
-                          <p:cTn id="24" fill="hold">
-                            <p:stCondLst>
-                              <p:cond delay="0"/>
-                            </p:stCondLst>
-                            <p:childTnLst>
-                              <p:par>
-                                <p:cTn id="25" presetID="1" presetClass="entr" presetSubtype="0" fill="hold" grpId="0" nodeType="clickEffect">
-                                  <p:stCondLst>
-                                    <p:cond delay="0"/>
-                                  </p:stCondLst>
-                                  <p:childTnLst>
-                                    <p:set>
-                                      <p:cBhvr>
-                                        <p:cTn id="26" dur="1" fill="hold">
-                                          <p:stCondLst>
-                                            <p:cond delay="0"/>
-                                          </p:stCondLst>
-                                        </p:cTn>
-                                        <p:tgtEl>
-                                          <p:spTgt spid="3">
-                                            <p:txEl>
-                                              <p:pRg st="6" end="6"/>
-                                            </p:txEl>
-                                          </p:spTgt>
-                                        </p:tgtEl>
-                                        <p:attrNameLst>
-                                          <p:attrName>style.visibility</p:attrName>
-                                        </p:attrNameLst>
-                                      </p:cBhvr>
-                                      <p:to>
-                                        <p:strVal val="visible"/>
-                                      </p:to>
-                                    </p:set>
-                                  </p:childTnLst>
-                                </p:cTn>
-                              </p:par>
-                            </p:childTnLst>
-                          </p:cTn>
-                        </p:par>
-                      </p:childTnLst>
-                    </p:cTn>
-                  </p:par>
-                </p:childTnLst>
-              </p:cTn>
-              <p:prevCondLst>
-                <p:cond evt="onPrev" delay="0">
-                  <p:tgtEl>
-                    <p:sldTgt/>
-                  </p:tgtEl>
-                </p:cond>
-              </p:prevCondLst>
-              <p:nextCondLst>
-                <p:cond evt="onNext" delay="0">
-                  <p:tgtEl>
-                    <p:sldTgt/>
-                  </p:tgtEl>
-                </p:cond>
-              </p:nextCondLst>
-            </p:seq>
-          </p:childTnLst>
-        </p:cTn>
-      </p:par>
-    </p:tnLst>
-    <p:bldLst>
-      <p:bldP spid="3" grpId="0" uiExpand="1" build="p"/>
-      <p:bldP spid="4" grpId="0" animBg="1"/>
-      <p:bldP spid="5" grpId="0" animBg="1"/>
-    </p:bldLst>
-  </p:timing>
 </p:sld>
 </file>
 
@@ -26769,6 +26367,674 @@
     <p:bldLst>
       <p:bldP spid="3" grpId="0" uiExpand="1" build="p" bldLvl="2"/>
       <p:bldP spid="4" grpId="0" animBg="1"/>
+    </p:bldLst>
+  </p:timing>
+</p:sld>
+</file>
+
+<file path=ppt/slides/slide50.xml><?xml version="1.0" encoding="utf-8"?>
+<p:sld xmlns:a="http://schemas.openxmlformats.org/drawingml/2006/main" xmlns:r="http://schemas.openxmlformats.org/officeDocument/2006/relationships" xmlns:p="http://schemas.openxmlformats.org/presentationml/2006/main">
+  <p:cSld>
+    <p:spTree>
+      <p:nvGrpSpPr>
+        <p:cNvPr id="1" name=""/>
+        <p:cNvGrpSpPr/>
+        <p:nvPr/>
+      </p:nvGrpSpPr>
+      <p:grpSpPr>
+        <a:xfrm>
+          <a:off x="0" y="0"/>
+          <a:ext cx="0" cy="0"/>
+          <a:chOff x="0" y="0"/>
+          <a:chExt cx="0" cy="0"/>
+        </a:xfrm>
+      </p:grpSpPr>
+      <p:sp>
+        <p:nvSpPr>
+          <p:cNvPr id="2" name="Title 1"/>
+          <p:cNvSpPr>
+            <a:spLocks noGrp="1"/>
+          </p:cNvSpPr>
+          <p:nvPr>
+            <p:ph type="title"/>
+          </p:nvPr>
+        </p:nvSpPr>
+        <p:spPr/>
+        <p:txBody>
+          <a:bodyPr/>
+          <a:lstStyle/>
+          <a:p>
+            <a:r>
+              <a:rPr lang="en-US" dirty="0"/>
+              <a:t>Create empty image</a:t>
+            </a:r>
+            <a:endParaRPr lang="nl-BE" dirty="0"/>
+          </a:p>
+        </p:txBody>
+      </p:sp>
+      <p:sp>
+        <p:nvSpPr>
+          <p:cNvPr id="3" name="Content Placeholder 2"/>
+          <p:cNvSpPr>
+            <a:spLocks noGrp="1"/>
+          </p:cNvSpPr>
+          <p:nvPr>
+            <p:ph idx="1"/>
+          </p:nvPr>
+        </p:nvSpPr>
+        <p:spPr/>
+        <p:txBody>
+          <a:bodyPr/>
+          <a:lstStyle/>
+          <a:p>
+            <a:r>
+              <a:rPr lang="en-US" dirty="0"/>
+              <a:t>Initially, empty image</a:t>
+            </a:r>
+          </a:p>
+          <a:p>
+            <a:r>
+              <a:rPr lang="en-US" dirty="0"/>
+              <a:t>Creation done with </a:t>
+            </a:r>
+            <a:r>
+              <a:rPr lang="en-US" dirty="0" err="1"/>
+              <a:t>sudo</a:t>
+            </a:r>
+            <a:endParaRPr lang="en-US" dirty="0"/>
+          </a:p>
+          <a:p>
+            <a:endParaRPr lang="en-US" dirty="0"/>
+          </a:p>
+          <a:p>
+            <a:r>
+              <a:rPr lang="en-US" dirty="0"/>
+              <a:t>Maximum size (in </a:t>
+            </a:r>
+            <a:r>
+              <a:rPr lang="en-US" dirty="0" err="1"/>
+              <a:t>MiB</a:t>
+            </a:r>
+            <a:r>
+              <a:rPr lang="en-US" dirty="0"/>
+              <a:t>) of the image</a:t>
+            </a:r>
+          </a:p>
+          <a:p>
+            <a:pPr lvl="1"/>
+            <a:r>
+              <a:rPr lang="en-US" dirty="0"/>
+              <a:t>Can be resized later, if necessary</a:t>
+            </a:r>
+          </a:p>
+          <a:p>
+            <a:endParaRPr lang="en-US" dirty="0"/>
+          </a:p>
+          <a:p>
+            <a:r>
+              <a:rPr lang="en-US" dirty="0"/>
+              <a:t>File system created "inside" image</a:t>
+            </a:r>
+            <a:endParaRPr lang="nl-BE" dirty="0"/>
+          </a:p>
+        </p:txBody>
+      </p:sp>
+      <p:sp>
+        <p:nvSpPr>
+          <p:cNvPr id="4" name="TextBox 3"/>
+          <p:cNvSpPr txBox="1"/>
+          <p:nvPr/>
+        </p:nvSpPr>
+        <p:spPr>
+          <a:xfrm>
+            <a:off x="1004208" y="2898322"/>
+            <a:ext cx="7491153" cy="369332"/>
+          </a:xfrm>
+          <a:prstGeom prst="rect">
+            <a:avLst/>
+          </a:prstGeom>
+          <a:solidFill>
+            <a:schemeClr val="tx1"/>
+          </a:solidFill>
+        </p:spPr>
+        <p:txBody>
+          <a:bodyPr wrap="none" rtlCol="0">
+            <a:spAutoFit/>
+          </a:bodyPr>
+          <a:lstStyle/>
+          <a:p>
+            <a:r>
+              <a:rPr lang="en-US" b="1" dirty="0">
+                <a:solidFill>
+                  <a:schemeClr val="bg1"/>
+                </a:solidFill>
+                <a:latin typeface="Courier New" panose="02070309020205020404" pitchFamily="49" charset="0"/>
+                <a:cs typeface="Courier New" panose="02070309020205020404" pitchFamily="49" charset="0"/>
+              </a:rPr>
+              <a:t>$ </a:t>
+            </a:r>
+            <a:r>
+              <a:rPr lang="en-US" b="1" dirty="0" err="1">
+                <a:solidFill>
+                  <a:schemeClr val="bg1"/>
+                </a:solidFill>
+                <a:latin typeface="Courier New" panose="02070309020205020404" pitchFamily="49" charset="0"/>
+                <a:cs typeface="Courier New" panose="02070309020205020404" pitchFamily="49" charset="0"/>
+              </a:rPr>
+              <a:t>sudo</a:t>
+            </a:r>
+            <a:r>
+              <a:rPr lang="en-US" b="1" dirty="0">
+                <a:solidFill>
+                  <a:schemeClr val="bg1"/>
+                </a:solidFill>
+                <a:latin typeface="Courier New" panose="02070309020205020404" pitchFamily="49" charset="0"/>
+                <a:cs typeface="Courier New" panose="02070309020205020404" pitchFamily="49" charset="0"/>
+              </a:rPr>
+              <a:t> singularity </a:t>
+            </a:r>
+            <a:r>
+              <a:rPr lang="en-US" b="1" dirty="0" err="1">
+                <a:solidFill>
+                  <a:schemeClr val="bg1"/>
+                </a:solidFill>
+                <a:latin typeface="Courier New" panose="02070309020205020404" pitchFamily="49" charset="0"/>
+                <a:cs typeface="Courier New" panose="02070309020205020404" pitchFamily="49" charset="0"/>
+              </a:rPr>
+              <a:t>image.create</a:t>
+            </a:r>
+            <a:r>
+              <a:rPr lang="en-US" b="1" dirty="0">
+                <a:solidFill>
+                  <a:schemeClr val="bg1"/>
+                </a:solidFill>
+                <a:latin typeface="Courier New" panose="02070309020205020404" pitchFamily="49" charset="0"/>
+                <a:cs typeface="Courier New" panose="02070309020205020404" pitchFamily="49" charset="0"/>
+              </a:rPr>
+              <a:t> --size 2048 </a:t>
+            </a:r>
+            <a:r>
+              <a:rPr lang="en-US" b="1" dirty="0" err="1">
+                <a:solidFill>
+                  <a:schemeClr val="bg1"/>
+                </a:solidFill>
+                <a:latin typeface="Courier New" panose="02070309020205020404" pitchFamily="49" charset="0"/>
+                <a:cs typeface="Courier New" panose="02070309020205020404" pitchFamily="49" charset="0"/>
+              </a:rPr>
+              <a:t>grace.sif</a:t>
+            </a:r>
+            <a:endParaRPr lang="nl-BE" b="1" dirty="0">
+              <a:solidFill>
+                <a:schemeClr val="bg1"/>
+              </a:solidFill>
+              <a:latin typeface="Courier New" panose="02070309020205020404" pitchFamily="49" charset="0"/>
+              <a:cs typeface="Courier New" panose="02070309020205020404" pitchFamily="49" charset="0"/>
+            </a:endParaRPr>
+          </a:p>
+        </p:txBody>
+      </p:sp>
+      <p:sp>
+        <p:nvSpPr>
+          <p:cNvPr id="5" name="TextBox 4"/>
+          <p:cNvSpPr txBox="1"/>
+          <p:nvPr/>
+        </p:nvSpPr>
+        <p:spPr>
+          <a:xfrm>
+            <a:off x="1004208" y="4340351"/>
+            <a:ext cx="7491153" cy="369332"/>
+          </a:xfrm>
+          <a:prstGeom prst="rect">
+            <a:avLst/>
+          </a:prstGeom>
+          <a:solidFill>
+            <a:schemeClr val="tx1"/>
+          </a:solidFill>
+        </p:spPr>
+        <p:txBody>
+          <a:bodyPr wrap="none" rtlCol="0">
+            <a:spAutoFit/>
+          </a:bodyPr>
+          <a:lstStyle/>
+          <a:p>
+            <a:r>
+              <a:rPr lang="en-US" b="1" dirty="0">
+                <a:solidFill>
+                  <a:schemeClr val="bg1"/>
+                </a:solidFill>
+                <a:latin typeface="Courier New" panose="02070309020205020404" pitchFamily="49" charset="0"/>
+                <a:cs typeface="Courier New" panose="02070309020205020404" pitchFamily="49" charset="0"/>
+              </a:rPr>
+              <a:t>$ </a:t>
+            </a:r>
+            <a:r>
+              <a:rPr lang="en-US" b="1" dirty="0" err="1">
+                <a:solidFill>
+                  <a:schemeClr val="bg1"/>
+                </a:solidFill>
+                <a:latin typeface="Courier New" panose="02070309020205020404" pitchFamily="49" charset="0"/>
+                <a:cs typeface="Courier New" panose="02070309020205020404" pitchFamily="49" charset="0"/>
+              </a:rPr>
+              <a:t>sudo</a:t>
+            </a:r>
+            <a:r>
+              <a:rPr lang="en-US" b="1" dirty="0">
+                <a:solidFill>
+                  <a:schemeClr val="bg1"/>
+                </a:solidFill>
+                <a:latin typeface="Courier New" panose="02070309020205020404" pitchFamily="49" charset="0"/>
+                <a:cs typeface="Courier New" panose="02070309020205020404" pitchFamily="49" charset="0"/>
+              </a:rPr>
+              <a:t> singularity </a:t>
+            </a:r>
+            <a:r>
+              <a:rPr lang="en-US" b="1" dirty="0" err="1">
+                <a:solidFill>
+                  <a:schemeClr val="bg1"/>
+                </a:solidFill>
+                <a:latin typeface="Courier New" panose="02070309020205020404" pitchFamily="49" charset="0"/>
+                <a:cs typeface="Courier New" panose="02070309020205020404" pitchFamily="49" charset="0"/>
+              </a:rPr>
+              <a:t>image.expand</a:t>
+            </a:r>
+            <a:r>
+              <a:rPr lang="en-US" b="1" dirty="0">
+                <a:solidFill>
+                  <a:schemeClr val="bg1"/>
+                </a:solidFill>
+                <a:latin typeface="Courier New" panose="02070309020205020404" pitchFamily="49" charset="0"/>
+                <a:cs typeface="Courier New" panose="02070309020205020404" pitchFamily="49" charset="0"/>
+              </a:rPr>
+              <a:t> --size 1024 </a:t>
+            </a:r>
+            <a:r>
+              <a:rPr lang="en-US" b="1" dirty="0" err="1">
+                <a:solidFill>
+                  <a:schemeClr val="bg1"/>
+                </a:solidFill>
+                <a:latin typeface="Courier New" panose="02070309020205020404" pitchFamily="49" charset="0"/>
+                <a:cs typeface="Courier New" panose="02070309020205020404" pitchFamily="49" charset="0"/>
+              </a:rPr>
+              <a:t>grace.sif</a:t>
+            </a:r>
+            <a:endParaRPr lang="nl-BE" b="1" dirty="0">
+              <a:solidFill>
+                <a:schemeClr val="bg1"/>
+              </a:solidFill>
+              <a:latin typeface="Courier New" panose="02070309020205020404" pitchFamily="49" charset="0"/>
+              <a:cs typeface="Courier New" panose="02070309020205020404" pitchFamily="49" charset="0"/>
+            </a:endParaRPr>
+          </a:p>
+        </p:txBody>
+      </p:sp>
+      <p:sp>
+        <p:nvSpPr>
+          <p:cNvPr id="6" name="Slide Number Placeholder 5"/>
+          <p:cNvSpPr>
+            <a:spLocks noGrp="1"/>
+          </p:cNvSpPr>
+          <p:nvPr>
+            <p:ph type="sldNum" sz="quarter" idx="12"/>
+          </p:nvPr>
+        </p:nvSpPr>
+        <p:spPr/>
+        <p:txBody>
+          <a:bodyPr/>
+          <a:lstStyle/>
+          <a:p>
+            <a:fld id="{AEFF399F-E3B5-4890-BC79-9BC8D4DF3F2D}" type="slidenum">
+              <a:rPr lang="nl-BE" smtClean="0"/>
+              <a:t>50</a:t>
+            </a:fld>
+            <a:endParaRPr lang="nl-BE"/>
+          </a:p>
+        </p:txBody>
+      </p:sp>
+    </p:spTree>
+    <p:extLst>
+      <p:ext uri="{BB962C8B-B14F-4D97-AF65-F5344CB8AC3E}">
+        <p14:creationId xmlns:p14="http://schemas.microsoft.com/office/powerpoint/2010/main" val="3169527940"/>
+      </p:ext>
+    </p:extLst>
+  </p:cSld>
+  <p:clrMapOvr>
+    <a:masterClrMapping/>
+  </p:clrMapOvr>
+  <p:timing>
+    <p:tnLst>
+      <p:par>
+        <p:cTn id="1" dur="indefinite" restart="never" nodeType="tmRoot">
+          <p:childTnLst>
+            <p:seq concurrent="1" nextAc="seek">
+              <p:cTn id="2" dur="indefinite" nodeType="mainSeq">
+                <p:childTnLst>
+                  <p:par>
+                    <p:cTn id="3" fill="hold">
+                      <p:stCondLst>
+                        <p:cond delay="indefinite"/>
+                        <p:cond evt="onBegin" delay="0">
+                          <p:tn val="2"/>
+                        </p:cond>
+                      </p:stCondLst>
+                      <p:childTnLst>
+                        <p:par>
+                          <p:cTn id="4" fill="hold">
+                            <p:stCondLst>
+                              <p:cond delay="0"/>
+                            </p:stCondLst>
+                            <p:childTnLst>
+                              <p:par>
+                                <p:cTn id="5" presetID="1" presetClass="entr" presetSubtype="0" fill="hold" grpId="0" nodeType="withEffect">
+                                  <p:stCondLst>
+                                    <p:cond delay="0"/>
+                                  </p:stCondLst>
+                                  <p:childTnLst>
+                                    <p:set>
+                                      <p:cBhvr>
+                                        <p:cTn id="6" dur="1" fill="hold">
+                                          <p:stCondLst>
+                                            <p:cond delay="0"/>
+                                          </p:stCondLst>
+                                        </p:cTn>
+                                        <p:tgtEl>
+                                          <p:spTgt spid="3">
+                                            <p:txEl>
+                                              <p:pRg st="0" end="0"/>
+                                            </p:txEl>
+                                          </p:spTgt>
+                                        </p:tgtEl>
+                                        <p:attrNameLst>
+                                          <p:attrName>style.visibility</p:attrName>
+                                        </p:attrNameLst>
+                                      </p:cBhvr>
+                                      <p:to>
+                                        <p:strVal val="visible"/>
+                                      </p:to>
+                                    </p:set>
+                                  </p:childTnLst>
+                                </p:cTn>
+                              </p:par>
+                            </p:childTnLst>
+                          </p:cTn>
+                        </p:par>
+                      </p:childTnLst>
+                    </p:cTn>
+                  </p:par>
+                  <p:par>
+                    <p:cTn id="7" fill="hold">
+                      <p:stCondLst>
+                        <p:cond delay="indefinite"/>
+                      </p:stCondLst>
+                      <p:childTnLst>
+                        <p:par>
+                          <p:cTn id="8" fill="hold">
+                            <p:stCondLst>
+                              <p:cond delay="0"/>
+                            </p:stCondLst>
+                            <p:childTnLst>
+                              <p:par>
+                                <p:cTn id="9" presetID="1" presetClass="entr" presetSubtype="0" fill="hold" grpId="0" nodeType="clickEffect">
+                                  <p:stCondLst>
+                                    <p:cond delay="0"/>
+                                  </p:stCondLst>
+                                  <p:childTnLst>
+                                    <p:set>
+                                      <p:cBhvr>
+                                        <p:cTn id="10" dur="1" fill="hold">
+                                          <p:stCondLst>
+                                            <p:cond delay="0"/>
+                                          </p:stCondLst>
+                                        </p:cTn>
+                                        <p:tgtEl>
+                                          <p:spTgt spid="3">
+                                            <p:txEl>
+                                              <p:pRg st="1" end="1"/>
+                                            </p:txEl>
+                                          </p:spTgt>
+                                        </p:tgtEl>
+                                        <p:attrNameLst>
+                                          <p:attrName>style.visibility</p:attrName>
+                                        </p:attrNameLst>
+                                      </p:cBhvr>
+                                      <p:to>
+                                        <p:strVal val="visible"/>
+                                      </p:to>
+                                    </p:set>
+                                  </p:childTnLst>
+                                </p:cTn>
+                              </p:par>
+                              <p:par>
+                                <p:cTn id="11" presetID="1" presetClass="entr" presetSubtype="0" fill="hold" grpId="0" nodeType="withEffect">
+                                  <p:stCondLst>
+                                    <p:cond delay="0"/>
+                                  </p:stCondLst>
+                                  <p:childTnLst>
+                                    <p:set>
+                                      <p:cBhvr>
+                                        <p:cTn id="12" dur="1" fill="hold">
+                                          <p:stCondLst>
+                                            <p:cond delay="0"/>
+                                          </p:stCondLst>
+                                        </p:cTn>
+                                        <p:tgtEl>
+                                          <p:spTgt spid="4"/>
+                                        </p:tgtEl>
+                                        <p:attrNameLst>
+                                          <p:attrName>style.visibility</p:attrName>
+                                        </p:attrNameLst>
+                                      </p:cBhvr>
+                                      <p:to>
+                                        <p:strVal val="visible"/>
+                                      </p:to>
+                                    </p:set>
+                                  </p:childTnLst>
+                                </p:cTn>
+                              </p:par>
+                            </p:childTnLst>
+                          </p:cTn>
+                        </p:par>
+                      </p:childTnLst>
+                    </p:cTn>
+                  </p:par>
+                  <p:par>
+                    <p:cTn id="13" fill="hold">
+                      <p:stCondLst>
+                        <p:cond delay="indefinite"/>
+                      </p:stCondLst>
+                      <p:childTnLst>
+                        <p:par>
+                          <p:cTn id="14" fill="hold">
+                            <p:stCondLst>
+                              <p:cond delay="0"/>
+                            </p:stCondLst>
+                            <p:childTnLst>
+                              <p:par>
+                                <p:cTn id="15" presetID="1" presetClass="entr" presetSubtype="0" fill="hold" grpId="0" nodeType="clickEffect">
+                                  <p:stCondLst>
+                                    <p:cond delay="0"/>
+                                  </p:stCondLst>
+                                  <p:childTnLst>
+                                    <p:set>
+                                      <p:cBhvr>
+                                        <p:cTn id="16" dur="1" fill="hold">
+                                          <p:stCondLst>
+                                            <p:cond delay="0"/>
+                                          </p:stCondLst>
+                                        </p:cTn>
+                                        <p:tgtEl>
+                                          <p:spTgt spid="3">
+                                            <p:txEl>
+                                              <p:pRg st="3" end="3"/>
+                                            </p:txEl>
+                                          </p:spTgt>
+                                        </p:tgtEl>
+                                        <p:attrNameLst>
+                                          <p:attrName>style.visibility</p:attrName>
+                                        </p:attrNameLst>
+                                      </p:cBhvr>
+                                      <p:to>
+                                        <p:strVal val="visible"/>
+                                      </p:to>
+                                    </p:set>
+                                  </p:childTnLst>
+                                </p:cTn>
+                              </p:par>
+                            </p:childTnLst>
+                          </p:cTn>
+                        </p:par>
+                      </p:childTnLst>
+                    </p:cTn>
+                  </p:par>
+                  <p:par>
+                    <p:cTn id="17" fill="hold">
+                      <p:stCondLst>
+                        <p:cond delay="indefinite"/>
+                      </p:stCondLst>
+                      <p:childTnLst>
+                        <p:par>
+                          <p:cTn id="18" fill="hold">
+                            <p:stCondLst>
+                              <p:cond delay="0"/>
+                            </p:stCondLst>
+                            <p:childTnLst>
+                              <p:par>
+                                <p:cTn id="19" presetID="1" presetClass="entr" presetSubtype="0" fill="hold" grpId="0" nodeType="clickEffect">
+                                  <p:stCondLst>
+                                    <p:cond delay="0"/>
+                                  </p:stCondLst>
+                                  <p:childTnLst>
+                                    <p:set>
+                                      <p:cBhvr>
+                                        <p:cTn id="20" dur="1" fill="hold">
+                                          <p:stCondLst>
+                                            <p:cond delay="0"/>
+                                          </p:stCondLst>
+                                        </p:cTn>
+                                        <p:tgtEl>
+                                          <p:spTgt spid="3">
+                                            <p:txEl>
+                                              <p:pRg st="4" end="4"/>
+                                            </p:txEl>
+                                          </p:spTgt>
+                                        </p:tgtEl>
+                                        <p:attrNameLst>
+                                          <p:attrName>style.visibility</p:attrName>
+                                        </p:attrNameLst>
+                                      </p:cBhvr>
+                                      <p:to>
+                                        <p:strVal val="visible"/>
+                                      </p:to>
+                                    </p:set>
+                                  </p:childTnLst>
+                                </p:cTn>
+                              </p:par>
+                              <p:par>
+                                <p:cTn id="21" presetID="1" presetClass="entr" presetSubtype="0" fill="hold" grpId="0" nodeType="withEffect">
+                                  <p:stCondLst>
+                                    <p:cond delay="0"/>
+                                  </p:stCondLst>
+                                  <p:childTnLst>
+                                    <p:set>
+                                      <p:cBhvr>
+                                        <p:cTn id="22" dur="1" fill="hold">
+                                          <p:stCondLst>
+                                            <p:cond delay="0"/>
+                                          </p:stCondLst>
+                                        </p:cTn>
+                                        <p:tgtEl>
+                                          <p:spTgt spid="5"/>
+                                        </p:tgtEl>
+                                        <p:attrNameLst>
+                                          <p:attrName>style.visibility</p:attrName>
+                                        </p:attrNameLst>
+                                      </p:cBhvr>
+                                      <p:to>
+                                        <p:strVal val="visible"/>
+                                      </p:to>
+                                    </p:set>
+                                  </p:childTnLst>
+                                </p:cTn>
+                              </p:par>
+                            </p:childTnLst>
+                          </p:cTn>
+                        </p:par>
+                      </p:childTnLst>
+                    </p:cTn>
+                  </p:par>
+                  <p:par>
+                    <p:cTn id="23" fill="hold">
+                      <p:stCondLst>
+                        <p:cond delay="indefinite"/>
+                      </p:stCondLst>
+                      <p:childTnLst>
+                        <p:par>
+                          <p:cTn id="24" fill="hold">
+                            <p:stCondLst>
+                              <p:cond delay="0"/>
+                            </p:stCondLst>
+                            <p:childTnLst>
+                              <p:par>
+                                <p:cTn id="25" presetID="1" presetClass="entr" presetSubtype="0" fill="hold" grpId="0" nodeType="clickEffect">
+                                  <p:stCondLst>
+                                    <p:cond delay="0"/>
+                                  </p:stCondLst>
+                                  <p:childTnLst>
+                                    <p:set>
+                                      <p:cBhvr>
+                                        <p:cTn id="26" dur="1" fill="hold">
+                                          <p:stCondLst>
+                                            <p:cond delay="0"/>
+                                          </p:stCondLst>
+                                        </p:cTn>
+                                        <p:tgtEl>
+                                          <p:spTgt spid="3">
+                                            <p:txEl>
+                                              <p:pRg st="6" end="6"/>
+                                            </p:txEl>
+                                          </p:spTgt>
+                                        </p:tgtEl>
+                                        <p:attrNameLst>
+                                          <p:attrName>style.visibility</p:attrName>
+                                        </p:attrNameLst>
+                                      </p:cBhvr>
+                                      <p:to>
+                                        <p:strVal val="visible"/>
+                                      </p:to>
+                                    </p:set>
+                                  </p:childTnLst>
+                                </p:cTn>
+                              </p:par>
+                            </p:childTnLst>
+                          </p:cTn>
+                        </p:par>
+                      </p:childTnLst>
+                    </p:cTn>
+                  </p:par>
+                </p:childTnLst>
+              </p:cTn>
+              <p:prevCondLst>
+                <p:cond evt="onPrev" delay="0">
+                  <p:tgtEl>
+                    <p:sldTgt/>
+                  </p:tgtEl>
+                </p:cond>
+              </p:prevCondLst>
+              <p:nextCondLst>
+                <p:cond evt="onNext" delay="0">
+                  <p:tgtEl>
+                    <p:sldTgt/>
+                  </p:tgtEl>
+                </p:cond>
+              </p:nextCondLst>
+            </p:seq>
+          </p:childTnLst>
+        </p:cTn>
+      </p:par>
+    </p:tnLst>
+    <p:bldLst>
+      <p:bldP spid="3" grpId="0" uiExpand="1" build="p"/>
+      <p:bldP spid="4" grpId="0" animBg="1"/>
+      <p:bldP spid="5" grpId="0" animBg="1"/>
     </p:bldLst>
   </p:timing>
 </p:sld>

</xml_diff>

<commit_message>
Fix outdated help command
</commit_message>
<xml_diff>
--- a/singularity.pptx
+++ b/singularity.pptx
@@ -340,7 +340,7 @@
           <a:p>
             <a:fld id="{6BD974B4-F374-4E74-84D3-1EB7DBF32A2A}" type="datetimeFigureOut">
               <a:rPr lang="nl-BE" smtClean="0"/>
-              <a:t>15/11/2021</a:t>
+              <a:t>8/01/2022</a:t>
             </a:fld>
             <a:endParaRPr lang="nl-BE"/>
           </a:p>
@@ -823,7 +823,7 @@
           <a:p>
             <a:fld id="{A433E747-842D-4EF3-8202-AC54FEC33061}" type="datetime1">
               <a:rPr lang="nl-BE" smtClean="0"/>
-              <a:t>15/11/2021</a:t>
+              <a:t>8/01/2022</a:t>
             </a:fld>
             <a:endParaRPr lang="nl-BE"/>
           </a:p>
@@ -993,7 +993,7 @@
           <a:p>
             <a:fld id="{7C821354-3381-4DF5-ABED-FDAFA2BAD3F8}" type="datetime1">
               <a:rPr lang="nl-BE" smtClean="0"/>
-              <a:t>15/11/2021</a:t>
+              <a:t>8/01/2022</a:t>
             </a:fld>
             <a:endParaRPr lang="nl-BE"/>
           </a:p>
@@ -1173,7 +1173,7 @@
           <a:p>
             <a:fld id="{C6B54B95-9964-4BBF-B171-A69413AB9FC5}" type="datetime1">
               <a:rPr lang="nl-BE" smtClean="0"/>
-              <a:t>15/11/2021</a:t>
+              <a:t>8/01/2022</a:t>
             </a:fld>
             <a:endParaRPr lang="nl-BE"/>
           </a:p>
@@ -1343,7 +1343,7 @@
           <a:p>
             <a:fld id="{BE45CDE5-064C-4862-90E9-83B8FD778625}" type="datetime1">
               <a:rPr lang="nl-BE" smtClean="0"/>
-              <a:t>15/11/2021</a:t>
+              <a:t>8/01/2022</a:t>
             </a:fld>
             <a:endParaRPr lang="nl-BE"/>
           </a:p>
@@ -1587,7 +1587,7 @@
           <a:p>
             <a:fld id="{C75A345C-628E-463E-B8F7-69C25D344DF5}" type="datetime1">
               <a:rPr lang="nl-BE" smtClean="0"/>
-              <a:t>15/11/2021</a:t>
+              <a:t>8/01/2022</a:t>
             </a:fld>
             <a:endParaRPr lang="nl-BE"/>
           </a:p>
@@ -1819,7 +1819,7 @@
           <a:p>
             <a:fld id="{65B04534-538C-4249-A635-8BB2B8486464}" type="datetime1">
               <a:rPr lang="nl-BE" smtClean="0"/>
-              <a:t>15/11/2021</a:t>
+              <a:t>8/01/2022</a:t>
             </a:fld>
             <a:endParaRPr lang="nl-BE"/>
           </a:p>
@@ -2186,7 +2186,7 @@
           <a:p>
             <a:fld id="{089671CB-8547-4C91-A3D5-012E6E8790E6}" type="datetime1">
               <a:rPr lang="nl-BE" smtClean="0"/>
-              <a:t>15/11/2021</a:t>
+              <a:t>8/01/2022</a:t>
             </a:fld>
             <a:endParaRPr lang="nl-BE"/>
           </a:p>
@@ -2304,7 +2304,7 @@
           <a:p>
             <a:fld id="{5765335F-FC99-4A2B-B87B-6AF6F3762B67}" type="datetime1">
               <a:rPr lang="nl-BE" smtClean="0"/>
-              <a:t>15/11/2021</a:t>
+              <a:t>8/01/2022</a:t>
             </a:fld>
             <a:endParaRPr lang="nl-BE"/>
           </a:p>
@@ -2399,7 +2399,7 @@
           <a:p>
             <a:fld id="{1711BA58-B677-4D21-BDCD-9DD1AEA8A328}" type="datetime1">
               <a:rPr lang="nl-BE" smtClean="0"/>
-              <a:t>15/11/2021</a:t>
+              <a:t>8/01/2022</a:t>
             </a:fld>
             <a:endParaRPr lang="nl-BE"/>
           </a:p>
@@ -2676,7 +2676,7 @@
           <a:p>
             <a:fld id="{5513BE8B-B89C-461B-89D1-D5BE33ADB6B9}" type="datetime1">
               <a:rPr lang="nl-BE" smtClean="0"/>
-              <a:t>15/11/2021</a:t>
+              <a:t>8/01/2022</a:t>
             </a:fld>
             <a:endParaRPr lang="nl-BE"/>
           </a:p>
@@ -2933,7 +2933,7 @@
           <a:p>
             <a:fld id="{AEE65485-0554-4482-9B9C-289893A0B56B}" type="datetime1">
               <a:rPr lang="nl-BE" smtClean="0"/>
-              <a:t>15/11/2021</a:t>
+              <a:t>8/01/2022</a:t>
             </a:fld>
             <a:endParaRPr lang="nl-BE"/>
           </a:p>
@@ -3146,7 +3146,7 @@
           <a:p>
             <a:fld id="{6FF26CEC-AF8A-4096-9A53-521F7571A055}" type="datetime1">
               <a:rPr lang="nl-BE" smtClean="0"/>
-              <a:t>15/11/2021</a:t>
+              <a:t>8/01/2022</a:t>
             </a:fld>
             <a:endParaRPr lang="nl-BE"/>
           </a:p>
@@ -7233,7 +7233,7 @@
                 <a:latin typeface="Courier New" panose="02070309020205020404" pitchFamily="49" charset="0"/>
                 <a:cs typeface="Courier New" panose="02070309020205020404" pitchFamily="49" charset="0"/>
               </a:rPr>
-              <a:t>singularity help</a:t>
+              <a:t>singularity run-help</a:t>
             </a:r>
           </a:p>
         </p:txBody>

</xml_diff>

<commit_message>
Add export to %environment
</commit_message>
<xml_diff>
--- a/singularity.pptx
+++ b/singularity.pptx
@@ -340,7 +340,7 @@
           <a:p>
             <a:fld id="{6BD974B4-F374-4E74-84D3-1EB7DBF32A2A}" type="datetimeFigureOut">
               <a:rPr lang="nl-BE" smtClean="0"/>
-              <a:t>8/01/2022</a:t>
+              <a:t>3/03/2022</a:t>
             </a:fld>
             <a:endParaRPr lang="nl-BE"/>
           </a:p>
@@ -823,7 +823,7 @@
           <a:p>
             <a:fld id="{A433E747-842D-4EF3-8202-AC54FEC33061}" type="datetime1">
               <a:rPr lang="nl-BE" smtClean="0"/>
-              <a:t>8/01/2022</a:t>
+              <a:t>3/03/2022</a:t>
             </a:fld>
             <a:endParaRPr lang="nl-BE"/>
           </a:p>
@@ -993,7 +993,7 @@
           <a:p>
             <a:fld id="{7C821354-3381-4DF5-ABED-FDAFA2BAD3F8}" type="datetime1">
               <a:rPr lang="nl-BE" smtClean="0"/>
-              <a:t>8/01/2022</a:t>
+              <a:t>3/03/2022</a:t>
             </a:fld>
             <a:endParaRPr lang="nl-BE"/>
           </a:p>
@@ -1173,7 +1173,7 @@
           <a:p>
             <a:fld id="{C6B54B95-9964-4BBF-B171-A69413AB9FC5}" type="datetime1">
               <a:rPr lang="nl-BE" smtClean="0"/>
-              <a:t>8/01/2022</a:t>
+              <a:t>3/03/2022</a:t>
             </a:fld>
             <a:endParaRPr lang="nl-BE"/>
           </a:p>
@@ -1343,7 +1343,7 @@
           <a:p>
             <a:fld id="{BE45CDE5-064C-4862-90E9-83B8FD778625}" type="datetime1">
               <a:rPr lang="nl-BE" smtClean="0"/>
-              <a:t>8/01/2022</a:t>
+              <a:t>3/03/2022</a:t>
             </a:fld>
             <a:endParaRPr lang="nl-BE"/>
           </a:p>
@@ -1587,7 +1587,7 @@
           <a:p>
             <a:fld id="{C75A345C-628E-463E-B8F7-69C25D344DF5}" type="datetime1">
               <a:rPr lang="nl-BE" smtClean="0"/>
-              <a:t>8/01/2022</a:t>
+              <a:t>3/03/2022</a:t>
             </a:fld>
             <a:endParaRPr lang="nl-BE"/>
           </a:p>
@@ -1819,7 +1819,7 @@
           <a:p>
             <a:fld id="{65B04534-538C-4249-A635-8BB2B8486464}" type="datetime1">
               <a:rPr lang="nl-BE" smtClean="0"/>
-              <a:t>8/01/2022</a:t>
+              <a:t>3/03/2022</a:t>
             </a:fld>
             <a:endParaRPr lang="nl-BE"/>
           </a:p>
@@ -2186,7 +2186,7 @@
           <a:p>
             <a:fld id="{089671CB-8547-4C91-A3D5-012E6E8790E6}" type="datetime1">
               <a:rPr lang="nl-BE" smtClean="0"/>
-              <a:t>8/01/2022</a:t>
+              <a:t>3/03/2022</a:t>
             </a:fld>
             <a:endParaRPr lang="nl-BE"/>
           </a:p>
@@ -2304,7 +2304,7 @@
           <a:p>
             <a:fld id="{5765335F-FC99-4A2B-B87B-6AF6F3762B67}" type="datetime1">
               <a:rPr lang="nl-BE" smtClean="0"/>
-              <a:t>8/01/2022</a:t>
+              <a:t>3/03/2022</a:t>
             </a:fld>
             <a:endParaRPr lang="nl-BE"/>
           </a:p>
@@ -2399,7 +2399,7 @@
           <a:p>
             <a:fld id="{1711BA58-B677-4D21-BDCD-9DD1AEA8A328}" type="datetime1">
               <a:rPr lang="nl-BE" smtClean="0"/>
-              <a:t>8/01/2022</a:t>
+              <a:t>3/03/2022</a:t>
             </a:fld>
             <a:endParaRPr lang="nl-BE"/>
           </a:p>
@@ -2676,7 +2676,7 @@
           <a:p>
             <a:fld id="{5513BE8B-B89C-461B-89D1-D5BE33ADB6B9}" type="datetime1">
               <a:rPr lang="nl-BE" smtClean="0"/>
-              <a:t>8/01/2022</a:t>
+              <a:t>3/03/2022</a:t>
             </a:fld>
             <a:endParaRPr lang="nl-BE"/>
           </a:p>
@@ -2933,7 +2933,7 @@
           <a:p>
             <a:fld id="{AEE65485-0554-4482-9B9C-289893A0B56B}" type="datetime1">
               <a:rPr lang="nl-BE" smtClean="0"/>
-              <a:t>8/01/2022</a:t>
+              <a:t>3/03/2022</a:t>
             </a:fld>
             <a:endParaRPr lang="nl-BE"/>
           </a:p>
@@ -3146,7 +3146,7 @@
           <a:p>
             <a:fld id="{6FF26CEC-AF8A-4096-9A53-521F7571A055}" type="datetime1">
               <a:rPr lang="nl-BE" smtClean="0"/>
-              <a:t>8/01/2022</a:t>
+              <a:t>3/03/2022</a:t>
             </a:fld>
             <a:endParaRPr lang="nl-BE"/>
           </a:p>
@@ -6799,7 +6799,7 @@
         <p:spPr>
           <a:xfrm>
             <a:off x="628650" y="2363303"/>
-            <a:ext cx="3631122" cy="646331"/>
+            <a:ext cx="4596130" cy="646331"/>
           </a:xfrm>
           <a:prstGeom prst="rect">
             <a:avLst/>
@@ -6835,7 +6835,7 @@
                 <a:latin typeface="Courier New" panose="02070309020205020404" pitchFamily="49" charset="0"/>
                 <a:cs typeface="Courier New" panose="02070309020205020404" pitchFamily="49" charset="0"/>
               </a:rPr>
-              <a:t>    DATA_DIR=/</a:t>
+              <a:t>    export DATA_DIR=/</a:t>
             </a:r>
             <a:r>
               <a:rPr lang="en-US" dirty="0" err="1">

</xml_diff>

<commit_message>
Add slide on multistage builds
</commit_message>
<xml_diff>
--- a/singularity.pptx
+++ b/singularity.pptx
@@ -5,7 +5,7 @@
     <p:sldMasterId id="2147483660" r:id="rId1"/>
   </p:sldMasterIdLst>
   <p:notesMasterIdLst>
-    <p:notesMasterId r:id="rId53"/>
+    <p:notesMasterId r:id="rId54"/>
   </p:notesMasterIdLst>
   <p:sldIdLst>
     <p:sldId id="256" r:id="rId2"/>
@@ -27,38 +27,39 @@
     <p:sldId id="266" r:id="rId18"/>
     <p:sldId id="267" r:id="rId19"/>
     <p:sldId id="293" r:id="rId20"/>
-    <p:sldId id="268" r:id="rId21"/>
-    <p:sldId id="302" r:id="rId22"/>
-    <p:sldId id="292" r:id="rId23"/>
-    <p:sldId id="304" r:id="rId24"/>
-    <p:sldId id="305" r:id="rId25"/>
-    <p:sldId id="306" r:id="rId26"/>
-    <p:sldId id="275" r:id="rId27"/>
-    <p:sldId id="269" r:id="rId28"/>
-    <p:sldId id="278" r:id="rId29"/>
-    <p:sldId id="271" r:id="rId30"/>
-    <p:sldId id="289" r:id="rId31"/>
-    <p:sldId id="282" r:id="rId32"/>
-    <p:sldId id="283" r:id="rId33"/>
-    <p:sldId id="284" r:id="rId34"/>
-    <p:sldId id="279" r:id="rId35"/>
-    <p:sldId id="280" r:id="rId36"/>
-    <p:sldId id="281" r:id="rId37"/>
-    <p:sldId id="296" r:id="rId38"/>
-    <p:sldId id="297" r:id="rId39"/>
-    <p:sldId id="298" r:id="rId40"/>
-    <p:sldId id="299" r:id="rId41"/>
-    <p:sldId id="300" r:id="rId42"/>
-    <p:sldId id="285" r:id="rId43"/>
-    <p:sldId id="286" r:id="rId44"/>
-    <p:sldId id="287" r:id="rId45"/>
-    <p:sldId id="307" r:id="rId46"/>
-    <p:sldId id="308" r:id="rId47"/>
-    <p:sldId id="272" r:id="rId48"/>
-    <p:sldId id="276" r:id="rId49"/>
-    <p:sldId id="270" r:id="rId50"/>
-    <p:sldId id="277" r:id="rId51"/>
-    <p:sldId id="291" r:id="rId52"/>
+    <p:sldId id="310" r:id="rId21"/>
+    <p:sldId id="268" r:id="rId22"/>
+    <p:sldId id="302" r:id="rId23"/>
+    <p:sldId id="292" r:id="rId24"/>
+    <p:sldId id="304" r:id="rId25"/>
+    <p:sldId id="305" r:id="rId26"/>
+    <p:sldId id="306" r:id="rId27"/>
+    <p:sldId id="275" r:id="rId28"/>
+    <p:sldId id="269" r:id="rId29"/>
+    <p:sldId id="278" r:id="rId30"/>
+    <p:sldId id="271" r:id="rId31"/>
+    <p:sldId id="289" r:id="rId32"/>
+    <p:sldId id="282" r:id="rId33"/>
+    <p:sldId id="283" r:id="rId34"/>
+    <p:sldId id="284" r:id="rId35"/>
+    <p:sldId id="279" r:id="rId36"/>
+    <p:sldId id="280" r:id="rId37"/>
+    <p:sldId id="281" r:id="rId38"/>
+    <p:sldId id="296" r:id="rId39"/>
+    <p:sldId id="297" r:id="rId40"/>
+    <p:sldId id="298" r:id="rId41"/>
+    <p:sldId id="299" r:id="rId42"/>
+    <p:sldId id="300" r:id="rId43"/>
+    <p:sldId id="285" r:id="rId44"/>
+    <p:sldId id="286" r:id="rId45"/>
+    <p:sldId id="287" r:id="rId46"/>
+    <p:sldId id="307" r:id="rId47"/>
+    <p:sldId id="308" r:id="rId48"/>
+    <p:sldId id="272" r:id="rId49"/>
+    <p:sldId id="276" r:id="rId50"/>
+    <p:sldId id="270" r:id="rId51"/>
+    <p:sldId id="277" r:id="rId52"/>
+    <p:sldId id="291" r:id="rId53"/>
   </p:sldIdLst>
   <p:sldSz cx="9144000" cy="6858000" type="screen4x3"/>
   <p:notesSz cx="6858000" cy="9144000"/>
@@ -189,6 +190,7 @@
             <p14:sldId id="266"/>
             <p14:sldId id="267"/>
             <p14:sldId id="293"/>
+            <p14:sldId id="310"/>
             <p14:sldId id="268"/>
             <p14:sldId id="302"/>
             <p14:sldId id="292"/>
@@ -9800,6 +9802,545 @@
       </p:grpSpPr>
       <p:sp>
         <p:nvSpPr>
+          <p:cNvPr id="2" name="Title 1">
+            <a:extLst>
+              <a:ext uri="{FF2B5EF4-FFF2-40B4-BE49-F238E27FC236}">
+                <a16:creationId xmlns:a16="http://schemas.microsoft.com/office/drawing/2014/main" id="{50037053-A591-F416-D8AF-E382290D3509}"/>
+              </a:ext>
+            </a:extLst>
+          </p:cNvPr>
+          <p:cNvSpPr>
+            <a:spLocks noGrp="1"/>
+          </p:cNvSpPr>
+          <p:nvPr>
+            <p:ph type="title"/>
+          </p:nvPr>
+        </p:nvSpPr>
+        <p:spPr/>
+        <p:txBody>
+          <a:bodyPr/>
+          <a:lstStyle/>
+          <a:p>
+            <a:r>
+              <a:rPr lang="en-US" dirty="0"/>
+              <a:t>Multistage builds</a:t>
+            </a:r>
+          </a:p>
+        </p:txBody>
+      </p:sp>
+      <p:sp>
+        <p:nvSpPr>
+          <p:cNvPr id="3" name="Content Placeholder 2">
+            <a:extLst>
+              <a:ext uri="{FF2B5EF4-FFF2-40B4-BE49-F238E27FC236}">
+                <a16:creationId xmlns:a16="http://schemas.microsoft.com/office/drawing/2014/main" id="{8B21C91A-E097-D350-6F6D-2F9051A230DD}"/>
+              </a:ext>
+            </a:extLst>
+          </p:cNvPr>
+          <p:cNvSpPr>
+            <a:spLocks noGrp="1"/>
+          </p:cNvSpPr>
+          <p:nvPr>
+            <p:ph idx="1"/>
+          </p:nvPr>
+        </p:nvSpPr>
+        <p:spPr/>
+        <p:txBody>
+          <a:bodyPr/>
+          <a:lstStyle/>
+          <a:p>
+            <a:r>
+              <a:rPr lang="en-US" dirty="0"/>
+              <a:t>Libraries/tools only required during software builds?</a:t>
+            </a:r>
+          </a:p>
+          <a:p>
+            <a:pPr lvl="1"/>
+            <a:r>
+              <a:rPr lang="en-US" dirty="0"/>
+              <a:t>Take up space</a:t>
+            </a:r>
+          </a:p>
+          <a:p>
+            <a:pPr lvl="1"/>
+            <a:r>
+              <a:rPr lang="en-US" dirty="0"/>
+              <a:t>Increases time to load</a:t>
+            </a:r>
+          </a:p>
+          <a:p>
+            <a:pPr lvl="1"/>
+            <a:r>
+              <a:rPr lang="en-US" dirty="0"/>
+              <a:t>Increases memory footprint</a:t>
+            </a:r>
+          </a:p>
+          <a:p>
+            <a:r>
+              <a:rPr lang="en-US" dirty="0"/>
+              <a:t>Multistage build</a:t>
+            </a:r>
+          </a:p>
+          <a:p>
+            <a:pPr lvl="1"/>
+            <a:r>
+              <a:rPr lang="en-US" dirty="0"/>
+              <a:t>Build stage: create temporary image</a:t>
+            </a:r>
+          </a:p>
+          <a:p>
+            <a:pPr lvl="1"/>
+            <a:r>
+              <a:rPr lang="en-US" dirty="0"/>
+              <a:t>Deployment stage: copy artefacts from build stage</a:t>
+            </a:r>
+          </a:p>
+        </p:txBody>
+      </p:sp>
+      <p:sp>
+        <p:nvSpPr>
+          <p:cNvPr id="4" name="Slide Number Placeholder 3">
+            <a:extLst>
+              <a:ext uri="{FF2B5EF4-FFF2-40B4-BE49-F238E27FC236}">
+                <a16:creationId xmlns:a16="http://schemas.microsoft.com/office/drawing/2014/main" id="{FEFA348A-3F57-6CB2-50F8-8F2C2087EBA5}"/>
+              </a:ext>
+            </a:extLst>
+          </p:cNvPr>
+          <p:cNvSpPr>
+            <a:spLocks noGrp="1"/>
+          </p:cNvSpPr>
+          <p:nvPr>
+            <p:ph type="sldNum" sz="quarter" idx="12"/>
+          </p:nvPr>
+        </p:nvSpPr>
+        <p:spPr/>
+        <p:txBody>
+          <a:bodyPr/>
+          <a:lstStyle/>
+          <a:p>
+            <a:fld id="{AEFF399F-E3B5-4890-BC79-9BC8D4DF3F2D}" type="slidenum">
+              <a:rPr lang="nl-BE" smtClean="0"/>
+              <a:t>20</a:t>
+            </a:fld>
+            <a:endParaRPr lang="nl-BE"/>
+          </a:p>
+        </p:txBody>
+      </p:sp>
+      <p:sp>
+        <p:nvSpPr>
+          <p:cNvPr id="5" name="TextBox 4">
+            <a:extLst>
+              <a:ext uri="{FF2B5EF4-FFF2-40B4-BE49-F238E27FC236}">
+                <a16:creationId xmlns:a16="http://schemas.microsoft.com/office/drawing/2014/main" id="{3FAB717A-4C72-2769-2BBE-DA78ECCF26B9}"/>
+              </a:ext>
+            </a:extLst>
+          </p:cNvPr>
+          <p:cNvSpPr txBox="1"/>
+          <p:nvPr/>
+        </p:nvSpPr>
+        <p:spPr>
+          <a:xfrm>
+            <a:off x="1242883" y="5574160"/>
+            <a:ext cx="6658233" cy="461665"/>
+          </a:xfrm>
+          <a:prstGeom prst="rect">
+            <a:avLst/>
+          </a:prstGeom>
+          <a:noFill/>
+          <a:ln>
+            <a:solidFill>
+              <a:schemeClr val="tx1"/>
+            </a:solidFill>
+          </a:ln>
+        </p:spPr>
+        <p:txBody>
+          <a:bodyPr wrap="none" rtlCol="0">
+            <a:spAutoFit/>
+          </a:bodyPr>
+          <a:lstStyle/>
+          <a:p>
+            <a:r>
+              <a:rPr lang="en-US" sz="2400" dirty="0"/>
+              <a:t>Don't forget to copy dependencies, use </a:t>
+            </a:r>
+            <a:r>
+              <a:rPr lang="en-US" sz="2400" dirty="0" err="1"/>
+              <a:t>dll</a:t>
+            </a:r>
+            <a:r>
+              <a:rPr lang="en-US" sz="2400" dirty="0"/>
+              <a:t> to check!</a:t>
+            </a:r>
+          </a:p>
+        </p:txBody>
+      </p:sp>
+    </p:spTree>
+    <p:extLst>
+      <p:ext uri="{BB962C8B-B14F-4D97-AF65-F5344CB8AC3E}">
+        <p14:creationId xmlns:p14="http://schemas.microsoft.com/office/powerpoint/2010/main" val="3465147219"/>
+      </p:ext>
+    </p:extLst>
+  </p:cSld>
+  <p:clrMapOvr>
+    <a:masterClrMapping/>
+  </p:clrMapOvr>
+  <p:timing>
+    <p:tnLst>
+      <p:par>
+        <p:cTn id="1" dur="indefinite" restart="never" nodeType="tmRoot">
+          <p:childTnLst>
+            <p:seq concurrent="1" nextAc="seek">
+              <p:cTn id="2" dur="indefinite" nodeType="mainSeq">
+                <p:childTnLst>
+                  <p:par>
+                    <p:cTn id="3" fill="hold">
+                      <p:stCondLst>
+                        <p:cond delay="indefinite"/>
+                        <p:cond evt="onBegin" delay="0">
+                          <p:tn val="2"/>
+                        </p:cond>
+                      </p:stCondLst>
+                      <p:childTnLst>
+                        <p:par>
+                          <p:cTn id="4" fill="hold">
+                            <p:stCondLst>
+                              <p:cond delay="0"/>
+                            </p:stCondLst>
+                            <p:childTnLst>
+                              <p:par>
+                                <p:cTn id="5" presetID="1" presetClass="entr" presetSubtype="0" fill="hold" grpId="0" nodeType="withEffect">
+                                  <p:stCondLst>
+                                    <p:cond delay="0"/>
+                                  </p:stCondLst>
+                                  <p:childTnLst>
+                                    <p:set>
+                                      <p:cBhvr>
+                                        <p:cTn id="6" dur="1" fill="hold">
+                                          <p:stCondLst>
+                                            <p:cond delay="0"/>
+                                          </p:stCondLst>
+                                        </p:cTn>
+                                        <p:tgtEl>
+                                          <p:spTgt spid="3">
+                                            <p:txEl>
+                                              <p:pRg st="0" end="0"/>
+                                            </p:txEl>
+                                          </p:spTgt>
+                                        </p:tgtEl>
+                                        <p:attrNameLst>
+                                          <p:attrName>style.visibility</p:attrName>
+                                        </p:attrNameLst>
+                                      </p:cBhvr>
+                                      <p:to>
+                                        <p:strVal val="visible"/>
+                                      </p:to>
+                                    </p:set>
+                                  </p:childTnLst>
+                                </p:cTn>
+                              </p:par>
+                              <p:par>
+                                <p:cTn id="7" presetID="1" presetClass="entr" presetSubtype="0" fill="hold" grpId="0" nodeType="withEffect">
+                                  <p:stCondLst>
+                                    <p:cond delay="0"/>
+                                  </p:stCondLst>
+                                  <p:childTnLst>
+                                    <p:set>
+                                      <p:cBhvr>
+                                        <p:cTn id="8" dur="1" fill="hold">
+                                          <p:stCondLst>
+                                            <p:cond delay="0"/>
+                                          </p:stCondLst>
+                                        </p:cTn>
+                                        <p:tgtEl>
+                                          <p:spTgt spid="3">
+                                            <p:txEl>
+                                              <p:pRg st="1" end="1"/>
+                                            </p:txEl>
+                                          </p:spTgt>
+                                        </p:tgtEl>
+                                        <p:attrNameLst>
+                                          <p:attrName>style.visibility</p:attrName>
+                                        </p:attrNameLst>
+                                      </p:cBhvr>
+                                      <p:to>
+                                        <p:strVal val="visible"/>
+                                      </p:to>
+                                    </p:set>
+                                  </p:childTnLst>
+                                </p:cTn>
+                              </p:par>
+                              <p:par>
+                                <p:cTn id="9" presetID="1" presetClass="entr" presetSubtype="0" fill="hold" grpId="0" nodeType="withEffect">
+                                  <p:stCondLst>
+                                    <p:cond delay="0"/>
+                                  </p:stCondLst>
+                                  <p:childTnLst>
+                                    <p:set>
+                                      <p:cBhvr>
+                                        <p:cTn id="10" dur="1" fill="hold">
+                                          <p:stCondLst>
+                                            <p:cond delay="0"/>
+                                          </p:stCondLst>
+                                        </p:cTn>
+                                        <p:tgtEl>
+                                          <p:spTgt spid="3">
+                                            <p:txEl>
+                                              <p:pRg st="2" end="2"/>
+                                            </p:txEl>
+                                          </p:spTgt>
+                                        </p:tgtEl>
+                                        <p:attrNameLst>
+                                          <p:attrName>style.visibility</p:attrName>
+                                        </p:attrNameLst>
+                                      </p:cBhvr>
+                                      <p:to>
+                                        <p:strVal val="visible"/>
+                                      </p:to>
+                                    </p:set>
+                                  </p:childTnLst>
+                                </p:cTn>
+                              </p:par>
+                              <p:par>
+                                <p:cTn id="11" presetID="1" presetClass="entr" presetSubtype="0" fill="hold" grpId="0" nodeType="withEffect">
+                                  <p:stCondLst>
+                                    <p:cond delay="0"/>
+                                  </p:stCondLst>
+                                  <p:childTnLst>
+                                    <p:set>
+                                      <p:cBhvr>
+                                        <p:cTn id="12" dur="1" fill="hold">
+                                          <p:stCondLst>
+                                            <p:cond delay="0"/>
+                                          </p:stCondLst>
+                                        </p:cTn>
+                                        <p:tgtEl>
+                                          <p:spTgt spid="3">
+                                            <p:txEl>
+                                              <p:pRg st="3" end="3"/>
+                                            </p:txEl>
+                                          </p:spTgt>
+                                        </p:tgtEl>
+                                        <p:attrNameLst>
+                                          <p:attrName>style.visibility</p:attrName>
+                                        </p:attrNameLst>
+                                      </p:cBhvr>
+                                      <p:to>
+                                        <p:strVal val="visible"/>
+                                      </p:to>
+                                    </p:set>
+                                  </p:childTnLst>
+                                </p:cTn>
+                              </p:par>
+                            </p:childTnLst>
+                          </p:cTn>
+                        </p:par>
+                      </p:childTnLst>
+                    </p:cTn>
+                  </p:par>
+                  <p:par>
+                    <p:cTn id="13" fill="hold">
+                      <p:stCondLst>
+                        <p:cond delay="indefinite"/>
+                      </p:stCondLst>
+                      <p:childTnLst>
+                        <p:par>
+                          <p:cTn id="14" fill="hold">
+                            <p:stCondLst>
+                              <p:cond delay="0"/>
+                            </p:stCondLst>
+                            <p:childTnLst>
+                              <p:par>
+                                <p:cTn id="15" presetID="1" presetClass="entr" presetSubtype="0" fill="hold" grpId="0" nodeType="clickEffect">
+                                  <p:stCondLst>
+                                    <p:cond delay="0"/>
+                                  </p:stCondLst>
+                                  <p:childTnLst>
+                                    <p:set>
+                                      <p:cBhvr>
+                                        <p:cTn id="16" dur="1" fill="hold">
+                                          <p:stCondLst>
+                                            <p:cond delay="0"/>
+                                          </p:stCondLst>
+                                        </p:cTn>
+                                        <p:tgtEl>
+                                          <p:spTgt spid="3">
+                                            <p:txEl>
+                                              <p:pRg st="4" end="4"/>
+                                            </p:txEl>
+                                          </p:spTgt>
+                                        </p:tgtEl>
+                                        <p:attrNameLst>
+                                          <p:attrName>style.visibility</p:attrName>
+                                        </p:attrNameLst>
+                                      </p:cBhvr>
+                                      <p:to>
+                                        <p:strVal val="visible"/>
+                                      </p:to>
+                                    </p:set>
+                                  </p:childTnLst>
+                                </p:cTn>
+                              </p:par>
+                              <p:par>
+                                <p:cTn id="17" presetID="1" presetClass="entr" presetSubtype="0" fill="hold" grpId="0" nodeType="withEffect">
+                                  <p:stCondLst>
+                                    <p:cond delay="0"/>
+                                  </p:stCondLst>
+                                  <p:childTnLst>
+                                    <p:set>
+                                      <p:cBhvr>
+                                        <p:cTn id="18" dur="1" fill="hold">
+                                          <p:stCondLst>
+                                            <p:cond delay="0"/>
+                                          </p:stCondLst>
+                                        </p:cTn>
+                                        <p:tgtEl>
+                                          <p:spTgt spid="3">
+                                            <p:txEl>
+                                              <p:pRg st="5" end="5"/>
+                                            </p:txEl>
+                                          </p:spTgt>
+                                        </p:tgtEl>
+                                        <p:attrNameLst>
+                                          <p:attrName>style.visibility</p:attrName>
+                                        </p:attrNameLst>
+                                      </p:cBhvr>
+                                      <p:to>
+                                        <p:strVal val="visible"/>
+                                      </p:to>
+                                    </p:set>
+                                  </p:childTnLst>
+                                </p:cTn>
+                              </p:par>
+                              <p:par>
+                                <p:cTn id="19" presetID="1" presetClass="entr" presetSubtype="0" fill="hold" grpId="0" nodeType="withEffect">
+                                  <p:stCondLst>
+                                    <p:cond delay="0"/>
+                                  </p:stCondLst>
+                                  <p:childTnLst>
+                                    <p:set>
+                                      <p:cBhvr>
+                                        <p:cTn id="20" dur="1" fill="hold">
+                                          <p:stCondLst>
+                                            <p:cond delay="0"/>
+                                          </p:stCondLst>
+                                        </p:cTn>
+                                        <p:tgtEl>
+                                          <p:spTgt spid="3">
+                                            <p:txEl>
+                                              <p:pRg st="6" end="6"/>
+                                            </p:txEl>
+                                          </p:spTgt>
+                                        </p:tgtEl>
+                                        <p:attrNameLst>
+                                          <p:attrName>style.visibility</p:attrName>
+                                        </p:attrNameLst>
+                                      </p:cBhvr>
+                                      <p:to>
+                                        <p:strVal val="visible"/>
+                                      </p:to>
+                                    </p:set>
+                                  </p:childTnLst>
+                                </p:cTn>
+                              </p:par>
+                            </p:childTnLst>
+                          </p:cTn>
+                        </p:par>
+                      </p:childTnLst>
+                    </p:cTn>
+                  </p:par>
+                  <p:par>
+                    <p:cTn id="21" fill="hold">
+                      <p:stCondLst>
+                        <p:cond delay="indefinite"/>
+                      </p:stCondLst>
+                      <p:childTnLst>
+                        <p:par>
+                          <p:cTn id="22" fill="hold">
+                            <p:stCondLst>
+                              <p:cond delay="0"/>
+                            </p:stCondLst>
+                            <p:childTnLst>
+                              <p:par>
+                                <p:cTn id="23" presetID="1" presetClass="entr" presetSubtype="0" fill="hold" grpId="0" nodeType="clickEffect">
+                                  <p:stCondLst>
+                                    <p:cond delay="0"/>
+                                  </p:stCondLst>
+                                  <p:childTnLst>
+                                    <p:set>
+                                      <p:cBhvr>
+                                        <p:cTn id="24" dur="1" fill="hold">
+                                          <p:stCondLst>
+                                            <p:cond delay="0"/>
+                                          </p:stCondLst>
+                                        </p:cTn>
+                                        <p:tgtEl>
+                                          <p:spTgt spid="5"/>
+                                        </p:tgtEl>
+                                        <p:attrNameLst>
+                                          <p:attrName>style.visibility</p:attrName>
+                                        </p:attrNameLst>
+                                      </p:cBhvr>
+                                      <p:to>
+                                        <p:strVal val="visible"/>
+                                      </p:to>
+                                    </p:set>
+                                  </p:childTnLst>
+                                </p:cTn>
+                              </p:par>
+                            </p:childTnLst>
+                          </p:cTn>
+                        </p:par>
+                      </p:childTnLst>
+                    </p:cTn>
+                  </p:par>
+                </p:childTnLst>
+              </p:cTn>
+              <p:prevCondLst>
+                <p:cond evt="onPrev" delay="0">
+                  <p:tgtEl>
+                    <p:sldTgt/>
+                  </p:tgtEl>
+                </p:cond>
+              </p:prevCondLst>
+              <p:nextCondLst>
+                <p:cond evt="onNext" delay="0">
+                  <p:tgtEl>
+                    <p:sldTgt/>
+                  </p:tgtEl>
+                </p:cond>
+              </p:nextCondLst>
+            </p:seq>
+          </p:childTnLst>
+        </p:cTn>
+      </p:par>
+    </p:tnLst>
+    <p:bldLst>
+      <p:bldP spid="3" grpId="0" uiExpand="1" build="p"/>
+      <p:bldP spid="5" grpId="0" animBg="1"/>
+    </p:bldLst>
+  </p:timing>
+</p:sld>
+</file>
+
+<file path=ppt/slides/slide21.xml><?xml version="1.0" encoding="utf-8"?>
+<p:sld xmlns:a="http://schemas.openxmlformats.org/drawingml/2006/main" xmlns:r="http://schemas.openxmlformats.org/officeDocument/2006/relationships" xmlns:p="http://schemas.openxmlformats.org/presentationml/2006/main">
+  <p:cSld>
+    <p:spTree>
+      <p:nvGrpSpPr>
+        <p:cNvPr id="1" name=""/>
+        <p:cNvGrpSpPr/>
+        <p:nvPr/>
+      </p:nvGrpSpPr>
+      <p:grpSpPr>
+        <a:xfrm>
+          <a:off x="0" y="0"/>
+          <a:ext cx="0" cy="0"/>
+          <a:chOff x="0" y="0"/>
+          <a:chExt cx="0" cy="0"/>
+        </a:xfrm>
+      </p:grpSpPr>
+      <p:sp>
+        <p:nvSpPr>
           <p:cNvPr id="2" name="Title 1"/>
           <p:cNvSpPr>
             <a:spLocks noGrp="1"/>
@@ -10004,7 +10545,7 @@
           <a:p>
             <a:fld id="{AEFF399F-E3B5-4890-BC79-9BC8D4DF3F2D}" type="slidenum">
               <a:rPr lang="nl-BE" smtClean="0"/>
-              <a:t>20</a:t>
+              <a:t>21</a:t>
             </a:fld>
             <a:endParaRPr lang="nl-BE"/>
           </a:p>
@@ -10425,7 +10966,7 @@
 </p:sld>
 </file>
 
-<file path=ppt/slides/slide21.xml><?xml version="1.0" encoding="utf-8"?>
+<file path=ppt/slides/slide22.xml><?xml version="1.0" encoding="utf-8"?>
 <p:sld xmlns:a="http://schemas.openxmlformats.org/drawingml/2006/main" xmlns:r="http://schemas.openxmlformats.org/officeDocument/2006/relationships" xmlns:p="http://schemas.openxmlformats.org/presentationml/2006/main">
   <p:cSld>
     <p:spTree>
@@ -10570,7 +11111,7 @@
           <a:p>
             <a:fld id="{AEFF399F-E3B5-4890-BC79-9BC8D4DF3F2D}" type="slidenum">
               <a:rPr lang="nl-BE" smtClean="0"/>
-              <a:t>21</a:t>
+              <a:t>22</a:t>
             </a:fld>
             <a:endParaRPr lang="nl-BE"/>
           </a:p>
@@ -11079,7 +11620,7 @@
 </p:sld>
 </file>
 
-<file path=ppt/slides/slide22.xml><?xml version="1.0" encoding="utf-8"?>
+<file path=ppt/slides/slide23.xml><?xml version="1.0" encoding="utf-8"?>
 <p:sld xmlns:a="http://schemas.openxmlformats.org/drawingml/2006/main" xmlns:r="http://schemas.openxmlformats.org/officeDocument/2006/relationships" xmlns:p="http://schemas.openxmlformats.org/presentationml/2006/main">
   <p:cSld>
     <p:spTree>
@@ -11135,7 +11676,7 @@
           <a:p>
             <a:fld id="{AEFF399F-E3B5-4890-BC79-9BC8D4DF3F2D}" type="slidenum">
               <a:rPr lang="nl-BE" smtClean="0"/>
-              <a:t>22</a:t>
+              <a:t>23</a:t>
             </a:fld>
             <a:endParaRPr lang="nl-BE"/>
           </a:p>
@@ -11178,7 +11719,7 @@
 </p:sld>
 </file>
 
-<file path=ppt/slides/slide23.xml><?xml version="1.0" encoding="utf-8"?>
+<file path=ppt/slides/slide24.xml><?xml version="1.0" encoding="utf-8"?>
 <p:sld xmlns:a="http://schemas.openxmlformats.org/drawingml/2006/main" xmlns:r="http://schemas.openxmlformats.org/officeDocument/2006/relationships" xmlns:p="http://schemas.openxmlformats.org/presentationml/2006/main">
   <p:cSld>
     <p:spTree>
@@ -11336,7 +11877,7 @@
           <a:p>
             <a:fld id="{AEFF399F-E3B5-4890-BC79-9BC8D4DF3F2D}" type="slidenum">
               <a:rPr lang="nl-BE" smtClean="0"/>
-              <a:t>23</a:t>
+              <a:t>24</a:t>
             </a:fld>
             <a:endParaRPr lang="nl-BE"/>
           </a:p>
@@ -11767,7 +12308,7 @@
 </p:sld>
 </file>
 
-<file path=ppt/slides/slide24.xml><?xml version="1.0" encoding="utf-8"?>
+<file path=ppt/slides/slide25.xml><?xml version="1.0" encoding="utf-8"?>
 <p:sld xmlns:a="http://schemas.openxmlformats.org/drawingml/2006/main" xmlns:r="http://schemas.openxmlformats.org/officeDocument/2006/relationships" xmlns:p="http://schemas.openxmlformats.org/presentationml/2006/main">
   <p:cSld>
     <p:spTree>
@@ -11840,7 +12381,7 @@
           <a:p>
             <a:fld id="{AEFF399F-E3B5-4890-BC79-9BC8D4DF3F2D}" type="slidenum">
               <a:rPr lang="nl-BE" smtClean="0"/>
-              <a:t>24</a:t>
+              <a:t>25</a:t>
             </a:fld>
             <a:endParaRPr lang="nl-BE"/>
           </a:p>
@@ -13066,7 +13607,7 @@
 </p:sld>
 </file>
 
-<file path=ppt/slides/slide25.xml><?xml version="1.0" encoding="utf-8"?>
+<file path=ppt/slides/slide26.xml><?xml version="1.0" encoding="utf-8"?>
 <p:sld xmlns:a="http://schemas.openxmlformats.org/drawingml/2006/main" xmlns:r="http://schemas.openxmlformats.org/officeDocument/2006/relationships" xmlns:p="http://schemas.openxmlformats.org/presentationml/2006/main">
   <p:cSld>
     <p:spTree>
@@ -13187,7 +13728,7 @@
           <a:p>
             <a:fld id="{AEFF399F-E3B5-4890-BC79-9BC8D4DF3F2D}" type="slidenum">
               <a:rPr lang="nl-BE" smtClean="0"/>
-              <a:t>25</a:t>
+              <a:t>26</a:t>
             </a:fld>
             <a:endParaRPr lang="nl-BE"/>
           </a:p>
@@ -13594,101 +14135,6 @@
 </p:sld>
 </file>
 
-<file path=ppt/slides/slide26.xml><?xml version="1.0" encoding="utf-8"?>
-<p:sld xmlns:a="http://schemas.openxmlformats.org/drawingml/2006/main" xmlns:r="http://schemas.openxmlformats.org/officeDocument/2006/relationships" xmlns:p="http://schemas.openxmlformats.org/presentationml/2006/main">
-  <p:cSld>
-    <p:spTree>
-      <p:nvGrpSpPr>
-        <p:cNvPr id="1" name=""/>
-        <p:cNvGrpSpPr/>
-        <p:nvPr/>
-      </p:nvGrpSpPr>
-      <p:grpSpPr>
-        <a:xfrm>
-          <a:off x="0" y="0"/>
-          <a:ext cx="0" cy="0"/>
-          <a:chOff x="0" y="0"/>
-          <a:chExt cx="0" cy="0"/>
-        </a:xfrm>
-      </p:grpSpPr>
-      <p:sp>
-        <p:nvSpPr>
-          <p:cNvPr id="2" name="Title 1"/>
-          <p:cNvSpPr>
-            <a:spLocks noGrp="1"/>
-          </p:cNvSpPr>
-          <p:nvPr>
-            <p:ph type="title"/>
-          </p:nvPr>
-        </p:nvSpPr>
-        <p:spPr/>
-        <p:txBody>
-          <a:bodyPr/>
-          <a:lstStyle/>
-          <a:p>
-            <a:r>
-              <a:rPr lang="en-US" dirty="0"/>
-              <a:t>Using images</a:t>
-            </a:r>
-            <a:endParaRPr lang="nl-BE" dirty="0"/>
-          </a:p>
-        </p:txBody>
-      </p:sp>
-      <p:sp>
-        <p:nvSpPr>
-          <p:cNvPr id="3" name="Text Placeholder 2"/>
-          <p:cNvSpPr>
-            <a:spLocks noGrp="1"/>
-          </p:cNvSpPr>
-          <p:nvPr>
-            <p:ph type="body" idx="1"/>
-          </p:nvPr>
-        </p:nvSpPr>
-        <p:spPr/>
-        <p:txBody>
-          <a:bodyPr/>
-          <a:lstStyle/>
-          <a:p>
-            <a:endParaRPr lang="nl-BE"/>
-          </a:p>
-        </p:txBody>
-      </p:sp>
-      <p:sp>
-        <p:nvSpPr>
-          <p:cNvPr id="4" name="Slide Number Placeholder 3"/>
-          <p:cNvSpPr>
-            <a:spLocks noGrp="1"/>
-          </p:cNvSpPr>
-          <p:nvPr>
-            <p:ph type="sldNum" sz="quarter" idx="12"/>
-          </p:nvPr>
-        </p:nvSpPr>
-        <p:spPr/>
-        <p:txBody>
-          <a:bodyPr/>
-          <a:lstStyle/>
-          <a:p>
-            <a:fld id="{AEFF399F-E3B5-4890-BC79-9BC8D4DF3F2D}" type="slidenum">
-              <a:rPr lang="nl-BE" smtClean="0"/>
-              <a:t>26</a:t>
-            </a:fld>
-            <a:endParaRPr lang="nl-BE"/>
-          </a:p>
-        </p:txBody>
-      </p:sp>
-    </p:spTree>
-    <p:extLst>
-      <p:ext uri="{BB962C8B-B14F-4D97-AF65-F5344CB8AC3E}">
-        <p14:creationId xmlns:p14="http://schemas.microsoft.com/office/powerpoint/2010/main" val="276782416"/>
-      </p:ext>
-    </p:extLst>
-  </p:cSld>
-  <p:clrMapOvr>
-    <a:masterClrMapping/>
-  </p:clrMapOvr>
-</p:sld>
-</file>
-
 <file path=ppt/slides/slide27.xml><?xml version="1.0" encoding="utf-8"?>
 <p:sld xmlns:a="http://schemas.openxmlformats.org/drawingml/2006/main" xmlns:r="http://schemas.openxmlformats.org/officeDocument/2006/relationships" xmlns:p="http://schemas.openxmlformats.org/presentationml/2006/main">
   <p:cSld>
@@ -13723,6 +14169,101 @@
           <a:p>
             <a:r>
               <a:rPr lang="en-US" dirty="0"/>
+              <a:t>Using images</a:t>
+            </a:r>
+            <a:endParaRPr lang="nl-BE" dirty="0"/>
+          </a:p>
+        </p:txBody>
+      </p:sp>
+      <p:sp>
+        <p:nvSpPr>
+          <p:cNvPr id="3" name="Text Placeholder 2"/>
+          <p:cNvSpPr>
+            <a:spLocks noGrp="1"/>
+          </p:cNvSpPr>
+          <p:nvPr>
+            <p:ph type="body" idx="1"/>
+          </p:nvPr>
+        </p:nvSpPr>
+        <p:spPr/>
+        <p:txBody>
+          <a:bodyPr/>
+          <a:lstStyle/>
+          <a:p>
+            <a:endParaRPr lang="nl-BE"/>
+          </a:p>
+        </p:txBody>
+      </p:sp>
+      <p:sp>
+        <p:nvSpPr>
+          <p:cNvPr id="4" name="Slide Number Placeholder 3"/>
+          <p:cNvSpPr>
+            <a:spLocks noGrp="1"/>
+          </p:cNvSpPr>
+          <p:nvPr>
+            <p:ph type="sldNum" sz="quarter" idx="12"/>
+          </p:nvPr>
+        </p:nvSpPr>
+        <p:spPr/>
+        <p:txBody>
+          <a:bodyPr/>
+          <a:lstStyle/>
+          <a:p>
+            <a:fld id="{AEFF399F-E3B5-4890-BC79-9BC8D4DF3F2D}" type="slidenum">
+              <a:rPr lang="nl-BE" smtClean="0"/>
+              <a:t>27</a:t>
+            </a:fld>
+            <a:endParaRPr lang="nl-BE"/>
+          </a:p>
+        </p:txBody>
+      </p:sp>
+    </p:spTree>
+    <p:extLst>
+      <p:ext uri="{BB962C8B-B14F-4D97-AF65-F5344CB8AC3E}">
+        <p14:creationId xmlns:p14="http://schemas.microsoft.com/office/powerpoint/2010/main" val="276782416"/>
+      </p:ext>
+    </p:extLst>
+  </p:cSld>
+  <p:clrMapOvr>
+    <a:masterClrMapping/>
+  </p:clrMapOvr>
+</p:sld>
+</file>
+
+<file path=ppt/slides/slide28.xml><?xml version="1.0" encoding="utf-8"?>
+<p:sld xmlns:a="http://schemas.openxmlformats.org/drawingml/2006/main" xmlns:r="http://schemas.openxmlformats.org/officeDocument/2006/relationships" xmlns:p="http://schemas.openxmlformats.org/presentationml/2006/main">
+  <p:cSld>
+    <p:spTree>
+      <p:nvGrpSpPr>
+        <p:cNvPr id="1" name=""/>
+        <p:cNvGrpSpPr/>
+        <p:nvPr/>
+      </p:nvGrpSpPr>
+      <p:grpSpPr>
+        <a:xfrm>
+          <a:off x="0" y="0"/>
+          <a:ext cx="0" cy="0"/>
+          <a:chOff x="0" y="0"/>
+          <a:chExt cx="0" cy="0"/>
+        </a:xfrm>
+      </p:grpSpPr>
+      <p:sp>
+        <p:nvSpPr>
+          <p:cNvPr id="2" name="Title 1"/>
+          <p:cNvSpPr>
+            <a:spLocks noGrp="1"/>
+          </p:cNvSpPr>
+          <p:nvPr>
+            <p:ph type="title"/>
+          </p:nvPr>
+        </p:nvSpPr>
+        <p:spPr/>
+        <p:txBody>
+          <a:bodyPr/>
+          <a:lstStyle/>
+          <a:p>
+            <a:r>
+              <a:rPr lang="en-US" dirty="0"/>
               <a:t>Run container/execute commands</a:t>
             </a:r>
             <a:endParaRPr lang="nl-BE" dirty="0"/>
@@ -14084,7 +14625,7 @@
           <a:p>
             <a:fld id="{AEFF399F-E3B5-4890-BC79-9BC8D4DF3F2D}" type="slidenum">
               <a:rPr lang="nl-BE" smtClean="0"/>
-              <a:t>27</a:t>
+              <a:t>28</a:t>
             </a:fld>
             <a:endParaRPr lang="nl-BE"/>
           </a:p>
@@ -14481,7 +15022,7 @@
 </p:sld>
 </file>
 
-<file path=ppt/slides/slide28.xml><?xml version="1.0" encoding="utf-8"?>
+<file path=ppt/slides/slide29.xml><?xml version="1.0" encoding="utf-8"?>
 <p:sld xmlns:a="http://schemas.openxmlformats.org/drawingml/2006/main" xmlns:r="http://schemas.openxmlformats.org/officeDocument/2006/relationships" xmlns:p="http://schemas.openxmlformats.org/presentationml/2006/main">
   <p:cSld>
     <p:spTree>
@@ -14582,7 +15123,7 @@
           <a:p>
             <a:fld id="{AEFF399F-E3B5-4890-BC79-9BC8D4DF3F2D}" type="slidenum">
               <a:rPr lang="nl-BE" smtClean="0"/>
-              <a:t>28</a:t>
+              <a:t>29</a:t>
             </a:fld>
             <a:endParaRPr lang="nl-BE"/>
           </a:p>
@@ -14901,7 +15442,102 @@
 </p:sld>
 </file>
 
-<file path=ppt/slides/slide29.xml><?xml version="1.0" encoding="utf-8"?>
+<file path=ppt/slides/slide3.xml><?xml version="1.0" encoding="utf-8"?>
+<p:sld xmlns:a="http://schemas.openxmlformats.org/drawingml/2006/main" xmlns:r="http://schemas.openxmlformats.org/officeDocument/2006/relationships" xmlns:p="http://schemas.openxmlformats.org/presentationml/2006/main">
+  <p:cSld>
+    <p:spTree>
+      <p:nvGrpSpPr>
+        <p:cNvPr id="1" name=""/>
+        <p:cNvGrpSpPr/>
+        <p:nvPr/>
+      </p:nvGrpSpPr>
+      <p:grpSpPr>
+        <a:xfrm>
+          <a:off x="0" y="0"/>
+          <a:ext cx="0" cy="0"/>
+          <a:chOff x="0" y="0"/>
+          <a:chExt cx="0" cy="0"/>
+        </a:xfrm>
+      </p:grpSpPr>
+      <p:sp>
+        <p:nvSpPr>
+          <p:cNvPr id="2" name="Slide Number Placeholder 1">
+            <a:extLst>
+              <a:ext uri="{FF2B5EF4-FFF2-40B4-BE49-F238E27FC236}">
+                <a16:creationId xmlns:a16="http://schemas.microsoft.com/office/drawing/2014/main" id="{B4DA63DE-79C3-1664-D137-3450C51B6223}"/>
+              </a:ext>
+            </a:extLst>
+          </p:cNvPr>
+          <p:cNvSpPr>
+            <a:spLocks noGrp="1"/>
+          </p:cNvSpPr>
+          <p:nvPr>
+            <p:ph type="sldNum" sz="quarter" idx="12"/>
+          </p:nvPr>
+        </p:nvSpPr>
+        <p:spPr/>
+        <p:txBody>
+          <a:bodyPr/>
+          <a:lstStyle/>
+          <a:p>
+            <a:fld id="{AEFF399F-E3B5-4890-BC79-9BC8D4DF3F2D}" type="slidenum">
+              <a:rPr lang="nl-BE" smtClean="0"/>
+              <a:t>3</a:t>
+            </a:fld>
+            <a:endParaRPr lang="nl-BE"/>
+          </a:p>
+        </p:txBody>
+      </p:sp>
+      <p:pic>
+        <p:nvPicPr>
+          <p:cNvPr id="4" name="Picture 3" descr="Qr code&#10;&#10;Description automatically generated">
+            <a:extLst>
+              <a:ext uri="{FF2B5EF4-FFF2-40B4-BE49-F238E27FC236}">
+                <a16:creationId xmlns:a16="http://schemas.microsoft.com/office/drawing/2014/main" id="{045858B9-522D-F8D1-A73A-3C2E724E3B50}"/>
+              </a:ext>
+            </a:extLst>
+          </p:cNvPr>
+          <p:cNvPicPr>
+            <a:picLocks noChangeAspect="1"/>
+          </p:cNvPicPr>
+          <p:nvPr/>
+        </p:nvPicPr>
+        <p:blipFill>
+          <a:blip r:embed="rId2">
+            <a:extLst>
+              <a:ext uri="{28A0092B-C50C-407E-A947-70E740481C1C}">
+                <a14:useLocalDpi xmlns:a14="http://schemas.microsoft.com/office/drawing/2010/main" val="0"/>
+              </a:ext>
+            </a:extLst>
+          </a:blip>
+          <a:stretch>
+            <a:fillRect/>
+          </a:stretch>
+        </p:blipFill>
+        <p:spPr>
+          <a:xfrm>
+            <a:off x="0" y="0"/>
+            <a:ext cx="9144000" cy="6858000"/>
+          </a:xfrm>
+          <a:prstGeom prst="rect">
+            <a:avLst/>
+          </a:prstGeom>
+        </p:spPr>
+      </p:pic>
+    </p:spTree>
+    <p:extLst>
+      <p:ext uri="{BB962C8B-B14F-4D97-AF65-F5344CB8AC3E}">
+        <p14:creationId xmlns:p14="http://schemas.microsoft.com/office/powerpoint/2010/main" val="3579092201"/>
+      </p:ext>
+    </p:extLst>
+  </p:cSld>
+  <p:clrMapOvr>
+    <a:masterClrMapping/>
+  </p:clrMapOvr>
+</p:sld>
+</file>
+
+<file path=ppt/slides/slide30.xml><?xml version="1.0" encoding="utf-8"?>
 <p:sld xmlns:a="http://schemas.openxmlformats.org/drawingml/2006/main" xmlns:r="http://schemas.openxmlformats.org/officeDocument/2006/relationships" xmlns:p="http://schemas.openxmlformats.org/presentationml/2006/main">
   <p:cSld>
     <p:spTree>
@@ -15122,7 +15758,7 @@
           <a:p>
             <a:fld id="{AEFF399F-E3B5-4890-BC79-9BC8D4DF3F2D}" type="slidenum">
               <a:rPr lang="nl-BE" smtClean="0"/>
-              <a:t>29</a:t>
+              <a:t>30</a:t>
             </a:fld>
             <a:endParaRPr lang="nl-BE"/>
           </a:p>
@@ -15383,102 +16019,7 @@
 </p:sld>
 </file>
 
-<file path=ppt/slides/slide3.xml><?xml version="1.0" encoding="utf-8"?>
-<p:sld xmlns:a="http://schemas.openxmlformats.org/drawingml/2006/main" xmlns:r="http://schemas.openxmlformats.org/officeDocument/2006/relationships" xmlns:p="http://schemas.openxmlformats.org/presentationml/2006/main">
-  <p:cSld>
-    <p:spTree>
-      <p:nvGrpSpPr>
-        <p:cNvPr id="1" name=""/>
-        <p:cNvGrpSpPr/>
-        <p:nvPr/>
-      </p:nvGrpSpPr>
-      <p:grpSpPr>
-        <a:xfrm>
-          <a:off x="0" y="0"/>
-          <a:ext cx="0" cy="0"/>
-          <a:chOff x="0" y="0"/>
-          <a:chExt cx="0" cy="0"/>
-        </a:xfrm>
-      </p:grpSpPr>
-      <p:sp>
-        <p:nvSpPr>
-          <p:cNvPr id="2" name="Slide Number Placeholder 1">
-            <a:extLst>
-              <a:ext uri="{FF2B5EF4-FFF2-40B4-BE49-F238E27FC236}">
-                <a16:creationId xmlns:a16="http://schemas.microsoft.com/office/drawing/2014/main" id="{B4DA63DE-79C3-1664-D137-3450C51B6223}"/>
-              </a:ext>
-            </a:extLst>
-          </p:cNvPr>
-          <p:cNvSpPr>
-            <a:spLocks noGrp="1"/>
-          </p:cNvSpPr>
-          <p:nvPr>
-            <p:ph type="sldNum" sz="quarter" idx="12"/>
-          </p:nvPr>
-        </p:nvSpPr>
-        <p:spPr/>
-        <p:txBody>
-          <a:bodyPr/>
-          <a:lstStyle/>
-          <a:p>
-            <a:fld id="{AEFF399F-E3B5-4890-BC79-9BC8D4DF3F2D}" type="slidenum">
-              <a:rPr lang="nl-BE" smtClean="0"/>
-              <a:t>3</a:t>
-            </a:fld>
-            <a:endParaRPr lang="nl-BE"/>
-          </a:p>
-        </p:txBody>
-      </p:sp>
-      <p:pic>
-        <p:nvPicPr>
-          <p:cNvPr id="4" name="Picture 3" descr="Qr code&#10;&#10;Description automatically generated">
-            <a:extLst>
-              <a:ext uri="{FF2B5EF4-FFF2-40B4-BE49-F238E27FC236}">
-                <a16:creationId xmlns:a16="http://schemas.microsoft.com/office/drawing/2014/main" id="{045858B9-522D-F8D1-A73A-3C2E724E3B50}"/>
-              </a:ext>
-            </a:extLst>
-          </p:cNvPr>
-          <p:cNvPicPr>
-            <a:picLocks noChangeAspect="1"/>
-          </p:cNvPicPr>
-          <p:nvPr/>
-        </p:nvPicPr>
-        <p:blipFill>
-          <a:blip r:embed="rId2">
-            <a:extLst>
-              <a:ext uri="{28A0092B-C50C-407E-A947-70E740481C1C}">
-                <a14:useLocalDpi xmlns:a14="http://schemas.microsoft.com/office/drawing/2010/main" val="0"/>
-              </a:ext>
-            </a:extLst>
-          </a:blip>
-          <a:stretch>
-            <a:fillRect/>
-          </a:stretch>
-        </p:blipFill>
-        <p:spPr>
-          <a:xfrm>
-            <a:off x="0" y="0"/>
-            <a:ext cx="9144000" cy="6858000"/>
-          </a:xfrm>
-          <a:prstGeom prst="rect">
-            <a:avLst/>
-          </a:prstGeom>
-        </p:spPr>
-      </p:pic>
-    </p:spTree>
-    <p:extLst>
-      <p:ext uri="{BB962C8B-B14F-4D97-AF65-F5344CB8AC3E}">
-        <p14:creationId xmlns:p14="http://schemas.microsoft.com/office/powerpoint/2010/main" val="3579092201"/>
-      </p:ext>
-    </p:extLst>
-  </p:cSld>
-  <p:clrMapOvr>
-    <a:masterClrMapping/>
-  </p:clrMapOvr>
-</p:sld>
-</file>
-
-<file path=ppt/slides/slide30.xml><?xml version="1.0" encoding="utf-8"?>
+<file path=ppt/slides/slide31.xml><?xml version="1.0" encoding="utf-8"?>
 <p:sld xmlns:a="http://schemas.openxmlformats.org/drawingml/2006/main" xmlns:r="http://schemas.openxmlformats.org/officeDocument/2006/relationships" xmlns:p="http://schemas.openxmlformats.org/presentationml/2006/main">
   <p:cSld>
     <p:spTree>
@@ -15679,7 +16220,7 @@
           <a:p>
             <a:fld id="{AEFF399F-E3B5-4890-BC79-9BC8D4DF3F2D}" type="slidenum">
               <a:rPr lang="nl-BE" smtClean="0"/>
-              <a:t>30</a:t>
+              <a:t>31</a:t>
             </a:fld>
             <a:endParaRPr lang="nl-BE"/>
           </a:p>
@@ -16067,101 +16608,6 @@
 </p:sld>
 </file>
 
-<file path=ppt/slides/slide31.xml><?xml version="1.0" encoding="utf-8"?>
-<p:sld xmlns:a="http://schemas.openxmlformats.org/drawingml/2006/main" xmlns:r="http://schemas.openxmlformats.org/officeDocument/2006/relationships" xmlns:p="http://schemas.openxmlformats.org/presentationml/2006/main">
-  <p:cSld>
-    <p:spTree>
-      <p:nvGrpSpPr>
-        <p:cNvPr id="1" name=""/>
-        <p:cNvGrpSpPr/>
-        <p:nvPr/>
-      </p:nvGrpSpPr>
-      <p:grpSpPr>
-        <a:xfrm>
-          <a:off x="0" y="0"/>
-          <a:ext cx="0" cy="0"/>
-          <a:chOff x="0" y="0"/>
-          <a:chExt cx="0" cy="0"/>
-        </a:xfrm>
-      </p:grpSpPr>
-      <p:sp>
-        <p:nvSpPr>
-          <p:cNvPr id="2" name="Title 1"/>
-          <p:cNvSpPr>
-            <a:spLocks noGrp="1"/>
-          </p:cNvSpPr>
-          <p:nvPr>
-            <p:ph type="title"/>
-          </p:nvPr>
-        </p:nvSpPr>
-        <p:spPr/>
-        <p:txBody>
-          <a:bodyPr/>
-          <a:lstStyle/>
-          <a:p>
-            <a:r>
-              <a:rPr lang="en-US" dirty="0"/>
-              <a:t>Multithreaded applications</a:t>
-            </a:r>
-            <a:endParaRPr lang="nl-BE" dirty="0"/>
-          </a:p>
-        </p:txBody>
-      </p:sp>
-      <p:sp>
-        <p:nvSpPr>
-          <p:cNvPr id="3" name="Text Placeholder 2"/>
-          <p:cNvSpPr>
-            <a:spLocks noGrp="1"/>
-          </p:cNvSpPr>
-          <p:nvPr>
-            <p:ph type="body" idx="1"/>
-          </p:nvPr>
-        </p:nvSpPr>
-        <p:spPr/>
-        <p:txBody>
-          <a:bodyPr/>
-          <a:lstStyle/>
-          <a:p>
-            <a:endParaRPr lang="nl-BE"/>
-          </a:p>
-        </p:txBody>
-      </p:sp>
-      <p:sp>
-        <p:nvSpPr>
-          <p:cNvPr id="4" name="Slide Number Placeholder 3"/>
-          <p:cNvSpPr>
-            <a:spLocks noGrp="1"/>
-          </p:cNvSpPr>
-          <p:nvPr>
-            <p:ph type="sldNum" sz="quarter" idx="12"/>
-          </p:nvPr>
-        </p:nvSpPr>
-        <p:spPr/>
-        <p:txBody>
-          <a:bodyPr/>
-          <a:lstStyle/>
-          <a:p>
-            <a:fld id="{AEFF399F-E3B5-4890-BC79-9BC8D4DF3F2D}" type="slidenum">
-              <a:rPr lang="nl-BE" smtClean="0"/>
-              <a:t>31</a:t>
-            </a:fld>
-            <a:endParaRPr lang="nl-BE"/>
-          </a:p>
-        </p:txBody>
-      </p:sp>
-    </p:spTree>
-    <p:extLst>
-      <p:ext uri="{BB962C8B-B14F-4D97-AF65-F5344CB8AC3E}">
-        <p14:creationId xmlns:p14="http://schemas.microsoft.com/office/powerpoint/2010/main" val="2233734622"/>
-      </p:ext>
-    </p:extLst>
-  </p:cSld>
-  <p:clrMapOvr>
-    <a:masterClrMapping/>
-  </p:clrMapOvr>
-</p:sld>
-</file>
-
 <file path=ppt/slides/slide32.xml><?xml version="1.0" encoding="utf-8"?>
 <p:sld xmlns:a="http://schemas.openxmlformats.org/drawingml/2006/main" xmlns:r="http://schemas.openxmlformats.org/officeDocument/2006/relationships" xmlns:p="http://schemas.openxmlformats.org/presentationml/2006/main">
   <p:cSld>
@@ -16196,9 +16642,28 @@
           <a:p>
             <a:r>
               <a:rPr lang="en-US" dirty="0"/>
-              <a:t>Example recipe file</a:t>
+              <a:t>Multithreaded applications</a:t>
             </a:r>
             <a:endParaRPr lang="nl-BE" dirty="0"/>
+          </a:p>
+        </p:txBody>
+      </p:sp>
+      <p:sp>
+        <p:nvSpPr>
+          <p:cNvPr id="3" name="Text Placeholder 2"/>
+          <p:cNvSpPr>
+            <a:spLocks noGrp="1"/>
+          </p:cNvSpPr>
+          <p:nvPr>
+            <p:ph type="body" idx="1"/>
+          </p:nvPr>
+        </p:nvSpPr>
+        <p:spPr/>
+        <p:txBody>
+          <a:bodyPr/>
+          <a:lstStyle/>
+          <a:p>
+            <a:endParaRPr lang="nl-BE"/>
           </a:p>
         </p:txBody>
       </p:sp>
@@ -16220,6 +16685,82 @@
             <a:fld id="{AEFF399F-E3B5-4890-BC79-9BC8D4DF3F2D}" type="slidenum">
               <a:rPr lang="nl-BE" smtClean="0"/>
               <a:t>32</a:t>
+            </a:fld>
+            <a:endParaRPr lang="nl-BE"/>
+          </a:p>
+        </p:txBody>
+      </p:sp>
+    </p:spTree>
+    <p:extLst>
+      <p:ext uri="{BB962C8B-B14F-4D97-AF65-F5344CB8AC3E}">
+        <p14:creationId xmlns:p14="http://schemas.microsoft.com/office/powerpoint/2010/main" val="2233734622"/>
+      </p:ext>
+    </p:extLst>
+  </p:cSld>
+  <p:clrMapOvr>
+    <a:masterClrMapping/>
+  </p:clrMapOvr>
+</p:sld>
+</file>
+
+<file path=ppt/slides/slide33.xml><?xml version="1.0" encoding="utf-8"?>
+<p:sld xmlns:a="http://schemas.openxmlformats.org/drawingml/2006/main" xmlns:r="http://schemas.openxmlformats.org/officeDocument/2006/relationships" xmlns:p="http://schemas.openxmlformats.org/presentationml/2006/main">
+  <p:cSld>
+    <p:spTree>
+      <p:nvGrpSpPr>
+        <p:cNvPr id="1" name=""/>
+        <p:cNvGrpSpPr/>
+        <p:nvPr/>
+      </p:nvGrpSpPr>
+      <p:grpSpPr>
+        <a:xfrm>
+          <a:off x="0" y="0"/>
+          <a:ext cx="0" cy="0"/>
+          <a:chOff x="0" y="0"/>
+          <a:chExt cx="0" cy="0"/>
+        </a:xfrm>
+      </p:grpSpPr>
+      <p:sp>
+        <p:nvSpPr>
+          <p:cNvPr id="2" name="Title 1"/>
+          <p:cNvSpPr>
+            <a:spLocks noGrp="1"/>
+          </p:cNvSpPr>
+          <p:nvPr>
+            <p:ph type="title"/>
+          </p:nvPr>
+        </p:nvSpPr>
+        <p:spPr/>
+        <p:txBody>
+          <a:bodyPr/>
+          <a:lstStyle/>
+          <a:p>
+            <a:r>
+              <a:rPr lang="en-US" dirty="0"/>
+              <a:t>Example recipe file</a:t>
+            </a:r>
+            <a:endParaRPr lang="nl-BE" dirty="0"/>
+          </a:p>
+        </p:txBody>
+      </p:sp>
+      <p:sp>
+        <p:nvSpPr>
+          <p:cNvPr id="4" name="Slide Number Placeholder 3"/>
+          <p:cNvSpPr>
+            <a:spLocks noGrp="1"/>
+          </p:cNvSpPr>
+          <p:nvPr>
+            <p:ph type="sldNum" sz="quarter" idx="12"/>
+          </p:nvPr>
+        </p:nvSpPr>
+        <p:spPr/>
+        <p:txBody>
+          <a:bodyPr/>
+          <a:lstStyle/>
+          <a:p>
+            <a:fld id="{AEFF399F-E3B5-4890-BC79-9BC8D4DF3F2D}" type="slidenum">
+              <a:rPr lang="nl-BE" smtClean="0"/>
+              <a:t>33</a:t>
             </a:fld>
             <a:endParaRPr lang="nl-BE"/>
           </a:p>
@@ -17003,7 +17544,7 @@
 </p:sld>
 </file>
 
-<file path=ppt/slides/slide33.xml><?xml version="1.0" encoding="utf-8"?>
+<file path=ppt/slides/slide34.xml><?xml version="1.0" encoding="utf-8"?>
 <p:sld xmlns:a="http://schemas.openxmlformats.org/drawingml/2006/main" xmlns:r="http://schemas.openxmlformats.org/officeDocument/2006/relationships" xmlns:p="http://schemas.openxmlformats.org/presentationml/2006/main">
   <p:cSld>
     <p:spTree>
@@ -17091,7 +17632,7 @@
           <a:p>
             <a:fld id="{AEFF399F-E3B5-4890-BC79-9BC8D4DF3F2D}" type="slidenum">
               <a:rPr lang="nl-BE" smtClean="0"/>
-              <a:t>33</a:t>
+              <a:t>34</a:t>
             </a:fld>
             <a:endParaRPr lang="nl-BE"/>
           </a:p>
@@ -17401,101 +17942,6 @@
 </p:sld>
 </file>
 
-<file path=ppt/slides/slide34.xml><?xml version="1.0" encoding="utf-8"?>
-<p:sld xmlns:a="http://schemas.openxmlformats.org/drawingml/2006/main" xmlns:r="http://schemas.openxmlformats.org/officeDocument/2006/relationships" xmlns:p="http://schemas.openxmlformats.org/presentationml/2006/main">
-  <p:cSld>
-    <p:spTree>
-      <p:nvGrpSpPr>
-        <p:cNvPr id="1" name=""/>
-        <p:cNvGrpSpPr/>
-        <p:nvPr/>
-      </p:nvGrpSpPr>
-      <p:grpSpPr>
-        <a:xfrm>
-          <a:off x="0" y="0"/>
-          <a:ext cx="0" cy="0"/>
-          <a:chOff x="0" y="0"/>
-          <a:chExt cx="0" cy="0"/>
-        </a:xfrm>
-      </p:grpSpPr>
-      <p:sp>
-        <p:nvSpPr>
-          <p:cNvPr id="2" name="Title 1"/>
-          <p:cNvSpPr>
-            <a:spLocks noGrp="1"/>
-          </p:cNvSpPr>
-          <p:nvPr>
-            <p:ph type="title"/>
-          </p:nvPr>
-        </p:nvSpPr>
-        <p:spPr/>
-        <p:txBody>
-          <a:bodyPr/>
-          <a:lstStyle/>
-          <a:p>
-            <a:r>
-              <a:rPr lang="en-US" dirty="0"/>
-              <a:t>Distributed applications</a:t>
-            </a:r>
-            <a:endParaRPr lang="nl-BE" dirty="0"/>
-          </a:p>
-        </p:txBody>
-      </p:sp>
-      <p:sp>
-        <p:nvSpPr>
-          <p:cNvPr id="3" name="Text Placeholder 2"/>
-          <p:cNvSpPr>
-            <a:spLocks noGrp="1"/>
-          </p:cNvSpPr>
-          <p:nvPr>
-            <p:ph type="body" idx="1"/>
-          </p:nvPr>
-        </p:nvSpPr>
-        <p:spPr/>
-        <p:txBody>
-          <a:bodyPr/>
-          <a:lstStyle/>
-          <a:p>
-            <a:endParaRPr lang="nl-BE"/>
-          </a:p>
-        </p:txBody>
-      </p:sp>
-      <p:sp>
-        <p:nvSpPr>
-          <p:cNvPr id="4" name="Slide Number Placeholder 3"/>
-          <p:cNvSpPr>
-            <a:spLocks noGrp="1"/>
-          </p:cNvSpPr>
-          <p:nvPr>
-            <p:ph type="sldNum" sz="quarter" idx="12"/>
-          </p:nvPr>
-        </p:nvSpPr>
-        <p:spPr/>
-        <p:txBody>
-          <a:bodyPr/>
-          <a:lstStyle/>
-          <a:p>
-            <a:fld id="{AEFF399F-E3B5-4890-BC79-9BC8D4DF3F2D}" type="slidenum">
-              <a:rPr lang="nl-BE" smtClean="0"/>
-              <a:t>34</a:t>
-            </a:fld>
-            <a:endParaRPr lang="nl-BE"/>
-          </a:p>
-        </p:txBody>
-      </p:sp>
-    </p:spTree>
-    <p:extLst>
-      <p:ext uri="{BB962C8B-B14F-4D97-AF65-F5344CB8AC3E}">
-        <p14:creationId xmlns:p14="http://schemas.microsoft.com/office/powerpoint/2010/main" val="3672421668"/>
-      </p:ext>
-    </p:extLst>
-  </p:cSld>
-  <p:clrMapOvr>
-    <a:masterClrMapping/>
-  </p:clrMapOvr>
-</p:sld>
-</file>
-
 <file path=ppt/slides/slide35.xml><?xml version="1.0" encoding="utf-8"?>
 <p:sld xmlns:a="http://schemas.openxmlformats.org/drawingml/2006/main" xmlns:r="http://schemas.openxmlformats.org/officeDocument/2006/relationships" xmlns:p="http://schemas.openxmlformats.org/presentationml/2006/main">
   <p:cSld>
@@ -17530,9 +17976,28 @@
           <a:p>
             <a:r>
               <a:rPr lang="en-US" dirty="0"/>
-              <a:t>Example recipe file</a:t>
+              <a:t>Distributed applications</a:t>
             </a:r>
             <a:endParaRPr lang="nl-BE" dirty="0"/>
+          </a:p>
+        </p:txBody>
+      </p:sp>
+      <p:sp>
+        <p:nvSpPr>
+          <p:cNvPr id="3" name="Text Placeholder 2"/>
+          <p:cNvSpPr>
+            <a:spLocks noGrp="1"/>
+          </p:cNvSpPr>
+          <p:nvPr>
+            <p:ph type="body" idx="1"/>
+          </p:nvPr>
+        </p:nvSpPr>
+        <p:spPr/>
+        <p:txBody>
+          <a:bodyPr/>
+          <a:lstStyle/>
+          <a:p>
+            <a:endParaRPr lang="nl-BE"/>
           </a:p>
         </p:txBody>
       </p:sp>
@@ -17554,6 +18019,82 @@
             <a:fld id="{AEFF399F-E3B5-4890-BC79-9BC8D4DF3F2D}" type="slidenum">
               <a:rPr lang="nl-BE" smtClean="0"/>
               <a:t>35</a:t>
+            </a:fld>
+            <a:endParaRPr lang="nl-BE"/>
+          </a:p>
+        </p:txBody>
+      </p:sp>
+    </p:spTree>
+    <p:extLst>
+      <p:ext uri="{BB962C8B-B14F-4D97-AF65-F5344CB8AC3E}">
+        <p14:creationId xmlns:p14="http://schemas.microsoft.com/office/powerpoint/2010/main" val="3672421668"/>
+      </p:ext>
+    </p:extLst>
+  </p:cSld>
+  <p:clrMapOvr>
+    <a:masterClrMapping/>
+  </p:clrMapOvr>
+</p:sld>
+</file>
+
+<file path=ppt/slides/slide36.xml><?xml version="1.0" encoding="utf-8"?>
+<p:sld xmlns:a="http://schemas.openxmlformats.org/drawingml/2006/main" xmlns:r="http://schemas.openxmlformats.org/officeDocument/2006/relationships" xmlns:p="http://schemas.openxmlformats.org/presentationml/2006/main">
+  <p:cSld>
+    <p:spTree>
+      <p:nvGrpSpPr>
+        <p:cNvPr id="1" name=""/>
+        <p:cNvGrpSpPr/>
+        <p:nvPr/>
+      </p:nvGrpSpPr>
+      <p:grpSpPr>
+        <a:xfrm>
+          <a:off x="0" y="0"/>
+          <a:ext cx="0" cy="0"/>
+          <a:chOff x="0" y="0"/>
+          <a:chExt cx="0" cy="0"/>
+        </a:xfrm>
+      </p:grpSpPr>
+      <p:sp>
+        <p:nvSpPr>
+          <p:cNvPr id="2" name="Title 1"/>
+          <p:cNvSpPr>
+            <a:spLocks noGrp="1"/>
+          </p:cNvSpPr>
+          <p:nvPr>
+            <p:ph type="title"/>
+          </p:nvPr>
+        </p:nvSpPr>
+        <p:spPr/>
+        <p:txBody>
+          <a:bodyPr/>
+          <a:lstStyle/>
+          <a:p>
+            <a:r>
+              <a:rPr lang="en-US" dirty="0"/>
+              <a:t>Example recipe file</a:t>
+            </a:r>
+            <a:endParaRPr lang="nl-BE" dirty="0"/>
+          </a:p>
+        </p:txBody>
+      </p:sp>
+      <p:sp>
+        <p:nvSpPr>
+          <p:cNvPr id="4" name="Slide Number Placeholder 3"/>
+          <p:cNvSpPr>
+            <a:spLocks noGrp="1"/>
+          </p:cNvSpPr>
+          <p:nvPr>
+            <p:ph type="sldNum" sz="quarter" idx="12"/>
+          </p:nvPr>
+        </p:nvSpPr>
+        <p:spPr/>
+        <p:txBody>
+          <a:bodyPr/>
+          <a:lstStyle/>
+          <a:p>
+            <a:fld id="{AEFF399F-E3B5-4890-BC79-9BC8D4DF3F2D}" type="slidenum">
+              <a:rPr lang="nl-BE" smtClean="0"/>
+              <a:t>36</a:t>
             </a:fld>
             <a:endParaRPr lang="nl-BE"/>
           </a:p>
@@ -18839,7 +19380,7 @@
 </p:sld>
 </file>
 
-<file path=ppt/slides/slide36.xml><?xml version="1.0" encoding="utf-8"?>
+<file path=ppt/slides/slide37.xml><?xml version="1.0" encoding="utf-8"?>
 <p:sld xmlns:a="http://schemas.openxmlformats.org/drawingml/2006/main" xmlns:r="http://schemas.openxmlformats.org/officeDocument/2006/relationships" xmlns:p="http://schemas.openxmlformats.org/presentationml/2006/main">
   <p:cSld>
     <p:spTree>
@@ -18919,7 +19460,7 @@
           <a:p>
             <a:fld id="{AEFF399F-E3B5-4890-BC79-9BC8D4DF3F2D}" type="slidenum">
               <a:rPr lang="nl-BE" smtClean="0"/>
-              <a:t>36</a:t>
+              <a:t>37</a:t>
             </a:fld>
             <a:endParaRPr lang="nl-BE"/>
           </a:p>
@@ -19249,100 +19790,6 @@
 </p:sld>
 </file>
 
-<file path=ppt/slides/slide37.xml><?xml version="1.0" encoding="utf-8"?>
-<p:sld xmlns:a="http://schemas.openxmlformats.org/drawingml/2006/main" xmlns:r="http://schemas.openxmlformats.org/officeDocument/2006/relationships" xmlns:p="http://schemas.openxmlformats.org/presentationml/2006/main">
-  <p:cSld>
-    <p:spTree>
-      <p:nvGrpSpPr>
-        <p:cNvPr id="1" name=""/>
-        <p:cNvGrpSpPr/>
-        <p:nvPr/>
-      </p:nvGrpSpPr>
-      <p:grpSpPr>
-        <a:xfrm>
-          <a:off x="0" y="0"/>
-          <a:ext cx="0" cy="0"/>
-          <a:chOff x="0" y="0"/>
-          <a:chExt cx="0" cy="0"/>
-        </a:xfrm>
-      </p:grpSpPr>
-      <p:sp>
-        <p:nvSpPr>
-          <p:cNvPr id="2" name="Title 1"/>
-          <p:cNvSpPr>
-            <a:spLocks noGrp="1"/>
-          </p:cNvSpPr>
-          <p:nvPr>
-            <p:ph type="title"/>
-          </p:nvPr>
-        </p:nvSpPr>
-        <p:spPr/>
-        <p:txBody>
-          <a:bodyPr/>
-          <a:lstStyle/>
-          <a:p>
-            <a:r>
-              <a:rPr lang="en-US" dirty="0"/>
-              <a:t>Services</a:t>
-            </a:r>
-          </a:p>
-        </p:txBody>
-      </p:sp>
-      <p:sp>
-        <p:nvSpPr>
-          <p:cNvPr id="3" name="Text Placeholder 2"/>
-          <p:cNvSpPr>
-            <a:spLocks noGrp="1"/>
-          </p:cNvSpPr>
-          <p:nvPr>
-            <p:ph type="body" idx="1"/>
-          </p:nvPr>
-        </p:nvSpPr>
-        <p:spPr/>
-        <p:txBody>
-          <a:bodyPr/>
-          <a:lstStyle/>
-          <a:p>
-            <a:endParaRPr lang="en-US"/>
-          </a:p>
-        </p:txBody>
-      </p:sp>
-      <p:sp>
-        <p:nvSpPr>
-          <p:cNvPr id="4" name="Slide Number Placeholder 3"/>
-          <p:cNvSpPr>
-            <a:spLocks noGrp="1"/>
-          </p:cNvSpPr>
-          <p:nvPr>
-            <p:ph type="sldNum" sz="quarter" idx="12"/>
-          </p:nvPr>
-        </p:nvSpPr>
-        <p:spPr/>
-        <p:txBody>
-          <a:bodyPr/>
-          <a:lstStyle/>
-          <a:p>
-            <a:fld id="{AEFF399F-E3B5-4890-BC79-9BC8D4DF3F2D}" type="slidenum">
-              <a:rPr lang="nl-BE" smtClean="0"/>
-              <a:t>37</a:t>
-            </a:fld>
-            <a:endParaRPr lang="nl-BE"/>
-          </a:p>
-        </p:txBody>
-      </p:sp>
-    </p:spTree>
-    <p:extLst>
-      <p:ext uri="{BB962C8B-B14F-4D97-AF65-F5344CB8AC3E}">
-        <p14:creationId xmlns:p14="http://schemas.microsoft.com/office/powerpoint/2010/main" val="1160171864"/>
-      </p:ext>
-    </p:extLst>
-  </p:cSld>
-  <p:clrMapOvr>
-    <a:masterClrMapping/>
-  </p:clrMapOvr>
-</p:sld>
-</file>
-
 <file path=ppt/slides/slide38.xml><?xml version="1.0" encoding="utf-8"?>
 <p:sld xmlns:a="http://schemas.openxmlformats.org/drawingml/2006/main" xmlns:r="http://schemas.openxmlformats.org/officeDocument/2006/relationships" xmlns:p="http://schemas.openxmlformats.org/presentationml/2006/main">
   <p:cSld>
@@ -19377,6 +19824,100 @@
           <a:p>
             <a:r>
               <a:rPr lang="en-US" dirty="0"/>
+              <a:t>Services</a:t>
+            </a:r>
+          </a:p>
+        </p:txBody>
+      </p:sp>
+      <p:sp>
+        <p:nvSpPr>
+          <p:cNvPr id="3" name="Text Placeholder 2"/>
+          <p:cNvSpPr>
+            <a:spLocks noGrp="1"/>
+          </p:cNvSpPr>
+          <p:nvPr>
+            <p:ph type="body" idx="1"/>
+          </p:nvPr>
+        </p:nvSpPr>
+        <p:spPr/>
+        <p:txBody>
+          <a:bodyPr/>
+          <a:lstStyle/>
+          <a:p>
+            <a:endParaRPr lang="en-US"/>
+          </a:p>
+        </p:txBody>
+      </p:sp>
+      <p:sp>
+        <p:nvSpPr>
+          <p:cNvPr id="4" name="Slide Number Placeholder 3"/>
+          <p:cNvSpPr>
+            <a:spLocks noGrp="1"/>
+          </p:cNvSpPr>
+          <p:nvPr>
+            <p:ph type="sldNum" sz="quarter" idx="12"/>
+          </p:nvPr>
+        </p:nvSpPr>
+        <p:spPr/>
+        <p:txBody>
+          <a:bodyPr/>
+          <a:lstStyle/>
+          <a:p>
+            <a:fld id="{AEFF399F-E3B5-4890-BC79-9BC8D4DF3F2D}" type="slidenum">
+              <a:rPr lang="nl-BE" smtClean="0"/>
+              <a:t>38</a:t>
+            </a:fld>
+            <a:endParaRPr lang="nl-BE"/>
+          </a:p>
+        </p:txBody>
+      </p:sp>
+    </p:spTree>
+    <p:extLst>
+      <p:ext uri="{BB962C8B-B14F-4D97-AF65-F5344CB8AC3E}">
+        <p14:creationId xmlns:p14="http://schemas.microsoft.com/office/powerpoint/2010/main" val="1160171864"/>
+      </p:ext>
+    </p:extLst>
+  </p:cSld>
+  <p:clrMapOvr>
+    <a:masterClrMapping/>
+  </p:clrMapOvr>
+</p:sld>
+</file>
+
+<file path=ppt/slides/slide39.xml><?xml version="1.0" encoding="utf-8"?>
+<p:sld xmlns:a="http://schemas.openxmlformats.org/drawingml/2006/main" xmlns:r="http://schemas.openxmlformats.org/officeDocument/2006/relationships" xmlns:p="http://schemas.openxmlformats.org/presentationml/2006/main">
+  <p:cSld>
+    <p:spTree>
+      <p:nvGrpSpPr>
+        <p:cNvPr id="1" name=""/>
+        <p:cNvGrpSpPr/>
+        <p:nvPr/>
+      </p:nvGrpSpPr>
+      <p:grpSpPr>
+        <a:xfrm>
+          <a:off x="0" y="0"/>
+          <a:ext cx="0" cy="0"/>
+          <a:chOff x="0" y="0"/>
+          <a:chExt cx="0" cy="0"/>
+        </a:xfrm>
+      </p:grpSpPr>
+      <p:sp>
+        <p:nvSpPr>
+          <p:cNvPr id="2" name="Title 1"/>
+          <p:cNvSpPr>
+            <a:spLocks noGrp="1"/>
+          </p:cNvSpPr>
+          <p:nvPr>
+            <p:ph type="title"/>
+          </p:nvPr>
+        </p:nvSpPr>
+        <p:spPr/>
+        <p:txBody>
+          <a:bodyPr/>
+          <a:lstStyle/>
+          <a:p>
+            <a:r>
+              <a:rPr lang="en-US" dirty="0"/>
               <a:t>Server processes</a:t>
             </a:r>
           </a:p>
@@ -19481,7 +20022,7 @@
           <a:p>
             <a:fld id="{AEFF399F-E3B5-4890-BC79-9BC8D4DF3F2D}" type="slidenum">
               <a:rPr lang="nl-BE" smtClean="0"/>
-              <a:t>38</a:t>
+              <a:t>39</a:t>
             </a:fld>
             <a:endParaRPr lang="nl-BE"/>
           </a:p>
@@ -20088,7 +20629,7 @@
 </p:sld>
 </file>
 
-<file path=ppt/slides/slide39.xml><?xml version="1.0" encoding="utf-8"?>
+<file path=ppt/slides/slide4.xml><?xml version="1.0" encoding="utf-8"?>
 <p:sld xmlns:a="http://schemas.openxmlformats.org/drawingml/2006/main" xmlns:r="http://schemas.openxmlformats.org/officeDocument/2006/relationships" xmlns:p="http://schemas.openxmlformats.org/presentationml/2006/main">
   <p:cSld>
     <p:spTree>
@@ -20122,8 +20663,28 @@
           <a:p>
             <a:r>
               <a:rPr lang="en-US" dirty="0"/>
-              <a:t>Define service</a:t>
-            </a:r>
+              <a:t>Introduction</a:t>
+            </a:r>
+            <a:endParaRPr lang="nl-BE" dirty="0"/>
+          </a:p>
+        </p:txBody>
+      </p:sp>
+      <p:sp>
+        <p:nvSpPr>
+          <p:cNvPr id="3" name="Text Placeholder 2"/>
+          <p:cNvSpPr>
+            <a:spLocks noGrp="1"/>
+          </p:cNvSpPr>
+          <p:nvPr>
+            <p:ph type="body" idx="1"/>
+          </p:nvPr>
+        </p:nvSpPr>
+        <p:spPr/>
+        <p:txBody>
+          <a:bodyPr/>
+          <a:lstStyle/>
+          <a:p>
+            <a:endParaRPr lang="nl-BE"/>
           </a:p>
         </p:txBody>
       </p:sp>
@@ -20144,7 +20705,82 @@
           <a:p>
             <a:fld id="{AEFF399F-E3B5-4890-BC79-9BC8D4DF3F2D}" type="slidenum">
               <a:rPr lang="nl-BE" smtClean="0"/>
-              <a:t>39</a:t>
+              <a:t>4</a:t>
+            </a:fld>
+            <a:endParaRPr lang="nl-BE"/>
+          </a:p>
+        </p:txBody>
+      </p:sp>
+    </p:spTree>
+    <p:extLst>
+      <p:ext uri="{BB962C8B-B14F-4D97-AF65-F5344CB8AC3E}">
+        <p14:creationId xmlns:p14="http://schemas.microsoft.com/office/powerpoint/2010/main" val="2215557954"/>
+      </p:ext>
+    </p:extLst>
+  </p:cSld>
+  <p:clrMapOvr>
+    <a:masterClrMapping/>
+  </p:clrMapOvr>
+</p:sld>
+</file>
+
+<file path=ppt/slides/slide40.xml><?xml version="1.0" encoding="utf-8"?>
+<p:sld xmlns:a="http://schemas.openxmlformats.org/drawingml/2006/main" xmlns:r="http://schemas.openxmlformats.org/officeDocument/2006/relationships" xmlns:p="http://schemas.openxmlformats.org/presentationml/2006/main">
+  <p:cSld>
+    <p:spTree>
+      <p:nvGrpSpPr>
+        <p:cNvPr id="1" name=""/>
+        <p:cNvGrpSpPr/>
+        <p:nvPr/>
+      </p:nvGrpSpPr>
+      <p:grpSpPr>
+        <a:xfrm>
+          <a:off x="0" y="0"/>
+          <a:ext cx="0" cy="0"/>
+          <a:chOff x="0" y="0"/>
+          <a:chExt cx="0" cy="0"/>
+        </a:xfrm>
+      </p:grpSpPr>
+      <p:sp>
+        <p:nvSpPr>
+          <p:cNvPr id="2" name="Title 1"/>
+          <p:cNvSpPr>
+            <a:spLocks noGrp="1"/>
+          </p:cNvSpPr>
+          <p:nvPr>
+            <p:ph type="title"/>
+          </p:nvPr>
+        </p:nvSpPr>
+        <p:spPr/>
+        <p:txBody>
+          <a:bodyPr/>
+          <a:lstStyle/>
+          <a:p>
+            <a:r>
+              <a:rPr lang="en-US" dirty="0"/>
+              <a:t>Define service</a:t>
+            </a:r>
+          </a:p>
+        </p:txBody>
+      </p:sp>
+      <p:sp>
+        <p:nvSpPr>
+          <p:cNvPr id="4" name="Slide Number Placeholder 3"/>
+          <p:cNvSpPr>
+            <a:spLocks noGrp="1"/>
+          </p:cNvSpPr>
+          <p:nvPr>
+            <p:ph type="sldNum" sz="quarter" idx="12"/>
+          </p:nvPr>
+        </p:nvSpPr>
+        <p:spPr/>
+        <p:txBody>
+          <a:bodyPr/>
+          <a:lstStyle/>
+          <a:p>
+            <a:fld id="{AEFF399F-E3B5-4890-BC79-9BC8D4DF3F2D}" type="slidenum">
+              <a:rPr lang="nl-BE" smtClean="0"/>
+              <a:t>40</a:t>
             </a:fld>
             <a:endParaRPr lang="nl-BE"/>
           </a:p>
@@ -20908,7 +21544,7 @@
 </p:sld>
 </file>
 
-<file path=ppt/slides/slide4.xml><?xml version="1.0" encoding="utf-8"?>
+<file path=ppt/slides/slide41.xml><?xml version="1.0" encoding="utf-8"?>
 <p:sld xmlns:a="http://schemas.openxmlformats.org/drawingml/2006/main" xmlns:r="http://schemas.openxmlformats.org/officeDocument/2006/relationships" xmlns:p="http://schemas.openxmlformats.org/presentationml/2006/main">
   <p:cSld>
     <p:spTree>
@@ -20942,101 +21578,6 @@
           <a:p>
             <a:r>
               <a:rPr lang="en-US" dirty="0"/>
-              <a:t>Introduction</a:t>
-            </a:r>
-            <a:endParaRPr lang="nl-BE" dirty="0"/>
-          </a:p>
-        </p:txBody>
-      </p:sp>
-      <p:sp>
-        <p:nvSpPr>
-          <p:cNvPr id="3" name="Text Placeholder 2"/>
-          <p:cNvSpPr>
-            <a:spLocks noGrp="1"/>
-          </p:cNvSpPr>
-          <p:nvPr>
-            <p:ph type="body" idx="1"/>
-          </p:nvPr>
-        </p:nvSpPr>
-        <p:spPr/>
-        <p:txBody>
-          <a:bodyPr/>
-          <a:lstStyle/>
-          <a:p>
-            <a:endParaRPr lang="nl-BE"/>
-          </a:p>
-        </p:txBody>
-      </p:sp>
-      <p:sp>
-        <p:nvSpPr>
-          <p:cNvPr id="4" name="Slide Number Placeholder 3"/>
-          <p:cNvSpPr>
-            <a:spLocks noGrp="1"/>
-          </p:cNvSpPr>
-          <p:nvPr>
-            <p:ph type="sldNum" sz="quarter" idx="12"/>
-          </p:nvPr>
-        </p:nvSpPr>
-        <p:spPr/>
-        <p:txBody>
-          <a:bodyPr/>
-          <a:lstStyle/>
-          <a:p>
-            <a:fld id="{AEFF399F-E3B5-4890-BC79-9BC8D4DF3F2D}" type="slidenum">
-              <a:rPr lang="nl-BE" smtClean="0"/>
-              <a:t>4</a:t>
-            </a:fld>
-            <a:endParaRPr lang="nl-BE"/>
-          </a:p>
-        </p:txBody>
-      </p:sp>
-    </p:spTree>
-    <p:extLst>
-      <p:ext uri="{BB962C8B-B14F-4D97-AF65-F5344CB8AC3E}">
-        <p14:creationId xmlns:p14="http://schemas.microsoft.com/office/powerpoint/2010/main" val="2215557954"/>
-      </p:ext>
-    </p:extLst>
-  </p:cSld>
-  <p:clrMapOvr>
-    <a:masterClrMapping/>
-  </p:clrMapOvr>
-</p:sld>
-</file>
-
-<file path=ppt/slides/slide40.xml><?xml version="1.0" encoding="utf-8"?>
-<p:sld xmlns:a="http://schemas.openxmlformats.org/drawingml/2006/main" xmlns:r="http://schemas.openxmlformats.org/officeDocument/2006/relationships" xmlns:p="http://schemas.openxmlformats.org/presentationml/2006/main">
-  <p:cSld>
-    <p:spTree>
-      <p:nvGrpSpPr>
-        <p:cNvPr id="1" name=""/>
-        <p:cNvGrpSpPr/>
-        <p:nvPr/>
-      </p:nvGrpSpPr>
-      <p:grpSpPr>
-        <a:xfrm>
-          <a:off x="0" y="0"/>
-          <a:ext cx="0" cy="0"/>
-          <a:chOff x="0" y="0"/>
-          <a:chExt cx="0" cy="0"/>
-        </a:xfrm>
-      </p:grpSpPr>
-      <p:sp>
-        <p:nvSpPr>
-          <p:cNvPr id="2" name="Title 1"/>
-          <p:cNvSpPr>
-            <a:spLocks noGrp="1"/>
-          </p:cNvSpPr>
-          <p:nvPr>
-            <p:ph type="title"/>
-          </p:nvPr>
-        </p:nvSpPr>
-        <p:spPr/>
-        <p:txBody>
-          <a:bodyPr/>
-          <a:lstStyle/>
-          <a:p>
-            <a:r>
-              <a:rPr lang="en-US" dirty="0"/>
               <a:t>Recipe</a:t>
             </a:r>
           </a:p>
@@ -21059,7 +21600,7 @@
           <a:p>
             <a:fld id="{AEFF399F-E3B5-4890-BC79-9BC8D4DF3F2D}" type="slidenum">
               <a:rPr lang="nl-BE" smtClean="0"/>
-              <a:t>40</a:t>
+              <a:t>41</a:t>
             </a:fld>
             <a:endParaRPr lang="nl-BE"/>
           </a:p>
@@ -21947,7 +22488,7 @@
 </p:sld>
 </file>
 
-<file path=ppt/slides/slide41.xml><?xml version="1.0" encoding="utf-8"?>
+<file path=ppt/slides/slide42.xml><?xml version="1.0" encoding="utf-8"?>
 <p:sld xmlns:a="http://schemas.openxmlformats.org/drawingml/2006/main" xmlns:r="http://schemas.openxmlformats.org/officeDocument/2006/relationships" xmlns:p="http://schemas.openxmlformats.org/presentationml/2006/main">
   <p:cSld>
     <p:spTree>
@@ -22055,7 +22596,7 @@
           <a:p>
             <a:fld id="{AEFF399F-E3B5-4890-BC79-9BC8D4DF3F2D}" type="slidenum">
               <a:rPr lang="nl-BE" smtClean="0"/>
-              <a:t>41</a:t>
+              <a:t>42</a:t>
             </a:fld>
             <a:endParaRPr lang="nl-BE" dirty="0"/>
           </a:p>
@@ -22863,7 +23404,7 @@
 </p:sld>
 </file>
 
-<file path=ppt/slides/slide42.xml><?xml version="1.0" encoding="utf-8"?>
+<file path=ppt/slides/slide43.xml><?xml version="1.0" encoding="utf-8"?>
 <p:sld xmlns:a="http://schemas.openxmlformats.org/drawingml/2006/main" xmlns:r="http://schemas.openxmlformats.org/officeDocument/2006/relationships" xmlns:p="http://schemas.openxmlformats.org/presentationml/2006/main">
   <p:cSld>
     <p:spTree>
@@ -22939,7 +23480,7 @@
           <a:p>
             <a:fld id="{AEFF399F-E3B5-4890-BC79-9BC8D4DF3F2D}" type="slidenum">
               <a:rPr lang="nl-BE" smtClean="0"/>
-              <a:t>42</a:t>
+              <a:t>43</a:t>
             </a:fld>
             <a:endParaRPr lang="nl-BE"/>
           </a:p>
@@ -22958,7 +23499,7 @@
 </p:sld>
 </file>
 
-<file path=ppt/slides/slide43.xml><?xml version="1.0" encoding="utf-8"?>
+<file path=ppt/slides/slide44.xml><?xml version="1.0" encoding="utf-8"?>
 <p:sld xmlns:a="http://schemas.openxmlformats.org/drawingml/2006/main" xmlns:r="http://schemas.openxmlformats.org/officeDocument/2006/relationships" xmlns:p="http://schemas.openxmlformats.org/presentationml/2006/main">
   <p:cSld>
     <p:spTree>
@@ -23168,7 +23709,7 @@
           <a:p>
             <a:fld id="{AEFF399F-E3B5-4890-BC79-9BC8D4DF3F2D}" type="slidenum">
               <a:rPr lang="nl-BE" smtClean="0"/>
-              <a:t>43</a:t>
+              <a:t>44</a:t>
             </a:fld>
             <a:endParaRPr lang="nl-BE"/>
           </a:p>
@@ -23698,7 +24239,7 @@
 </p:sld>
 </file>
 
-<file path=ppt/slides/slide44.xml><?xml version="1.0" encoding="utf-8"?>
+<file path=ppt/slides/slide45.xml><?xml version="1.0" encoding="utf-8"?>
 <p:sld xmlns:a="http://schemas.openxmlformats.org/drawingml/2006/main" xmlns:r="http://schemas.openxmlformats.org/officeDocument/2006/relationships" xmlns:p="http://schemas.openxmlformats.org/presentationml/2006/main">
   <p:cSld>
     <p:spTree>
@@ -23844,7 +24385,7 @@
           <a:p>
             <a:fld id="{AEFF399F-E3B5-4890-BC79-9BC8D4DF3F2D}" type="slidenum">
               <a:rPr lang="nl-BE" smtClean="0"/>
-              <a:t>44</a:t>
+              <a:t>45</a:t>
             </a:fld>
             <a:endParaRPr lang="nl-BE"/>
           </a:p>
@@ -24095,7 +24636,7 @@
 </p:sld>
 </file>
 
-<file path=ppt/slides/slide45.xml><?xml version="1.0" encoding="utf-8"?>
+<file path=ppt/slides/slide46.xml><?xml version="1.0" encoding="utf-8"?>
 <p:sld xmlns:a="http://schemas.openxmlformats.org/drawingml/2006/main" xmlns:r="http://schemas.openxmlformats.org/officeDocument/2006/relationships" xmlns:p="http://schemas.openxmlformats.org/presentationml/2006/main">
   <p:cSld>
     <p:spTree>
@@ -24189,7 +24730,7 @@
           <a:p>
             <a:fld id="{AEFF399F-E3B5-4890-BC79-9BC8D4DF3F2D}" type="slidenum">
               <a:rPr lang="nl-BE" smtClean="0"/>
-              <a:t>45</a:t>
+              <a:t>46</a:t>
             </a:fld>
             <a:endParaRPr lang="nl-BE"/>
           </a:p>
@@ -24208,7 +24749,7 @@
 </p:sld>
 </file>
 
-<file path=ppt/slides/slide46.xml><?xml version="1.0" encoding="utf-8"?>
+<file path=ppt/slides/slide47.xml><?xml version="1.0" encoding="utf-8"?>
 <p:sld xmlns:a="http://schemas.openxmlformats.org/drawingml/2006/main" xmlns:r="http://schemas.openxmlformats.org/officeDocument/2006/relationships" xmlns:p="http://schemas.openxmlformats.org/presentationml/2006/main">
   <p:cSld>
     <p:spTree>
@@ -24338,7 +24879,7 @@
           <a:p>
             <a:fld id="{AEFF399F-E3B5-4890-BC79-9BC8D4DF3F2D}" type="slidenum">
               <a:rPr lang="nl-BE" smtClean="0"/>
-              <a:t>46</a:t>
+              <a:t>47</a:t>
             </a:fld>
             <a:endParaRPr lang="nl-BE"/>
           </a:p>
@@ -24348,101 +24889,6 @@
     <p:extLst>
       <p:ext uri="{BB962C8B-B14F-4D97-AF65-F5344CB8AC3E}">
         <p14:creationId xmlns:p14="http://schemas.microsoft.com/office/powerpoint/2010/main" val="1785437508"/>
-      </p:ext>
-    </p:extLst>
-  </p:cSld>
-  <p:clrMapOvr>
-    <a:masterClrMapping/>
-  </p:clrMapOvr>
-</p:sld>
-</file>
-
-<file path=ppt/slides/slide47.xml><?xml version="1.0" encoding="utf-8"?>
-<p:sld xmlns:a="http://schemas.openxmlformats.org/drawingml/2006/main" xmlns:r="http://schemas.openxmlformats.org/officeDocument/2006/relationships" xmlns:p="http://schemas.openxmlformats.org/presentationml/2006/main">
-  <p:cSld>
-    <p:spTree>
-      <p:nvGrpSpPr>
-        <p:cNvPr id="1" name=""/>
-        <p:cNvGrpSpPr/>
-        <p:nvPr/>
-      </p:nvGrpSpPr>
-      <p:grpSpPr>
-        <a:xfrm>
-          <a:off x="0" y="0"/>
-          <a:ext cx="0" cy="0"/>
-          <a:chOff x="0" y="0"/>
-          <a:chExt cx="0" cy="0"/>
-        </a:xfrm>
-      </p:grpSpPr>
-      <p:sp>
-        <p:nvSpPr>
-          <p:cNvPr id="2" name="Title 1"/>
-          <p:cNvSpPr>
-            <a:spLocks noGrp="1"/>
-          </p:cNvSpPr>
-          <p:nvPr>
-            <p:ph type="title"/>
-          </p:nvPr>
-        </p:nvSpPr>
-        <p:spPr/>
-        <p:txBody>
-          <a:bodyPr/>
-          <a:lstStyle/>
-          <a:p>
-            <a:r>
-              <a:rPr lang="en-US" dirty="0"/>
-              <a:t>Conclusions</a:t>
-            </a:r>
-            <a:endParaRPr lang="nl-BE" dirty="0"/>
-          </a:p>
-        </p:txBody>
-      </p:sp>
-      <p:sp>
-        <p:nvSpPr>
-          <p:cNvPr id="3" name="Text Placeholder 2"/>
-          <p:cNvSpPr>
-            <a:spLocks noGrp="1"/>
-          </p:cNvSpPr>
-          <p:nvPr>
-            <p:ph type="body" idx="1"/>
-          </p:nvPr>
-        </p:nvSpPr>
-        <p:spPr/>
-        <p:txBody>
-          <a:bodyPr/>
-          <a:lstStyle/>
-          <a:p>
-            <a:endParaRPr lang="nl-BE"/>
-          </a:p>
-        </p:txBody>
-      </p:sp>
-      <p:sp>
-        <p:nvSpPr>
-          <p:cNvPr id="4" name="Slide Number Placeholder 3"/>
-          <p:cNvSpPr>
-            <a:spLocks noGrp="1"/>
-          </p:cNvSpPr>
-          <p:nvPr>
-            <p:ph type="sldNum" sz="quarter" idx="12"/>
-          </p:nvPr>
-        </p:nvSpPr>
-        <p:spPr/>
-        <p:txBody>
-          <a:bodyPr/>
-          <a:lstStyle/>
-          <a:p>
-            <a:fld id="{AEFF399F-E3B5-4890-BC79-9BC8D4DF3F2D}" type="slidenum">
-              <a:rPr lang="nl-BE" smtClean="0"/>
-              <a:t>47</a:t>
-            </a:fld>
-            <a:endParaRPr lang="nl-BE"/>
-          </a:p>
-        </p:txBody>
-      </p:sp>
-    </p:spTree>
-    <p:extLst>
-      <p:ext uri="{BB962C8B-B14F-4D97-AF65-F5344CB8AC3E}">
-        <p14:creationId xmlns:p14="http://schemas.microsoft.com/office/powerpoint/2010/main" val="2192721825"/>
       </p:ext>
     </p:extLst>
   </p:cSld>
@@ -24494,12 +24940,12 @@
       </p:sp>
       <p:sp>
         <p:nvSpPr>
-          <p:cNvPr id="3" name="Content Placeholder 2"/>
+          <p:cNvPr id="3" name="Text Placeholder 2"/>
           <p:cNvSpPr>
             <a:spLocks noGrp="1"/>
           </p:cNvSpPr>
           <p:nvPr>
-            <p:ph idx="1"/>
+            <p:ph type="body" idx="1"/>
           </p:nvPr>
         </p:nvSpPr>
         <p:spPr/>
@@ -24507,81 +24953,7 @@
           <a:bodyPr/>
           <a:lstStyle/>
           <a:p>
-            <a:r>
-              <a:rPr lang="en-US" dirty="0"/>
-              <a:t>Singularity advantages</a:t>
-            </a:r>
-          </a:p>
-          <a:p>
-            <a:pPr lvl="1"/>
-            <a:r>
-              <a:rPr lang="en-US" dirty="0"/>
-              <a:t>Portability</a:t>
-            </a:r>
-          </a:p>
-          <a:p>
-            <a:pPr lvl="1"/>
-            <a:r>
-              <a:rPr lang="en-US" dirty="0"/>
-              <a:t>Reproducibility: recipes under version control</a:t>
-            </a:r>
-          </a:p>
-          <a:p>
-            <a:pPr lvl="1"/>
-            <a:r>
-              <a:rPr lang="en-US" dirty="0"/>
-              <a:t>Easily create images</a:t>
-            </a:r>
-          </a:p>
-          <a:p>
-            <a:pPr lvl="1"/>
-            <a:r>
-              <a:rPr lang="en-US" dirty="0"/>
-              <a:t>Integrate images into existing workflows</a:t>
-            </a:r>
-          </a:p>
-          <a:p>
-            <a:pPr lvl="1"/>
-            <a:r>
-              <a:rPr lang="en-US" dirty="0"/>
-              <a:t>No privilege escalation</a:t>
-            </a:r>
-          </a:p>
-          <a:p>
-            <a:pPr lvl="2"/>
-            <a:r>
-              <a:rPr lang="en-US" dirty="0"/>
-              <a:t>Create as root</a:t>
-            </a:r>
-          </a:p>
-          <a:p>
-            <a:pPr lvl="2"/>
-            <a:r>
-              <a:rPr lang="en-US" dirty="0"/>
-              <a:t>Run as user, no </a:t>
-            </a:r>
-            <a:r>
-              <a:rPr lang="en-US" dirty="0" err="1"/>
-              <a:t>sudo</a:t>
-            </a:r>
-            <a:r>
-              <a:rPr lang="en-US" dirty="0"/>
-              <a:t> possible</a:t>
-            </a:r>
-          </a:p>
-          <a:p>
-            <a:pPr lvl="1"/>
-            <a:r>
-              <a:rPr lang="en-US" dirty="0"/>
-              <a:t>Quite reasonable performance/overhead</a:t>
-            </a:r>
-          </a:p>
-          <a:p>
-            <a:r>
-              <a:rPr lang="en-US" dirty="0"/>
-              <a:t>No excuse to run crappy/suboptimal software!</a:t>
-            </a:r>
-            <a:endParaRPr lang="nl-BE" dirty="0"/>
+            <a:endParaRPr lang="nl-BE"/>
           </a:p>
         </p:txBody>
       </p:sp>
@@ -24603,6 +24975,175 @@
             <a:fld id="{AEFF399F-E3B5-4890-BC79-9BC8D4DF3F2D}" type="slidenum">
               <a:rPr lang="nl-BE" smtClean="0"/>
               <a:t>48</a:t>
+            </a:fld>
+            <a:endParaRPr lang="nl-BE"/>
+          </a:p>
+        </p:txBody>
+      </p:sp>
+    </p:spTree>
+    <p:extLst>
+      <p:ext uri="{BB962C8B-B14F-4D97-AF65-F5344CB8AC3E}">
+        <p14:creationId xmlns:p14="http://schemas.microsoft.com/office/powerpoint/2010/main" val="2192721825"/>
+      </p:ext>
+    </p:extLst>
+  </p:cSld>
+  <p:clrMapOvr>
+    <a:masterClrMapping/>
+  </p:clrMapOvr>
+</p:sld>
+</file>
+
+<file path=ppt/slides/slide49.xml><?xml version="1.0" encoding="utf-8"?>
+<p:sld xmlns:a="http://schemas.openxmlformats.org/drawingml/2006/main" xmlns:r="http://schemas.openxmlformats.org/officeDocument/2006/relationships" xmlns:p="http://schemas.openxmlformats.org/presentationml/2006/main">
+  <p:cSld>
+    <p:spTree>
+      <p:nvGrpSpPr>
+        <p:cNvPr id="1" name=""/>
+        <p:cNvGrpSpPr/>
+        <p:nvPr/>
+      </p:nvGrpSpPr>
+      <p:grpSpPr>
+        <a:xfrm>
+          <a:off x="0" y="0"/>
+          <a:ext cx="0" cy="0"/>
+          <a:chOff x="0" y="0"/>
+          <a:chExt cx="0" cy="0"/>
+        </a:xfrm>
+      </p:grpSpPr>
+      <p:sp>
+        <p:nvSpPr>
+          <p:cNvPr id="2" name="Title 1"/>
+          <p:cNvSpPr>
+            <a:spLocks noGrp="1"/>
+          </p:cNvSpPr>
+          <p:nvPr>
+            <p:ph type="title"/>
+          </p:nvPr>
+        </p:nvSpPr>
+        <p:spPr/>
+        <p:txBody>
+          <a:bodyPr/>
+          <a:lstStyle/>
+          <a:p>
+            <a:r>
+              <a:rPr lang="en-US" dirty="0"/>
+              <a:t>Conclusions</a:t>
+            </a:r>
+            <a:endParaRPr lang="nl-BE" dirty="0"/>
+          </a:p>
+        </p:txBody>
+      </p:sp>
+      <p:sp>
+        <p:nvSpPr>
+          <p:cNvPr id="3" name="Content Placeholder 2"/>
+          <p:cNvSpPr>
+            <a:spLocks noGrp="1"/>
+          </p:cNvSpPr>
+          <p:nvPr>
+            <p:ph idx="1"/>
+          </p:nvPr>
+        </p:nvSpPr>
+        <p:spPr/>
+        <p:txBody>
+          <a:bodyPr/>
+          <a:lstStyle/>
+          <a:p>
+            <a:r>
+              <a:rPr lang="en-US" dirty="0"/>
+              <a:t>Singularity advantages</a:t>
+            </a:r>
+          </a:p>
+          <a:p>
+            <a:pPr lvl="1"/>
+            <a:r>
+              <a:rPr lang="en-US" dirty="0"/>
+              <a:t>Portability</a:t>
+            </a:r>
+          </a:p>
+          <a:p>
+            <a:pPr lvl="1"/>
+            <a:r>
+              <a:rPr lang="en-US" dirty="0"/>
+              <a:t>Reproducibility: recipes under version control</a:t>
+            </a:r>
+          </a:p>
+          <a:p>
+            <a:pPr lvl="1"/>
+            <a:r>
+              <a:rPr lang="en-US" dirty="0"/>
+              <a:t>Easily create images</a:t>
+            </a:r>
+          </a:p>
+          <a:p>
+            <a:pPr lvl="1"/>
+            <a:r>
+              <a:rPr lang="en-US" dirty="0"/>
+              <a:t>Integrate images into existing workflows</a:t>
+            </a:r>
+          </a:p>
+          <a:p>
+            <a:pPr lvl="1"/>
+            <a:r>
+              <a:rPr lang="en-US" dirty="0"/>
+              <a:t>No privilege escalation</a:t>
+            </a:r>
+          </a:p>
+          <a:p>
+            <a:pPr lvl="2"/>
+            <a:r>
+              <a:rPr lang="en-US" dirty="0"/>
+              <a:t>Create as root</a:t>
+            </a:r>
+          </a:p>
+          <a:p>
+            <a:pPr lvl="2"/>
+            <a:r>
+              <a:rPr lang="en-US" dirty="0"/>
+              <a:t>Run as user, no </a:t>
+            </a:r>
+            <a:r>
+              <a:rPr lang="en-US" dirty="0" err="1"/>
+              <a:t>sudo</a:t>
+            </a:r>
+            <a:r>
+              <a:rPr lang="en-US" dirty="0"/>
+              <a:t> possible</a:t>
+            </a:r>
+          </a:p>
+          <a:p>
+            <a:pPr lvl="1"/>
+            <a:r>
+              <a:rPr lang="en-US" dirty="0"/>
+              <a:t>Quite reasonable performance/overhead</a:t>
+            </a:r>
+          </a:p>
+          <a:p>
+            <a:r>
+              <a:rPr lang="en-US" dirty="0"/>
+              <a:t>No excuse to run crappy/suboptimal software!</a:t>
+            </a:r>
+            <a:endParaRPr lang="nl-BE" dirty="0"/>
+          </a:p>
+        </p:txBody>
+      </p:sp>
+      <p:sp>
+        <p:nvSpPr>
+          <p:cNvPr id="4" name="Slide Number Placeholder 3"/>
+          <p:cNvSpPr>
+            <a:spLocks noGrp="1"/>
+          </p:cNvSpPr>
+          <p:nvPr>
+            <p:ph type="sldNum" sz="quarter" idx="12"/>
+          </p:nvPr>
+        </p:nvSpPr>
+        <p:spPr/>
+        <p:txBody>
+          <a:bodyPr/>
+          <a:lstStyle/>
+          <a:p>
+            <a:fld id="{AEFF399F-E3B5-4890-BC79-9BC8D4DF3F2D}" type="slidenum">
+              <a:rPr lang="nl-BE" smtClean="0"/>
+              <a:t>49</a:t>
             </a:fld>
             <a:endParaRPr lang="nl-BE"/>
           </a:p>
@@ -25111,7 +25652,7 @@
 </p:sld>
 </file>
 
-<file path=ppt/slides/slide49.xml><?xml version="1.0" encoding="utf-8"?>
+<file path=ppt/slides/slide5.xml><?xml version="1.0" encoding="utf-8"?>
 <p:sld xmlns:a="http://schemas.openxmlformats.org/drawingml/2006/main" xmlns:r="http://schemas.openxmlformats.org/officeDocument/2006/relationships" xmlns:p="http://schemas.openxmlformats.org/presentationml/2006/main">
   <p:cSld>
     <p:spTree>
@@ -25145,7 +25686,7 @@
           <a:p>
             <a:r>
               <a:rPr lang="en-US" dirty="0"/>
-              <a:t>Bootstrap best practices</a:t>
+              <a:t>Introduction</a:t>
             </a:r>
             <a:endParaRPr lang="nl-BE" dirty="0"/>
           </a:p>
@@ -25168,138 +25709,90 @@
           <a:p>
             <a:r>
               <a:rPr lang="en-US" dirty="0"/>
-              <a:t>Install software in default location, not home directory</a:t>
-            </a:r>
-          </a:p>
-          <a:p>
-            <a:r>
+              <a:t>Singularity originally developed by Berkeley Lab, now at </a:t>
+            </a:r>
+            <a:r>
+              <a:rPr lang="en-US" dirty="0" err="1"/>
+              <a:t>Sylabs</a:t>
+            </a:r>
+            <a:br>
               <a:rPr lang="en-US" dirty="0"/>
-              <a:t>Define environment variables in image's </a:t>
-            </a:r>
-            <a:r>
-              <a:rPr lang="en-BE" dirty="0">
-                <a:latin typeface="Courier New" panose="02070309020205020404" pitchFamily="49" charset="0"/>
-                <a:cs typeface="Courier New" panose="02070309020205020404" pitchFamily="49" charset="0"/>
-              </a:rPr>
-              <a:t>%</a:t>
-            </a:r>
+            </a:br>
             <a:r>
               <a:rPr lang="en-US" dirty="0">
-                <a:latin typeface="Courier New" panose="02070309020205020404" pitchFamily="49" charset="0"/>
-                <a:cs typeface="Courier New" panose="02070309020205020404" pitchFamily="49" charset="0"/>
-              </a:rPr>
-              <a:t>environment</a:t>
-            </a:r>
+                <a:hlinkClick r:id="rId2"/>
+              </a:rPr>
+              <a:t>https://sylabs.io/singularity/</a:t>
+            </a:r>
+            <a:endParaRPr lang="en-US" dirty="0"/>
           </a:p>
           <a:p>
             <a:r>
               <a:rPr lang="en-US" dirty="0"/>
-              <a:t>Files should be owned by system account, not user</a:t>
-            </a:r>
-          </a:p>
-          <a:p>
+              <a:t>Intended as HPC alternative to</a:t>
+            </a:r>
+          </a:p>
+          <a:p>
+            <a:pPr lvl="1"/>
             <a:r>
               <a:rPr lang="en-US" dirty="0"/>
-              <a:t>Don’t mess with </a:t>
-            </a:r>
+              <a:t>Docker</a:t>
+            </a:r>
+            <a:br>
+              <a:rPr lang="en-US" dirty="0"/>
+            </a:br>
             <a:r>
               <a:rPr lang="en-US" dirty="0">
-                <a:latin typeface="Courier New" panose="02070309020205020404" pitchFamily="49" charset="0"/>
-                <a:cs typeface="Courier New" panose="02070309020205020404" pitchFamily="49" charset="0"/>
-              </a:rPr>
-              <a:t>/</a:t>
-            </a:r>
-            <a:r>
-              <a:rPr lang="en-US" dirty="0" err="1">
-                <a:latin typeface="Courier New" panose="02070309020205020404" pitchFamily="49" charset="0"/>
-                <a:cs typeface="Courier New" panose="02070309020205020404" pitchFamily="49" charset="0"/>
-              </a:rPr>
-              <a:t>etc</a:t>
-            </a:r>
+                <a:hlinkClick r:id="rId3"/>
+              </a:rPr>
+              <a:t>https://www.docker.com/</a:t>
+            </a:r>
+            <a:r>
+              <a:rPr lang="en-US" dirty="0"/>
+              <a:t> </a:t>
+            </a:r>
+          </a:p>
+          <a:p>
+            <a:pPr lvl="1"/>
+            <a:r>
+              <a:rPr lang="en-US" dirty="0"/>
+              <a:t>Shifter</a:t>
+            </a:r>
+            <a:br>
+              <a:rPr lang="en-US" dirty="0"/>
+            </a:br>
             <a:r>
               <a:rPr lang="en-US" dirty="0">
-                <a:latin typeface="Courier New" panose="02070309020205020404" pitchFamily="49" charset="0"/>
-                <a:cs typeface="Courier New" panose="02070309020205020404" pitchFamily="49" charset="0"/>
-              </a:rPr>
-              <a:t>/</a:t>
-            </a:r>
-            <a:r>
-              <a:rPr lang="en-US" dirty="0" err="1">
-                <a:latin typeface="Courier New" panose="02070309020205020404" pitchFamily="49" charset="0"/>
-                <a:cs typeface="Courier New" panose="02070309020205020404" pitchFamily="49" charset="0"/>
-              </a:rPr>
-              <a:t>passwd</a:t>
+                <a:hlinkClick r:id="rId4"/>
+              </a:rPr>
+              <a:t>https://github.com/NERSC/shifter</a:t>
             </a:r>
             <a:r>
               <a:rPr lang="en-US" dirty="0"/>
-              <a:t>, </a:t>
-            </a:r>
+              <a:t> </a:t>
+            </a:r>
+          </a:p>
+          <a:p>
+            <a:r>
+              <a:rPr lang="en-US" dirty="0"/>
+              <a:t>Open source project: name change to </a:t>
+            </a:r>
+            <a:r>
+              <a:rPr lang="en-US" dirty="0" err="1"/>
+              <a:t>Apptainer</a:t>
+            </a:r>
+            <a:br>
+              <a:rPr lang="en-US" dirty="0"/>
+            </a:br>
             <a:r>
               <a:rPr lang="en-US" dirty="0">
-                <a:latin typeface="Courier New" panose="02070309020205020404" pitchFamily="49" charset="0"/>
-                <a:cs typeface="Courier New" panose="02070309020205020404" pitchFamily="49" charset="0"/>
-              </a:rPr>
-              <a:t>/</a:t>
-            </a:r>
-            <a:r>
-              <a:rPr lang="en-US" dirty="0" err="1">
-                <a:latin typeface="Courier New" panose="02070309020205020404" pitchFamily="49" charset="0"/>
-                <a:cs typeface="Courier New" panose="02070309020205020404" pitchFamily="49" charset="0"/>
-              </a:rPr>
-              <a:t>etc</a:t>
-            </a:r>
-            <a:r>
-              <a:rPr lang="en-US" dirty="0">
-                <a:latin typeface="Courier New" panose="02070309020205020404" pitchFamily="49" charset="0"/>
-                <a:cs typeface="Courier New" panose="02070309020205020404" pitchFamily="49" charset="0"/>
-              </a:rPr>
-              <a:t>/group</a:t>
+                <a:hlinkClick r:id="rId5"/>
+              </a:rPr>
+              <a:t>https://apptainer.org/</a:t>
             </a:r>
             <a:r>
               <a:rPr lang="en-US" dirty="0"/>
-              <a:t>, </a:t>
-            </a:r>
-            <a:r>
-              <a:rPr lang="en-US" dirty="0">
-                <a:latin typeface="Courier New" panose="02070309020205020404" pitchFamily="49" charset="0"/>
-                <a:cs typeface="Courier New" panose="02070309020205020404" pitchFamily="49" charset="0"/>
-              </a:rPr>
-              <a:t>/</a:t>
-            </a:r>
-            <a:r>
-              <a:rPr lang="en-US" dirty="0" err="1">
-                <a:latin typeface="Courier New" panose="02070309020205020404" pitchFamily="49" charset="0"/>
-                <a:cs typeface="Courier New" panose="02070309020205020404" pitchFamily="49" charset="0"/>
-              </a:rPr>
-              <a:t>etc</a:t>
-            </a:r>
-            <a:r>
-              <a:rPr lang="en-US" dirty="0">
-                <a:latin typeface="Courier New" panose="02070309020205020404" pitchFamily="49" charset="0"/>
-                <a:cs typeface="Courier New" panose="02070309020205020404" pitchFamily="49" charset="0"/>
-              </a:rPr>
-              <a:t>/shadow</a:t>
-            </a:r>
-          </a:p>
-          <a:p>
-            <a:r>
-              <a:rPr lang="en-US" dirty="0"/>
-              <a:t>Do installation via recipe file, </a:t>
-            </a:r>
-            <a:r>
-              <a:rPr lang="en-US" i="1" dirty="0"/>
-              <a:t>not</a:t>
-            </a:r>
-            <a:r>
-              <a:rPr lang="en-US" dirty="0"/>
-              <a:t> by hand</a:t>
-            </a:r>
-          </a:p>
-          <a:p>
-            <a:pPr lvl="1"/>
-            <a:r>
-              <a:rPr lang="en-US" dirty="0"/>
-              <a:t>Better reproducibility</a:t>
+              <a:t> </a:t>
             </a:r>
             <a:endParaRPr lang="nl-BE" dirty="0"/>
           </a:p>
@@ -25322,7 +25815,564 @@
           <a:p>
             <a:fld id="{AEFF399F-E3B5-4890-BC79-9BC8D4DF3F2D}" type="slidenum">
               <a:rPr lang="nl-BE" smtClean="0"/>
-              <a:t>49</a:t>
+              <a:t>5</a:t>
+            </a:fld>
+            <a:endParaRPr lang="nl-BE"/>
+          </a:p>
+        </p:txBody>
+      </p:sp>
+      <p:sp>
+        <p:nvSpPr>
+          <p:cNvPr id="5" name="Rectangle: Rounded Corners 4">
+            <a:extLst>
+              <a:ext uri="{FF2B5EF4-FFF2-40B4-BE49-F238E27FC236}">
+                <a16:creationId xmlns:a16="http://schemas.microsoft.com/office/drawing/2014/main" id="{037F983B-06B8-82E5-960E-0F35700C8237}"/>
+              </a:ext>
+            </a:extLst>
+          </p:cNvPr>
+          <p:cNvSpPr/>
+          <p:nvPr/>
+        </p:nvSpPr>
+        <p:spPr>
+          <a:xfrm>
+            <a:off x="6432072" y="5115464"/>
+            <a:ext cx="1512858" cy="388188"/>
+          </a:xfrm>
+          <a:prstGeom prst="roundRect">
+            <a:avLst/>
+          </a:prstGeom>
+          <a:solidFill>
+            <a:srgbClr val="FFC000">
+              <a:alpha val="24000"/>
+            </a:srgbClr>
+          </a:solidFill>
+          <a:ln>
+            <a:noFill/>
+          </a:ln>
+        </p:spPr>
+        <p:style>
+          <a:lnRef idx="2">
+            <a:schemeClr val="accent1">
+              <a:shade val="50000"/>
+            </a:schemeClr>
+          </a:lnRef>
+          <a:fillRef idx="1">
+            <a:schemeClr val="accent1"/>
+          </a:fillRef>
+          <a:effectRef idx="0">
+            <a:schemeClr val="accent1"/>
+          </a:effectRef>
+          <a:fontRef idx="minor">
+            <a:schemeClr val="lt1"/>
+          </a:fontRef>
+        </p:style>
+        <p:txBody>
+          <a:bodyPr rtlCol="0" anchor="ctr"/>
+          <a:lstStyle/>
+          <a:p>
+            <a:pPr algn="ctr"/>
+            <a:endParaRPr lang="en-US"/>
+          </a:p>
+        </p:txBody>
+      </p:sp>
+    </p:spTree>
+    <p:extLst>
+      <p:ext uri="{BB962C8B-B14F-4D97-AF65-F5344CB8AC3E}">
+        <p14:creationId xmlns:p14="http://schemas.microsoft.com/office/powerpoint/2010/main" val="658783311"/>
+      </p:ext>
+    </p:extLst>
+  </p:cSld>
+  <p:clrMapOvr>
+    <a:masterClrMapping/>
+  </p:clrMapOvr>
+  <p:timing>
+    <p:tnLst>
+      <p:par>
+        <p:cTn id="1" dur="indefinite" restart="never" nodeType="tmRoot">
+          <p:childTnLst>
+            <p:seq concurrent="1" nextAc="seek">
+              <p:cTn id="2" dur="indefinite" nodeType="mainSeq">
+                <p:childTnLst>
+                  <p:par>
+                    <p:cTn id="3" fill="hold">
+                      <p:stCondLst>
+                        <p:cond delay="indefinite"/>
+                        <p:cond evt="onBegin" delay="0">
+                          <p:tn val="2"/>
+                        </p:cond>
+                      </p:stCondLst>
+                      <p:childTnLst>
+                        <p:par>
+                          <p:cTn id="4" fill="hold">
+                            <p:stCondLst>
+                              <p:cond delay="0"/>
+                            </p:stCondLst>
+                            <p:childTnLst>
+                              <p:par>
+                                <p:cTn id="5" presetID="1" presetClass="entr" presetSubtype="0" fill="hold" grpId="0" nodeType="withEffect">
+                                  <p:stCondLst>
+                                    <p:cond delay="0"/>
+                                  </p:stCondLst>
+                                  <p:childTnLst>
+                                    <p:set>
+                                      <p:cBhvr>
+                                        <p:cTn id="6" dur="1" fill="hold">
+                                          <p:stCondLst>
+                                            <p:cond delay="0"/>
+                                          </p:stCondLst>
+                                        </p:cTn>
+                                        <p:tgtEl>
+                                          <p:spTgt spid="3">
+                                            <p:txEl>
+                                              <p:pRg st="0" end="0"/>
+                                            </p:txEl>
+                                          </p:spTgt>
+                                        </p:tgtEl>
+                                        <p:attrNameLst>
+                                          <p:attrName>style.visibility</p:attrName>
+                                        </p:attrNameLst>
+                                      </p:cBhvr>
+                                      <p:to>
+                                        <p:strVal val="visible"/>
+                                      </p:to>
+                                    </p:set>
+                                  </p:childTnLst>
+                                </p:cTn>
+                              </p:par>
+                            </p:childTnLst>
+                          </p:cTn>
+                        </p:par>
+                      </p:childTnLst>
+                    </p:cTn>
+                  </p:par>
+                  <p:par>
+                    <p:cTn id="7" fill="hold">
+                      <p:stCondLst>
+                        <p:cond delay="indefinite"/>
+                      </p:stCondLst>
+                      <p:childTnLst>
+                        <p:par>
+                          <p:cTn id="8" fill="hold">
+                            <p:stCondLst>
+                              <p:cond delay="0"/>
+                            </p:stCondLst>
+                            <p:childTnLst>
+                              <p:par>
+                                <p:cTn id="9" presetID="1" presetClass="entr" presetSubtype="0" fill="hold" grpId="0" nodeType="clickEffect">
+                                  <p:stCondLst>
+                                    <p:cond delay="0"/>
+                                  </p:stCondLst>
+                                  <p:childTnLst>
+                                    <p:set>
+                                      <p:cBhvr>
+                                        <p:cTn id="10" dur="1" fill="hold">
+                                          <p:stCondLst>
+                                            <p:cond delay="0"/>
+                                          </p:stCondLst>
+                                        </p:cTn>
+                                        <p:tgtEl>
+                                          <p:spTgt spid="3">
+                                            <p:txEl>
+                                              <p:pRg st="1" end="1"/>
+                                            </p:txEl>
+                                          </p:spTgt>
+                                        </p:tgtEl>
+                                        <p:attrNameLst>
+                                          <p:attrName>style.visibility</p:attrName>
+                                        </p:attrNameLst>
+                                      </p:cBhvr>
+                                      <p:to>
+                                        <p:strVal val="visible"/>
+                                      </p:to>
+                                    </p:set>
+                                  </p:childTnLst>
+                                </p:cTn>
+                              </p:par>
+                              <p:par>
+                                <p:cTn id="11" presetID="1" presetClass="entr" presetSubtype="0" fill="hold" grpId="0" nodeType="withEffect">
+                                  <p:stCondLst>
+                                    <p:cond delay="0"/>
+                                  </p:stCondLst>
+                                  <p:childTnLst>
+                                    <p:set>
+                                      <p:cBhvr>
+                                        <p:cTn id="12" dur="1" fill="hold">
+                                          <p:stCondLst>
+                                            <p:cond delay="0"/>
+                                          </p:stCondLst>
+                                        </p:cTn>
+                                        <p:tgtEl>
+                                          <p:spTgt spid="3">
+                                            <p:txEl>
+                                              <p:pRg st="2" end="2"/>
+                                            </p:txEl>
+                                          </p:spTgt>
+                                        </p:tgtEl>
+                                        <p:attrNameLst>
+                                          <p:attrName>style.visibility</p:attrName>
+                                        </p:attrNameLst>
+                                      </p:cBhvr>
+                                      <p:to>
+                                        <p:strVal val="visible"/>
+                                      </p:to>
+                                    </p:set>
+                                  </p:childTnLst>
+                                </p:cTn>
+                              </p:par>
+                              <p:par>
+                                <p:cTn id="13" presetID="1" presetClass="entr" presetSubtype="0" fill="hold" grpId="0" nodeType="withEffect">
+                                  <p:stCondLst>
+                                    <p:cond delay="0"/>
+                                  </p:stCondLst>
+                                  <p:childTnLst>
+                                    <p:set>
+                                      <p:cBhvr>
+                                        <p:cTn id="14" dur="1" fill="hold">
+                                          <p:stCondLst>
+                                            <p:cond delay="0"/>
+                                          </p:stCondLst>
+                                        </p:cTn>
+                                        <p:tgtEl>
+                                          <p:spTgt spid="3">
+                                            <p:txEl>
+                                              <p:pRg st="3" end="3"/>
+                                            </p:txEl>
+                                          </p:spTgt>
+                                        </p:tgtEl>
+                                        <p:attrNameLst>
+                                          <p:attrName>style.visibility</p:attrName>
+                                        </p:attrNameLst>
+                                      </p:cBhvr>
+                                      <p:to>
+                                        <p:strVal val="visible"/>
+                                      </p:to>
+                                    </p:set>
+                                  </p:childTnLst>
+                                </p:cTn>
+                              </p:par>
+                            </p:childTnLst>
+                          </p:cTn>
+                        </p:par>
+                      </p:childTnLst>
+                    </p:cTn>
+                  </p:par>
+                  <p:par>
+                    <p:cTn id="15" fill="hold">
+                      <p:stCondLst>
+                        <p:cond delay="indefinite"/>
+                      </p:stCondLst>
+                      <p:childTnLst>
+                        <p:par>
+                          <p:cTn id="16" fill="hold">
+                            <p:stCondLst>
+                              <p:cond delay="0"/>
+                            </p:stCondLst>
+                            <p:childTnLst>
+                              <p:par>
+                                <p:cTn id="17" presetID="1" presetClass="entr" presetSubtype="0" fill="hold" grpId="0" nodeType="clickEffect">
+                                  <p:stCondLst>
+                                    <p:cond delay="0"/>
+                                  </p:stCondLst>
+                                  <p:childTnLst>
+                                    <p:set>
+                                      <p:cBhvr>
+                                        <p:cTn id="18" dur="1" fill="hold">
+                                          <p:stCondLst>
+                                            <p:cond delay="0"/>
+                                          </p:stCondLst>
+                                        </p:cTn>
+                                        <p:tgtEl>
+                                          <p:spTgt spid="3">
+                                            <p:txEl>
+                                              <p:pRg st="4" end="4"/>
+                                            </p:txEl>
+                                          </p:spTgt>
+                                        </p:tgtEl>
+                                        <p:attrNameLst>
+                                          <p:attrName>style.visibility</p:attrName>
+                                        </p:attrNameLst>
+                                      </p:cBhvr>
+                                      <p:to>
+                                        <p:strVal val="visible"/>
+                                      </p:to>
+                                    </p:set>
+                                  </p:childTnLst>
+                                </p:cTn>
+                              </p:par>
+                              <p:par>
+                                <p:cTn id="19" presetID="1" presetClass="entr" presetSubtype="0" fill="hold" grpId="0" nodeType="withEffect">
+                                  <p:stCondLst>
+                                    <p:cond delay="0"/>
+                                  </p:stCondLst>
+                                  <p:childTnLst>
+                                    <p:set>
+                                      <p:cBhvr>
+                                        <p:cTn id="20" dur="1" fill="hold">
+                                          <p:stCondLst>
+                                            <p:cond delay="0"/>
+                                          </p:stCondLst>
+                                        </p:cTn>
+                                        <p:tgtEl>
+                                          <p:spTgt spid="5"/>
+                                        </p:tgtEl>
+                                        <p:attrNameLst>
+                                          <p:attrName>style.visibility</p:attrName>
+                                        </p:attrNameLst>
+                                      </p:cBhvr>
+                                      <p:to>
+                                        <p:strVal val="visible"/>
+                                      </p:to>
+                                    </p:set>
+                                  </p:childTnLst>
+                                </p:cTn>
+                              </p:par>
+                            </p:childTnLst>
+                          </p:cTn>
+                        </p:par>
+                      </p:childTnLst>
+                    </p:cTn>
+                  </p:par>
+                </p:childTnLst>
+              </p:cTn>
+              <p:prevCondLst>
+                <p:cond evt="onPrev" delay="0">
+                  <p:tgtEl>
+                    <p:sldTgt/>
+                  </p:tgtEl>
+                </p:cond>
+              </p:prevCondLst>
+              <p:nextCondLst>
+                <p:cond evt="onNext" delay="0">
+                  <p:tgtEl>
+                    <p:sldTgt/>
+                  </p:tgtEl>
+                </p:cond>
+              </p:nextCondLst>
+            </p:seq>
+          </p:childTnLst>
+        </p:cTn>
+      </p:par>
+    </p:tnLst>
+    <p:bldLst>
+      <p:bldP spid="3" grpId="0" uiExpand="1" build="p"/>
+      <p:bldP spid="5" grpId="0" animBg="1"/>
+    </p:bldLst>
+  </p:timing>
+</p:sld>
+</file>
+
+<file path=ppt/slides/slide50.xml><?xml version="1.0" encoding="utf-8"?>
+<p:sld xmlns:a="http://schemas.openxmlformats.org/drawingml/2006/main" xmlns:r="http://schemas.openxmlformats.org/officeDocument/2006/relationships" xmlns:p="http://schemas.openxmlformats.org/presentationml/2006/main">
+  <p:cSld>
+    <p:spTree>
+      <p:nvGrpSpPr>
+        <p:cNvPr id="1" name=""/>
+        <p:cNvGrpSpPr/>
+        <p:nvPr/>
+      </p:nvGrpSpPr>
+      <p:grpSpPr>
+        <a:xfrm>
+          <a:off x="0" y="0"/>
+          <a:ext cx="0" cy="0"/>
+          <a:chOff x="0" y="0"/>
+          <a:chExt cx="0" cy="0"/>
+        </a:xfrm>
+      </p:grpSpPr>
+      <p:sp>
+        <p:nvSpPr>
+          <p:cNvPr id="2" name="Title 1"/>
+          <p:cNvSpPr>
+            <a:spLocks noGrp="1"/>
+          </p:cNvSpPr>
+          <p:nvPr>
+            <p:ph type="title"/>
+          </p:nvPr>
+        </p:nvSpPr>
+        <p:spPr/>
+        <p:txBody>
+          <a:bodyPr/>
+          <a:lstStyle/>
+          <a:p>
+            <a:r>
+              <a:rPr lang="en-US" dirty="0"/>
+              <a:t>Bootstrap best practices</a:t>
+            </a:r>
+            <a:endParaRPr lang="nl-BE" dirty="0"/>
+          </a:p>
+        </p:txBody>
+      </p:sp>
+      <p:sp>
+        <p:nvSpPr>
+          <p:cNvPr id="3" name="Content Placeholder 2"/>
+          <p:cNvSpPr>
+            <a:spLocks noGrp="1"/>
+          </p:cNvSpPr>
+          <p:nvPr>
+            <p:ph idx="1"/>
+          </p:nvPr>
+        </p:nvSpPr>
+        <p:spPr/>
+        <p:txBody>
+          <a:bodyPr/>
+          <a:lstStyle/>
+          <a:p>
+            <a:r>
+              <a:rPr lang="en-US" dirty="0"/>
+              <a:t>Install software in default location, not home directory</a:t>
+            </a:r>
+          </a:p>
+          <a:p>
+            <a:r>
+              <a:rPr lang="en-US" dirty="0"/>
+              <a:t>Define environment variables in image's </a:t>
+            </a:r>
+            <a:r>
+              <a:rPr lang="en-BE" dirty="0">
+                <a:latin typeface="Courier New" panose="02070309020205020404" pitchFamily="49" charset="0"/>
+                <a:cs typeface="Courier New" panose="02070309020205020404" pitchFamily="49" charset="0"/>
+              </a:rPr>
+              <a:t>%</a:t>
+            </a:r>
+            <a:r>
+              <a:rPr lang="en-US" dirty="0">
+                <a:latin typeface="Courier New" panose="02070309020205020404" pitchFamily="49" charset="0"/>
+                <a:cs typeface="Courier New" panose="02070309020205020404" pitchFamily="49" charset="0"/>
+              </a:rPr>
+              <a:t>environment</a:t>
+            </a:r>
+          </a:p>
+          <a:p>
+            <a:r>
+              <a:rPr lang="en-US" dirty="0"/>
+              <a:t>Files should be owned by system account, not user</a:t>
+            </a:r>
+          </a:p>
+          <a:p>
+            <a:r>
+              <a:rPr lang="en-US" dirty="0"/>
+              <a:t>Don’t mess with </a:t>
+            </a:r>
+            <a:r>
+              <a:rPr lang="en-US" dirty="0">
+                <a:latin typeface="Courier New" panose="02070309020205020404" pitchFamily="49" charset="0"/>
+                <a:cs typeface="Courier New" panose="02070309020205020404" pitchFamily="49" charset="0"/>
+              </a:rPr>
+              <a:t>/</a:t>
+            </a:r>
+            <a:r>
+              <a:rPr lang="en-US" dirty="0" err="1">
+                <a:latin typeface="Courier New" panose="02070309020205020404" pitchFamily="49" charset="0"/>
+                <a:cs typeface="Courier New" panose="02070309020205020404" pitchFamily="49" charset="0"/>
+              </a:rPr>
+              <a:t>etc</a:t>
+            </a:r>
+            <a:r>
+              <a:rPr lang="en-US" dirty="0">
+                <a:latin typeface="Courier New" panose="02070309020205020404" pitchFamily="49" charset="0"/>
+                <a:cs typeface="Courier New" panose="02070309020205020404" pitchFamily="49" charset="0"/>
+              </a:rPr>
+              <a:t>/</a:t>
+            </a:r>
+            <a:r>
+              <a:rPr lang="en-US" dirty="0" err="1">
+                <a:latin typeface="Courier New" panose="02070309020205020404" pitchFamily="49" charset="0"/>
+                <a:cs typeface="Courier New" panose="02070309020205020404" pitchFamily="49" charset="0"/>
+              </a:rPr>
+              <a:t>passwd</a:t>
+            </a:r>
+            <a:r>
+              <a:rPr lang="en-US" dirty="0"/>
+              <a:t>, </a:t>
+            </a:r>
+            <a:r>
+              <a:rPr lang="en-US" dirty="0">
+                <a:latin typeface="Courier New" panose="02070309020205020404" pitchFamily="49" charset="0"/>
+                <a:cs typeface="Courier New" panose="02070309020205020404" pitchFamily="49" charset="0"/>
+              </a:rPr>
+              <a:t>/</a:t>
+            </a:r>
+            <a:r>
+              <a:rPr lang="en-US" dirty="0" err="1">
+                <a:latin typeface="Courier New" panose="02070309020205020404" pitchFamily="49" charset="0"/>
+                <a:cs typeface="Courier New" panose="02070309020205020404" pitchFamily="49" charset="0"/>
+              </a:rPr>
+              <a:t>etc</a:t>
+            </a:r>
+            <a:r>
+              <a:rPr lang="en-US" dirty="0">
+                <a:latin typeface="Courier New" panose="02070309020205020404" pitchFamily="49" charset="0"/>
+                <a:cs typeface="Courier New" panose="02070309020205020404" pitchFamily="49" charset="0"/>
+              </a:rPr>
+              <a:t>/group</a:t>
+            </a:r>
+            <a:r>
+              <a:rPr lang="en-US" dirty="0"/>
+              <a:t>, </a:t>
+            </a:r>
+            <a:r>
+              <a:rPr lang="en-US" dirty="0">
+                <a:latin typeface="Courier New" panose="02070309020205020404" pitchFamily="49" charset="0"/>
+                <a:cs typeface="Courier New" panose="02070309020205020404" pitchFamily="49" charset="0"/>
+              </a:rPr>
+              <a:t>/</a:t>
+            </a:r>
+            <a:r>
+              <a:rPr lang="en-US" dirty="0" err="1">
+                <a:latin typeface="Courier New" panose="02070309020205020404" pitchFamily="49" charset="0"/>
+                <a:cs typeface="Courier New" panose="02070309020205020404" pitchFamily="49" charset="0"/>
+              </a:rPr>
+              <a:t>etc</a:t>
+            </a:r>
+            <a:r>
+              <a:rPr lang="en-US" dirty="0">
+                <a:latin typeface="Courier New" panose="02070309020205020404" pitchFamily="49" charset="0"/>
+                <a:cs typeface="Courier New" panose="02070309020205020404" pitchFamily="49" charset="0"/>
+              </a:rPr>
+              <a:t>/shadow</a:t>
+            </a:r>
+          </a:p>
+          <a:p>
+            <a:r>
+              <a:rPr lang="en-US" dirty="0"/>
+              <a:t>Do installation via recipe file, </a:t>
+            </a:r>
+            <a:r>
+              <a:rPr lang="en-US" i="1" dirty="0"/>
+              <a:t>not</a:t>
+            </a:r>
+            <a:r>
+              <a:rPr lang="en-US" dirty="0"/>
+              <a:t> by hand</a:t>
+            </a:r>
+          </a:p>
+          <a:p>
+            <a:pPr lvl="1"/>
+            <a:r>
+              <a:rPr lang="en-US" dirty="0"/>
+              <a:t>Better reproducibility</a:t>
+            </a:r>
+            <a:endParaRPr lang="nl-BE" dirty="0"/>
+          </a:p>
+        </p:txBody>
+      </p:sp>
+      <p:sp>
+        <p:nvSpPr>
+          <p:cNvPr id="4" name="Slide Number Placeholder 3"/>
+          <p:cNvSpPr>
+            <a:spLocks noGrp="1"/>
+          </p:cNvSpPr>
+          <p:nvPr>
+            <p:ph type="sldNum" sz="quarter" idx="12"/>
+          </p:nvPr>
+        </p:nvSpPr>
+        <p:spPr/>
+        <p:txBody>
+          <a:bodyPr/>
+          <a:lstStyle/>
+          <a:p>
+            <a:fld id="{AEFF399F-E3B5-4890-BC79-9BC8D4DF3F2D}" type="slidenum">
+              <a:rPr lang="nl-BE" smtClean="0"/>
+              <a:t>50</a:t>
             </a:fld>
             <a:endParaRPr lang="nl-BE"/>
           </a:p>
@@ -25653,680 +26703,6 @@
 </p:sld>
 </file>
 
-<file path=ppt/slides/slide5.xml><?xml version="1.0" encoding="utf-8"?>
-<p:sld xmlns:a="http://schemas.openxmlformats.org/drawingml/2006/main" xmlns:r="http://schemas.openxmlformats.org/officeDocument/2006/relationships" xmlns:p="http://schemas.openxmlformats.org/presentationml/2006/main">
-  <p:cSld>
-    <p:spTree>
-      <p:nvGrpSpPr>
-        <p:cNvPr id="1" name=""/>
-        <p:cNvGrpSpPr/>
-        <p:nvPr/>
-      </p:nvGrpSpPr>
-      <p:grpSpPr>
-        <a:xfrm>
-          <a:off x="0" y="0"/>
-          <a:ext cx="0" cy="0"/>
-          <a:chOff x="0" y="0"/>
-          <a:chExt cx="0" cy="0"/>
-        </a:xfrm>
-      </p:grpSpPr>
-      <p:sp>
-        <p:nvSpPr>
-          <p:cNvPr id="2" name="Title 1"/>
-          <p:cNvSpPr>
-            <a:spLocks noGrp="1"/>
-          </p:cNvSpPr>
-          <p:nvPr>
-            <p:ph type="title"/>
-          </p:nvPr>
-        </p:nvSpPr>
-        <p:spPr/>
-        <p:txBody>
-          <a:bodyPr/>
-          <a:lstStyle/>
-          <a:p>
-            <a:r>
-              <a:rPr lang="en-US" dirty="0"/>
-              <a:t>Introduction</a:t>
-            </a:r>
-            <a:endParaRPr lang="nl-BE" dirty="0"/>
-          </a:p>
-        </p:txBody>
-      </p:sp>
-      <p:sp>
-        <p:nvSpPr>
-          <p:cNvPr id="3" name="Content Placeholder 2"/>
-          <p:cNvSpPr>
-            <a:spLocks noGrp="1"/>
-          </p:cNvSpPr>
-          <p:nvPr>
-            <p:ph idx="1"/>
-          </p:nvPr>
-        </p:nvSpPr>
-        <p:spPr/>
-        <p:txBody>
-          <a:bodyPr/>
-          <a:lstStyle/>
-          <a:p>
-            <a:r>
-              <a:rPr lang="en-US" dirty="0"/>
-              <a:t>Singularity originally developed by Berkeley Lab, now at </a:t>
-            </a:r>
-            <a:r>
-              <a:rPr lang="en-US" dirty="0" err="1"/>
-              <a:t>Sylabs</a:t>
-            </a:r>
-            <a:br>
-              <a:rPr lang="en-US" dirty="0"/>
-            </a:br>
-            <a:r>
-              <a:rPr lang="en-US" dirty="0">
-                <a:hlinkClick r:id="rId2"/>
-              </a:rPr>
-              <a:t>https://sylabs.io/singularity/</a:t>
-            </a:r>
-            <a:endParaRPr lang="en-US" dirty="0"/>
-          </a:p>
-          <a:p>
-            <a:r>
-              <a:rPr lang="en-US" dirty="0"/>
-              <a:t>Intended as HPC alternative to</a:t>
-            </a:r>
-          </a:p>
-          <a:p>
-            <a:pPr lvl="1"/>
-            <a:r>
-              <a:rPr lang="en-US" dirty="0"/>
-              <a:t>Docker</a:t>
-            </a:r>
-            <a:br>
-              <a:rPr lang="en-US" dirty="0"/>
-            </a:br>
-            <a:r>
-              <a:rPr lang="en-US" dirty="0">
-                <a:hlinkClick r:id="rId3"/>
-              </a:rPr>
-              <a:t>https://www.docker.com/</a:t>
-            </a:r>
-            <a:r>
-              <a:rPr lang="en-US" dirty="0"/>
-              <a:t> </a:t>
-            </a:r>
-          </a:p>
-          <a:p>
-            <a:pPr lvl="1"/>
-            <a:r>
-              <a:rPr lang="en-US" dirty="0"/>
-              <a:t>Shifter</a:t>
-            </a:r>
-            <a:br>
-              <a:rPr lang="en-US" dirty="0"/>
-            </a:br>
-            <a:r>
-              <a:rPr lang="en-US" dirty="0">
-                <a:hlinkClick r:id="rId4"/>
-              </a:rPr>
-              <a:t>https://github.com/NERSC/shifter</a:t>
-            </a:r>
-            <a:r>
-              <a:rPr lang="en-US" dirty="0"/>
-              <a:t> </a:t>
-            </a:r>
-          </a:p>
-          <a:p>
-            <a:r>
-              <a:rPr lang="en-US" dirty="0"/>
-              <a:t>Open source project: name change to </a:t>
-            </a:r>
-            <a:r>
-              <a:rPr lang="en-US" dirty="0" err="1"/>
-              <a:t>Apptainer</a:t>
-            </a:r>
-            <a:br>
-              <a:rPr lang="en-US" dirty="0"/>
-            </a:br>
-            <a:r>
-              <a:rPr lang="en-US" dirty="0">
-                <a:hlinkClick r:id="rId5"/>
-              </a:rPr>
-              <a:t>https://apptainer.org/</a:t>
-            </a:r>
-            <a:r>
-              <a:rPr lang="en-US" dirty="0"/>
-              <a:t> </a:t>
-            </a:r>
-            <a:endParaRPr lang="nl-BE" dirty="0"/>
-          </a:p>
-        </p:txBody>
-      </p:sp>
-      <p:sp>
-        <p:nvSpPr>
-          <p:cNvPr id="4" name="Slide Number Placeholder 3"/>
-          <p:cNvSpPr>
-            <a:spLocks noGrp="1"/>
-          </p:cNvSpPr>
-          <p:nvPr>
-            <p:ph type="sldNum" sz="quarter" idx="12"/>
-          </p:nvPr>
-        </p:nvSpPr>
-        <p:spPr/>
-        <p:txBody>
-          <a:bodyPr/>
-          <a:lstStyle/>
-          <a:p>
-            <a:fld id="{AEFF399F-E3B5-4890-BC79-9BC8D4DF3F2D}" type="slidenum">
-              <a:rPr lang="nl-BE" smtClean="0"/>
-              <a:t>5</a:t>
-            </a:fld>
-            <a:endParaRPr lang="nl-BE"/>
-          </a:p>
-        </p:txBody>
-      </p:sp>
-      <p:sp>
-        <p:nvSpPr>
-          <p:cNvPr id="5" name="Rectangle: Rounded Corners 4">
-            <a:extLst>
-              <a:ext uri="{FF2B5EF4-FFF2-40B4-BE49-F238E27FC236}">
-                <a16:creationId xmlns:a16="http://schemas.microsoft.com/office/drawing/2014/main" id="{037F983B-06B8-82E5-960E-0F35700C8237}"/>
-              </a:ext>
-            </a:extLst>
-          </p:cNvPr>
-          <p:cNvSpPr/>
-          <p:nvPr/>
-        </p:nvSpPr>
-        <p:spPr>
-          <a:xfrm>
-            <a:off x="6432072" y="5115464"/>
-            <a:ext cx="1512858" cy="388188"/>
-          </a:xfrm>
-          <a:prstGeom prst="roundRect">
-            <a:avLst/>
-          </a:prstGeom>
-          <a:solidFill>
-            <a:srgbClr val="FFC000">
-              <a:alpha val="24000"/>
-            </a:srgbClr>
-          </a:solidFill>
-          <a:ln>
-            <a:noFill/>
-          </a:ln>
-        </p:spPr>
-        <p:style>
-          <a:lnRef idx="2">
-            <a:schemeClr val="accent1">
-              <a:shade val="50000"/>
-            </a:schemeClr>
-          </a:lnRef>
-          <a:fillRef idx="1">
-            <a:schemeClr val="accent1"/>
-          </a:fillRef>
-          <a:effectRef idx="0">
-            <a:schemeClr val="accent1"/>
-          </a:effectRef>
-          <a:fontRef idx="minor">
-            <a:schemeClr val="lt1"/>
-          </a:fontRef>
-        </p:style>
-        <p:txBody>
-          <a:bodyPr rtlCol="0" anchor="ctr"/>
-          <a:lstStyle/>
-          <a:p>
-            <a:pPr algn="ctr"/>
-            <a:endParaRPr lang="en-US"/>
-          </a:p>
-        </p:txBody>
-      </p:sp>
-    </p:spTree>
-    <p:extLst>
-      <p:ext uri="{BB962C8B-B14F-4D97-AF65-F5344CB8AC3E}">
-        <p14:creationId xmlns:p14="http://schemas.microsoft.com/office/powerpoint/2010/main" val="658783311"/>
-      </p:ext>
-    </p:extLst>
-  </p:cSld>
-  <p:clrMapOvr>
-    <a:masterClrMapping/>
-  </p:clrMapOvr>
-  <p:timing>
-    <p:tnLst>
-      <p:par>
-        <p:cTn id="1" dur="indefinite" restart="never" nodeType="tmRoot">
-          <p:childTnLst>
-            <p:seq concurrent="1" nextAc="seek">
-              <p:cTn id="2" dur="indefinite" nodeType="mainSeq">
-                <p:childTnLst>
-                  <p:par>
-                    <p:cTn id="3" fill="hold">
-                      <p:stCondLst>
-                        <p:cond delay="indefinite"/>
-                        <p:cond evt="onBegin" delay="0">
-                          <p:tn val="2"/>
-                        </p:cond>
-                      </p:stCondLst>
-                      <p:childTnLst>
-                        <p:par>
-                          <p:cTn id="4" fill="hold">
-                            <p:stCondLst>
-                              <p:cond delay="0"/>
-                            </p:stCondLst>
-                            <p:childTnLst>
-                              <p:par>
-                                <p:cTn id="5" presetID="1" presetClass="entr" presetSubtype="0" fill="hold" grpId="0" nodeType="withEffect">
-                                  <p:stCondLst>
-                                    <p:cond delay="0"/>
-                                  </p:stCondLst>
-                                  <p:childTnLst>
-                                    <p:set>
-                                      <p:cBhvr>
-                                        <p:cTn id="6" dur="1" fill="hold">
-                                          <p:stCondLst>
-                                            <p:cond delay="0"/>
-                                          </p:stCondLst>
-                                        </p:cTn>
-                                        <p:tgtEl>
-                                          <p:spTgt spid="3">
-                                            <p:txEl>
-                                              <p:pRg st="0" end="0"/>
-                                            </p:txEl>
-                                          </p:spTgt>
-                                        </p:tgtEl>
-                                        <p:attrNameLst>
-                                          <p:attrName>style.visibility</p:attrName>
-                                        </p:attrNameLst>
-                                      </p:cBhvr>
-                                      <p:to>
-                                        <p:strVal val="visible"/>
-                                      </p:to>
-                                    </p:set>
-                                  </p:childTnLst>
-                                </p:cTn>
-                              </p:par>
-                            </p:childTnLst>
-                          </p:cTn>
-                        </p:par>
-                      </p:childTnLst>
-                    </p:cTn>
-                  </p:par>
-                  <p:par>
-                    <p:cTn id="7" fill="hold">
-                      <p:stCondLst>
-                        <p:cond delay="indefinite"/>
-                      </p:stCondLst>
-                      <p:childTnLst>
-                        <p:par>
-                          <p:cTn id="8" fill="hold">
-                            <p:stCondLst>
-                              <p:cond delay="0"/>
-                            </p:stCondLst>
-                            <p:childTnLst>
-                              <p:par>
-                                <p:cTn id="9" presetID="1" presetClass="entr" presetSubtype="0" fill="hold" grpId="0" nodeType="clickEffect">
-                                  <p:stCondLst>
-                                    <p:cond delay="0"/>
-                                  </p:stCondLst>
-                                  <p:childTnLst>
-                                    <p:set>
-                                      <p:cBhvr>
-                                        <p:cTn id="10" dur="1" fill="hold">
-                                          <p:stCondLst>
-                                            <p:cond delay="0"/>
-                                          </p:stCondLst>
-                                        </p:cTn>
-                                        <p:tgtEl>
-                                          <p:spTgt spid="3">
-                                            <p:txEl>
-                                              <p:pRg st="1" end="1"/>
-                                            </p:txEl>
-                                          </p:spTgt>
-                                        </p:tgtEl>
-                                        <p:attrNameLst>
-                                          <p:attrName>style.visibility</p:attrName>
-                                        </p:attrNameLst>
-                                      </p:cBhvr>
-                                      <p:to>
-                                        <p:strVal val="visible"/>
-                                      </p:to>
-                                    </p:set>
-                                  </p:childTnLst>
-                                </p:cTn>
-                              </p:par>
-                              <p:par>
-                                <p:cTn id="11" presetID="1" presetClass="entr" presetSubtype="0" fill="hold" grpId="0" nodeType="withEffect">
-                                  <p:stCondLst>
-                                    <p:cond delay="0"/>
-                                  </p:stCondLst>
-                                  <p:childTnLst>
-                                    <p:set>
-                                      <p:cBhvr>
-                                        <p:cTn id="12" dur="1" fill="hold">
-                                          <p:stCondLst>
-                                            <p:cond delay="0"/>
-                                          </p:stCondLst>
-                                        </p:cTn>
-                                        <p:tgtEl>
-                                          <p:spTgt spid="3">
-                                            <p:txEl>
-                                              <p:pRg st="2" end="2"/>
-                                            </p:txEl>
-                                          </p:spTgt>
-                                        </p:tgtEl>
-                                        <p:attrNameLst>
-                                          <p:attrName>style.visibility</p:attrName>
-                                        </p:attrNameLst>
-                                      </p:cBhvr>
-                                      <p:to>
-                                        <p:strVal val="visible"/>
-                                      </p:to>
-                                    </p:set>
-                                  </p:childTnLst>
-                                </p:cTn>
-                              </p:par>
-                              <p:par>
-                                <p:cTn id="13" presetID="1" presetClass="entr" presetSubtype="0" fill="hold" grpId="0" nodeType="withEffect">
-                                  <p:stCondLst>
-                                    <p:cond delay="0"/>
-                                  </p:stCondLst>
-                                  <p:childTnLst>
-                                    <p:set>
-                                      <p:cBhvr>
-                                        <p:cTn id="14" dur="1" fill="hold">
-                                          <p:stCondLst>
-                                            <p:cond delay="0"/>
-                                          </p:stCondLst>
-                                        </p:cTn>
-                                        <p:tgtEl>
-                                          <p:spTgt spid="3">
-                                            <p:txEl>
-                                              <p:pRg st="3" end="3"/>
-                                            </p:txEl>
-                                          </p:spTgt>
-                                        </p:tgtEl>
-                                        <p:attrNameLst>
-                                          <p:attrName>style.visibility</p:attrName>
-                                        </p:attrNameLst>
-                                      </p:cBhvr>
-                                      <p:to>
-                                        <p:strVal val="visible"/>
-                                      </p:to>
-                                    </p:set>
-                                  </p:childTnLst>
-                                </p:cTn>
-                              </p:par>
-                            </p:childTnLst>
-                          </p:cTn>
-                        </p:par>
-                      </p:childTnLst>
-                    </p:cTn>
-                  </p:par>
-                  <p:par>
-                    <p:cTn id="15" fill="hold">
-                      <p:stCondLst>
-                        <p:cond delay="indefinite"/>
-                      </p:stCondLst>
-                      <p:childTnLst>
-                        <p:par>
-                          <p:cTn id="16" fill="hold">
-                            <p:stCondLst>
-                              <p:cond delay="0"/>
-                            </p:stCondLst>
-                            <p:childTnLst>
-                              <p:par>
-                                <p:cTn id="17" presetID="1" presetClass="entr" presetSubtype="0" fill="hold" grpId="0" nodeType="clickEffect">
-                                  <p:stCondLst>
-                                    <p:cond delay="0"/>
-                                  </p:stCondLst>
-                                  <p:childTnLst>
-                                    <p:set>
-                                      <p:cBhvr>
-                                        <p:cTn id="18" dur="1" fill="hold">
-                                          <p:stCondLst>
-                                            <p:cond delay="0"/>
-                                          </p:stCondLst>
-                                        </p:cTn>
-                                        <p:tgtEl>
-                                          <p:spTgt spid="3">
-                                            <p:txEl>
-                                              <p:pRg st="4" end="4"/>
-                                            </p:txEl>
-                                          </p:spTgt>
-                                        </p:tgtEl>
-                                        <p:attrNameLst>
-                                          <p:attrName>style.visibility</p:attrName>
-                                        </p:attrNameLst>
-                                      </p:cBhvr>
-                                      <p:to>
-                                        <p:strVal val="visible"/>
-                                      </p:to>
-                                    </p:set>
-                                  </p:childTnLst>
-                                </p:cTn>
-                              </p:par>
-                              <p:par>
-                                <p:cTn id="19" presetID="1" presetClass="entr" presetSubtype="0" fill="hold" grpId="0" nodeType="withEffect">
-                                  <p:stCondLst>
-                                    <p:cond delay="0"/>
-                                  </p:stCondLst>
-                                  <p:childTnLst>
-                                    <p:set>
-                                      <p:cBhvr>
-                                        <p:cTn id="20" dur="1" fill="hold">
-                                          <p:stCondLst>
-                                            <p:cond delay="0"/>
-                                          </p:stCondLst>
-                                        </p:cTn>
-                                        <p:tgtEl>
-                                          <p:spTgt spid="5"/>
-                                        </p:tgtEl>
-                                        <p:attrNameLst>
-                                          <p:attrName>style.visibility</p:attrName>
-                                        </p:attrNameLst>
-                                      </p:cBhvr>
-                                      <p:to>
-                                        <p:strVal val="visible"/>
-                                      </p:to>
-                                    </p:set>
-                                  </p:childTnLst>
-                                </p:cTn>
-                              </p:par>
-                            </p:childTnLst>
-                          </p:cTn>
-                        </p:par>
-                      </p:childTnLst>
-                    </p:cTn>
-                  </p:par>
-                </p:childTnLst>
-              </p:cTn>
-              <p:prevCondLst>
-                <p:cond evt="onPrev" delay="0">
-                  <p:tgtEl>
-                    <p:sldTgt/>
-                  </p:tgtEl>
-                </p:cond>
-              </p:prevCondLst>
-              <p:nextCondLst>
-                <p:cond evt="onNext" delay="0">
-                  <p:tgtEl>
-                    <p:sldTgt/>
-                  </p:tgtEl>
-                </p:cond>
-              </p:nextCondLst>
-            </p:seq>
-          </p:childTnLst>
-        </p:cTn>
-      </p:par>
-    </p:tnLst>
-    <p:bldLst>
-      <p:bldP spid="3" grpId="0" uiExpand="1" build="p"/>
-      <p:bldP spid="5" grpId="0" animBg="1"/>
-    </p:bldLst>
-  </p:timing>
-</p:sld>
-</file>
-
-<file path=ppt/slides/slide50.xml><?xml version="1.0" encoding="utf-8"?>
-<p:sld xmlns:a="http://schemas.openxmlformats.org/drawingml/2006/main" xmlns:r="http://schemas.openxmlformats.org/officeDocument/2006/relationships" xmlns:p="http://schemas.openxmlformats.org/presentationml/2006/main">
-  <p:cSld>
-    <p:spTree>
-      <p:nvGrpSpPr>
-        <p:cNvPr id="1" name=""/>
-        <p:cNvGrpSpPr/>
-        <p:nvPr/>
-      </p:nvGrpSpPr>
-      <p:grpSpPr>
-        <a:xfrm>
-          <a:off x="0" y="0"/>
-          <a:ext cx="0" cy="0"/>
-          <a:chOff x="0" y="0"/>
-          <a:chExt cx="0" cy="0"/>
-        </a:xfrm>
-      </p:grpSpPr>
-      <p:sp>
-        <p:nvSpPr>
-          <p:cNvPr id="2" name="Title 1"/>
-          <p:cNvSpPr>
-            <a:spLocks noGrp="1"/>
-          </p:cNvSpPr>
-          <p:nvPr>
-            <p:ph type="title"/>
-          </p:nvPr>
-        </p:nvSpPr>
-        <p:spPr/>
-        <p:txBody>
-          <a:bodyPr/>
-          <a:lstStyle/>
-          <a:p>
-            <a:r>
-              <a:rPr lang="en-US" dirty="0"/>
-              <a:t>References</a:t>
-            </a:r>
-            <a:endParaRPr lang="nl-BE" dirty="0"/>
-          </a:p>
-        </p:txBody>
-      </p:sp>
-      <p:sp>
-        <p:nvSpPr>
-          <p:cNvPr id="3" name="Content Placeholder 2"/>
-          <p:cNvSpPr>
-            <a:spLocks noGrp="1"/>
-          </p:cNvSpPr>
-          <p:nvPr>
-            <p:ph idx="1"/>
-          </p:nvPr>
-        </p:nvSpPr>
-        <p:spPr/>
-        <p:txBody>
-          <a:bodyPr>
-            <a:normAutofit/>
-          </a:bodyPr>
-          <a:lstStyle/>
-          <a:p>
-            <a:r>
-              <a:rPr lang="en-US" dirty="0"/>
-              <a:t>Singularity documentation</a:t>
-            </a:r>
-            <a:br>
-              <a:rPr lang="en-US" dirty="0"/>
-            </a:br>
-            <a:r>
-              <a:rPr lang="en-US" dirty="0">
-                <a:hlinkClick r:id="rId2"/>
-              </a:rPr>
-              <a:t>https://www.sylabs.io/docs/</a:t>
-            </a:r>
-            <a:r>
-              <a:rPr lang="en-US" dirty="0"/>
-              <a:t> </a:t>
-            </a:r>
-          </a:p>
-          <a:p>
-            <a:pPr lvl="1"/>
-            <a:r>
-              <a:rPr lang="en-US" dirty="0"/>
-              <a:t>User guide</a:t>
-            </a:r>
-          </a:p>
-          <a:p>
-            <a:pPr lvl="1"/>
-            <a:r>
-              <a:rPr lang="en-US" dirty="0"/>
-              <a:t>Admin guide</a:t>
-            </a:r>
-          </a:p>
-          <a:p>
-            <a:r>
-              <a:rPr lang="en-US" dirty="0"/>
-              <a:t>Singularity GitHub repository</a:t>
-            </a:r>
-            <a:br>
-              <a:rPr lang="en-US" dirty="0"/>
-            </a:br>
-            <a:r>
-              <a:rPr lang="en-US" dirty="0">
-                <a:hlinkClick r:id="rId3"/>
-              </a:rPr>
-              <a:t>https://github.com/singularityware/singularity</a:t>
-            </a:r>
-            <a:r>
-              <a:rPr lang="en-US" dirty="0"/>
-              <a:t> </a:t>
-            </a:r>
-          </a:p>
-          <a:p>
-            <a:r>
-              <a:rPr lang="en-US" dirty="0" err="1">
-                <a:hlinkClick r:id="rId4"/>
-              </a:rPr>
-              <a:t>HPCWired</a:t>
-            </a:r>
-            <a:r>
-              <a:rPr lang="en-US" dirty="0">
-                <a:hlinkClick r:id="rId4"/>
-              </a:rPr>
-              <a:t> article</a:t>
-            </a:r>
-            <a:r>
-              <a:rPr lang="en-US" dirty="0"/>
-              <a:t> discussing singularity versus Docker/Shifter</a:t>
-            </a:r>
-            <a:endParaRPr lang="nl-BE" dirty="0"/>
-          </a:p>
-        </p:txBody>
-      </p:sp>
-      <p:sp>
-        <p:nvSpPr>
-          <p:cNvPr id="4" name="Slide Number Placeholder 3"/>
-          <p:cNvSpPr>
-            <a:spLocks noGrp="1"/>
-          </p:cNvSpPr>
-          <p:nvPr>
-            <p:ph type="sldNum" sz="quarter" idx="12"/>
-          </p:nvPr>
-        </p:nvSpPr>
-        <p:spPr/>
-        <p:txBody>
-          <a:bodyPr/>
-          <a:lstStyle/>
-          <a:p>
-            <a:fld id="{AEFF399F-E3B5-4890-BC79-9BC8D4DF3F2D}" type="slidenum">
-              <a:rPr lang="nl-BE" smtClean="0"/>
-              <a:t>50</a:t>
-            </a:fld>
-            <a:endParaRPr lang="nl-BE"/>
-          </a:p>
-        </p:txBody>
-      </p:sp>
-    </p:spTree>
-    <p:extLst>
-      <p:ext uri="{BB962C8B-B14F-4D97-AF65-F5344CB8AC3E}">
-        <p14:creationId xmlns:p14="http://schemas.microsoft.com/office/powerpoint/2010/main" val="3984500910"/>
-      </p:ext>
-    </p:extLst>
-  </p:cSld>
-  <p:clrMapOvr>
-    <a:masterClrMapping/>
-  </p:clrMapOvr>
-</p:sld>
-</file>
-
 <file path=ppt/slides/slide51.xml><?xml version="1.0" encoding="utf-8"?>
 <p:sld xmlns:a="http://schemas.openxmlformats.org/drawingml/2006/main" xmlns:r="http://schemas.openxmlformats.org/officeDocument/2006/relationships" xmlns:p="http://schemas.openxmlformats.org/presentationml/2006/main">
   <p:cSld>
@@ -26361,6 +26737,171 @@
           <a:p>
             <a:r>
               <a:rPr lang="en-US" dirty="0"/>
+              <a:t>References</a:t>
+            </a:r>
+            <a:endParaRPr lang="nl-BE" dirty="0"/>
+          </a:p>
+        </p:txBody>
+      </p:sp>
+      <p:sp>
+        <p:nvSpPr>
+          <p:cNvPr id="3" name="Content Placeholder 2"/>
+          <p:cNvSpPr>
+            <a:spLocks noGrp="1"/>
+          </p:cNvSpPr>
+          <p:nvPr>
+            <p:ph idx="1"/>
+          </p:nvPr>
+        </p:nvSpPr>
+        <p:spPr/>
+        <p:txBody>
+          <a:bodyPr>
+            <a:normAutofit/>
+          </a:bodyPr>
+          <a:lstStyle/>
+          <a:p>
+            <a:r>
+              <a:rPr lang="en-US" dirty="0"/>
+              <a:t>Singularity documentation</a:t>
+            </a:r>
+            <a:br>
+              <a:rPr lang="en-US" dirty="0"/>
+            </a:br>
+            <a:r>
+              <a:rPr lang="en-US" dirty="0">
+                <a:hlinkClick r:id="rId2"/>
+              </a:rPr>
+              <a:t>https://www.sylabs.io/docs/</a:t>
+            </a:r>
+            <a:r>
+              <a:rPr lang="en-US" dirty="0"/>
+              <a:t> </a:t>
+            </a:r>
+          </a:p>
+          <a:p>
+            <a:pPr lvl="1"/>
+            <a:r>
+              <a:rPr lang="en-US" dirty="0"/>
+              <a:t>User guide</a:t>
+            </a:r>
+          </a:p>
+          <a:p>
+            <a:pPr lvl="1"/>
+            <a:r>
+              <a:rPr lang="en-US" dirty="0"/>
+              <a:t>Admin guide</a:t>
+            </a:r>
+          </a:p>
+          <a:p>
+            <a:r>
+              <a:rPr lang="en-US" dirty="0"/>
+              <a:t>Singularity GitHub repository</a:t>
+            </a:r>
+            <a:br>
+              <a:rPr lang="en-US" dirty="0"/>
+            </a:br>
+            <a:r>
+              <a:rPr lang="en-US" dirty="0">
+                <a:hlinkClick r:id="rId3"/>
+              </a:rPr>
+              <a:t>https://github.com/singularityware/singularity</a:t>
+            </a:r>
+            <a:r>
+              <a:rPr lang="en-US" dirty="0"/>
+              <a:t> </a:t>
+            </a:r>
+          </a:p>
+          <a:p>
+            <a:r>
+              <a:rPr lang="en-US" dirty="0" err="1">
+                <a:hlinkClick r:id="rId4"/>
+              </a:rPr>
+              <a:t>HPCWired</a:t>
+            </a:r>
+            <a:r>
+              <a:rPr lang="en-US" dirty="0">
+                <a:hlinkClick r:id="rId4"/>
+              </a:rPr>
+              <a:t> article</a:t>
+            </a:r>
+            <a:r>
+              <a:rPr lang="en-US" dirty="0"/>
+              <a:t> discussing singularity versus Docker/Shifter</a:t>
+            </a:r>
+            <a:endParaRPr lang="nl-BE" dirty="0"/>
+          </a:p>
+        </p:txBody>
+      </p:sp>
+      <p:sp>
+        <p:nvSpPr>
+          <p:cNvPr id="4" name="Slide Number Placeholder 3"/>
+          <p:cNvSpPr>
+            <a:spLocks noGrp="1"/>
+          </p:cNvSpPr>
+          <p:nvPr>
+            <p:ph type="sldNum" sz="quarter" idx="12"/>
+          </p:nvPr>
+        </p:nvSpPr>
+        <p:spPr/>
+        <p:txBody>
+          <a:bodyPr/>
+          <a:lstStyle/>
+          <a:p>
+            <a:fld id="{AEFF399F-E3B5-4890-BC79-9BC8D4DF3F2D}" type="slidenum">
+              <a:rPr lang="nl-BE" smtClean="0"/>
+              <a:t>51</a:t>
+            </a:fld>
+            <a:endParaRPr lang="nl-BE"/>
+          </a:p>
+        </p:txBody>
+      </p:sp>
+    </p:spTree>
+    <p:extLst>
+      <p:ext uri="{BB962C8B-B14F-4D97-AF65-F5344CB8AC3E}">
+        <p14:creationId xmlns:p14="http://schemas.microsoft.com/office/powerpoint/2010/main" val="3984500910"/>
+      </p:ext>
+    </p:extLst>
+  </p:cSld>
+  <p:clrMapOvr>
+    <a:masterClrMapping/>
+  </p:clrMapOvr>
+</p:sld>
+</file>
+
+<file path=ppt/slides/slide52.xml><?xml version="1.0" encoding="utf-8"?>
+<p:sld xmlns:a="http://schemas.openxmlformats.org/drawingml/2006/main" xmlns:r="http://schemas.openxmlformats.org/officeDocument/2006/relationships" xmlns:p="http://schemas.openxmlformats.org/presentationml/2006/main">
+  <p:cSld>
+    <p:spTree>
+      <p:nvGrpSpPr>
+        <p:cNvPr id="1" name=""/>
+        <p:cNvGrpSpPr/>
+        <p:nvPr/>
+      </p:nvGrpSpPr>
+      <p:grpSpPr>
+        <a:xfrm>
+          <a:off x="0" y="0"/>
+          <a:ext cx="0" cy="0"/>
+          <a:chOff x="0" y="0"/>
+          <a:chExt cx="0" cy="0"/>
+        </a:xfrm>
+      </p:grpSpPr>
+      <p:sp>
+        <p:nvSpPr>
+          <p:cNvPr id="2" name="Title 1"/>
+          <p:cNvSpPr>
+            <a:spLocks noGrp="1"/>
+          </p:cNvSpPr>
+          <p:nvPr>
+            <p:ph type="title"/>
+          </p:nvPr>
+        </p:nvSpPr>
+        <p:spPr/>
+        <p:txBody>
+          <a:bodyPr/>
+          <a:lstStyle/>
+          <a:p>
+            <a:r>
+              <a:rPr lang="en-US" dirty="0"/>
               <a:t>Create empty image</a:t>
             </a:r>
             <a:endParaRPr lang="nl-BE" dirty="0"/>
@@ -26639,7 +27180,7 @@
           <a:p>
             <a:fld id="{AEFF399F-E3B5-4890-BC79-9BC8D4DF3F2D}" type="slidenum">
               <a:rPr lang="nl-BE" smtClean="0"/>
-              <a:t>51</a:t>
+              <a:t>52</a:t>
             </a:fld>
             <a:endParaRPr lang="nl-BE"/>
           </a:p>

</xml_diff>

<commit_message>
Restructure slides & fix typos
</commit_message>
<xml_diff>
--- a/singularity.pptx
+++ b/singularity.pptx
@@ -53,12 +53,12 @@
     <p:sldId id="285" r:id="rId44"/>
     <p:sldId id="286" r:id="rId45"/>
     <p:sldId id="287" r:id="rId46"/>
-    <p:sldId id="307" r:id="rId47"/>
-    <p:sldId id="308" r:id="rId48"/>
-    <p:sldId id="272" r:id="rId49"/>
-    <p:sldId id="276" r:id="rId50"/>
-    <p:sldId id="270" r:id="rId51"/>
-    <p:sldId id="277" r:id="rId52"/>
+    <p:sldId id="270" r:id="rId47"/>
+    <p:sldId id="272" r:id="rId48"/>
+    <p:sldId id="276" r:id="rId49"/>
+    <p:sldId id="277" r:id="rId50"/>
+    <p:sldId id="307" r:id="rId51"/>
+    <p:sldId id="308" r:id="rId52"/>
     <p:sldId id="291" r:id="rId53"/>
   </p:sldIdLst>
   <p:sldSz cx="9144000" cy="6858000" type="screen4x3"/>
@@ -224,6 +224,10 @@
             <p14:sldId id="279"/>
             <p14:sldId id="280"/>
             <p14:sldId id="281"/>
+          </p14:sldIdLst>
+        </p14:section>
+        <p14:section name="Services" id="{73BC88DB-DEAD-4A8C-B24B-311D00DBBC0A}">
+          <p14:sldIdLst>
             <p14:sldId id="296"/>
             <p14:sldId id="297"/>
             <p14:sldId id="298"/>
@@ -236,20 +240,20 @@
             <p14:sldId id="285"/>
             <p14:sldId id="286"/>
             <p14:sldId id="287"/>
-            <p14:sldId id="307"/>
-            <p14:sldId id="308"/>
+            <p14:sldId id="270"/>
           </p14:sldIdLst>
         </p14:section>
         <p14:section name="Conclusions" id="{BD187F37-5316-4956-98DF-2B94953326CB}">
           <p14:sldIdLst>
             <p14:sldId id="272"/>
             <p14:sldId id="276"/>
-            <p14:sldId id="270"/>
+            <p14:sldId id="277"/>
           </p14:sldIdLst>
         </p14:section>
         <p14:section name="Appendices" id="{4F11D7B8-8248-4048-BFFA-6A39FFF2C19D}">
           <p14:sldIdLst>
-            <p14:sldId id="277"/>
+            <p14:sldId id="307"/>
+            <p14:sldId id="308"/>
             <p14:sldId id="291"/>
           </p14:sldIdLst>
         </p14:section>
@@ -7332,7 +7336,7 @@
                 <a:latin typeface="Courier New" panose="02070309020205020404" pitchFamily="49" charset="0"/>
                 <a:cs typeface="Courier New" panose="02070309020205020404" pitchFamily="49" charset="0"/>
               </a:rPr>
-              <a:t>singularity run-help</a:t>
+              <a:t>singularity run -help</a:t>
             </a:r>
           </a:p>
         </p:txBody>
@@ -9941,7 +9945,7 @@
         <p:spPr>
           <a:xfrm>
             <a:off x="1242883" y="5574160"/>
-            <a:ext cx="6658233" cy="461665"/>
+            <a:ext cx="6908301" cy="461665"/>
           </a:xfrm>
           <a:prstGeom prst="rect">
             <a:avLst/>
@@ -9964,7 +9968,10 @@
               <a:t>Don't forget to copy dependencies, use </a:t>
             </a:r>
             <a:r>
-              <a:rPr lang="en-US" sz="2400" dirty="0" err="1"/>
+              <a:rPr lang="en-US" sz="2400" dirty="0" err="1">
+                <a:latin typeface="Courier New" panose="02070309020205020404" pitchFamily="49" charset="0"/>
+                <a:cs typeface="Courier New" panose="02070309020205020404" pitchFamily="49" charset="0"/>
+              </a:rPr>
               <a:t>dll</a:t>
             </a:r>
             <a:r>
@@ -11799,7 +11806,7 @@
             <a:pPr lvl="1"/>
             <a:r>
               <a:rPr lang="en-US" dirty="0"/>
-              <a:t>NIVIDIA open source project</a:t>
+              <a:t>NVIDIA open source project</a:t>
             </a:r>
             <a:br>
               <a:rPr lang="en-US" dirty="0"/>
@@ -23438,7 +23445,7 @@
           <a:p>
             <a:r>
               <a:rPr lang="en-US" dirty="0"/>
-              <a:t>Performance</a:t>
+              <a:t>Performance &amp; best practices</a:t>
             </a:r>
             <a:endParaRPr lang="nl-BE" dirty="0"/>
           </a:p>
@@ -24655,13 +24662,7 @@
       </p:grpSpPr>
       <p:sp>
         <p:nvSpPr>
-          <p:cNvPr id="5" name="Title 4">
-            <a:extLst>
-              <a:ext uri="{FF2B5EF4-FFF2-40B4-BE49-F238E27FC236}">
-                <a16:creationId xmlns:a16="http://schemas.microsoft.com/office/drawing/2014/main" id="{9091AECB-7A4E-4CDD-8034-431325CB5480}"/>
-              </a:ext>
-            </a:extLst>
-          </p:cNvPr>
+          <p:cNvPr id="2" name="Title 1"/>
           <p:cNvSpPr>
             <a:spLocks noGrp="1"/>
           </p:cNvSpPr>
@@ -24675,27 +24676,21 @@
           <a:lstStyle/>
           <a:p>
             <a:r>
-              <a:rPr lang="en-US" dirty="0" err="1"/>
-              <a:t>podman</a:t>
-            </a:r>
-            <a:endParaRPr lang="en-US" dirty="0"/>
+              <a:rPr lang="en-US" dirty="0"/>
+              <a:t>Bootstrap best practices</a:t>
+            </a:r>
+            <a:endParaRPr lang="nl-BE" dirty="0"/>
           </a:p>
         </p:txBody>
       </p:sp>
       <p:sp>
         <p:nvSpPr>
-          <p:cNvPr id="6" name="Text Placeholder 5">
-            <a:extLst>
-              <a:ext uri="{FF2B5EF4-FFF2-40B4-BE49-F238E27FC236}">
-                <a16:creationId xmlns:a16="http://schemas.microsoft.com/office/drawing/2014/main" id="{C6E58A0E-B656-4AC9-956C-A89EE4C1B406}"/>
-              </a:ext>
-            </a:extLst>
-          </p:cNvPr>
+          <p:cNvPr id="3" name="Content Placeholder 2"/>
           <p:cNvSpPr>
             <a:spLocks noGrp="1"/>
           </p:cNvSpPr>
           <p:nvPr>
-            <p:ph type="body" idx="1"/>
+            <p:ph idx="1"/>
           </p:nvPr>
         </p:nvSpPr>
         <p:spPr/>
@@ -24703,19 +24698,148 @@
           <a:bodyPr/>
           <a:lstStyle/>
           <a:p>
-            <a:endParaRPr lang="en-US"/>
+            <a:r>
+              <a:rPr lang="en-US" dirty="0"/>
+              <a:t>Install software in default location, not home directory</a:t>
+            </a:r>
+          </a:p>
+          <a:p>
+            <a:r>
+              <a:rPr lang="en-US" dirty="0"/>
+              <a:t>Define environment variables in image's </a:t>
+            </a:r>
+            <a:r>
+              <a:rPr lang="en-BE" dirty="0">
+                <a:latin typeface="Courier New" panose="02070309020205020404" pitchFamily="49" charset="0"/>
+                <a:cs typeface="Courier New" panose="02070309020205020404" pitchFamily="49" charset="0"/>
+              </a:rPr>
+              <a:t>%</a:t>
+            </a:r>
+            <a:r>
+              <a:rPr lang="en-US" dirty="0">
+                <a:latin typeface="Courier New" panose="02070309020205020404" pitchFamily="49" charset="0"/>
+                <a:cs typeface="Courier New" panose="02070309020205020404" pitchFamily="49" charset="0"/>
+              </a:rPr>
+              <a:t>environment</a:t>
+            </a:r>
+          </a:p>
+          <a:p>
+            <a:r>
+              <a:rPr lang="en-US" dirty="0"/>
+              <a:t>Files should be owned by system account, not user</a:t>
+            </a:r>
+          </a:p>
+          <a:p>
+            <a:r>
+              <a:rPr lang="en-US" dirty="0"/>
+              <a:t>Don’t mess with </a:t>
+            </a:r>
+            <a:r>
+              <a:rPr lang="en-US" dirty="0">
+                <a:latin typeface="Courier New" panose="02070309020205020404" pitchFamily="49" charset="0"/>
+                <a:cs typeface="Courier New" panose="02070309020205020404" pitchFamily="49" charset="0"/>
+              </a:rPr>
+              <a:t>/</a:t>
+            </a:r>
+            <a:r>
+              <a:rPr lang="en-US" dirty="0" err="1">
+                <a:latin typeface="Courier New" panose="02070309020205020404" pitchFamily="49" charset="0"/>
+                <a:cs typeface="Courier New" panose="02070309020205020404" pitchFamily="49" charset="0"/>
+              </a:rPr>
+              <a:t>etc</a:t>
+            </a:r>
+            <a:r>
+              <a:rPr lang="en-US" dirty="0">
+                <a:latin typeface="Courier New" panose="02070309020205020404" pitchFamily="49" charset="0"/>
+                <a:cs typeface="Courier New" panose="02070309020205020404" pitchFamily="49" charset="0"/>
+              </a:rPr>
+              <a:t>/</a:t>
+            </a:r>
+            <a:r>
+              <a:rPr lang="en-US" dirty="0" err="1">
+                <a:latin typeface="Courier New" panose="02070309020205020404" pitchFamily="49" charset="0"/>
+                <a:cs typeface="Courier New" panose="02070309020205020404" pitchFamily="49" charset="0"/>
+              </a:rPr>
+              <a:t>passwd</a:t>
+            </a:r>
+            <a:r>
+              <a:rPr lang="en-US" dirty="0"/>
+              <a:t>, </a:t>
+            </a:r>
+            <a:r>
+              <a:rPr lang="en-US" dirty="0">
+                <a:latin typeface="Courier New" panose="02070309020205020404" pitchFamily="49" charset="0"/>
+                <a:cs typeface="Courier New" panose="02070309020205020404" pitchFamily="49" charset="0"/>
+              </a:rPr>
+              <a:t>/</a:t>
+            </a:r>
+            <a:r>
+              <a:rPr lang="en-US" dirty="0" err="1">
+                <a:latin typeface="Courier New" panose="02070309020205020404" pitchFamily="49" charset="0"/>
+                <a:cs typeface="Courier New" panose="02070309020205020404" pitchFamily="49" charset="0"/>
+              </a:rPr>
+              <a:t>etc</a:t>
+            </a:r>
+            <a:r>
+              <a:rPr lang="en-US" dirty="0">
+                <a:latin typeface="Courier New" panose="02070309020205020404" pitchFamily="49" charset="0"/>
+                <a:cs typeface="Courier New" panose="02070309020205020404" pitchFamily="49" charset="0"/>
+              </a:rPr>
+              <a:t>/group</a:t>
+            </a:r>
+            <a:r>
+              <a:rPr lang="en-US" dirty="0"/>
+              <a:t>, </a:t>
+            </a:r>
+            <a:r>
+              <a:rPr lang="en-US" dirty="0">
+                <a:latin typeface="Courier New" panose="02070309020205020404" pitchFamily="49" charset="0"/>
+                <a:cs typeface="Courier New" panose="02070309020205020404" pitchFamily="49" charset="0"/>
+              </a:rPr>
+              <a:t>/</a:t>
+            </a:r>
+            <a:r>
+              <a:rPr lang="en-US" dirty="0" err="1">
+                <a:latin typeface="Courier New" panose="02070309020205020404" pitchFamily="49" charset="0"/>
+                <a:cs typeface="Courier New" panose="02070309020205020404" pitchFamily="49" charset="0"/>
+              </a:rPr>
+              <a:t>etc</a:t>
+            </a:r>
+            <a:r>
+              <a:rPr lang="en-US" dirty="0">
+                <a:latin typeface="Courier New" panose="02070309020205020404" pitchFamily="49" charset="0"/>
+                <a:cs typeface="Courier New" panose="02070309020205020404" pitchFamily="49" charset="0"/>
+              </a:rPr>
+              <a:t>/shadow</a:t>
+            </a:r>
+          </a:p>
+          <a:p>
+            <a:r>
+              <a:rPr lang="en-US" dirty="0"/>
+              <a:t>Do installation via recipe file, </a:t>
+            </a:r>
+            <a:r>
+              <a:rPr lang="en-US" i="1" dirty="0"/>
+              <a:t>not</a:t>
+            </a:r>
+            <a:r>
+              <a:rPr lang="en-US" dirty="0"/>
+              <a:t> by hand</a:t>
+            </a:r>
+          </a:p>
+          <a:p>
+            <a:pPr lvl="1"/>
+            <a:r>
+              <a:rPr lang="en-US" dirty="0"/>
+              <a:t>Better reproducibility</a:t>
+            </a:r>
+            <a:endParaRPr lang="nl-BE" dirty="0"/>
           </a:p>
         </p:txBody>
       </p:sp>
       <p:sp>
         <p:nvSpPr>
-          <p:cNvPr id="4" name="Slide Number Placeholder 3">
-            <a:extLst>
-              <a:ext uri="{FF2B5EF4-FFF2-40B4-BE49-F238E27FC236}">
-                <a16:creationId xmlns:a16="http://schemas.microsoft.com/office/drawing/2014/main" id="{452170FA-B818-48CB-9A82-774DAE2FEC5D}"/>
-              </a:ext>
-            </a:extLst>
-          </p:cNvPr>
+          <p:cNvPr id="4" name="Slide Number Placeholder 3"/>
           <p:cNvSpPr>
             <a:spLocks noGrp="1"/>
           </p:cNvSpPr>
@@ -24739,13 +24863,325 @@
     </p:spTree>
     <p:extLst>
       <p:ext uri="{BB962C8B-B14F-4D97-AF65-F5344CB8AC3E}">
-        <p14:creationId xmlns:p14="http://schemas.microsoft.com/office/powerpoint/2010/main" val="1670907563"/>
+        <p14:creationId xmlns:p14="http://schemas.microsoft.com/office/powerpoint/2010/main" val="1728430184"/>
       </p:ext>
     </p:extLst>
   </p:cSld>
   <p:clrMapOvr>
     <a:masterClrMapping/>
   </p:clrMapOvr>
+  <p:timing>
+    <p:tnLst>
+      <p:par>
+        <p:cTn id="1" dur="indefinite" restart="never" nodeType="tmRoot">
+          <p:childTnLst>
+            <p:seq concurrent="1" nextAc="seek">
+              <p:cTn id="2" dur="indefinite" nodeType="mainSeq">
+                <p:childTnLst>
+                  <p:par>
+                    <p:cTn id="3" fill="hold">
+                      <p:stCondLst>
+                        <p:cond delay="indefinite"/>
+                        <p:cond evt="onBegin" delay="0">
+                          <p:tn val="2"/>
+                        </p:cond>
+                      </p:stCondLst>
+                      <p:childTnLst>
+                        <p:par>
+                          <p:cTn id="4" fill="hold">
+                            <p:stCondLst>
+                              <p:cond delay="0"/>
+                            </p:stCondLst>
+                            <p:childTnLst>
+                              <p:par>
+                                <p:cTn id="5" presetID="1" presetClass="entr" presetSubtype="0" fill="hold" grpId="0" nodeType="withEffect">
+                                  <p:stCondLst>
+                                    <p:cond delay="0"/>
+                                  </p:stCondLst>
+                                  <p:childTnLst>
+                                    <p:set>
+                                      <p:cBhvr>
+                                        <p:cTn id="6" dur="1" fill="hold">
+                                          <p:stCondLst>
+                                            <p:cond delay="0"/>
+                                          </p:stCondLst>
+                                        </p:cTn>
+                                        <p:tgtEl>
+                                          <p:spTgt spid="3">
+                                            <p:txEl>
+                                              <p:pRg st="0" end="0"/>
+                                            </p:txEl>
+                                          </p:spTgt>
+                                        </p:tgtEl>
+                                        <p:attrNameLst>
+                                          <p:attrName>style.visibility</p:attrName>
+                                        </p:attrNameLst>
+                                      </p:cBhvr>
+                                      <p:to>
+                                        <p:strVal val="visible"/>
+                                      </p:to>
+                                    </p:set>
+                                  </p:childTnLst>
+                                </p:cTn>
+                              </p:par>
+                            </p:childTnLst>
+                          </p:cTn>
+                        </p:par>
+                      </p:childTnLst>
+                    </p:cTn>
+                  </p:par>
+                  <p:par>
+                    <p:cTn id="7" fill="hold">
+                      <p:stCondLst>
+                        <p:cond delay="indefinite"/>
+                      </p:stCondLst>
+                      <p:childTnLst>
+                        <p:par>
+                          <p:cTn id="8" fill="hold">
+                            <p:stCondLst>
+                              <p:cond delay="0"/>
+                            </p:stCondLst>
+                            <p:childTnLst>
+                              <p:par>
+                                <p:cTn id="9" presetID="1" presetClass="entr" presetSubtype="0" fill="hold" grpId="0" nodeType="clickEffect">
+                                  <p:stCondLst>
+                                    <p:cond delay="0"/>
+                                  </p:stCondLst>
+                                  <p:childTnLst>
+                                    <p:set>
+                                      <p:cBhvr>
+                                        <p:cTn id="10" dur="1" fill="hold">
+                                          <p:stCondLst>
+                                            <p:cond delay="0"/>
+                                          </p:stCondLst>
+                                        </p:cTn>
+                                        <p:tgtEl>
+                                          <p:spTgt spid="3">
+                                            <p:txEl>
+                                              <p:pRg st="1" end="1"/>
+                                            </p:txEl>
+                                          </p:spTgt>
+                                        </p:tgtEl>
+                                        <p:attrNameLst>
+                                          <p:attrName>style.visibility</p:attrName>
+                                        </p:attrNameLst>
+                                      </p:cBhvr>
+                                      <p:to>
+                                        <p:strVal val="visible"/>
+                                      </p:to>
+                                    </p:set>
+                                  </p:childTnLst>
+                                </p:cTn>
+                              </p:par>
+                            </p:childTnLst>
+                          </p:cTn>
+                        </p:par>
+                      </p:childTnLst>
+                    </p:cTn>
+                  </p:par>
+                  <p:par>
+                    <p:cTn id="11" fill="hold">
+                      <p:stCondLst>
+                        <p:cond delay="indefinite"/>
+                      </p:stCondLst>
+                      <p:childTnLst>
+                        <p:par>
+                          <p:cTn id="12" fill="hold">
+                            <p:stCondLst>
+                              <p:cond delay="0"/>
+                            </p:stCondLst>
+                            <p:childTnLst>
+                              <p:par>
+                                <p:cTn id="13" presetID="1" presetClass="entr" presetSubtype="0" fill="hold" grpId="0" nodeType="clickEffect">
+                                  <p:stCondLst>
+                                    <p:cond delay="0"/>
+                                  </p:stCondLst>
+                                  <p:childTnLst>
+                                    <p:set>
+                                      <p:cBhvr>
+                                        <p:cTn id="14" dur="1" fill="hold">
+                                          <p:stCondLst>
+                                            <p:cond delay="0"/>
+                                          </p:stCondLst>
+                                        </p:cTn>
+                                        <p:tgtEl>
+                                          <p:spTgt spid="3">
+                                            <p:txEl>
+                                              <p:pRg st="2" end="2"/>
+                                            </p:txEl>
+                                          </p:spTgt>
+                                        </p:tgtEl>
+                                        <p:attrNameLst>
+                                          <p:attrName>style.visibility</p:attrName>
+                                        </p:attrNameLst>
+                                      </p:cBhvr>
+                                      <p:to>
+                                        <p:strVal val="visible"/>
+                                      </p:to>
+                                    </p:set>
+                                  </p:childTnLst>
+                                </p:cTn>
+                              </p:par>
+                            </p:childTnLst>
+                          </p:cTn>
+                        </p:par>
+                      </p:childTnLst>
+                    </p:cTn>
+                  </p:par>
+                  <p:par>
+                    <p:cTn id="15" fill="hold">
+                      <p:stCondLst>
+                        <p:cond delay="indefinite"/>
+                      </p:stCondLst>
+                      <p:childTnLst>
+                        <p:par>
+                          <p:cTn id="16" fill="hold">
+                            <p:stCondLst>
+                              <p:cond delay="0"/>
+                            </p:stCondLst>
+                            <p:childTnLst>
+                              <p:par>
+                                <p:cTn id="17" presetID="1" presetClass="entr" presetSubtype="0" fill="hold" grpId="0" nodeType="clickEffect">
+                                  <p:stCondLst>
+                                    <p:cond delay="0"/>
+                                  </p:stCondLst>
+                                  <p:childTnLst>
+                                    <p:set>
+                                      <p:cBhvr>
+                                        <p:cTn id="18" dur="1" fill="hold">
+                                          <p:stCondLst>
+                                            <p:cond delay="0"/>
+                                          </p:stCondLst>
+                                        </p:cTn>
+                                        <p:tgtEl>
+                                          <p:spTgt spid="3">
+                                            <p:txEl>
+                                              <p:pRg st="3" end="3"/>
+                                            </p:txEl>
+                                          </p:spTgt>
+                                        </p:tgtEl>
+                                        <p:attrNameLst>
+                                          <p:attrName>style.visibility</p:attrName>
+                                        </p:attrNameLst>
+                                      </p:cBhvr>
+                                      <p:to>
+                                        <p:strVal val="visible"/>
+                                      </p:to>
+                                    </p:set>
+                                  </p:childTnLst>
+                                </p:cTn>
+                              </p:par>
+                            </p:childTnLst>
+                          </p:cTn>
+                        </p:par>
+                      </p:childTnLst>
+                    </p:cTn>
+                  </p:par>
+                  <p:par>
+                    <p:cTn id="19" fill="hold">
+                      <p:stCondLst>
+                        <p:cond delay="indefinite"/>
+                      </p:stCondLst>
+                      <p:childTnLst>
+                        <p:par>
+                          <p:cTn id="20" fill="hold">
+                            <p:stCondLst>
+                              <p:cond delay="0"/>
+                            </p:stCondLst>
+                            <p:childTnLst>
+                              <p:par>
+                                <p:cTn id="21" presetID="1" presetClass="entr" presetSubtype="0" fill="hold" grpId="0" nodeType="clickEffect">
+                                  <p:stCondLst>
+                                    <p:cond delay="0"/>
+                                  </p:stCondLst>
+                                  <p:childTnLst>
+                                    <p:set>
+                                      <p:cBhvr>
+                                        <p:cTn id="22" dur="1" fill="hold">
+                                          <p:stCondLst>
+                                            <p:cond delay="0"/>
+                                          </p:stCondLst>
+                                        </p:cTn>
+                                        <p:tgtEl>
+                                          <p:spTgt spid="3">
+                                            <p:txEl>
+                                              <p:pRg st="4" end="4"/>
+                                            </p:txEl>
+                                          </p:spTgt>
+                                        </p:tgtEl>
+                                        <p:attrNameLst>
+                                          <p:attrName>style.visibility</p:attrName>
+                                        </p:attrNameLst>
+                                      </p:cBhvr>
+                                      <p:to>
+                                        <p:strVal val="visible"/>
+                                      </p:to>
+                                    </p:set>
+                                  </p:childTnLst>
+                                </p:cTn>
+                              </p:par>
+                              <p:par>
+                                <p:cTn id="23" presetID="1" presetClass="entr" presetSubtype="0" fill="hold" grpId="0" nodeType="withEffect">
+                                  <p:stCondLst>
+                                    <p:cond delay="0"/>
+                                  </p:stCondLst>
+                                  <p:childTnLst>
+                                    <p:set>
+                                      <p:cBhvr>
+                                        <p:cTn id="24" dur="1" fill="hold">
+                                          <p:stCondLst>
+                                            <p:cond delay="0"/>
+                                          </p:stCondLst>
+                                        </p:cTn>
+                                        <p:tgtEl>
+                                          <p:spTgt spid="3">
+                                            <p:txEl>
+                                              <p:pRg st="5" end="5"/>
+                                            </p:txEl>
+                                          </p:spTgt>
+                                        </p:tgtEl>
+                                        <p:attrNameLst>
+                                          <p:attrName>style.visibility</p:attrName>
+                                        </p:attrNameLst>
+                                      </p:cBhvr>
+                                      <p:to>
+                                        <p:strVal val="visible"/>
+                                      </p:to>
+                                    </p:set>
+                                  </p:childTnLst>
+                                </p:cTn>
+                              </p:par>
+                            </p:childTnLst>
+                          </p:cTn>
+                        </p:par>
+                      </p:childTnLst>
+                    </p:cTn>
+                  </p:par>
+                </p:childTnLst>
+              </p:cTn>
+              <p:prevCondLst>
+                <p:cond evt="onPrev" delay="0">
+                  <p:tgtEl>
+                    <p:sldTgt/>
+                  </p:tgtEl>
+                </p:cond>
+              </p:prevCondLst>
+              <p:nextCondLst>
+                <p:cond evt="onNext" delay="0">
+                  <p:tgtEl>
+                    <p:sldTgt/>
+                  </p:tgtEl>
+                </p:cond>
+              </p:nextCondLst>
+            </p:seq>
+          </p:childTnLst>
+        </p:cTn>
+      </p:par>
+    </p:tnLst>
+    <p:bldLst>
+      <p:bldP spid="3" grpId="0" uiExpand="1" build="p"/>
+    </p:bldLst>
+  </p:timing>
 </p:sld>
 </file>
 
@@ -24768,13 +25204,7 @@
       </p:grpSpPr>
       <p:sp>
         <p:nvSpPr>
-          <p:cNvPr id="5" name="Title 4">
-            <a:extLst>
-              <a:ext uri="{FF2B5EF4-FFF2-40B4-BE49-F238E27FC236}">
-                <a16:creationId xmlns:a16="http://schemas.microsoft.com/office/drawing/2014/main" id="{0CEDB9E8-B663-4F3A-A21B-A8783B115314}"/>
-              </a:ext>
-            </a:extLst>
-          </p:cNvPr>
+          <p:cNvPr id="2" name="Title 1"/>
           <p:cNvSpPr>
             <a:spLocks noGrp="1"/>
           </p:cNvSpPr>
@@ -24789,25 +25219,20 @@
           <a:p>
             <a:r>
               <a:rPr lang="en-US" dirty="0"/>
-              <a:t>But I want docker…</a:t>
-            </a:r>
+              <a:t>Conclusions</a:t>
+            </a:r>
+            <a:endParaRPr lang="nl-BE" dirty="0"/>
           </a:p>
         </p:txBody>
       </p:sp>
       <p:sp>
         <p:nvSpPr>
-          <p:cNvPr id="6" name="Content Placeholder 5">
-            <a:extLst>
-              <a:ext uri="{FF2B5EF4-FFF2-40B4-BE49-F238E27FC236}">
-                <a16:creationId xmlns:a16="http://schemas.microsoft.com/office/drawing/2014/main" id="{649BF7E2-9ACC-4E8B-B122-38ECC991897B}"/>
-              </a:ext>
-            </a:extLst>
-          </p:cNvPr>
+          <p:cNvPr id="3" name="Text Placeholder 2"/>
           <p:cNvSpPr>
             <a:spLocks noGrp="1"/>
           </p:cNvSpPr>
           <p:nvPr>
-            <p:ph idx="1"/>
+            <p:ph type="body" idx="1"/>
           </p:nvPr>
         </p:nvSpPr>
         <p:spPr/>
@@ -24815,56 +25240,13 @@
           <a:bodyPr/>
           <a:lstStyle/>
           <a:p>
-            <a:r>
-              <a:rPr lang="en-US" dirty="0" err="1"/>
-              <a:t>podman</a:t>
-            </a:r>
-            <a:endParaRPr lang="en-US" dirty="0"/>
-          </a:p>
-          <a:p>
-            <a:pPr lvl="1"/>
-            <a:r>
-              <a:rPr lang="en-US" dirty="0"/>
-              <a:t>Can build containers without </a:t>
-            </a:r>
-            <a:r>
-              <a:rPr lang="en-US" dirty="0" err="1"/>
-              <a:t>sudo</a:t>
-            </a:r>
-            <a:endParaRPr lang="en-US" dirty="0"/>
-          </a:p>
-          <a:p>
-            <a:pPr lvl="1"/>
-            <a:r>
-              <a:rPr lang="en-US" dirty="0"/>
-              <a:t>Can run rootless containers</a:t>
-            </a:r>
-          </a:p>
-          <a:p>
-            <a:pPr lvl="2"/>
-            <a:r>
-              <a:rPr lang="en-US" dirty="0"/>
-              <a:t>No daemon</a:t>
-            </a:r>
-          </a:p>
-          <a:p>
-            <a:pPr lvl="1"/>
-            <a:r>
-              <a:rPr lang="en-US" dirty="0"/>
-              <a:t>Same commands as docker</a:t>
-            </a:r>
+            <a:endParaRPr lang="nl-BE"/>
           </a:p>
         </p:txBody>
       </p:sp>
       <p:sp>
         <p:nvSpPr>
-          <p:cNvPr id="4" name="Slide Number Placeholder 3">
-            <a:extLst>
-              <a:ext uri="{FF2B5EF4-FFF2-40B4-BE49-F238E27FC236}">
-                <a16:creationId xmlns:a16="http://schemas.microsoft.com/office/drawing/2014/main" id="{1A84113E-F77B-43C6-BF67-2394DEA6519B}"/>
-              </a:ext>
-            </a:extLst>
-          </p:cNvPr>
+          <p:cNvPr id="4" name="Slide Number Placeholder 3"/>
           <p:cNvSpPr>
             <a:spLocks noGrp="1"/>
           </p:cNvSpPr>
@@ -24888,7 +25270,7 @@
     </p:spTree>
     <p:extLst>
       <p:ext uri="{BB962C8B-B14F-4D97-AF65-F5344CB8AC3E}">
-        <p14:creationId xmlns:p14="http://schemas.microsoft.com/office/powerpoint/2010/main" val="1785437508"/>
+        <p14:creationId xmlns:p14="http://schemas.microsoft.com/office/powerpoint/2010/main" val="2192721825"/>
       </p:ext>
     </p:extLst>
   </p:cSld>
@@ -24940,12 +25322,12 @@
       </p:sp>
       <p:sp>
         <p:nvSpPr>
-          <p:cNvPr id="3" name="Text Placeholder 2"/>
+          <p:cNvPr id="3" name="Content Placeholder 2"/>
           <p:cNvSpPr>
             <a:spLocks noGrp="1"/>
           </p:cNvSpPr>
           <p:nvPr>
-            <p:ph type="body" idx="1"/>
+            <p:ph idx="1"/>
           </p:nvPr>
         </p:nvSpPr>
         <p:spPr/>
@@ -24953,7 +25335,81 @@
           <a:bodyPr/>
           <a:lstStyle/>
           <a:p>
-            <a:endParaRPr lang="nl-BE"/>
+            <a:r>
+              <a:rPr lang="en-US" dirty="0"/>
+              <a:t>Singularity advantages</a:t>
+            </a:r>
+          </a:p>
+          <a:p>
+            <a:pPr lvl="1"/>
+            <a:r>
+              <a:rPr lang="en-US" dirty="0"/>
+              <a:t>Portability</a:t>
+            </a:r>
+          </a:p>
+          <a:p>
+            <a:pPr lvl="1"/>
+            <a:r>
+              <a:rPr lang="en-US" dirty="0"/>
+              <a:t>Reproducibility: recipes under version control</a:t>
+            </a:r>
+          </a:p>
+          <a:p>
+            <a:pPr lvl="1"/>
+            <a:r>
+              <a:rPr lang="en-US" dirty="0"/>
+              <a:t>Easily create images</a:t>
+            </a:r>
+          </a:p>
+          <a:p>
+            <a:pPr lvl="1"/>
+            <a:r>
+              <a:rPr lang="en-US" dirty="0"/>
+              <a:t>Integrate images into existing workflows</a:t>
+            </a:r>
+          </a:p>
+          <a:p>
+            <a:pPr lvl="1"/>
+            <a:r>
+              <a:rPr lang="en-US" dirty="0"/>
+              <a:t>No privilege escalation</a:t>
+            </a:r>
+          </a:p>
+          <a:p>
+            <a:pPr lvl="2"/>
+            <a:r>
+              <a:rPr lang="en-US" dirty="0"/>
+              <a:t>Create as root</a:t>
+            </a:r>
+          </a:p>
+          <a:p>
+            <a:pPr lvl="2"/>
+            <a:r>
+              <a:rPr lang="en-US" dirty="0"/>
+              <a:t>Run as user, no </a:t>
+            </a:r>
+            <a:r>
+              <a:rPr lang="en-US" dirty="0" err="1"/>
+              <a:t>sudo</a:t>
+            </a:r>
+            <a:r>
+              <a:rPr lang="en-US" dirty="0"/>
+              <a:t> possible</a:t>
+            </a:r>
+          </a:p>
+          <a:p>
+            <a:pPr lvl="1"/>
+            <a:r>
+              <a:rPr lang="en-US" dirty="0"/>
+              <a:t>Quite reasonable performance/overhead</a:t>
+            </a:r>
+          </a:p>
+          <a:p>
+            <a:r>
+              <a:rPr lang="en-US" dirty="0"/>
+              <a:t>No excuse to run crappy/suboptimal software!</a:t>
+            </a:r>
+            <a:endParaRPr lang="nl-BE" dirty="0"/>
           </a:p>
         </p:txBody>
       </p:sp>
@@ -24975,175 +25431,6 @@
             <a:fld id="{AEFF399F-E3B5-4890-BC79-9BC8D4DF3F2D}" type="slidenum">
               <a:rPr lang="nl-BE" smtClean="0"/>
               <a:t>48</a:t>
-            </a:fld>
-            <a:endParaRPr lang="nl-BE"/>
-          </a:p>
-        </p:txBody>
-      </p:sp>
-    </p:spTree>
-    <p:extLst>
-      <p:ext uri="{BB962C8B-B14F-4D97-AF65-F5344CB8AC3E}">
-        <p14:creationId xmlns:p14="http://schemas.microsoft.com/office/powerpoint/2010/main" val="2192721825"/>
-      </p:ext>
-    </p:extLst>
-  </p:cSld>
-  <p:clrMapOvr>
-    <a:masterClrMapping/>
-  </p:clrMapOvr>
-</p:sld>
-</file>
-
-<file path=ppt/slides/slide49.xml><?xml version="1.0" encoding="utf-8"?>
-<p:sld xmlns:a="http://schemas.openxmlformats.org/drawingml/2006/main" xmlns:r="http://schemas.openxmlformats.org/officeDocument/2006/relationships" xmlns:p="http://schemas.openxmlformats.org/presentationml/2006/main">
-  <p:cSld>
-    <p:spTree>
-      <p:nvGrpSpPr>
-        <p:cNvPr id="1" name=""/>
-        <p:cNvGrpSpPr/>
-        <p:nvPr/>
-      </p:nvGrpSpPr>
-      <p:grpSpPr>
-        <a:xfrm>
-          <a:off x="0" y="0"/>
-          <a:ext cx="0" cy="0"/>
-          <a:chOff x="0" y="0"/>
-          <a:chExt cx="0" cy="0"/>
-        </a:xfrm>
-      </p:grpSpPr>
-      <p:sp>
-        <p:nvSpPr>
-          <p:cNvPr id="2" name="Title 1"/>
-          <p:cNvSpPr>
-            <a:spLocks noGrp="1"/>
-          </p:cNvSpPr>
-          <p:nvPr>
-            <p:ph type="title"/>
-          </p:nvPr>
-        </p:nvSpPr>
-        <p:spPr/>
-        <p:txBody>
-          <a:bodyPr/>
-          <a:lstStyle/>
-          <a:p>
-            <a:r>
-              <a:rPr lang="en-US" dirty="0"/>
-              <a:t>Conclusions</a:t>
-            </a:r>
-            <a:endParaRPr lang="nl-BE" dirty="0"/>
-          </a:p>
-        </p:txBody>
-      </p:sp>
-      <p:sp>
-        <p:nvSpPr>
-          <p:cNvPr id="3" name="Content Placeholder 2"/>
-          <p:cNvSpPr>
-            <a:spLocks noGrp="1"/>
-          </p:cNvSpPr>
-          <p:nvPr>
-            <p:ph idx="1"/>
-          </p:nvPr>
-        </p:nvSpPr>
-        <p:spPr/>
-        <p:txBody>
-          <a:bodyPr/>
-          <a:lstStyle/>
-          <a:p>
-            <a:r>
-              <a:rPr lang="en-US" dirty="0"/>
-              <a:t>Singularity advantages</a:t>
-            </a:r>
-          </a:p>
-          <a:p>
-            <a:pPr lvl="1"/>
-            <a:r>
-              <a:rPr lang="en-US" dirty="0"/>
-              <a:t>Portability</a:t>
-            </a:r>
-          </a:p>
-          <a:p>
-            <a:pPr lvl="1"/>
-            <a:r>
-              <a:rPr lang="en-US" dirty="0"/>
-              <a:t>Reproducibility: recipes under version control</a:t>
-            </a:r>
-          </a:p>
-          <a:p>
-            <a:pPr lvl="1"/>
-            <a:r>
-              <a:rPr lang="en-US" dirty="0"/>
-              <a:t>Easily create images</a:t>
-            </a:r>
-          </a:p>
-          <a:p>
-            <a:pPr lvl="1"/>
-            <a:r>
-              <a:rPr lang="en-US" dirty="0"/>
-              <a:t>Integrate images into existing workflows</a:t>
-            </a:r>
-          </a:p>
-          <a:p>
-            <a:pPr lvl="1"/>
-            <a:r>
-              <a:rPr lang="en-US" dirty="0"/>
-              <a:t>No privilege escalation</a:t>
-            </a:r>
-          </a:p>
-          <a:p>
-            <a:pPr lvl="2"/>
-            <a:r>
-              <a:rPr lang="en-US" dirty="0"/>
-              <a:t>Create as root</a:t>
-            </a:r>
-          </a:p>
-          <a:p>
-            <a:pPr lvl="2"/>
-            <a:r>
-              <a:rPr lang="en-US" dirty="0"/>
-              <a:t>Run as user, no </a:t>
-            </a:r>
-            <a:r>
-              <a:rPr lang="en-US" dirty="0" err="1"/>
-              <a:t>sudo</a:t>
-            </a:r>
-            <a:r>
-              <a:rPr lang="en-US" dirty="0"/>
-              <a:t> possible</a:t>
-            </a:r>
-          </a:p>
-          <a:p>
-            <a:pPr lvl="1"/>
-            <a:r>
-              <a:rPr lang="en-US" dirty="0"/>
-              <a:t>Quite reasonable performance/overhead</a:t>
-            </a:r>
-          </a:p>
-          <a:p>
-            <a:r>
-              <a:rPr lang="en-US" dirty="0"/>
-              <a:t>No excuse to run crappy/suboptimal software!</a:t>
-            </a:r>
-            <a:endParaRPr lang="nl-BE" dirty="0"/>
-          </a:p>
-        </p:txBody>
-      </p:sp>
-      <p:sp>
-        <p:nvSpPr>
-          <p:cNvPr id="4" name="Slide Number Placeholder 3"/>
-          <p:cNvSpPr>
-            <a:spLocks noGrp="1"/>
-          </p:cNvSpPr>
-          <p:nvPr>
-            <p:ph type="sldNum" sz="quarter" idx="12"/>
-          </p:nvPr>
-        </p:nvSpPr>
-        <p:spPr/>
-        <p:txBody>
-          <a:bodyPr/>
-          <a:lstStyle/>
-          <a:p>
-            <a:fld id="{AEFF399F-E3B5-4890-BC79-9BC8D4DF3F2D}" type="slidenum">
-              <a:rPr lang="nl-BE" smtClean="0"/>
-              <a:t>49</a:t>
             </a:fld>
             <a:endParaRPr lang="nl-BE"/>
           </a:p>
@@ -25652,6 +25939,179 @@
 </p:sld>
 </file>
 
+<file path=ppt/slides/slide49.xml><?xml version="1.0" encoding="utf-8"?>
+<p:sld xmlns:a="http://schemas.openxmlformats.org/drawingml/2006/main" xmlns:r="http://schemas.openxmlformats.org/officeDocument/2006/relationships" xmlns:p="http://schemas.openxmlformats.org/presentationml/2006/main">
+  <p:cSld>
+    <p:spTree>
+      <p:nvGrpSpPr>
+        <p:cNvPr id="1" name=""/>
+        <p:cNvGrpSpPr/>
+        <p:nvPr/>
+      </p:nvGrpSpPr>
+      <p:grpSpPr>
+        <a:xfrm>
+          <a:off x="0" y="0"/>
+          <a:ext cx="0" cy="0"/>
+          <a:chOff x="0" y="0"/>
+          <a:chExt cx="0" cy="0"/>
+        </a:xfrm>
+      </p:grpSpPr>
+      <p:sp>
+        <p:nvSpPr>
+          <p:cNvPr id="2" name="Title 1"/>
+          <p:cNvSpPr>
+            <a:spLocks noGrp="1"/>
+          </p:cNvSpPr>
+          <p:nvPr>
+            <p:ph type="title"/>
+          </p:nvPr>
+        </p:nvSpPr>
+        <p:spPr/>
+        <p:txBody>
+          <a:bodyPr/>
+          <a:lstStyle/>
+          <a:p>
+            <a:r>
+              <a:rPr lang="en-US" dirty="0"/>
+              <a:t>References</a:t>
+            </a:r>
+            <a:endParaRPr lang="nl-BE" dirty="0"/>
+          </a:p>
+        </p:txBody>
+      </p:sp>
+      <p:sp>
+        <p:nvSpPr>
+          <p:cNvPr id="3" name="Content Placeholder 2"/>
+          <p:cNvSpPr>
+            <a:spLocks noGrp="1"/>
+          </p:cNvSpPr>
+          <p:nvPr>
+            <p:ph idx="1"/>
+          </p:nvPr>
+        </p:nvSpPr>
+        <p:spPr/>
+        <p:txBody>
+          <a:bodyPr>
+            <a:normAutofit/>
+          </a:bodyPr>
+          <a:lstStyle/>
+          <a:p>
+            <a:r>
+              <a:rPr lang="en-US" dirty="0" err="1"/>
+              <a:t>Apptainer</a:t>
+            </a:r>
+            <a:r>
+              <a:rPr lang="en-US" dirty="0"/>
+              <a:t> documentation</a:t>
+            </a:r>
+            <a:br>
+              <a:rPr lang="en-US" dirty="0"/>
+            </a:br>
+            <a:r>
+              <a:rPr lang="en-US" dirty="0">
+                <a:hlinkClick r:id="rId2"/>
+              </a:rPr>
+              <a:t>https://apptainer.org/docs/</a:t>
+            </a:r>
+            <a:r>
+              <a:rPr lang="en-US" dirty="0"/>
+              <a:t> </a:t>
+            </a:r>
+          </a:p>
+          <a:p>
+            <a:pPr lvl="1"/>
+            <a:r>
+              <a:rPr lang="en-US" dirty="0"/>
+              <a:t>User guide</a:t>
+            </a:r>
+          </a:p>
+          <a:p>
+            <a:pPr lvl="1"/>
+            <a:r>
+              <a:rPr lang="en-US" dirty="0"/>
+              <a:t>Admin guide</a:t>
+            </a:r>
+          </a:p>
+          <a:p>
+            <a:r>
+              <a:rPr lang="en-US" dirty="0" err="1"/>
+              <a:t>Apptainer</a:t>
+            </a:r>
+            <a:r>
+              <a:rPr lang="en-US" dirty="0"/>
+              <a:t> GitHub repository</a:t>
+            </a:r>
+            <a:br>
+              <a:rPr lang="en-US" dirty="0"/>
+            </a:br>
+            <a:r>
+              <a:rPr lang="en-US" dirty="0">
+                <a:hlinkClick r:id="rId3"/>
+              </a:rPr>
+              <a:t>https://github.com/apptainer/apptainer</a:t>
+            </a:r>
+            <a:r>
+              <a:rPr lang="en-US" dirty="0"/>
+              <a:t> </a:t>
+            </a:r>
+          </a:p>
+          <a:p>
+            <a:r>
+              <a:rPr lang="en-US" dirty="0" err="1">
+                <a:hlinkClick r:id="rId4"/>
+              </a:rPr>
+              <a:t>HPCWired</a:t>
+            </a:r>
+            <a:r>
+              <a:rPr lang="en-US" dirty="0">
+                <a:hlinkClick r:id="rId4"/>
+              </a:rPr>
+              <a:t> article</a:t>
+            </a:r>
+            <a:r>
+              <a:rPr lang="en-US" dirty="0"/>
+              <a:t> discussing singularity versus Docker/Shifter</a:t>
+            </a:r>
+            <a:endParaRPr lang="nl-BE" dirty="0"/>
+          </a:p>
+        </p:txBody>
+      </p:sp>
+      <p:sp>
+        <p:nvSpPr>
+          <p:cNvPr id="4" name="Slide Number Placeholder 3"/>
+          <p:cNvSpPr>
+            <a:spLocks noGrp="1"/>
+          </p:cNvSpPr>
+          <p:nvPr>
+            <p:ph type="sldNum" sz="quarter" idx="12"/>
+          </p:nvPr>
+        </p:nvSpPr>
+        <p:spPr/>
+        <p:txBody>
+          <a:bodyPr/>
+          <a:lstStyle/>
+          <a:p>
+            <a:fld id="{AEFF399F-E3B5-4890-BC79-9BC8D4DF3F2D}" type="slidenum">
+              <a:rPr lang="nl-BE" smtClean="0"/>
+              <a:t>49</a:t>
+            </a:fld>
+            <a:endParaRPr lang="nl-BE"/>
+          </a:p>
+        </p:txBody>
+      </p:sp>
+    </p:spTree>
+    <p:extLst>
+      <p:ext uri="{BB962C8B-B14F-4D97-AF65-F5344CB8AC3E}">
+        <p14:creationId xmlns:p14="http://schemas.microsoft.com/office/powerpoint/2010/main" val="3984500910"/>
+      </p:ext>
+    </p:extLst>
+  </p:cSld>
+  <p:clrMapOvr>
+    <a:masterClrMapping/>
+  </p:clrMapOvr>
+</p:sld>
+</file>
+
 <file path=ppt/slides/slide5.xml><?xml version="1.0" encoding="utf-8"?>
 <p:sld xmlns:a="http://schemas.openxmlformats.org/drawingml/2006/main" xmlns:r="http://schemas.openxmlformats.org/officeDocument/2006/relationships" xmlns:p="http://schemas.openxmlformats.org/presentationml/2006/main">
   <p:cSld>
@@ -26180,7 +26640,13 @@
       </p:grpSpPr>
       <p:sp>
         <p:nvSpPr>
-          <p:cNvPr id="2" name="Title 1"/>
+          <p:cNvPr id="5" name="Title 4">
+            <a:extLst>
+              <a:ext uri="{FF2B5EF4-FFF2-40B4-BE49-F238E27FC236}">
+                <a16:creationId xmlns:a16="http://schemas.microsoft.com/office/drawing/2014/main" id="{9091AECB-7A4E-4CDD-8034-431325CB5480}"/>
+              </a:ext>
+            </a:extLst>
+          </p:cNvPr>
           <p:cNvSpPr>
             <a:spLocks noGrp="1"/>
           </p:cNvSpPr>
@@ -26194,21 +26660,27 @@
           <a:lstStyle/>
           <a:p>
             <a:r>
-              <a:rPr lang="en-US" dirty="0"/>
-              <a:t>Bootstrap best practices</a:t>
-            </a:r>
-            <a:endParaRPr lang="nl-BE" dirty="0"/>
+              <a:rPr lang="en-US" dirty="0" err="1"/>
+              <a:t>podman</a:t>
+            </a:r>
+            <a:endParaRPr lang="en-US" dirty="0"/>
           </a:p>
         </p:txBody>
       </p:sp>
       <p:sp>
         <p:nvSpPr>
-          <p:cNvPr id="3" name="Content Placeholder 2"/>
+          <p:cNvPr id="6" name="Text Placeholder 5">
+            <a:extLst>
+              <a:ext uri="{FF2B5EF4-FFF2-40B4-BE49-F238E27FC236}">
+                <a16:creationId xmlns:a16="http://schemas.microsoft.com/office/drawing/2014/main" id="{C6E58A0E-B656-4AC9-956C-A89EE4C1B406}"/>
+              </a:ext>
+            </a:extLst>
+          </p:cNvPr>
           <p:cNvSpPr>
             <a:spLocks noGrp="1"/>
           </p:cNvSpPr>
           <p:nvPr>
-            <p:ph idx="1"/>
+            <p:ph type="body" idx="1"/>
           </p:nvPr>
         </p:nvSpPr>
         <p:spPr/>
@@ -26216,148 +26688,19 @@
           <a:bodyPr/>
           <a:lstStyle/>
           <a:p>
-            <a:r>
-              <a:rPr lang="en-US" dirty="0"/>
-              <a:t>Install software in default location, not home directory</a:t>
-            </a:r>
-          </a:p>
-          <a:p>
-            <a:r>
-              <a:rPr lang="en-US" dirty="0"/>
-              <a:t>Define environment variables in image's </a:t>
-            </a:r>
-            <a:r>
-              <a:rPr lang="en-BE" dirty="0">
-                <a:latin typeface="Courier New" panose="02070309020205020404" pitchFamily="49" charset="0"/>
-                <a:cs typeface="Courier New" panose="02070309020205020404" pitchFamily="49" charset="0"/>
-              </a:rPr>
-              <a:t>%</a:t>
-            </a:r>
-            <a:r>
-              <a:rPr lang="en-US" dirty="0">
-                <a:latin typeface="Courier New" panose="02070309020205020404" pitchFamily="49" charset="0"/>
-                <a:cs typeface="Courier New" panose="02070309020205020404" pitchFamily="49" charset="0"/>
-              </a:rPr>
-              <a:t>environment</a:t>
-            </a:r>
-          </a:p>
-          <a:p>
-            <a:r>
-              <a:rPr lang="en-US" dirty="0"/>
-              <a:t>Files should be owned by system account, not user</a:t>
-            </a:r>
-          </a:p>
-          <a:p>
-            <a:r>
-              <a:rPr lang="en-US" dirty="0"/>
-              <a:t>Don’t mess with </a:t>
-            </a:r>
-            <a:r>
-              <a:rPr lang="en-US" dirty="0">
-                <a:latin typeface="Courier New" panose="02070309020205020404" pitchFamily="49" charset="0"/>
-                <a:cs typeface="Courier New" panose="02070309020205020404" pitchFamily="49" charset="0"/>
-              </a:rPr>
-              <a:t>/</a:t>
-            </a:r>
-            <a:r>
-              <a:rPr lang="en-US" dirty="0" err="1">
-                <a:latin typeface="Courier New" panose="02070309020205020404" pitchFamily="49" charset="0"/>
-                <a:cs typeface="Courier New" panose="02070309020205020404" pitchFamily="49" charset="0"/>
-              </a:rPr>
-              <a:t>etc</a:t>
-            </a:r>
-            <a:r>
-              <a:rPr lang="en-US" dirty="0">
-                <a:latin typeface="Courier New" panose="02070309020205020404" pitchFamily="49" charset="0"/>
-                <a:cs typeface="Courier New" panose="02070309020205020404" pitchFamily="49" charset="0"/>
-              </a:rPr>
-              <a:t>/</a:t>
-            </a:r>
-            <a:r>
-              <a:rPr lang="en-US" dirty="0" err="1">
-                <a:latin typeface="Courier New" panose="02070309020205020404" pitchFamily="49" charset="0"/>
-                <a:cs typeface="Courier New" panose="02070309020205020404" pitchFamily="49" charset="0"/>
-              </a:rPr>
-              <a:t>passwd</a:t>
-            </a:r>
-            <a:r>
-              <a:rPr lang="en-US" dirty="0"/>
-              <a:t>, </a:t>
-            </a:r>
-            <a:r>
-              <a:rPr lang="en-US" dirty="0">
-                <a:latin typeface="Courier New" panose="02070309020205020404" pitchFamily="49" charset="0"/>
-                <a:cs typeface="Courier New" panose="02070309020205020404" pitchFamily="49" charset="0"/>
-              </a:rPr>
-              <a:t>/</a:t>
-            </a:r>
-            <a:r>
-              <a:rPr lang="en-US" dirty="0" err="1">
-                <a:latin typeface="Courier New" panose="02070309020205020404" pitchFamily="49" charset="0"/>
-                <a:cs typeface="Courier New" panose="02070309020205020404" pitchFamily="49" charset="0"/>
-              </a:rPr>
-              <a:t>etc</a:t>
-            </a:r>
-            <a:r>
-              <a:rPr lang="en-US" dirty="0">
-                <a:latin typeface="Courier New" panose="02070309020205020404" pitchFamily="49" charset="0"/>
-                <a:cs typeface="Courier New" panose="02070309020205020404" pitchFamily="49" charset="0"/>
-              </a:rPr>
-              <a:t>/group</a:t>
-            </a:r>
-            <a:r>
-              <a:rPr lang="en-US" dirty="0"/>
-              <a:t>, </a:t>
-            </a:r>
-            <a:r>
-              <a:rPr lang="en-US" dirty="0">
-                <a:latin typeface="Courier New" panose="02070309020205020404" pitchFamily="49" charset="0"/>
-                <a:cs typeface="Courier New" panose="02070309020205020404" pitchFamily="49" charset="0"/>
-              </a:rPr>
-              <a:t>/</a:t>
-            </a:r>
-            <a:r>
-              <a:rPr lang="en-US" dirty="0" err="1">
-                <a:latin typeface="Courier New" panose="02070309020205020404" pitchFamily="49" charset="0"/>
-                <a:cs typeface="Courier New" panose="02070309020205020404" pitchFamily="49" charset="0"/>
-              </a:rPr>
-              <a:t>etc</a:t>
-            </a:r>
-            <a:r>
-              <a:rPr lang="en-US" dirty="0">
-                <a:latin typeface="Courier New" panose="02070309020205020404" pitchFamily="49" charset="0"/>
-                <a:cs typeface="Courier New" panose="02070309020205020404" pitchFamily="49" charset="0"/>
-              </a:rPr>
-              <a:t>/shadow</a:t>
-            </a:r>
-          </a:p>
-          <a:p>
-            <a:r>
-              <a:rPr lang="en-US" dirty="0"/>
-              <a:t>Do installation via recipe file, </a:t>
-            </a:r>
-            <a:r>
-              <a:rPr lang="en-US" i="1" dirty="0"/>
-              <a:t>not</a:t>
-            </a:r>
-            <a:r>
-              <a:rPr lang="en-US" dirty="0"/>
-              <a:t> by hand</a:t>
-            </a:r>
-          </a:p>
-          <a:p>
-            <a:pPr lvl="1"/>
-            <a:r>
-              <a:rPr lang="en-US" dirty="0"/>
-              <a:t>Better reproducibility</a:t>
-            </a:r>
-            <a:endParaRPr lang="nl-BE" dirty="0"/>
+            <a:endParaRPr lang="en-US"/>
           </a:p>
         </p:txBody>
       </p:sp>
       <p:sp>
         <p:nvSpPr>
-          <p:cNvPr id="4" name="Slide Number Placeholder 3"/>
+          <p:cNvPr id="4" name="Slide Number Placeholder 3">
+            <a:extLst>
+              <a:ext uri="{FF2B5EF4-FFF2-40B4-BE49-F238E27FC236}">
+                <a16:creationId xmlns:a16="http://schemas.microsoft.com/office/drawing/2014/main" id="{452170FA-B818-48CB-9A82-774DAE2FEC5D}"/>
+              </a:ext>
+            </a:extLst>
+          </p:cNvPr>
           <p:cNvSpPr>
             <a:spLocks noGrp="1"/>
           </p:cNvSpPr>
@@ -26381,325 +26724,13 @@
     </p:spTree>
     <p:extLst>
       <p:ext uri="{BB962C8B-B14F-4D97-AF65-F5344CB8AC3E}">
-        <p14:creationId xmlns:p14="http://schemas.microsoft.com/office/powerpoint/2010/main" val="1728430184"/>
+        <p14:creationId xmlns:p14="http://schemas.microsoft.com/office/powerpoint/2010/main" val="1670907563"/>
       </p:ext>
     </p:extLst>
   </p:cSld>
   <p:clrMapOvr>
     <a:masterClrMapping/>
   </p:clrMapOvr>
-  <p:timing>
-    <p:tnLst>
-      <p:par>
-        <p:cTn id="1" dur="indefinite" restart="never" nodeType="tmRoot">
-          <p:childTnLst>
-            <p:seq concurrent="1" nextAc="seek">
-              <p:cTn id="2" dur="indefinite" nodeType="mainSeq">
-                <p:childTnLst>
-                  <p:par>
-                    <p:cTn id="3" fill="hold">
-                      <p:stCondLst>
-                        <p:cond delay="indefinite"/>
-                        <p:cond evt="onBegin" delay="0">
-                          <p:tn val="2"/>
-                        </p:cond>
-                      </p:stCondLst>
-                      <p:childTnLst>
-                        <p:par>
-                          <p:cTn id="4" fill="hold">
-                            <p:stCondLst>
-                              <p:cond delay="0"/>
-                            </p:stCondLst>
-                            <p:childTnLst>
-                              <p:par>
-                                <p:cTn id="5" presetID="1" presetClass="entr" presetSubtype="0" fill="hold" grpId="0" nodeType="withEffect">
-                                  <p:stCondLst>
-                                    <p:cond delay="0"/>
-                                  </p:stCondLst>
-                                  <p:childTnLst>
-                                    <p:set>
-                                      <p:cBhvr>
-                                        <p:cTn id="6" dur="1" fill="hold">
-                                          <p:stCondLst>
-                                            <p:cond delay="0"/>
-                                          </p:stCondLst>
-                                        </p:cTn>
-                                        <p:tgtEl>
-                                          <p:spTgt spid="3">
-                                            <p:txEl>
-                                              <p:pRg st="0" end="0"/>
-                                            </p:txEl>
-                                          </p:spTgt>
-                                        </p:tgtEl>
-                                        <p:attrNameLst>
-                                          <p:attrName>style.visibility</p:attrName>
-                                        </p:attrNameLst>
-                                      </p:cBhvr>
-                                      <p:to>
-                                        <p:strVal val="visible"/>
-                                      </p:to>
-                                    </p:set>
-                                  </p:childTnLst>
-                                </p:cTn>
-                              </p:par>
-                            </p:childTnLst>
-                          </p:cTn>
-                        </p:par>
-                      </p:childTnLst>
-                    </p:cTn>
-                  </p:par>
-                  <p:par>
-                    <p:cTn id="7" fill="hold">
-                      <p:stCondLst>
-                        <p:cond delay="indefinite"/>
-                      </p:stCondLst>
-                      <p:childTnLst>
-                        <p:par>
-                          <p:cTn id="8" fill="hold">
-                            <p:stCondLst>
-                              <p:cond delay="0"/>
-                            </p:stCondLst>
-                            <p:childTnLst>
-                              <p:par>
-                                <p:cTn id="9" presetID="1" presetClass="entr" presetSubtype="0" fill="hold" grpId="0" nodeType="clickEffect">
-                                  <p:stCondLst>
-                                    <p:cond delay="0"/>
-                                  </p:stCondLst>
-                                  <p:childTnLst>
-                                    <p:set>
-                                      <p:cBhvr>
-                                        <p:cTn id="10" dur="1" fill="hold">
-                                          <p:stCondLst>
-                                            <p:cond delay="0"/>
-                                          </p:stCondLst>
-                                        </p:cTn>
-                                        <p:tgtEl>
-                                          <p:spTgt spid="3">
-                                            <p:txEl>
-                                              <p:pRg st="1" end="1"/>
-                                            </p:txEl>
-                                          </p:spTgt>
-                                        </p:tgtEl>
-                                        <p:attrNameLst>
-                                          <p:attrName>style.visibility</p:attrName>
-                                        </p:attrNameLst>
-                                      </p:cBhvr>
-                                      <p:to>
-                                        <p:strVal val="visible"/>
-                                      </p:to>
-                                    </p:set>
-                                  </p:childTnLst>
-                                </p:cTn>
-                              </p:par>
-                            </p:childTnLst>
-                          </p:cTn>
-                        </p:par>
-                      </p:childTnLst>
-                    </p:cTn>
-                  </p:par>
-                  <p:par>
-                    <p:cTn id="11" fill="hold">
-                      <p:stCondLst>
-                        <p:cond delay="indefinite"/>
-                      </p:stCondLst>
-                      <p:childTnLst>
-                        <p:par>
-                          <p:cTn id="12" fill="hold">
-                            <p:stCondLst>
-                              <p:cond delay="0"/>
-                            </p:stCondLst>
-                            <p:childTnLst>
-                              <p:par>
-                                <p:cTn id="13" presetID="1" presetClass="entr" presetSubtype="0" fill="hold" grpId="0" nodeType="clickEffect">
-                                  <p:stCondLst>
-                                    <p:cond delay="0"/>
-                                  </p:stCondLst>
-                                  <p:childTnLst>
-                                    <p:set>
-                                      <p:cBhvr>
-                                        <p:cTn id="14" dur="1" fill="hold">
-                                          <p:stCondLst>
-                                            <p:cond delay="0"/>
-                                          </p:stCondLst>
-                                        </p:cTn>
-                                        <p:tgtEl>
-                                          <p:spTgt spid="3">
-                                            <p:txEl>
-                                              <p:pRg st="2" end="2"/>
-                                            </p:txEl>
-                                          </p:spTgt>
-                                        </p:tgtEl>
-                                        <p:attrNameLst>
-                                          <p:attrName>style.visibility</p:attrName>
-                                        </p:attrNameLst>
-                                      </p:cBhvr>
-                                      <p:to>
-                                        <p:strVal val="visible"/>
-                                      </p:to>
-                                    </p:set>
-                                  </p:childTnLst>
-                                </p:cTn>
-                              </p:par>
-                            </p:childTnLst>
-                          </p:cTn>
-                        </p:par>
-                      </p:childTnLst>
-                    </p:cTn>
-                  </p:par>
-                  <p:par>
-                    <p:cTn id="15" fill="hold">
-                      <p:stCondLst>
-                        <p:cond delay="indefinite"/>
-                      </p:stCondLst>
-                      <p:childTnLst>
-                        <p:par>
-                          <p:cTn id="16" fill="hold">
-                            <p:stCondLst>
-                              <p:cond delay="0"/>
-                            </p:stCondLst>
-                            <p:childTnLst>
-                              <p:par>
-                                <p:cTn id="17" presetID="1" presetClass="entr" presetSubtype="0" fill="hold" grpId="0" nodeType="clickEffect">
-                                  <p:stCondLst>
-                                    <p:cond delay="0"/>
-                                  </p:stCondLst>
-                                  <p:childTnLst>
-                                    <p:set>
-                                      <p:cBhvr>
-                                        <p:cTn id="18" dur="1" fill="hold">
-                                          <p:stCondLst>
-                                            <p:cond delay="0"/>
-                                          </p:stCondLst>
-                                        </p:cTn>
-                                        <p:tgtEl>
-                                          <p:spTgt spid="3">
-                                            <p:txEl>
-                                              <p:pRg st="3" end="3"/>
-                                            </p:txEl>
-                                          </p:spTgt>
-                                        </p:tgtEl>
-                                        <p:attrNameLst>
-                                          <p:attrName>style.visibility</p:attrName>
-                                        </p:attrNameLst>
-                                      </p:cBhvr>
-                                      <p:to>
-                                        <p:strVal val="visible"/>
-                                      </p:to>
-                                    </p:set>
-                                  </p:childTnLst>
-                                </p:cTn>
-                              </p:par>
-                            </p:childTnLst>
-                          </p:cTn>
-                        </p:par>
-                      </p:childTnLst>
-                    </p:cTn>
-                  </p:par>
-                  <p:par>
-                    <p:cTn id="19" fill="hold">
-                      <p:stCondLst>
-                        <p:cond delay="indefinite"/>
-                      </p:stCondLst>
-                      <p:childTnLst>
-                        <p:par>
-                          <p:cTn id="20" fill="hold">
-                            <p:stCondLst>
-                              <p:cond delay="0"/>
-                            </p:stCondLst>
-                            <p:childTnLst>
-                              <p:par>
-                                <p:cTn id="21" presetID="1" presetClass="entr" presetSubtype="0" fill="hold" grpId="0" nodeType="clickEffect">
-                                  <p:stCondLst>
-                                    <p:cond delay="0"/>
-                                  </p:stCondLst>
-                                  <p:childTnLst>
-                                    <p:set>
-                                      <p:cBhvr>
-                                        <p:cTn id="22" dur="1" fill="hold">
-                                          <p:stCondLst>
-                                            <p:cond delay="0"/>
-                                          </p:stCondLst>
-                                        </p:cTn>
-                                        <p:tgtEl>
-                                          <p:spTgt spid="3">
-                                            <p:txEl>
-                                              <p:pRg st="4" end="4"/>
-                                            </p:txEl>
-                                          </p:spTgt>
-                                        </p:tgtEl>
-                                        <p:attrNameLst>
-                                          <p:attrName>style.visibility</p:attrName>
-                                        </p:attrNameLst>
-                                      </p:cBhvr>
-                                      <p:to>
-                                        <p:strVal val="visible"/>
-                                      </p:to>
-                                    </p:set>
-                                  </p:childTnLst>
-                                </p:cTn>
-                              </p:par>
-                              <p:par>
-                                <p:cTn id="23" presetID="1" presetClass="entr" presetSubtype="0" fill="hold" grpId="0" nodeType="withEffect">
-                                  <p:stCondLst>
-                                    <p:cond delay="0"/>
-                                  </p:stCondLst>
-                                  <p:childTnLst>
-                                    <p:set>
-                                      <p:cBhvr>
-                                        <p:cTn id="24" dur="1" fill="hold">
-                                          <p:stCondLst>
-                                            <p:cond delay="0"/>
-                                          </p:stCondLst>
-                                        </p:cTn>
-                                        <p:tgtEl>
-                                          <p:spTgt spid="3">
-                                            <p:txEl>
-                                              <p:pRg st="5" end="5"/>
-                                            </p:txEl>
-                                          </p:spTgt>
-                                        </p:tgtEl>
-                                        <p:attrNameLst>
-                                          <p:attrName>style.visibility</p:attrName>
-                                        </p:attrNameLst>
-                                      </p:cBhvr>
-                                      <p:to>
-                                        <p:strVal val="visible"/>
-                                      </p:to>
-                                    </p:set>
-                                  </p:childTnLst>
-                                </p:cTn>
-                              </p:par>
-                            </p:childTnLst>
-                          </p:cTn>
-                        </p:par>
-                      </p:childTnLst>
-                    </p:cTn>
-                  </p:par>
-                </p:childTnLst>
-              </p:cTn>
-              <p:prevCondLst>
-                <p:cond evt="onPrev" delay="0">
-                  <p:tgtEl>
-                    <p:sldTgt/>
-                  </p:tgtEl>
-                </p:cond>
-              </p:prevCondLst>
-              <p:nextCondLst>
-                <p:cond evt="onNext" delay="0">
-                  <p:tgtEl>
-                    <p:sldTgt/>
-                  </p:tgtEl>
-                </p:cond>
-              </p:nextCondLst>
-            </p:seq>
-          </p:childTnLst>
-        </p:cTn>
-      </p:par>
-    </p:tnLst>
-    <p:bldLst>
-      <p:bldP spid="3" grpId="0" uiExpand="1" build="p"/>
-    </p:bldLst>
-  </p:timing>
 </p:sld>
 </file>
 
@@ -26722,7 +26753,13 @@
       </p:grpSpPr>
       <p:sp>
         <p:nvSpPr>
-          <p:cNvPr id="2" name="Title 1"/>
+          <p:cNvPr id="5" name="Title 4">
+            <a:extLst>
+              <a:ext uri="{FF2B5EF4-FFF2-40B4-BE49-F238E27FC236}">
+                <a16:creationId xmlns:a16="http://schemas.microsoft.com/office/drawing/2014/main" id="{0CEDB9E8-B663-4F3A-A21B-A8783B115314}"/>
+              </a:ext>
+            </a:extLst>
+          </p:cNvPr>
           <p:cNvSpPr>
             <a:spLocks noGrp="1"/>
           </p:cNvSpPr>
@@ -26737,15 +26774,20 @@
           <a:p>
             <a:r>
               <a:rPr lang="en-US" dirty="0"/>
-              <a:t>References</a:t>
-            </a:r>
-            <a:endParaRPr lang="nl-BE" dirty="0"/>
+              <a:t>But I want docker…</a:t>
+            </a:r>
           </a:p>
         </p:txBody>
       </p:sp>
       <p:sp>
         <p:nvSpPr>
-          <p:cNvPr id="3" name="Content Placeholder 2"/>
+          <p:cNvPr id="6" name="Content Placeholder 5">
+            <a:extLst>
+              <a:ext uri="{FF2B5EF4-FFF2-40B4-BE49-F238E27FC236}">
+                <a16:creationId xmlns:a16="http://schemas.microsoft.com/office/drawing/2014/main" id="{649BF7E2-9ACC-4E8B-B122-38ECC991897B}"/>
+              </a:ext>
+            </a:extLst>
+          </p:cNvPr>
           <p:cNvSpPr>
             <a:spLocks noGrp="1"/>
           </p:cNvSpPr>
@@ -26755,94 +26797,59 @@
         </p:nvSpPr>
         <p:spPr/>
         <p:txBody>
-          <a:bodyPr>
-            <a:normAutofit/>
-          </a:bodyPr>
+          <a:bodyPr/>
           <a:lstStyle/>
           <a:p>
             <a:r>
               <a:rPr lang="en-US" dirty="0" err="1"/>
-              <a:t>Apptainer</a:t>
-            </a:r>
+              <a:t>podman</a:t>
+            </a:r>
+            <a:endParaRPr lang="en-US" dirty="0"/>
+          </a:p>
+          <a:p>
+            <a:pPr lvl="1"/>
             <a:r>
               <a:rPr lang="en-US" dirty="0"/>
-              <a:t> documentation</a:t>
-            </a:r>
-            <a:br>
+              <a:t>Can build containers without </a:t>
+            </a:r>
+            <a:r>
+              <a:rPr lang="en-US" dirty="0" err="1"/>
+              <a:t>sudo</a:t>
+            </a:r>
+            <a:endParaRPr lang="en-US" dirty="0"/>
+          </a:p>
+          <a:p>
+            <a:pPr lvl="1"/>
+            <a:r>
               <a:rPr lang="en-US" dirty="0"/>
-            </a:br>
-            <a:r>
-              <a:rPr lang="en-US" dirty="0">
-                <a:hlinkClick r:id="rId2"/>
-              </a:rPr>
-              <a:t>https://apptainer.org/docs/</a:t>
-            </a:r>
+              <a:t>Can run rootless containers</a:t>
+            </a:r>
+          </a:p>
+          <a:p>
+            <a:pPr lvl="2"/>
             <a:r>
               <a:rPr lang="en-US" dirty="0"/>
-              <a:t> </a:t>
+              <a:t>No daemon</a:t>
             </a:r>
           </a:p>
           <a:p>
             <a:pPr lvl="1"/>
             <a:r>
               <a:rPr lang="en-US" dirty="0"/>
-              <a:t>User guide</a:t>
-            </a:r>
-          </a:p>
-          <a:p>
-            <a:pPr lvl="1"/>
-            <a:r>
-              <a:rPr lang="en-US" dirty="0"/>
-              <a:t>Admin guide</a:t>
-            </a:r>
-          </a:p>
-          <a:p>
-            <a:r>
-              <a:rPr lang="en-US" dirty="0" err="1"/>
-              <a:t>Apptainer</a:t>
-            </a:r>
-            <a:r>
-              <a:rPr lang="en-US" dirty="0"/>
-              <a:t> GitHub repository</a:t>
-            </a:r>
-            <a:br>
-              <a:rPr lang="en-US" dirty="0"/>
-            </a:br>
-            <a:r>
-              <a:rPr lang="en-US" dirty="0">
-                <a:hlinkClick r:id="rId3"/>
-              </a:rPr>
-              <a:t>https://github.com/apptainer/apptainer</a:t>
-            </a:r>
-            <a:r>
-              <a:rPr lang="en-US" dirty="0"/>
-              <a:t> </a:t>
-            </a:r>
-          </a:p>
-          <a:p>
-            <a:r>
-              <a:rPr lang="en-US" dirty="0" err="1">
-                <a:hlinkClick r:id="rId4"/>
-              </a:rPr>
-              <a:t>HPCWired</a:t>
-            </a:r>
-            <a:r>
-              <a:rPr lang="en-US" dirty="0">
-                <a:hlinkClick r:id="rId4"/>
-              </a:rPr>
-              <a:t> article</a:t>
-            </a:r>
-            <a:r>
-              <a:rPr lang="en-US" dirty="0"/>
-              <a:t> discussing singularity versus Docker/Shifter</a:t>
-            </a:r>
-            <a:endParaRPr lang="nl-BE" dirty="0"/>
+              <a:t>Same commands as docker</a:t>
+            </a:r>
           </a:p>
         </p:txBody>
       </p:sp>
       <p:sp>
         <p:nvSpPr>
-          <p:cNvPr id="4" name="Slide Number Placeholder 3"/>
+          <p:cNvPr id="4" name="Slide Number Placeholder 3">
+            <a:extLst>
+              <a:ext uri="{FF2B5EF4-FFF2-40B4-BE49-F238E27FC236}">
+                <a16:creationId xmlns:a16="http://schemas.microsoft.com/office/drawing/2014/main" id="{1A84113E-F77B-43C6-BF67-2394DEA6519B}"/>
+              </a:ext>
+            </a:extLst>
+          </p:cNvPr>
           <p:cNvSpPr>
             <a:spLocks noGrp="1"/>
           </p:cNvSpPr>
@@ -26866,7 +26873,7 @@
     </p:spTree>
     <p:extLst>
       <p:ext uri="{BB962C8B-B14F-4D97-AF65-F5344CB8AC3E}">
-        <p14:creationId xmlns:p14="http://schemas.microsoft.com/office/powerpoint/2010/main" val="3984500910"/>
+        <p14:creationId xmlns:p14="http://schemas.microsoft.com/office/powerpoint/2010/main" val="1785437508"/>
       </p:ext>
     </p:extLst>
   </p:cSld>

</xml_diff>

<commit_message>
Add reference to hpccm
</commit_message>
<xml_diff>
--- a/singularity.pptx
+++ b/singularity.pptx
@@ -26057,14 +26057,33 @@
           </a:p>
           <a:p>
             <a:r>
-              <a:rPr lang="en-US" dirty="0" err="1">
-                <a:hlinkClick r:id="rId4"/>
-              </a:rPr>
-              <a:t>HPCWired</a:t>
-            </a:r>
+              <a:rPr lang="en-US" dirty="0" err="1"/>
+              <a:t>hpccm</a:t>
+            </a:r>
+            <a:br>
+              <a:rPr lang="en-US" dirty="0"/>
+            </a:br>
             <a:r>
               <a:rPr lang="en-US" dirty="0">
                 <a:hlinkClick r:id="rId4"/>
+              </a:rPr>
+              <a:t>https://github.com/NVIDIA/hpc-container-maker</a:t>
+            </a:r>
+            <a:r>
+              <a:rPr lang="en-US" dirty="0"/>
+              <a:t> </a:t>
+            </a:r>
+          </a:p>
+          <a:p>
+            <a:r>
+              <a:rPr lang="en-US" dirty="0" err="1">
+                <a:hlinkClick r:id="rId5"/>
+              </a:rPr>
+              <a:t>HPCWired</a:t>
+            </a:r>
+            <a:r>
+              <a:rPr lang="en-US" dirty="0">
+                <a:hlinkClick r:id="rId5"/>
               </a:rPr>
               <a:t> article</a:t>
             </a:r>

</xml_diff>

<commit_message>
Fix illusion that current working directory is bound
If the current working directory is a subdirectory of an overlay directory, the container's current working directory will be identical.  If not it will the the home directory.
If you bind a parent directory of the current working directory, your container will still start there.
</commit_message>
<xml_diff>
--- a/singularity.pptx
+++ b/singularity.pptx
@@ -348,7 +348,7 @@
           <a:p>
             <a:fld id="{6BD974B4-F374-4E74-84D3-1EB7DBF32A2A}" type="datetimeFigureOut">
               <a:rPr lang="nl-BE" smtClean="0"/>
-              <a:t>9/11/2022</a:t>
+              <a:t>18/11/2022</a:t>
             </a:fld>
             <a:endParaRPr lang="nl-BE"/>
           </a:p>
@@ -831,7 +831,7 @@
           <a:p>
             <a:fld id="{A433E747-842D-4EF3-8202-AC54FEC33061}" type="datetime1">
               <a:rPr lang="nl-BE" smtClean="0"/>
-              <a:t>9/11/2022</a:t>
+              <a:t>18/11/2022</a:t>
             </a:fld>
             <a:endParaRPr lang="nl-BE"/>
           </a:p>
@@ -1001,7 +1001,7 @@
           <a:p>
             <a:fld id="{7C821354-3381-4DF5-ABED-FDAFA2BAD3F8}" type="datetime1">
               <a:rPr lang="nl-BE" smtClean="0"/>
-              <a:t>9/11/2022</a:t>
+              <a:t>18/11/2022</a:t>
             </a:fld>
             <a:endParaRPr lang="nl-BE"/>
           </a:p>
@@ -1181,7 +1181,7 @@
           <a:p>
             <a:fld id="{C6B54B95-9964-4BBF-B171-A69413AB9FC5}" type="datetime1">
               <a:rPr lang="nl-BE" smtClean="0"/>
-              <a:t>9/11/2022</a:t>
+              <a:t>18/11/2022</a:t>
             </a:fld>
             <a:endParaRPr lang="nl-BE"/>
           </a:p>
@@ -1351,7 +1351,7 @@
           <a:p>
             <a:fld id="{BE45CDE5-064C-4862-90E9-83B8FD778625}" type="datetime1">
               <a:rPr lang="nl-BE" smtClean="0"/>
-              <a:t>9/11/2022</a:t>
+              <a:t>18/11/2022</a:t>
             </a:fld>
             <a:endParaRPr lang="nl-BE"/>
           </a:p>
@@ -1595,7 +1595,7 @@
           <a:p>
             <a:fld id="{C75A345C-628E-463E-B8F7-69C25D344DF5}" type="datetime1">
               <a:rPr lang="nl-BE" smtClean="0"/>
-              <a:t>9/11/2022</a:t>
+              <a:t>18/11/2022</a:t>
             </a:fld>
             <a:endParaRPr lang="nl-BE"/>
           </a:p>
@@ -1827,7 +1827,7 @@
           <a:p>
             <a:fld id="{65B04534-538C-4249-A635-8BB2B8486464}" type="datetime1">
               <a:rPr lang="nl-BE" smtClean="0"/>
-              <a:t>9/11/2022</a:t>
+              <a:t>18/11/2022</a:t>
             </a:fld>
             <a:endParaRPr lang="nl-BE"/>
           </a:p>
@@ -2194,7 +2194,7 @@
           <a:p>
             <a:fld id="{089671CB-8547-4C91-A3D5-012E6E8790E6}" type="datetime1">
               <a:rPr lang="nl-BE" smtClean="0"/>
-              <a:t>9/11/2022</a:t>
+              <a:t>18/11/2022</a:t>
             </a:fld>
             <a:endParaRPr lang="nl-BE"/>
           </a:p>
@@ -2312,7 +2312,7 @@
           <a:p>
             <a:fld id="{5765335F-FC99-4A2B-B87B-6AF6F3762B67}" type="datetime1">
               <a:rPr lang="nl-BE" smtClean="0"/>
-              <a:t>9/11/2022</a:t>
+              <a:t>18/11/2022</a:t>
             </a:fld>
             <a:endParaRPr lang="nl-BE"/>
           </a:p>
@@ -2407,7 +2407,7 @@
           <a:p>
             <a:fld id="{1711BA58-B677-4D21-BDCD-9DD1AEA8A328}" type="datetime1">
               <a:rPr lang="nl-BE" smtClean="0"/>
-              <a:t>9/11/2022</a:t>
+              <a:t>18/11/2022</a:t>
             </a:fld>
             <a:endParaRPr lang="nl-BE"/>
           </a:p>
@@ -2684,7 +2684,7 @@
           <a:p>
             <a:fld id="{5513BE8B-B89C-461B-89D1-D5BE33ADB6B9}" type="datetime1">
               <a:rPr lang="nl-BE" smtClean="0"/>
-              <a:t>9/11/2022</a:t>
+              <a:t>18/11/2022</a:t>
             </a:fld>
             <a:endParaRPr lang="nl-BE"/>
           </a:p>
@@ -2941,7 +2941,7 @@
           <a:p>
             <a:fld id="{AEE65485-0554-4482-9B9C-289893A0B56B}" type="datetime1">
               <a:rPr lang="nl-BE" smtClean="0"/>
-              <a:t>9/11/2022</a:t>
+              <a:t>18/11/2022</a:t>
             </a:fld>
             <a:endParaRPr lang="nl-BE"/>
           </a:p>
@@ -3154,7 +3154,7 @@
           <a:p>
             <a:fld id="{6FF26CEC-AF8A-4096-9A53-521F7571A055}" type="datetime1">
               <a:rPr lang="nl-BE" smtClean="0"/>
-              <a:t>9/11/2022</a:t>
+              <a:t>18/11/2022</a:t>
             </a:fld>
             <a:endParaRPr lang="nl-BE"/>
           </a:p>
@@ -14316,13 +14316,6 @@
           <a:p>
             <a:pPr lvl="1"/>
             <a:r>
-              <a:rPr lang="en-US" dirty="0"/>
-              <a:t>Current working directory</a:t>
-            </a:r>
-          </a:p>
-          <a:p>
-            <a:pPr lvl="1"/>
-            <a:r>
               <a:rPr lang="en-US" dirty="0">
                 <a:latin typeface="Courier New" panose="02070309020205020404" pitchFamily="49" charset="0"/>
                 <a:cs typeface="Courier New" panose="02070309020205020404" pitchFamily="49" charset="0"/>
@@ -14347,21 +14340,7 @@
                 <a:latin typeface="Courier New" panose="02070309020205020404" pitchFamily="49" charset="0"/>
                 <a:cs typeface="Courier New" panose="02070309020205020404" pitchFamily="49" charset="0"/>
               </a:rPr>
-              <a:t>/</a:t>
-            </a:r>
-            <a:r>
-              <a:rPr lang="en-US" dirty="0" err="1">
-                <a:latin typeface="Courier New" panose="02070309020205020404" pitchFamily="49" charset="0"/>
-                <a:cs typeface="Courier New" panose="02070309020205020404" pitchFamily="49" charset="0"/>
-              </a:rPr>
-              <a:t>var</a:t>
-            </a:r>
-            <a:r>
-              <a:rPr lang="en-US" dirty="0">
-                <a:latin typeface="Courier New" panose="02070309020205020404" pitchFamily="49" charset="0"/>
-                <a:cs typeface="Courier New" panose="02070309020205020404" pitchFamily="49" charset="0"/>
-              </a:rPr>
-              <a:t>/</a:t>
+              <a:t>/var/</a:t>
             </a:r>
             <a:r>
               <a:rPr lang="en-US" dirty="0" err="1">
@@ -14550,7 +14529,7 @@
         <p:spPr>
           <a:xfrm>
             <a:off x="693966" y="5722185"/>
-            <a:ext cx="5147563" cy="369332"/>
+            <a:ext cx="7629012" cy="369332"/>
           </a:xfrm>
           <a:prstGeom prst="rect">
             <a:avLst/>
@@ -14560,7 +14539,7 @@
           </a:solidFill>
         </p:spPr>
         <p:txBody>
-          <a:bodyPr wrap="none" rtlCol="0">
+          <a:bodyPr wrap="square" rtlCol="0">
             <a:spAutoFit/>
           </a:bodyPr>
           <a:lstStyle/>
@@ -14840,15 +14819,33 @@
                                   </p:childTnLst>
                                 </p:cTn>
                               </p:par>
+                            </p:childTnLst>
+                          </p:cTn>
+                        </p:par>
+                      </p:childTnLst>
+                    </p:cTn>
+                  </p:par>
+                  <p:par>
+                    <p:cTn id="17" fill="hold">
+                      <p:stCondLst>
+                        <p:cond delay="indefinite"/>
+                      </p:stCondLst>
+                      <p:childTnLst>
+                        <p:par>
+                          <p:cTn id="18" fill="hold">
+                            <p:stCondLst>
+                              <p:cond delay="0"/>
+                            </p:stCondLst>
+                            <p:childTnLst>
                               <p:par>
-                                <p:cTn id="17" presetID="1" presetClass="entr" presetSubtype="0" fill="hold" grpId="0" nodeType="withEffect">
+                                <p:cTn id="19" presetID="1" presetClass="entr" presetSubtype="0" fill="hold" grpId="0" nodeType="clickEffect">
                                   <p:stCondLst>
                                     <p:cond delay="0"/>
                                   </p:stCondLst>
                                   <p:childTnLst>
                                     <p:set>
                                       <p:cBhvr>
-                                        <p:cTn id="18" dur="1" fill="hold">
+                                        <p:cTn id="20" dur="1" fill="hold">
                                           <p:stCondLst>
                                             <p:cond delay="0"/>
                                           </p:stCondLst>
@@ -14871,26 +14868,8 @@
                                   </p:childTnLst>
                                 </p:cTn>
                               </p:par>
-                            </p:childTnLst>
-                          </p:cTn>
-                        </p:par>
-                      </p:childTnLst>
-                    </p:cTn>
-                  </p:par>
-                  <p:par>
-                    <p:cTn id="19" fill="hold">
-                      <p:stCondLst>
-                        <p:cond delay="indefinite"/>
-                      </p:stCondLst>
-                      <p:childTnLst>
-                        <p:par>
-                          <p:cTn id="20" fill="hold">
-                            <p:stCondLst>
-                              <p:cond delay="0"/>
-                            </p:stCondLst>
-                            <p:childTnLst>
                               <p:par>
-                                <p:cTn id="21" presetID="1" presetClass="entr" presetSubtype="0" fill="hold" grpId="0" nodeType="clickEffect">
+                                <p:cTn id="21" presetID="1" presetClass="entr" presetSubtype="0" fill="hold" grpId="0" nodeType="withEffect">
                                   <p:stCondLst>
                                     <p:cond delay="0"/>
                                   </p:stCondLst>
@@ -14898,37 +14877,6 @@
                                     <p:set>
                                       <p:cBhvr>
                                         <p:cTn id="22" dur="1" fill="hold">
-                                          <p:stCondLst>
-                                            <p:cond delay="0"/>
-                                          </p:stCondLst>
-                                        </p:cTn>
-                                        <p:tgtEl>
-                                          <p:spTgt spid="3">
-                                            <p:txEl>
-                                              <p:pRg st="6" end="6"/>
-                                            </p:txEl>
-                                          </p:spTgt>
-                                        </p:tgtEl>
-                                        <p:attrNameLst>
-                                          <p:attrName>style.visibility</p:attrName>
-                                        </p:attrNameLst>
-                                      </p:cBhvr>
-                                      <p:to>
-                                        <p:strVal val="visible"/>
-                                      </p:to>
-                                    </p:set>
-                                  </p:childTnLst>
-                                </p:cTn>
-                              </p:par>
-                              <p:par>
-                                <p:cTn id="23" presetID="1" presetClass="entr" presetSubtype="0" fill="hold" grpId="0" nodeType="withEffect">
-                                  <p:stCondLst>
-                                    <p:cond delay="0"/>
-                                  </p:stCondLst>
-                                  <p:childTnLst>
-                                    <p:set>
-                                      <p:cBhvr>
-                                        <p:cTn id="24" dur="1" fill="hold">
                                           <p:stCondLst>
                                             <p:cond delay="0"/>
                                           </p:stCondLst>
@@ -14954,26 +14902,26 @@
                     </p:cTn>
                   </p:par>
                   <p:par>
-                    <p:cTn id="25" fill="hold">
+                    <p:cTn id="23" fill="hold">
                       <p:stCondLst>
                         <p:cond delay="indefinite"/>
                       </p:stCondLst>
                       <p:childTnLst>
                         <p:par>
-                          <p:cTn id="26" fill="hold">
+                          <p:cTn id="24" fill="hold">
                             <p:stCondLst>
                               <p:cond delay="0"/>
                             </p:stCondLst>
                             <p:childTnLst>
                               <p:par>
-                                <p:cTn id="27" presetID="1" presetClass="entr" presetSubtype="0" fill="hold" grpId="0" nodeType="clickEffect">
+                                <p:cTn id="25" presetID="1" presetClass="entr" presetSubtype="0" fill="hold" grpId="0" nodeType="clickEffect">
                                   <p:stCondLst>
                                     <p:cond delay="0"/>
                                   </p:stCondLst>
                                   <p:childTnLst>
                                     <p:set>
                                       <p:cBhvr>
-                                        <p:cTn id="28" dur="1" fill="hold">
+                                        <p:cTn id="26" dur="1" fill="hold">
                                           <p:stCondLst>
                                             <p:cond delay="0"/>
                                           </p:stCondLst>
@@ -16091,7 +16039,11 @@
             <a:pPr lvl="1"/>
             <a:r>
               <a:rPr lang="en-US" dirty="0"/>
-              <a:t>where image is executed</a:t>
+              <a:t>where image is executed </a:t>
+            </a:r>
+            <a:r>
+              <a:rPr lang="en-US" i="1" dirty="0"/>
+              <a:t>if in parent overlay directory</a:t>
             </a:r>
           </a:p>
           <a:p>
@@ -16110,14 +16062,7 @@
           <a:p>
             <a:r>
               <a:rPr lang="en-US" dirty="0"/>
-              <a:t>Additional bindings</a:t>
-            </a:r>
-          </a:p>
-          <a:p>
-            <a:pPr lvl="1"/>
-            <a:r>
-              <a:rPr lang="en-US" dirty="0"/>
-              <a:t>command line option:</a:t>
+              <a:t>Additional bindings, command line option:</a:t>
             </a:r>
             <a:br>
               <a:rPr lang="en-US" dirty="0"/>
@@ -16148,7 +16093,7 @@
             <a:pPr lvl="1"/>
             <a:r>
               <a:rPr lang="en-US" dirty="0"/>
-              <a:t>e.g., </a:t>
+              <a:t>e.g.,   </a:t>
             </a:r>
             <a:r>
               <a:rPr lang="en-US" dirty="0">
@@ -16170,6 +16115,19 @@
                 <a:cs typeface="Courier New" panose="02070309020205020404" pitchFamily="49" charset="0"/>
               </a:rPr>
               <a:t>/data</a:t>
+            </a:r>
+            <a:br>
+              <a:rPr lang="en-US" dirty="0">
+                <a:latin typeface="Courier New" panose="02070309020205020404" pitchFamily="49" charset="0"/>
+                <a:cs typeface="Courier New" panose="02070309020205020404" pitchFamily="49" charset="0"/>
+              </a:rPr>
+            </a:br>
+            <a:r>
+              <a:rPr lang="en-US" dirty="0">
+                <a:latin typeface="Courier New" panose="02070309020205020404" pitchFamily="49" charset="0"/>
+                <a:cs typeface="Courier New" panose="02070309020205020404" pitchFamily="49" charset="0"/>
+              </a:rPr>
+              <a:t>    -B $VSC_DATA</a:t>
             </a:r>
           </a:p>
           <a:p>
@@ -16536,37 +16494,6 @@
                                           <p:spTgt spid="3">
                                             <p:txEl>
                                               <p:pRg st="7" end="7"/>
-                                            </p:txEl>
-                                          </p:spTgt>
-                                        </p:tgtEl>
-                                        <p:attrNameLst>
-                                          <p:attrName>style.visibility</p:attrName>
-                                        </p:attrNameLst>
-                                      </p:cBhvr>
-                                      <p:to>
-                                        <p:strVal val="visible"/>
-                                      </p:to>
-                                    </p:set>
-                                  </p:childTnLst>
-                                </p:cTn>
-                              </p:par>
-                              <p:par>
-                                <p:cTn id="25" presetID="1" presetClass="entr" presetSubtype="0" fill="hold" grpId="0" nodeType="withEffect">
-                                  <p:stCondLst>
-                                    <p:cond delay="0"/>
-                                  </p:stCondLst>
-                                  <p:childTnLst>
-                                    <p:set>
-                                      <p:cBhvr>
-                                        <p:cTn id="26" dur="1" fill="hold">
-                                          <p:stCondLst>
-                                            <p:cond delay="0"/>
-                                          </p:stCondLst>
-                                        </p:cTn>
-                                        <p:tgtEl>
-                                          <p:spTgt spid="3">
-                                            <p:txEl>
-                                              <p:pRg st="8" end="8"/>
                                             </p:txEl>
                                           </p:spTgt>
                                         </p:tgtEl>

</xml_diff>